<commit_message>
Still working :( Wanna sleep.
</commit_message>
<xml_diff>
--- a/diploma/trunk/ppt/kostyukov.pptx
+++ b/diploma/trunk/ppt/kostyukov.pptx
@@ -4286,13 +4286,7 @@
               <a:rPr lang="ru-RU" sz="2000" dirty="0" smtClean="0">
                 <a:latin typeface="Calibri" pitchFamily="34" charset="0"/>
               </a:rPr>
-              <a:t>Службы</a:t>
-            </a:r>
-            <a:r>
-              <a:rPr lang="ru-RU" sz="2000" dirty="0" smtClean="0">
-                <a:latin typeface="Calibri" pitchFamily="34" charset="0"/>
-              </a:rPr>
-              <a:t>,</a:t>
+              <a:t>Службы,</a:t>
             </a:r>
             <a:r>
               <a:rPr lang="en-US" sz="2000" dirty="0" smtClean="0">
@@ -4677,53 +4671,6 @@
       </p:grpSpPr>
       <p:sp>
         <p:nvSpPr>
-          <p:cNvPr id="12290" name="Text Box 5"/>
-          <p:cNvSpPr txBox="1">
-            <a:spLocks noChangeArrowheads="1"/>
-          </p:cNvSpPr>
-          <p:nvPr/>
-        </p:nvSpPr>
-        <p:spPr bwMode="auto">
-          <a:xfrm>
-            <a:off x="450850" y="7263261"/>
-            <a:ext cx="2200275" cy="190052"/>
-          </a:xfrm>
-          <a:prstGeom prst="rect">
-            <a:avLst/>
-          </a:prstGeom>
-          <a:noFill/>
-          <a:ln w="9525">
-            <a:noFill/>
-            <a:miter lim="800000"/>
-            <a:headEnd/>
-            <a:tailEnd/>
-          </a:ln>
-        </p:spPr>
-        <p:txBody>
-          <a:bodyPr lIns="0" tIns="0" rIns="0" bIns="0" anchor="b">
-            <a:spAutoFit/>
-          </a:bodyPr>
-          <a:lstStyle/>
-          <a:p>
-            <a:pPr>
-              <a:lnSpc>
-                <a:spcPct val="95000"/>
-              </a:lnSpc>
-            </a:pPr>
-            <a:r>
-              <a:rPr lang="en-US" sz="1300" dirty="0" smtClean="0">
-                <a:solidFill>
-                  <a:srgbClr val="045C75"/>
-                </a:solidFill>
-                <a:latin typeface="Arial" charset="0"/>
-              </a:rPr>
-              <a:t>DICR’2010</a:t>
-            </a:r>
-          </a:p>
-        </p:txBody>
-      </p:sp>
-      <p:sp>
-        <p:nvSpPr>
           <p:cNvPr id="12294" name="TextBox 13"/>
           <p:cNvSpPr txBox="1">
             <a:spLocks noChangeArrowheads="1"/>
@@ -4953,53 +4900,6 @@
       </p:grpSpPr>
       <p:sp>
         <p:nvSpPr>
-          <p:cNvPr id="12290" name="Text Box 5"/>
-          <p:cNvSpPr txBox="1">
-            <a:spLocks noChangeArrowheads="1"/>
-          </p:cNvSpPr>
-          <p:nvPr/>
-        </p:nvSpPr>
-        <p:spPr bwMode="auto">
-          <a:xfrm>
-            <a:off x="450850" y="7263261"/>
-            <a:ext cx="2200275" cy="190052"/>
-          </a:xfrm>
-          <a:prstGeom prst="rect">
-            <a:avLst/>
-          </a:prstGeom>
-          <a:noFill/>
-          <a:ln w="9525">
-            <a:noFill/>
-            <a:miter lim="800000"/>
-            <a:headEnd/>
-            <a:tailEnd/>
-          </a:ln>
-        </p:spPr>
-        <p:txBody>
-          <a:bodyPr lIns="0" tIns="0" rIns="0" bIns="0" anchor="b">
-            <a:spAutoFit/>
-          </a:bodyPr>
-          <a:lstStyle/>
-          <a:p>
-            <a:pPr>
-              <a:lnSpc>
-                <a:spcPct val="95000"/>
-              </a:lnSpc>
-            </a:pPr>
-            <a:r>
-              <a:rPr lang="en-US" sz="1300" dirty="0" smtClean="0">
-                <a:solidFill>
-                  <a:srgbClr val="045C75"/>
-                </a:solidFill>
-                <a:latin typeface="Arial" charset="0"/>
-              </a:rPr>
-              <a:t>DICR’2010</a:t>
-            </a:r>
-          </a:p>
-        </p:txBody>
-      </p:sp>
-      <p:sp>
-        <p:nvSpPr>
           <p:cNvPr id="17" name="Rectangle 1"/>
           <p:cNvSpPr txBox="1">
             <a:spLocks noChangeArrowheads="1"/>
@@ -5141,6 +5041,102 @@
           </a:prstGeom>
         </p:spPr>
       </p:pic>
+      <p:sp>
+        <p:nvSpPr>
+          <p:cNvPr id="6" name="TextBox 13"/>
+          <p:cNvSpPr txBox="1">
+            <a:spLocks noChangeArrowheads="1"/>
+          </p:cNvSpPr>
+          <p:nvPr/>
+        </p:nvSpPr>
+        <p:spPr bwMode="auto">
+          <a:xfrm>
+            <a:off x="327472" y="2297832"/>
+            <a:ext cx="4176464" cy="1631216"/>
+          </a:xfrm>
+          <a:prstGeom prst="rect">
+            <a:avLst/>
+          </a:prstGeom>
+          <a:noFill/>
+          <a:ln w="9525">
+            <a:noFill/>
+            <a:miter lim="800000"/>
+            <a:headEnd/>
+            <a:tailEnd/>
+          </a:ln>
+        </p:spPr>
+        <p:txBody>
+          <a:bodyPr wrap="square">
+            <a:spAutoFit/>
+          </a:bodyPr>
+          <a:lstStyle/>
+          <a:p>
+            <a:r>
+              <a:rPr lang="ru-RU" sz="2000" b="1" dirty="0" smtClean="0">
+                <a:latin typeface="Calibri" pitchFamily="34" charset="0"/>
+              </a:rPr>
+              <a:t>Ядро </a:t>
+            </a:r>
+            <a:r>
+              <a:rPr lang="ru-RU" sz="2000" dirty="0" smtClean="0">
+                <a:latin typeface="Calibri" pitchFamily="34" charset="0"/>
+              </a:rPr>
+              <a:t>реализует базовую программную платформу в рамках которой запускаются и функционируют основные подсистемы службы; </a:t>
+            </a:r>
+            <a:endParaRPr lang="ru-RU" sz="2000" dirty="0">
+              <a:latin typeface="Calibri" pitchFamily="34" charset="0"/>
+            </a:endParaRPr>
+          </a:p>
+        </p:txBody>
+      </p:sp>
+      <p:sp>
+        <p:nvSpPr>
+          <p:cNvPr id="7" name="TextBox 13"/>
+          <p:cNvSpPr txBox="1">
+            <a:spLocks noChangeArrowheads="1"/>
+          </p:cNvSpPr>
+          <p:nvPr/>
+        </p:nvSpPr>
+        <p:spPr bwMode="auto">
+          <a:xfrm>
+            <a:off x="327472" y="4314056"/>
+            <a:ext cx="4176464" cy="707886"/>
+          </a:xfrm>
+          <a:prstGeom prst="rect">
+            <a:avLst/>
+          </a:prstGeom>
+          <a:noFill/>
+          <a:ln w="9525">
+            <a:noFill/>
+            <a:miter lim="800000"/>
+            <a:headEnd/>
+            <a:tailEnd/>
+          </a:ln>
+        </p:spPr>
+        <p:txBody>
+          <a:bodyPr wrap="square">
+            <a:spAutoFit/>
+          </a:bodyPr>
+          <a:lstStyle/>
+          <a:p>
+            <a:r>
+              <a:rPr lang="ru-RU" sz="2000" b="1" dirty="0" smtClean="0">
+                <a:latin typeface="Calibri" pitchFamily="34" charset="0"/>
+              </a:rPr>
+              <a:t>Ядро </a:t>
+            </a:r>
+            <a:r>
+              <a:rPr lang="ru-RU" sz="2000" dirty="0" smtClean="0">
+                <a:latin typeface="Calibri" pitchFamily="34" charset="0"/>
+              </a:rPr>
+              <a:t>реализует модель конечного автомата;</a:t>
+            </a:r>
+            <a:endParaRPr lang="ru-RU" sz="2000" dirty="0">
+              <a:latin typeface="Calibri" pitchFamily="34" charset="0"/>
+            </a:endParaRPr>
+          </a:p>
+        </p:txBody>
+      </p:sp>
     </p:spTree>
   </p:cSld>
   <p:clrMapOvr>
@@ -5185,53 +5181,6 @@
           <a:chExt cx="0" cy="0"/>
         </a:xfrm>
       </p:grpSpPr>
-      <p:sp>
-        <p:nvSpPr>
-          <p:cNvPr id="12290" name="Text Box 5"/>
-          <p:cNvSpPr txBox="1">
-            <a:spLocks noChangeArrowheads="1"/>
-          </p:cNvSpPr>
-          <p:nvPr/>
-        </p:nvSpPr>
-        <p:spPr bwMode="auto">
-          <a:xfrm>
-            <a:off x="450850" y="7263261"/>
-            <a:ext cx="2200275" cy="190052"/>
-          </a:xfrm>
-          <a:prstGeom prst="rect">
-            <a:avLst/>
-          </a:prstGeom>
-          <a:noFill/>
-          <a:ln w="9525">
-            <a:noFill/>
-            <a:miter lim="800000"/>
-            <a:headEnd/>
-            <a:tailEnd/>
-          </a:ln>
-        </p:spPr>
-        <p:txBody>
-          <a:bodyPr lIns="0" tIns="0" rIns="0" bIns="0" anchor="b">
-            <a:spAutoFit/>
-          </a:bodyPr>
-          <a:lstStyle/>
-          <a:p>
-            <a:pPr>
-              <a:lnSpc>
-                <a:spcPct val="95000"/>
-              </a:lnSpc>
-            </a:pPr>
-            <a:r>
-              <a:rPr lang="en-US" sz="1300" dirty="0" smtClean="0">
-                <a:solidFill>
-                  <a:srgbClr val="045C75"/>
-                </a:solidFill>
-                <a:latin typeface="Arial" charset="0"/>
-              </a:rPr>
-              <a:t>DICR’2010</a:t>
-            </a:r>
-          </a:p>
-        </p:txBody>
-      </p:sp>
       <p:sp>
         <p:nvSpPr>
           <p:cNvPr id="17" name="Rectangle 1"/>
@@ -5421,53 +5370,6 @@
       </p:grpSpPr>
       <p:sp>
         <p:nvSpPr>
-          <p:cNvPr id="12290" name="Text Box 5"/>
-          <p:cNvSpPr txBox="1">
-            <a:spLocks noChangeArrowheads="1"/>
-          </p:cNvSpPr>
-          <p:nvPr/>
-        </p:nvSpPr>
-        <p:spPr bwMode="auto">
-          <a:xfrm>
-            <a:off x="450850" y="7263261"/>
-            <a:ext cx="2200275" cy="190052"/>
-          </a:xfrm>
-          <a:prstGeom prst="rect">
-            <a:avLst/>
-          </a:prstGeom>
-          <a:noFill/>
-          <a:ln w="9525">
-            <a:noFill/>
-            <a:miter lim="800000"/>
-            <a:headEnd/>
-            <a:tailEnd/>
-          </a:ln>
-        </p:spPr>
-        <p:txBody>
-          <a:bodyPr lIns="0" tIns="0" rIns="0" bIns="0" anchor="b">
-            <a:spAutoFit/>
-          </a:bodyPr>
-          <a:lstStyle/>
-          <a:p>
-            <a:pPr>
-              <a:lnSpc>
-                <a:spcPct val="95000"/>
-              </a:lnSpc>
-            </a:pPr>
-            <a:r>
-              <a:rPr lang="en-US" sz="1300" dirty="0" smtClean="0">
-                <a:solidFill>
-                  <a:srgbClr val="045C75"/>
-                </a:solidFill>
-                <a:latin typeface="Arial" charset="0"/>
-              </a:rPr>
-              <a:t>DICR’2010</a:t>
-            </a:r>
-          </a:p>
-        </p:txBody>
-      </p:sp>
-      <p:sp>
-        <p:nvSpPr>
           <p:cNvPr id="17" name="Rectangle 1"/>
           <p:cNvSpPr txBox="1">
             <a:spLocks noChangeArrowheads="1"/>
@@ -6005,6 +5907,191 @@
           </a:p>
         </p:txBody>
       </p:sp>
+      <p:pic>
+        <p:nvPicPr>
+          <p:cNvPr id="5" name="Picture 4" descr="transport.png"/>
+          <p:cNvPicPr>
+            <a:picLocks noChangeAspect="1"/>
+          </p:cNvPicPr>
+          <p:nvPr/>
+        </p:nvPicPr>
+        <p:blipFill>
+          <a:blip r:embed="rId3" cstate="print"/>
+          <a:stretch>
+            <a:fillRect/>
+          </a:stretch>
+        </p:blipFill>
+        <p:spPr>
+          <a:xfrm>
+            <a:off x="39440" y="2369840"/>
+            <a:ext cx="5343525" cy="3771900"/>
+          </a:xfrm>
+          <a:prstGeom prst="rect">
+            <a:avLst/>
+          </a:prstGeom>
+        </p:spPr>
+      </p:pic>
+      <p:sp>
+        <p:nvSpPr>
+          <p:cNvPr id="6" name="TextBox 13"/>
+          <p:cNvSpPr txBox="1">
+            <a:spLocks noChangeArrowheads="1"/>
+          </p:cNvSpPr>
+          <p:nvPr/>
+        </p:nvSpPr>
+        <p:spPr bwMode="auto">
+          <a:xfrm>
+            <a:off x="5328592" y="2729880"/>
+            <a:ext cx="4791968" cy="2616101"/>
+          </a:xfrm>
+          <a:prstGeom prst="rect">
+            <a:avLst/>
+          </a:prstGeom>
+          <a:noFill/>
+          <a:ln w="9525">
+            <a:noFill/>
+            <a:miter lim="800000"/>
+            <a:headEnd/>
+            <a:tailEnd/>
+          </a:ln>
+        </p:spPr>
+        <p:txBody>
+          <a:bodyPr wrap="square">
+            <a:spAutoFit/>
+          </a:bodyPr>
+          <a:lstStyle/>
+          <a:p>
+            <a:r>
+              <a:rPr lang="ru-RU" sz="2200" b="1" dirty="0" smtClean="0">
+                <a:latin typeface="Calibri" pitchFamily="34" charset="0"/>
+              </a:rPr>
+              <a:t>Функции</a:t>
+            </a:r>
+            <a:r>
+              <a:rPr lang="ru-RU" sz="2200" dirty="0" smtClean="0">
+                <a:latin typeface="Calibri" pitchFamily="34" charset="0"/>
+              </a:rPr>
+              <a:t> транспортной подсистемы:</a:t>
+            </a:r>
+          </a:p>
+          <a:p>
+            <a:endParaRPr lang="ru-RU" sz="1000" dirty="0" smtClean="0">
+              <a:latin typeface="Calibri" pitchFamily="34" charset="0"/>
+            </a:endParaRPr>
+          </a:p>
+          <a:p>
+            <a:pPr>
+              <a:buFont typeface="Arial" pitchFamily="34" charset="0"/>
+              <a:buChar char="•"/>
+            </a:pPr>
+            <a:r>
+              <a:rPr lang="en-US" sz="2200" dirty="0" smtClean="0">
+                <a:latin typeface="Calibri" pitchFamily="34" charset="0"/>
+              </a:rPr>
+              <a:t> </a:t>
+            </a:r>
+            <a:r>
+              <a:rPr lang="ru-RU" sz="2200" dirty="0" smtClean="0">
+                <a:latin typeface="Calibri" pitchFamily="34" charset="0"/>
+              </a:rPr>
+              <a:t>управление сессиями;</a:t>
+            </a:r>
+          </a:p>
+          <a:p>
+            <a:pPr>
+              <a:buFont typeface="Arial" pitchFamily="34" charset="0"/>
+              <a:buChar char="•"/>
+            </a:pPr>
+            <a:r>
+              <a:rPr lang="ru-RU" sz="2200" dirty="0" smtClean="0">
+                <a:latin typeface="Calibri" pitchFamily="34" charset="0"/>
+              </a:rPr>
+              <a:t> </a:t>
+            </a:r>
+            <a:r>
+              <a:rPr lang="ru-RU" sz="2200" dirty="0" smtClean="0">
+                <a:latin typeface="Calibri" pitchFamily="34" charset="0"/>
+              </a:rPr>
+              <a:t>мониторинг сетевой активности;</a:t>
+            </a:r>
+          </a:p>
+          <a:p>
+            <a:pPr>
+              <a:buFont typeface="Arial" pitchFamily="34" charset="0"/>
+              <a:buChar char="•"/>
+            </a:pPr>
+            <a:r>
+              <a:rPr lang="ru-RU" sz="2200" dirty="0" smtClean="0">
+                <a:latin typeface="Calibri" pitchFamily="34" charset="0"/>
+              </a:rPr>
+              <a:t> </a:t>
+            </a:r>
+            <a:r>
+              <a:rPr lang="ru-RU" sz="2200" dirty="0" smtClean="0">
+                <a:latin typeface="Calibri" pitchFamily="34" charset="0"/>
+              </a:rPr>
+              <a:t>именование объектов;</a:t>
+            </a:r>
+          </a:p>
+          <a:p>
+            <a:pPr>
+              <a:buFont typeface="Arial" pitchFamily="34" charset="0"/>
+              <a:buChar char="•"/>
+            </a:pPr>
+            <a:r>
+              <a:rPr lang="ru-RU" sz="2200" dirty="0" smtClean="0">
+                <a:latin typeface="Calibri" pitchFamily="34" charset="0"/>
+              </a:rPr>
+              <a:t> </a:t>
+            </a:r>
+            <a:r>
+              <a:rPr lang="ru-RU" sz="2200" dirty="0" smtClean="0">
+                <a:latin typeface="Calibri" pitchFamily="34" charset="0"/>
+              </a:rPr>
+              <a:t>адресация;</a:t>
+            </a:r>
+          </a:p>
+          <a:p>
+            <a:pPr>
+              <a:buFont typeface="Arial" pitchFamily="34" charset="0"/>
+              <a:buChar char="•"/>
+            </a:pPr>
+            <a:r>
+              <a:rPr lang="ru-RU" sz="2200" dirty="0" smtClean="0">
+                <a:latin typeface="Calibri" pitchFamily="34" charset="0"/>
+              </a:rPr>
+              <a:t> </a:t>
+            </a:r>
+            <a:r>
+              <a:rPr lang="ru-RU" sz="2200" dirty="0" smtClean="0">
+                <a:latin typeface="Calibri" pitchFamily="34" charset="0"/>
+              </a:rPr>
+              <a:t>балансировка нагрузки;</a:t>
+            </a:r>
+          </a:p>
+          <a:p>
+            <a:pPr>
+              <a:buFont typeface="Arial" pitchFamily="34" charset="0"/>
+              <a:buChar char="•"/>
+            </a:pPr>
+            <a:r>
+              <a:rPr lang="ru-RU" sz="2200" dirty="0" smtClean="0">
+                <a:latin typeface="Calibri" pitchFamily="34" charset="0"/>
+              </a:rPr>
+              <a:t> </a:t>
+            </a:r>
+            <a:r>
+              <a:rPr lang="ru-RU" sz="2200" dirty="0" smtClean="0">
+                <a:latin typeface="Calibri" pitchFamily="34" charset="0"/>
+              </a:rPr>
+              <a:t>выбор лидеров;</a:t>
+            </a:r>
+            <a:endParaRPr lang="ru-RU" sz="2200" dirty="0">
+              <a:latin typeface="Calibri" pitchFamily="34" charset="0"/>
+            </a:endParaRPr>
+          </a:p>
+        </p:txBody>
+      </p:sp>
     </p:spTree>
   </p:cSld>
   <p:clrMapOvr>
@@ -6051,53 +6138,6 @@
       </p:grpSpPr>
       <p:sp>
         <p:nvSpPr>
-          <p:cNvPr id="12290" name="Text Box 5"/>
-          <p:cNvSpPr txBox="1">
-            <a:spLocks noChangeArrowheads="1"/>
-          </p:cNvSpPr>
-          <p:nvPr/>
-        </p:nvSpPr>
-        <p:spPr bwMode="auto">
-          <a:xfrm>
-            <a:off x="450850" y="7263261"/>
-            <a:ext cx="2200275" cy="190052"/>
-          </a:xfrm>
-          <a:prstGeom prst="rect">
-            <a:avLst/>
-          </a:prstGeom>
-          <a:noFill/>
-          <a:ln w="9525">
-            <a:noFill/>
-            <a:miter lim="800000"/>
-            <a:headEnd/>
-            <a:tailEnd/>
-          </a:ln>
-        </p:spPr>
-        <p:txBody>
-          <a:bodyPr lIns="0" tIns="0" rIns="0" bIns="0" anchor="b">
-            <a:spAutoFit/>
-          </a:bodyPr>
-          <a:lstStyle/>
-          <a:p>
-            <a:pPr>
-              <a:lnSpc>
-                <a:spcPct val="95000"/>
-              </a:lnSpc>
-            </a:pPr>
-            <a:r>
-              <a:rPr lang="en-US" sz="1300" dirty="0" smtClean="0">
-                <a:solidFill>
-                  <a:srgbClr val="045C75"/>
-                </a:solidFill>
-                <a:latin typeface="Arial" charset="0"/>
-              </a:rPr>
-              <a:t>DICR’2010</a:t>
-            </a:r>
-          </a:p>
-        </p:txBody>
-      </p:sp>
-      <p:sp>
-        <p:nvSpPr>
           <p:cNvPr id="17" name="Rectangle 1"/>
           <p:cNvSpPr txBox="1">
             <a:spLocks noChangeArrowheads="1"/>
@@ -6419,53 +6459,6 @@
       </p:grpSpPr>
       <p:sp>
         <p:nvSpPr>
-          <p:cNvPr id="12290" name="Text Box 5"/>
-          <p:cNvSpPr txBox="1">
-            <a:spLocks noChangeArrowheads="1"/>
-          </p:cNvSpPr>
-          <p:nvPr/>
-        </p:nvSpPr>
-        <p:spPr bwMode="auto">
-          <a:xfrm>
-            <a:off x="450850" y="7263261"/>
-            <a:ext cx="2200275" cy="190052"/>
-          </a:xfrm>
-          <a:prstGeom prst="rect">
-            <a:avLst/>
-          </a:prstGeom>
-          <a:noFill/>
-          <a:ln w="9525">
-            <a:noFill/>
-            <a:miter lim="800000"/>
-            <a:headEnd/>
-            <a:tailEnd/>
-          </a:ln>
-        </p:spPr>
-        <p:txBody>
-          <a:bodyPr lIns="0" tIns="0" rIns="0" bIns="0" anchor="b">
-            <a:spAutoFit/>
-          </a:bodyPr>
-          <a:lstStyle/>
-          <a:p>
-            <a:pPr>
-              <a:lnSpc>
-                <a:spcPct val="95000"/>
-              </a:lnSpc>
-            </a:pPr>
-            <a:r>
-              <a:rPr lang="en-US" sz="1300" dirty="0" smtClean="0">
-                <a:solidFill>
-                  <a:srgbClr val="045C75"/>
-                </a:solidFill>
-                <a:latin typeface="Arial" charset="0"/>
-              </a:rPr>
-              <a:t>DICR’2010</a:t>
-            </a:r>
-          </a:p>
-        </p:txBody>
-      </p:sp>
-      <p:sp>
-        <p:nvSpPr>
           <p:cNvPr id="17" name="Rectangle 1"/>
           <p:cNvSpPr txBox="1">
             <a:spLocks noChangeArrowheads="1"/>
@@ -6839,53 +6832,6 @@
       </p:grpSpPr>
       <p:sp>
         <p:nvSpPr>
-          <p:cNvPr id="12290" name="Text Box 5"/>
-          <p:cNvSpPr txBox="1">
-            <a:spLocks noChangeArrowheads="1"/>
-          </p:cNvSpPr>
-          <p:nvPr/>
-        </p:nvSpPr>
-        <p:spPr bwMode="auto">
-          <a:xfrm>
-            <a:off x="450850" y="7263261"/>
-            <a:ext cx="2200275" cy="190052"/>
-          </a:xfrm>
-          <a:prstGeom prst="rect">
-            <a:avLst/>
-          </a:prstGeom>
-          <a:noFill/>
-          <a:ln w="9525">
-            <a:noFill/>
-            <a:miter lim="800000"/>
-            <a:headEnd/>
-            <a:tailEnd/>
-          </a:ln>
-        </p:spPr>
-        <p:txBody>
-          <a:bodyPr lIns="0" tIns="0" rIns="0" bIns="0" anchor="b">
-            <a:spAutoFit/>
-          </a:bodyPr>
-          <a:lstStyle/>
-          <a:p>
-            <a:pPr>
-              <a:lnSpc>
-                <a:spcPct val="95000"/>
-              </a:lnSpc>
-            </a:pPr>
-            <a:r>
-              <a:rPr lang="en-US" sz="1300" dirty="0" smtClean="0">
-                <a:solidFill>
-                  <a:srgbClr val="045C75"/>
-                </a:solidFill>
-                <a:latin typeface="Arial" charset="0"/>
-              </a:rPr>
-              <a:t>DICR’2010</a:t>
-            </a:r>
-          </a:p>
-        </p:txBody>
-      </p:sp>
-      <p:sp>
-        <p:nvSpPr>
           <p:cNvPr id="17" name="Rectangle 1"/>
           <p:cNvSpPr txBox="1">
             <a:spLocks noChangeArrowheads="1"/>
@@ -7049,53 +6995,6 @@
       </p:grpSpPr>
       <p:sp>
         <p:nvSpPr>
-          <p:cNvPr id="12290" name="Text Box 5"/>
-          <p:cNvSpPr txBox="1">
-            <a:spLocks noChangeArrowheads="1"/>
-          </p:cNvSpPr>
-          <p:nvPr/>
-        </p:nvSpPr>
-        <p:spPr bwMode="auto">
-          <a:xfrm>
-            <a:off x="450850" y="7263261"/>
-            <a:ext cx="2200275" cy="190052"/>
-          </a:xfrm>
-          <a:prstGeom prst="rect">
-            <a:avLst/>
-          </a:prstGeom>
-          <a:noFill/>
-          <a:ln w="9525">
-            <a:noFill/>
-            <a:miter lim="800000"/>
-            <a:headEnd/>
-            <a:tailEnd/>
-          </a:ln>
-        </p:spPr>
-        <p:txBody>
-          <a:bodyPr lIns="0" tIns="0" rIns="0" bIns="0" anchor="b">
-            <a:spAutoFit/>
-          </a:bodyPr>
-          <a:lstStyle/>
-          <a:p>
-            <a:pPr>
-              <a:lnSpc>
-                <a:spcPct val="95000"/>
-              </a:lnSpc>
-            </a:pPr>
-            <a:r>
-              <a:rPr lang="en-US" sz="1300" dirty="0" smtClean="0">
-                <a:solidFill>
-                  <a:srgbClr val="045C75"/>
-                </a:solidFill>
-                <a:latin typeface="Arial" charset="0"/>
-              </a:rPr>
-              <a:t>DICR’2010</a:t>
-            </a:r>
-          </a:p>
-        </p:txBody>
-      </p:sp>
-      <p:sp>
-        <p:nvSpPr>
           <p:cNvPr id="17" name="Rectangle 1"/>
           <p:cNvSpPr txBox="1">
             <a:spLocks noChangeArrowheads="1"/>
@@ -7259,53 +7158,6 @@
       </p:grpSpPr>
       <p:sp>
         <p:nvSpPr>
-          <p:cNvPr id="12290" name="Text Box 5"/>
-          <p:cNvSpPr txBox="1">
-            <a:spLocks noChangeArrowheads="1"/>
-          </p:cNvSpPr>
-          <p:nvPr/>
-        </p:nvSpPr>
-        <p:spPr bwMode="auto">
-          <a:xfrm>
-            <a:off x="450850" y="7263261"/>
-            <a:ext cx="2200275" cy="190052"/>
-          </a:xfrm>
-          <a:prstGeom prst="rect">
-            <a:avLst/>
-          </a:prstGeom>
-          <a:noFill/>
-          <a:ln w="9525">
-            <a:noFill/>
-            <a:miter lim="800000"/>
-            <a:headEnd/>
-            <a:tailEnd/>
-          </a:ln>
-        </p:spPr>
-        <p:txBody>
-          <a:bodyPr lIns="0" tIns="0" rIns="0" bIns="0" anchor="b">
-            <a:spAutoFit/>
-          </a:bodyPr>
-          <a:lstStyle/>
-          <a:p>
-            <a:pPr>
-              <a:lnSpc>
-                <a:spcPct val="95000"/>
-              </a:lnSpc>
-            </a:pPr>
-            <a:r>
-              <a:rPr lang="en-US" sz="1300" dirty="0" smtClean="0">
-                <a:solidFill>
-                  <a:srgbClr val="045C75"/>
-                </a:solidFill>
-                <a:latin typeface="Arial" charset="0"/>
-              </a:rPr>
-              <a:t>DICR’2010</a:t>
-            </a:r>
-          </a:p>
-        </p:txBody>
-      </p:sp>
-      <p:sp>
-        <p:nvSpPr>
           <p:cNvPr id="17" name="Rectangle 1"/>
           <p:cNvSpPr txBox="1">
             <a:spLocks noChangeArrowheads="1"/>
@@ -7679,53 +7531,6 @@
       </p:grpSpPr>
       <p:sp>
         <p:nvSpPr>
-          <p:cNvPr id="12290" name="Text Box 5"/>
-          <p:cNvSpPr txBox="1">
-            <a:spLocks noChangeArrowheads="1"/>
-          </p:cNvSpPr>
-          <p:nvPr/>
-        </p:nvSpPr>
-        <p:spPr bwMode="auto">
-          <a:xfrm>
-            <a:off x="450850" y="7263261"/>
-            <a:ext cx="2200275" cy="190052"/>
-          </a:xfrm>
-          <a:prstGeom prst="rect">
-            <a:avLst/>
-          </a:prstGeom>
-          <a:noFill/>
-          <a:ln w="9525">
-            <a:noFill/>
-            <a:miter lim="800000"/>
-            <a:headEnd/>
-            <a:tailEnd/>
-          </a:ln>
-        </p:spPr>
-        <p:txBody>
-          <a:bodyPr lIns="0" tIns="0" rIns="0" bIns="0" anchor="b">
-            <a:spAutoFit/>
-          </a:bodyPr>
-          <a:lstStyle/>
-          <a:p>
-            <a:pPr>
-              <a:lnSpc>
-                <a:spcPct val="95000"/>
-              </a:lnSpc>
-            </a:pPr>
-            <a:r>
-              <a:rPr lang="en-US" sz="1300" dirty="0" smtClean="0">
-                <a:solidFill>
-                  <a:srgbClr val="045C75"/>
-                </a:solidFill>
-                <a:latin typeface="Arial" charset="0"/>
-              </a:rPr>
-              <a:t>DICR’2010</a:t>
-            </a:r>
-          </a:p>
-        </p:txBody>
-      </p:sp>
-      <p:sp>
-        <p:nvSpPr>
           <p:cNvPr id="17" name="Rectangle 1"/>
           <p:cNvSpPr txBox="1">
             <a:spLocks noChangeArrowheads="1"/>
@@ -8033,25 +7838,7 @@
               <a:rPr lang="ru-RU" sz="2200" dirty="0" smtClean="0">
                 <a:latin typeface="Calibri" pitchFamily="34" charset="0"/>
               </a:rPr>
-              <a:t> </a:t>
-            </a:r>
-            <a:r>
-              <a:rPr lang="ru-RU" sz="2200" dirty="0" smtClean="0">
-                <a:latin typeface="Calibri" pitchFamily="34" charset="0"/>
-              </a:rPr>
-              <a:t>совершенствование </a:t>
-            </a:r>
-            <a:r>
-              <a:rPr lang="ru-RU" sz="2200" dirty="0" smtClean="0">
-                <a:latin typeface="Calibri" pitchFamily="34" charset="0"/>
-              </a:rPr>
-              <a:t>компонентов и оптимизация алгоритмов базовой </a:t>
-            </a:r>
-            <a:r>
-              <a:rPr lang="ru-RU" sz="2200" dirty="0" smtClean="0">
-                <a:latin typeface="Calibri" pitchFamily="34" charset="0"/>
-              </a:rPr>
-              <a:t>платформы;</a:t>
+              <a:t> совершенствование компонентов и оптимизация алгоритмов базовой платформы;</a:t>
             </a:r>
           </a:p>
           <a:p>
@@ -8072,19 +7859,7 @@
               <a:rPr lang="ru-RU" sz="2200" dirty="0" smtClean="0">
                 <a:latin typeface="Calibri" pitchFamily="34" charset="0"/>
               </a:rPr>
-              <a:t>  </a:t>
-            </a:r>
-            <a:r>
-              <a:rPr lang="ru-RU" sz="2200" dirty="0" smtClean="0">
-                <a:latin typeface="Calibri" pitchFamily="34" charset="0"/>
-              </a:rPr>
-              <a:t>полномасштабное </a:t>
-            </a:r>
-            <a:r>
-              <a:rPr lang="ru-RU" sz="2200" dirty="0" smtClean="0">
-                <a:latin typeface="Calibri" pitchFamily="34" charset="0"/>
-              </a:rPr>
-              <a:t>внедрение и нагрузочное тестирование системы на базе существующей инфраструктуры предприятия, например лаборатории МикроЭВМ АлтГТУ;</a:t>
+              <a:t>  полномасштабное внедрение и нагрузочное тестирование системы на базе существующей инфраструктуры предприятия, например лаборатории МикроЭВМ АлтГТУ;</a:t>
             </a:r>
             <a:endParaRPr lang="en-US" sz="2200" dirty="0">
               <a:latin typeface="Calibri" pitchFamily="34" charset="0"/>
@@ -9857,14 +9632,14 @@
           <a:lstStyle/>
           <a:p>
             <a:r>
-              <a:rPr lang="ru-RU" sz="2300">
+              <a:rPr lang="ru-RU" sz="2300" dirty="0">
                 <a:latin typeface="Calibri" pitchFamily="34" charset="0"/>
               </a:rPr>
               <a:t>Система исполнения модулей мониторинга реализует: </a:t>
             </a:r>
           </a:p>
           <a:p>
-            <a:endParaRPr lang="ru-RU" sz="1000">
+            <a:endParaRPr lang="ru-RU" sz="1000" dirty="0">
               <a:latin typeface="Calibri" pitchFamily="34" charset="0"/>
             </a:endParaRPr>
           </a:p>
@@ -9874,26 +9649,26 @@
               <a:buChar char="•"/>
             </a:pPr>
             <a:r>
-              <a:rPr lang="ru-RU" sz="2200">
+              <a:rPr lang="ru-RU" sz="2200" dirty="0">
                 <a:latin typeface="Calibri" pitchFamily="34" charset="0"/>
               </a:rPr>
               <a:t> генерацию </a:t>
             </a:r>
             <a:r>
-              <a:rPr lang="ru-RU" sz="2200" b="1">
+              <a:rPr lang="ru-RU" sz="2200" b="1" dirty="0">
                 <a:latin typeface="Calibri" pitchFamily="34" charset="0"/>
               </a:rPr>
               <a:t>кода каркаса</a:t>
             </a:r>
             <a:r>
-              <a:rPr lang="ru-RU" sz="2200">
+              <a:rPr lang="ru-RU" sz="2200" dirty="0">
                 <a:latin typeface="Calibri" pitchFamily="34" charset="0"/>
               </a:rPr>
               <a:t> модулей и их исполнение  в операционной  среде; </a:t>
             </a:r>
           </a:p>
           <a:p>
-            <a:endParaRPr lang="ru-RU" sz="1000">
+            <a:endParaRPr lang="ru-RU" sz="1000" dirty="0">
               <a:latin typeface="Calibri" pitchFamily="34" charset="0"/>
             </a:endParaRPr>
           </a:p>
@@ -9903,19 +9678,19 @@
               <a:buChar char="•"/>
             </a:pPr>
             <a:r>
-              <a:rPr lang="ru-RU" sz="2200">
+              <a:rPr lang="ru-RU" sz="2200" dirty="0">
                 <a:latin typeface="Calibri" pitchFamily="34" charset="0"/>
               </a:rPr>
               <a:t> </a:t>
             </a:r>
             <a:r>
-              <a:rPr lang="ru-RU" sz="2200" b="1">
+              <a:rPr lang="ru-RU" sz="2200" b="1" dirty="0">
                 <a:latin typeface="Calibri" pitchFamily="34" charset="0"/>
               </a:rPr>
               <a:t>промежуточный слой</a:t>
             </a:r>
             <a:r>
-              <a:rPr lang="ru-RU" sz="2200">
+              <a:rPr lang="ru-RU" sz="2200" dirty="0">
                 <a:latin typeface="Calibri" pitchFamily="34" charset="0"/>
               </a:rPr>
               <a:t> между модулем мониторинга и агентом, в </a:t>
@@ -9923,14 +9698,14 @@
           </a:p>
           <a:p>
             <a:r>
-              <a:rPr lang="ru-RU" sz="2200">
+              <a:rPr lang="ru-RU" sz="2200" dirty="0">
                 <a:latin typeface="Calibri" pitchFamily="34" charset="0"/>
               </a:rPr>
               <a:t>рамках  которого  он запускается;</a:t>
             </a:r>
           </a:p>
           <a:p>
-            <a:endParaRPr lang="ru-RU" sz="1000">
+            <a:endParaRPr lang="ru-RU" sz="1000" dirty="0">
               <a:latin typeface="Calibri" pitchFamily="34" charset="0"/>
             </a:endParaRPr>
           </a:p>
@@ -9940,19 +9715,19 @@
               <a:buChar char="•"/>
             </a:pPr>
             <a:r>
-              <a:rPr lang="ru-RU" sz="2200">
+              <a:rPr lang="ru-RU" sz="2200" dirty="0">
                 <a:latin typeface="Calibri" pitchFamily="34" charset="0"/>
               </a:rPr>
               <a:t> </a:t>
             </a:r>
             <a:r>
-              <a:rPr lang="ru-RU" sz="2200" b="1">
+              <a:rPr lang="ru-RU" sz="2200" b="1" dirty="0">
                 <a:latin typeface="Calibri" pitchFamily="34" charset="0"/>
               </a:rPr>
               <a:t>независимость</a:t>
             </a:r>
             <a:r>
-              <a:rPr lang="ru-RU" sz="2200">
+              <a:rPr lang="ru-RU" sz="2200" dirty="0">
                 <a:latin typeface="Calibri" pitchFamily="34" charset="0"/>
               </a:rPr>
               <a:t> программного кода модуля от физического расположения агентов (адресации, топологии сети);</a:t>

</xml_diff>

<commit_message>
Added new picture, new text.
</commit_message>
<xml_diff>
--- a/diploma/trunk/ppt/kostyukov.pptx
+++ b/diploma/trunk/ppt/kostyukov.pptx
@@ -6006,13 +6006,7 @@
               <a:rPr lang="ru-RU" sz="2200" dirty="0" smtClean="0">
                 <a:latin typeface="Calibri" pitchFamily="34" charset="0"/>
               </a:rPr>
-              <a:t> </a:t>
-            </a:r>
-            <a:r>
-              <a:rPr lang="ru-RU" sz="2200" dirty="0" smtClean="0">
-                <a:latin typeface="Calibri" pitchFamily="34" charset="0"/>
-              </a:rPr>
-              <a:t>мониторинг сетевой активности;</a:t>
+              <a:t> мониторинг сетевой активности;</a:t>
             </a:r>
           </a:p>
           <a:p>
@@ -6024,13 +6018,7 @@
               <a:rPr lang="ru-RU" sz="2200" dirty="0" smtClean="0">
                 <a:latin typeface="Calibri" pitchFamily="34" charset="0"/>
               </a:rPr>
-              <a:t> </a:t>
-            </a:r>
-            <a:r>
-              <a:rPr lang="ru-RU" sz="2200" dirty="0" smtClean="0">
-                <a:latin typeface="Calibri" pitchFamily="34" charset="0"/>
-              </a:rPr>
-              <a:t>именование объектов;</a:t>
+              <a:t> именование объектов;</a:t>
             </a:r>
           </a:p>
           <a:p>
@@ -6042,13 +6030,7 @@
               <a:rPr lang="ru-RU" sz="2200" dirty="0" smtClean="0">
                 <a:latin typeface="Calibri" pitchFamily="34" charset="0"/>
               </a:rPr>
-              <a:t> </a:t>
-            </a:r>
-            <a:r>
-              <a:rPr lang="ru-RU" sz="2200" dirty="0" smtClean="0">
-                <a:latin typeface="Calibri" pitchFamily="34" charset="0"/>
-              </a:rPr>
-              <a:t>адресация;</a:t>
+              <a:t> адресация;</a:t>
             </a:r>
           </a:p>
           <a:p>
@@ -6060,13 +6042,7 @@
               <a:rPr lang="ru-RU" sz="2200" dirty="0" smtClean="0">
                 <a:latin typeface="Calibri" pitchFamily="34" charset="0"/>
               </a:rPr>
-              <a:t> </a:t>
-            </a:r>
-            <a:r>
-              <a:rPr lang="ru-RU" sz="2200" dirty="0" smtClean="0">
-                <a:latin typeface="Calibri" pitchFamily="34" charset="0"/>
-              </a:rPr>
-              <a:t>балансировка нагрузки;</a:t>
+              <a:t> балансировка нагрузки;</a:t>
             </a:r>
           </a:p>
           <a:p>
@@ -6078,13 +6054,7 @@
               <a:rPr lang="ru-RU" sz="2200" dirty="0" smtClean="0">
                 <a:latin typeface="Calibri" pitchFamily="34" charset="0"/>
               </a:rPr>
-              <a:t> </a:t>
-            </a:r>
-            <a:r>
-              <a:rPr lang="ru-RU" sz="2200" dirty="0" smtClean="0">
-                <a:latin typeface="Calibri" pitchFamily="34" charset="0"/>
-              </a:rPr>
-              <a:t>выбор лидеров;</a:t>
+              <a:t> выбор лидеров;</a:t>
             </a:r>
             <a:endParaRPr lang="ru-RU" sz="2200" dirty="0">
               <a:latin typeface="Calibri" pitchFamily="34" charset="0"/>
@@ -6576,6 +6546,30 @@
           </a:p>
         </p:txBody>
       </p:sp>
+      <p:pic>
+        <p:nvPicPr>
+          <p:cNvPr id="4" name="Picture 3" descr="algo.png"/>
+          <p:cNvPicPr>
+            <a:picLocks noChangeAspect="1"/>
+          </p:cNvPicPr>
+          <p:nvPr/>
+        </p:nvPicPr>
+        <p:blipFill>
+          <a:blip r:embed="rId3" cstate="print"/>
+          <a:stretch>
+            <a:fillRect/>
+          </a:stretch>
+        </p:blipFill>
+        <p:spPr>
+          <a:xfrm>
+            <a:off x="6880200" y="2657872"/>
+            <a:ext cx="2324100" cy="2181225"/>
+          </a:xfrm>
+          <a:prstGeom prst="rect">
+            <a:avLst/>
+          </a:prstGeom>
+        </p:spPr>
+      </p:pic>
     </p:spTree>
   </p:cSld>
   <p:clrMapOvr>

</xml_diff>

<commit_message>
presentation was improved (new slide + new captions)
</commit_message>
<xml_diff>
--- a/diploma/trunk/ppt/kostyukov.pptx
+++ b/diploma/trunk/ppt/kostyukov.pptx
@@ -1,9 +1,15 @@
 
 <file path=ppt/presentation.xml><?xml version="1.0" encoding="utf-8"?>
-<p:presentation xmlns:a="http://schemas.openxmlformats.org/drawingml/2006/main" xmlns:r="http://schemas.openxmlformats.org/officeDocument/2006/relationships" xmlns:p="http://schemas.openxmlformats.org/presentationml/2006/main" saveSubsetFonts="1">
+<p:presentation xmlns:a="http://schemas.openxmlformats.org/drawingml/2006/main" xmlns:r="http://schemas.openxmlformats.org/officeDocument/2006/relationships" xmlns:p="http://schemas.openxmlformats.org/presentationml/2006/main" showSpecialPlsOnTitleSld="0" saveSubsetFonts="1">
   <p:sldMasterIdLst>
     <p:sldMasterId id="2147483648" r:id="rId1"/>
   </p:sldMasterIdLst>
+  <p:notesMasterIdLst>
+    <p:notesMasterId r:id="rId30"/>
+  </p:notesMasterIdLst>
+  <p:handoutMasterIdLst>
+    <p:handoutMasterId r:id="rId31"/>
+  </p:handoutMasterIdLst>
   <p:sldIdLst>
     <p:sldId id="256" r:id="rId2"/>
     <p:sldId id="258" r:id="rId3"/>
@@ -164,6 +170,596 @@
 </p:presentation>
 </file>
 
+<file path=ppt/handoutMasters/handoutMaster1.xml><?xml version="1.0" encoding="utf-8"?>
+<p:handoutMaster xmlns:a="http://schemas.openxmlformats.org/drawingml/2006/main" xmlns:r="http://schemas.openxmlformats.org/officeDocument/2006/relationships" xmlns:p="http://schemas.openxmlformats.org/presentationml/2006/main">
+  <p:cSld>
+    <p:bg>
+      <p:bgRef idx="1001">
+        <a:schemeClr val="bg1"/>
+      </p:bgRef>
+    </p:bg>
+    <p:spTree>
+      <p:nvGrpSpPr>
+        <p:cNvPr id="1" name=""/>
+        <p:cNvGrpSpPr/>
+        <p:nvPr/>
+      </p:nvGrpSpPr>
+      <p:grpSpPr>
+        <a:xfrm>
+          <a:off x="0" y="0"/>
+          <a:ext cx="0" cy="0"/>
+          <a:chOff x="0" y="0"/>
+          <a:chExt cx="0" cy="0"/>
+        </a:xfrm>
+      </p:grpSpPr>
+      <p:sp>
+        <p:nvSpPr>
+          <p:cNvPr id="2" name="Header Placeholder 1"/>
+          <p:cNvSpPr>
+            <a:spLocks noGrp="1"/>
+          </p:cNvSpPr>
+          <p:nvPr>
+            <p:ph type="hdr" sz="quarter"/>
+          </p:nvPr>
+        </p:nvSpPr>
+        <p:spPr>
+          <a:xfrm>
+            <a:off x="0" y="0"/>
+            <a:ext cx="2971800" cy="457200"/>
+          </a:xfrm>
+          <a:prstGeom prst="rect">
+            <a:avLst/>
+          </a:prstGeom>
+        </p:spPr>
+        <p:txBody>
+          <a:bodyPr vert="horz" lIns="91440" tIns="45720" rIns="91440" bIns="45720" rtlCol="0"/>
+          <a:lstStyle>
+            <a:lvl1pPr algn="l">
+              <a:defRPr sz="1200"/>
+            </a:lvl1pPr>
+          </a:lstStyle>
+          <a:p>
+            <a:endParaRPr lang="ru-RU"/>
+          </a:p>
+        </p:txBody>
+      </p:sp>
+      <p:sp>
+        <p:nvSpPr>
+          <p:cNvPr id="3" name="Date Placeholder 2"/>
+          <p:cNvSpPr>
+            <a:spLocks noGrp="1"/>
+          </p:cNvSpPr>
+          <p:nvPr>
+            <p:ph type="dt" sz="quarter" idx="1"/>
+          </p:nvPr>
+        </p:nvSpPr>
+        <p:spPr>
+          <a:xfrm>
+            <a:off x="3884613" y="0"/>
+            <a:ext cx="2971800" cy="457200"/>
+          </a:xfrm>
+          <a:prstGeom prst="rect">
+            <a:avLst/>
+          </a:prstGeom>
+        </p:spPr>
+        <p:txBody>
+          <a:bodyPr vert="horz" lIns="91440" tIns="45720" rIns="91440" bIns="45720" rtlCol="0"/>
+          <a:lstStyle>
+            <a:lvl1pPr algn="r">
+              <a:defRPr sz="1200"/>
+            </a:lvl1pPr>
+          </a:lstStyle>
+          <a:p>
+            <a:fld id="{D3BF2DFF-AB80-4F3F-88AF-9FA5AC44A75C}" type="datetimeFigureOut">
+              <a:rPr lang="ru-RU" smtClean="0"/>
+              <a:t>24.05.2011</a:t>
+            </a:fld>
+            <a:endParaRPr lang="ru-RU"/>
+          </a:p>
+        </p:txBody>
+      </p:sp>
+      <p:sp>
+        <p:nvSpPr>
+          <p:cNvPr id="4" name="Footer Placeholder 3"/>
+          <p:cNvSpPr>
+            <a:spLocks noGrp="1"/>
+          </p:cNvSpPr>
+          <p:nvPr>
+            <p:ph type="ftr" sz="quarter" idx="2"/>
+          </p:nvPr>
+        </p:nvSpPr>
+        <p:spPr>
+          <a:xfrm>
+            <a:off x="0" y="8685213"/>
+            <a:ext cx="2971800" cy="457200"/>
+          </a:xfrm>
+          <a:prstGeom prst="rect">
+            <a:avLst/>
+          </a:prstGeom>
+        </p:spPr>
+        <p:txBody>
+          <a:bodyPr vert="horz" lIns="91440" tIns="45720" rIns="91440" bIns="45720" rtlCol="0" anchor="b"/>
+          <a:lstStyle>
+            <a:lvl1pPr algn="l">
+              <a:defRPr sz="1200"/>
+            </a:lvl1pPr>
+          </a:lstStyle>
+          <a:p>
+            <a:endParaRPr lang="ru-RU"/>
+          </a:p>
+        </p:txBody>
+      </p:sp>
+      <p:sp>
+        <p:nvSpPr>
+          <p:cNvPr id="5" name="Slide Number Placeholder 4"/>
+          <p:cNvSpPr>
+            <a:spLocks noGrp="1"/>
+          </p:cNvSpPr>
+          <p:nvPr>
+            <p:ph type="sldNum" sz="quarter" idx="3"/>
+          </p:nvPr>
+        </p:nvSpPr>
+        <p:spPr>
+          <a:xfrm>
+            <a:off x="3884613" y="8685213"/>
+            <a:ext cx="2971800" cy="457200"/>
+          </a:xfrm>
+          <a:prstGeom prst="rect">
+            <a:avLst/>
+          </a:prstGeom>
+        </p:spPr>
+        <p:txBody>
+          <a:bodyPr vert="horz" lIns="91440" tIns="45720" rIns="91440" bIns="45720" rtlCol="0" anchor="b"/>
+          <a:lstStyle>
+            <a:lvl1pPr algn="r">
+              <a:defRPr sz="1200"/>
+            </a:lvl1pPr>
+          </a:lstStyle>
+          <a:p>
+            <a:fld id="{6A35E683-E85A-4A3D-9EF8-8A69B90147C4}" type="slidenum">
+              <a:rPr lang="ru-RU" smtClean="0"/>
+              <a:t>‹#›</a:t>
+            </a:fld>
+            <a:endParaRPr lang="ru-RU"/>
+          </a:p>
+        </p:txBody>
+      </p:sp>
+    </p:spTree>
+  </p:cSld>
+  <p:clrMap bg1="lt1" tx1="dk1" bg2="lt2" tx2="dk2" accent1="accent1" accent2="accent2" accent3="accent3" accent4="accent4" accent5="accent5" accent6="accent6" hlink="hlink" folHlink="folHlink"/>
+  <p:hf hdr="0" ftr="0" dt="0"/>
+</p:handoutMaster>
+</file>
+
+<file path=ppt/notesMasters/notesMaster1.xml><?xml version="1.0" encoding="utf-8"?>
+<p:notesMaster xmlns:a="http://schemas.openxmlformats.org/drawingml/2006/main" xmlns:r="http://schemas.openxmlformats.org/officeDocument/2006/relationships" xmlns:p="http://schemas.openxmlformats.org/presentationml/2006/main">
+  <p:cSld>
+    <p:bg>
+      <p:bgRef idx="1001">
+        <a:schemeClr val="bg1"/>
+      </p:bgRef>
+    </p:bg>
+    <p:spTree>
+      <p:nvGrpSpPr>
+        <p:cNvPr id="1" name=""/>
+        <p:cNvGrpSpPr/>
+        <p:nvPr/>
+      </p:nvGrpSpPr>
+      <p:grpSpPr>
+        <a:xfrm>
+          <a:off x="0" y="0"/>
+          <a:ext cx="0" cy="0"/>
+          <a:chOff x="0" y="0"/>
+          <a:chExt cx="0" cy="0"/>
+        </a:xfrm>
+      </p:grpSpPr>
+      <p:sp>
+        <p:nvSpPr>
+          <p:cNvPr id="2" name="Header Placeholder 1"/>
+          <p:cNvSpPr>
+            <a:spLocks noGrp="1"/>
+          </p:cNvSpPr>
+          <p:nvPr>
+            <p:ph type="hdr" sz="quarter"/>
+          </p:nvPr>
+        </p:nvSpPr>
+        <p:spPr>
+          <a:xfrm>
+            <a:off x="0" y="0"/>
+            <a:ext cx="2971800" cy="457200"/>
+          </a:xfrm>
+          <a:prstGeom prst="rect">
+            <a:avLst/>
+          </a:prstGeom>
+        </p:spPr>
+        <p:txBody>
+          <a:bodyPr vert="horz" lIns="91440" tIns="45720" rIns="91440" bIns="45720" rtlCol="0"/>
+          <a:lstStyle>
+            <a:lvl1pPr algn="l">
+              <a:defRPr sz="1200"/>
+            </a:lvl1pPr>
+          </a:lstStyle>
+          <a:p>
+            <a:endParaRPr lang="ru-RU"/>
+          </a:p>
+        </p:txBody>
+      </p:sp>
+      <p:sp>
+        <p:nvSpPr>
+          <p:cNvPr id="3" name="Date Placeholder 2"/>
+          <p:cNvSpPr>
+            <a:spLocks noGrp="1"/>
+          </p:cNvSpPr>
+          <p:nvPr>
+            <p:ph type="dt" idx="1"/>
+          </p:nvPr>
+        </p:nvSpPr>
+        <p:spPr>
+          <a:xfrm>
+            <a:off x="3884613" y="0"/>
+            <a:ext cx="2971800" cy="457200"/>
+          </a:xfrm>
+          <a:prstGeom prst="rect">
+            <a:avLst/>
+          </a:prstGeom>
+        </p:spPr>
+        <p:txBody>
+          <a:bodyPr vert="horz" lIns="91440" tIns="45720" rIns="91440" bIns="45720" rtlCol="0"/>
+          <a:lstStyle>
+            <a:lvl1pPr algn="r">
+              <a:defRPr sz="1200"/>
+            </a:lvl1pPr>
+          </a:lstStyle>
+          <a:p>
+            <a:fld id="{62F8D462-216D-4530-ADAC-7A73135CBCEF}" type="datetimeFigureOut">
+              <a:rPr lang="ru-RU" smtClean="0"/>
+              <a:t>24.05.2011</a:t>
+            </a:fld>
+            <a:endParaRPr lang="ru-RU"/>
+          </a:p>
+        </p:txBody>
+      </p:sp>
+      <p:sp>
+        <p:nvSpPr>
+          <p:cNvPr id="4" name="Slide Image Placeholder 3"/>
+          <p:cNvSpPr>
+            <a:spLocks noGrp="1" noRot="1" noChangeAspect="1"/>
+          </p:cNvSpPr>
+          <p:nvPr>
+            <p:ph type="sldImg" idx="2"/>
+          </p:nvPr>
+        </p:nvSpPr>
+        <p:spPr>
+          <a:xfrm>
+            <a:off x="1143000" y="685800"/>
+            <a:ext cx="4572000" cy="3429000"/>
+          </a:xfrm>
+          <a:prstGeom prst="rect">
+            <a:avLst/>
+          </a:prstGeom>
+          <a:noFill/>
+          <a:ln w="12700">
+            <a:solidFill>
+              <a:prstClr val="black"/>
+            </a:solidFill>
+          </a:ln>
+        </p:spPr>
+        <p:txBody>
+          <a:bodyPr vert="horz" lIns="91440" tIns="45720" rIns="91440" bIns="45720" rtlCol="0" anchor="ctr"/>
+          <a:lstStyle/>
+          <a:p>
+            <a:endParaRPr lang="ru-RU"/>
+          </a:p>
+        </p:txBody>
+      </p:sp>
+      <p:sp>
+        <p:nvSpPr>
+          <p:cNvPr id="5" name="Notes Placeholder 4"/>
+          <p:cNvSpPr>
+            <a:spLocks noGrp="1"/>
+          </p:cNvSpPr>
+          <p:nvPr>
+            <p:ph type="body" sz="quarter" idx="3"/>
+          </p:nvPr>
+        </p:nvSpPr>
+        <p:spPr>
+          <a:xfrm>
+            <a:off x="685800" y="4343400"/>
+            <a:ext cx="5486400" cy="4114800"/>
+          </a:xfrm>
+          <a:prstGeom prst="rect">
+            <a:avLst/>
+          </a:prstGeom>
+        </p:spPr>
+        <p:txBody>
+          <a:bodyPr vert="horz" lIns="91440" tIns="45720" rIns="91440" bIns="45720" rtlCol="0">
+            <a:normAutofit/>
+          </a:bodyPr>
+          <a:lstStyle/>
+          <a:p>
+            <a:pPr lvl="0"/>
+            <a:r>
+              <a:rPr lang="en-US" smtClean="0"/>
+              <a:t>Click to edit Master text styles</a:t>
+            </a:r>
+          </a:p>
+          <a:p>
+            <a:pPr lvl="1"/>
+            <a:r>
+              <a:rPr lang="en-US" smtClean="0"/>
+              <a:t>Second level</a:t>
+            </a:r>
+          </a:p>
+          <a:p>
+            <a:pPr lvl="2"/>
+            <a:r>
+              <a:rPr lang="en-US" smtClean="0"/>
+              <a:t>Third level</a:t>
+            </a:r>
+          </a:p>
+          <a:p>
+            <a:pPr lvl="3"/>
+            <a:r>
+              <a:rPr lang="en-US" smtClean="0"/>
+              <a:t>Fourth level</a:t>
+            </a:r>
+          </a:p>
+          <a:p>
+            <a:pPr lvl="4"/>
+            <a:r>
+              <a:rPr lang="en-US" smtClean="0"/>
+              <a:t>Fifth level</a:t>
+            </a:r>
+            <a:endParaRPr lang="ru-RU"/>
+          </a:p>
+        </p:txBody>
+      </p:sp>
+      <p:sp>
+        <p:nvSpPr>
+          <p:cNvPr id="6" name="Footer Placeholder 5"/>
+          <p:cNvSpPr>
+            <a:spLocks noGrp="1"/>
+          </p:cNvSpPr>
+          <p:nvPr>
+            <p:ph type="ftr" sz="quarter" idx="4"/>
+          </p:nvPr>
+        </p:nvSpPr>
+        <p:spPr>
+          <a:xfrm>
+            <a:off x="0" y="8685213"/>
+            <a:ext cx="2971800" cy="457200"/>
+          </a:xfrm>
+          <a:prstGeom prst="rect">
+            <a:avLst/>
+          </a:prstGeom>
+        </p:spPr>
+        <p:txBody>
+          <a:bodyPr vert="horz" lIns="91440" tIns="45720" rIns="91440" bIns="45720" rtlCol="0" anchor="b"/>
+          <a:lstStyle>
+            <a:lvl1pPr algn="l">
+              <a:defRPr sz="1200"/>
+            </a:lvl1pPr>
+          </a:lstStyle>
+          <a:p>
+            <a:endParaRPr lang="ru-RU"/>
+          </a:p>
+        </p:txBody>
+      </p:sp>
+      <p:sp>
+        <p:nvSpPr>
+          <p:cNvPr id="7" name="Slide Number Placeholder 6"/>
+          <p:cNvSpPr>
+            <a:spLocks noGrp="1"/>
+          </p:cNvSpPr>
+          <p:nvPr>
+            <p:ph type="sldNum" sz="quarter" idx="5"/>
+          </p:nvPr>
+        </p:nvSpPr>
+        <p:spPr>
+          <a:xfrm>
+            <a:off x="3884613" y="8685213"/>
+            <a:ext cx="2971800" cy="457200"/>
+          </a:xfrm>
+          <a:prstGeom prst="rect">
+            <a:avLst/>
+          </a:prstGeom>
+        </p:spPr>
+        <p:txBody>
+          <a:bodyPr vert="horz" lIns="91440" tIns="45720" rIns="91440" bIns="45720" rtlCol="0" anchor="b"/>
+          <a:lstStyle>
+            <a:lvl1pPr algn="r">
+              <a:defRPr sz="1200"/>
+            </a:lvl1pPr>
+          </a:lstStyle>
+          <a:p>
+            <a:fld id="{F6E4E343-22A0-441F-B24F-7C0FBB6B3D8E}" type="slidenum">
+              <a:rPr lang="ru-RU" smtClean="0"/>
+              <a:t>‹#›</a:t>
+            </a:fld>
+            <a:endParaRPr lang="ru-RU"/>
+          </a:p>
+        </p:txBody>
+      </p:sp>
+    </p:spTree>
+  </p:cSld>
+  <p:clrMap bg1="lt1" tx1="dk1" bg2="lt2" tx2="dk2" accent1="accent1" accent2="accent2" accent3="accent3" accent4="accent4" accent5="accent5" accent6="accent6" hlink="hlink" folHlink="folHlink"/>
+  <p:hf hdr="0" ftr="0" dt="0"/>
+  <p:notesStyle>
+    <a:lvl1pPr marL="0" algn="l" defTabSz="914400" rtl="0" eaLnBrk="1" latinLnBrk="0" hangingPunct="1">
+      <a:defRPr sz="1200" kern="1200">
+        <a:solidFill>
+          <a:schemeClr val="tx1"/>
+        </a:solidFill>
+        <a:latin typeface="+mn-lt"/>
+        <a:ea typeface="+mn-ea"/>
+        <a:cs typeface="+mn-cs"/>
+      </a:defRPr>
+    </a:lvl1pPr>
+    <a:lvl2pPr marL="457200" algn="l" defTabSz="914400" rtl="0" eaLnBrk="1" latinLnBrk="0" hangingPunct="1">
+      <a:defRPr sz="1200" kern="1200">
+        <a:solidFill>
+          <a:schemeClr val="tx1"/>
+        </a:solidFill>
+        <a:latin typeface="+mn-lt"/>
+        <a:ea typeface="+mn-ea"/>
+        <a:cs typeface="+mn-cs"/>
+      </a:defRPr>
+    </a:lvl2pPr>
+    <a:lvl3pPr marL="914400" algn="l" defTabSz="914400" rtl="0" eaLnBrk="1" latinLnBrk="0" hangingPunct="1">
+      <a:defRPr sz="1200" kern="1200">
+        <a:solidFill>
+          <a:schemeClr val="tx1"/>
+        </a:solidFill>
+        <a:latin typeface="+mn-lt"/>
+        <a:ea typeface="+mn-ea"/>
+        <a:cs typeface="+mn-cs"/>
+      </a:defRPr>
+    </a:lvl3pPr>
+    <a:lvl4pPr marL="1371600" algn="l" defTabSz="914400" rtl="0" eaLnBrk="1" latinLnBrk="0" hangingPunct="1">
+      <a:defRPr sz="1200" kern="1200">
+        <a:solidFill>
+          <a:schemeClr val="tx1"/>
+        </a:solidFill>
+        <a:latin typeface="+mn-lt"/>
+        <a:ea typeface="+mn-ea"/>
+        <a:cs typeface="+mn-cs"/>
+      </a:defRPr>
+    </a:lvl4pPr>
+    <a:lvl5pPr marL="1828800" algn="l" defTabSz="914400" rtl="0" eaLnBrk="1" latinLnBrk="0" hangingPunct="1">
+      <a:defRPr sz="1200" kern="1200">
+        <a:solidFill>
+          <a:schemeClr val="tx1"/>
+        </a:solidFill>
+        <a:latin typeface="+mn-lt"/>
+        <a:ea typeface="+mn-ea"/>
+        <a:cs typeface="+mn-cs"/>
+      </a:defRPr>
+    </a:lvl5pPr>
+    <a:lvl6pPr marL="2286000" algn="l" defTabSz="914400" rtl="0" eaLnBrk="1" latinLnBrk="0" hangingPunct="1">
+      <a:defRPr sz="1200" kern="1200">
+        <a:solidFill>
+          <a:schemeClr val="tx1"/>
+        </a:solidFill>
+        <a:latin typeface="+mn-lt"/>
+        <a:ea typeface="+mn-ea"/>
+        <a:cs typeface="+mn-cs"/>
+      </a:defRPr>
+    </a:lvl6pPr>
+    <a:lvl7pPr marL="2743200" algn="l" defTabSz="914400" rtl="0" eaLnBrk="1" latinLnBrk="0" hangingPunct="1">
+      <a:defRPr sz="1200" kern="1200">
+        <a:solidFill>
+          <a:schemeClr val="tx1"/>
+        </a:solidFill>
+        <a:latin typeface="+mn-lt"/>
+        <a:ea typeface="+mn-ea"/>
+        <a:cs typeface="+mn-cs"/>
+      </a:defRPr>
+    </a:lvl7pPr>
+    <a:lvl8pPr marL="3200400" algn="l" defTabSz="914400" rtl="0" eaLnBrk="1" latinLnBrk="0" hangingPunct="1">
+      <a:defRPr sz="1200" kern="1200">
+        <a:solidFill>
+          <a:schemeClr val="tx1"/>
+        </a:solidFill>
+        <a:latin typeface="+mn-lt"/>
+        <a:ea typeface="+mn-ea"/>
+        <a:cs typeface="+mn-cs"/>
+      </a:defRPr>
+    </a:lvl8pPr>
+    <a:lvl9pPr marL="3657600" algn="l" defTabSz="914400" rtl="0" eaLnBrk="1" latinLnBrk="0" hangingPunct="1">
+      <a:defRPr sz="1200" kern="1200">
+        <a:solidFill>
+          <a:schemeClr val="tx1"/>
+        </a:solidFill>
+        <a:latin typeface="+mn-lt"/>
+        <a:ea typeface="+mn-ea"/>
+        <a:cs typeface="+mn-cs"/>
+      </a:defRPr>
+    </a:lvl9pPr>
+  </p:notesStyle>
+</p:notesMaster>
+</file>
+
+<file path=ppt/notesSlides/notesSlide1.xml><?xml version="1.0" encoding="utf-8"?>
+<p:notes xmlns:a="http://schemas.openxmlformats.org/drawingml/2006/main" xmlns:r="http://schemas.openxmlformats.org/officeDocument/2006/relationships" xmlns:p="http://schemas.openxmlformats.org/presentationml/2006/main">
+  <p:cSld>
+    <p:spTree>
+      <p:nvGrpSpPr>
+        <p:cNvPr id="1" name=""/>
+        <p:cNvGrpSpPr/>
+        <p:nvPr/>
+      </p:nvGrpSpPr>
+      <p:grpSpPr>
+        <a:xfrm>
+          <a:off x="0" y="0"/>
+          <a:ext cx="0" cy="0"/>
+          <a:chOff x="0" y="0"/>
+          <a:chExt cx="0" cy="0"/>
+        </a:xfrm>
+      </p:grpSpPr>
+      <p:sp>
+        <p:nvSpPr>
+          <p:cNvPr id="2" name="Slide Image Placeholder 1"/>
+          <p:cNvSpPr>
+            <a:spLocks noGrp="1" noRot="1" noChangeAspect="1"/>
+          </p:cNvSpPr>
+          <p:nvPr>
+            <p:ph type="sldImg"/>
+          </p:nvPr>
+        </p:nvSpPr>
+        <p:spPr/>
+      </p:sp>
+      <p:sp>
+        <p:nvSpPr>
+          <p:cNvPr id="3" name="Notes Placeholder 2"/>
+          <p:cNvSpPr>
+            <a:spLocks noGrp="1"/>
+          </p:cNvSpPr>
+          <p:nvPr>
+            <p:ph type="body" idx="1"/>
+          </p:nvPr>
+        </p:nvSpPr>
+        <p:spPr/>
+        <p:txBody>
+          <a:bodyPr>
+            <a:normAutofit/>
+          </a:bodyPr>
+          <a:lstStyle/>
+          <a:p>
+            <a:endParaRPr lang="ru-RU"/>
+          </a:p>
+        </p:txBody>
+      </p:sp>
+      <p:sp>
+        <p:nvSpPr>
+          <p:cNvPr id="4" name="Slide Number Placeholder 3"/>
+          <p:cNvSpPr>
+            <a:spLocks noGrp="1"/>
+          </p:cNvSpPr>
+          <p:nvPr>
+            <p:ph type="sldNum" sz="quarter" idx="10"/>
+          </p:nvPr>
+        </p:nvSpPr>
+        <p:spPr/>
+        <p:txBody>
+          <a:bodyPr/>
+          <a:lstStyle/>
+          <a:p>
+            <a:fld id="{F6E4E343-22A0-441F-B24F-7C0FBB6B3D8E}" type="slidenum">
+              <a:rPr lang="ru-RU" smtClean="0"/>
+              <a:t>2</a:t>
+            </a:fld>
+            <a:endParaRPr lang="ru-RU"/>
+          </a:p>
+        </p:txBody>
+      </p:sp>
+    </p:spTree>
+  </p:cSld>
+  <p:clrMapOvr>
+    <a:masterClrMapping/>
+  </p:clrMapOvr>
+</p:notes>
+</file>
+
 <file path=ppt/slideLayouts/slideLayout1.xml><?xml version="1.0" encoding="utf-8"?>
 <p:sldLayout xmlns:a="http://schemas.openxmlformats.org/drawingml/2006/main" xmlns:r="http://schemas.openxmlformats.org/officeDocument/2006/relationships" xmlns:p="http://schemas.openxmlformats.org/presentationml/2006/main" type="title" preserve="1">
   <p:cSld name="Титульный слайд">
@@ -3052,6 +3648,7 @@
     <p:sldLayoutId id="2147483658" r:id="rId10"/>
     <p:sldLayoutId id="2147483659" r:id="rId11"/>
   </p:sldLayoutIdLst>
+  <p:hf hdr="0" ftr="0" dt="0"/>
   <p:txStyles>
     <p:titleStyle>
       <a:lvl1pPr algn="ctr" rtl="0" eaLnBrk="0" fontAlgn="base" hangingPunct="0">
@@ -3452,59 +4049,6 @@
       </p:grpSpPr>
       <p:sp>
         <p:nvSpPr>
-          <p:cNvPr id="2" name="Rectangle 2"/>
-          <p:cNvSpPr>
-            <a:spLocks noGrp="1" noChangeArrowheads="1"/>
-          </p:cNvSpPr>
-          <p:nvPr>
-            <p:ph type="subTitle" idx="1"/>
-          </p:nvPr>
-        </p:nvSpPr>
-        <p:spPr>
-          <a:xfrm>
-            <a:off x="4579938" y="5381625"/>
-            <a:ext cx="5214937" cy="441325"/>
-          </a:xfrm>
-        </p:spPr>
-        <p:txBody>
-          <a:bodyPr lIns="0" tIns="0" rIns="0" bIns="0"/>
-          <a:lstStyle/>
-          <a:p>
-            <a:pPr eaLnBrk="1" hangingPunct="1">
-              <a:lnSpc>
-                <a:spcPct val="95000"/>
-              </a:lnSpc>
-              <a:spcBef>
-                <a:spcPct val="0"/>
-              </a:spcBef>
-              <a:defRPr/>
-            </a:pPr>
-            <a:r>
-              <a:rPr lang="ru-RU" sz="2200" dirty="0" smtClean="0">
-                <a:solidFill>
-                  <a:schemeClr val="accent1">
-                    <a:lumMod val="20000"/>
-                    <a:lumOff val="80000"/>
-                  </a:schemeClr>
-                </a:solidFill>
-                <a:latin typeface="Arial" charset="0"/>
-              </a:rPr>
-              <a:t>Владимир Костюков, АлтГТУ</a:t>
-            </a:r>
-            <a:endParaRPr lang="en-US" sz="2200" dirty="0" smtClean="0">
-              <a:solidFill>
-                <a:schemeClr val="accent1">
-                  <a:lumMod val="20000"/>
-                  <a:lumOff val="80000"/>
-                </a:schemeClr>
-              </a:solidFill>
-              <a:latin typeface="Arial" charset="0"/>
-            </a:endParaRPr>
-          </a:p>
-        </p:txBody>
-      </p:sp>
-      <p:sp>
-        <p:nvSpPr>
           <p:cNvPr id="2052" name="Text Box 6"/>
           <p:cNvSpPr txBox="1">
             <a:spLocks noChangeArrowheads="1"/>
@@ -3590,24 +4134,181 @@
             <a:pPr algn="ctr"/>
             <a:r>
               <a:rPr lang="ru-RU" sz="4000" dirty="0" smtClean="0">
-                <a:solidFill>
-                  <a:schemeClr val="bg2">
-                    <a:lumMod val="20000"/>
-                    <a:lumOff val="80000"/>
-                  </a:schemeClr>
-                </a:solidFill>
+                <a:ln w="0" cap="rnd">
+                  <a:noFill/>
+                  <a:bevel/>
+                </a:ln>
+                <a:gradFill>
+                  <a:gsLst>
+                    <a:gs pos="100000">
+                      <a:srgbClr val="0070C0">
+                        <a:alpha val="65000"/>
+                      </a:srgbClr>
+                    </a:gs>
+                    <a:gs pos="50000">
+                      <a:schemeClr val="accent1">
+                        <a:tint val="44500"/>
+                        <a:satMod val="160000"/>
+                      </a:schemeClr>
+                    </a:gs>
+                    <a:gs pos="100000">
+                      <a:schemeClr val="accent1">
+                        <a:tint val="23500"/>
+                        <a:satMod val="160000"/>
+                      </a:schemeClr>
+                    </a:gs>
+                  </a:gsLst>
+                  <a:lin ang="5400000" scaled="0"/>
+                </a:gradFill>
+                <a:effectLst>
+                  <a:outerShdw blurRad="50800" dist="38100" dir="5400000" algn="t" rotWithShape="0">
+                    <a:prstClr val="black">
+                      <a:alpha val="40000"/>
+                    </a:prstClr>
+                  </a:outerShdw>
+                </a:effectLst>
                 <a:latin typeface="Arial" pitchFamily="34" charset="0"/>
                 <a:cs typeface="Arial" pitchFamily="34" charset="0"/>
               </a:rPr>
               <a:t>Распределенная система мониторинга и диспетчерезации процессов гетерогенной среды</a:t>
             </a:r>
             <a:endParaRPr lang="ru-RU" sz="4000" dirty="0">
-              <a:solidFill>
-                <a:schemeClr val="bg2">
-                  <a:lumMod val="20000"/>
-                  <a:lumOff val="80000"/>
-                </a:schemeClr>
-              </a:solidFill>
+              <a:ln w="0" cap="rnd">
+                <a:noFill/>
+                <a:bevel/>
+              </a:ln>
+              <a:gradFill>
+                <a:gsLst>
+                  <a:gs pos="100000">
+                    <a:srgbClr val="0070C0">
+                      <a:alpha val="65000"/>
+                    </a:srgbClr>
+                  </a:gs>
+                  <a:gs pos="50000">
+                    <a:schemeClr val="accent1">
+                      <a:tint val="44500"/>
+                      <a:satMod val="160000"/>
+                    </a:schemeClr>
+                  </a:gs>
+                  <a:gs pos="100000">
+                    <a:schemeClr val="accent1">
+                      <a:tint val="23500"/>
+                      <a:satMod val="160000"/>
+                    </a:schemeClr>
+                  </a:gs>
+                </a:gsLst>
+                <a:lin ang="5400000" scaled="0"/>
+              </a:gradFill>
+              <a:effectLst>
+                <a:outerShdw blurRad="50800" dist="38100" dir="5400000" algn="t" rotWithShape="0">
+                  <a:prstClr val="black">
+                    <a:alpha val="40000"/>
+                  </a:prstClr>
+                </a:outerShdw>
+              </a:effectLst>
+              <a:latin typeface="Arial" pitchFamily="34" charset="0"/>
+              <a:cs typeface="Arial" pitchFamily="34" charset="0"/>
+            </a:endParaRPr>
+          </a:p>
+        </p:txBody>
+      </p:sp>
+      <p:sp>
+        <p:nvSpPr>
+          <p:cNvPr id="11" name="TextBox 10"/>
+          <p:cNvSpPr txBox="1"/>
+          <p:nvPr/>
+        </p:nvSpPr>
+        <p:spPr>
+          <a:xfrm>
+            <a:off x="3999880" y="4962128"/>
+            <a:ext cx="5536232" cy="461665"/>
+          </a:xfrm>
+          <a:prstGeom prst="rect">
+            <a:avLst/>
+          </a:prstGeom>
+          <a:noFill/>
+        </p:spPr>
+        <p:txBody>
+          <a:bodyPr wrap="square" rtlCol="0">
+            <a:spAutoFit/>
+          </a:bodyPr>
+          <a:lstStyle/>
+          <a:p>
+            <a:pPr algn="ctr"/>
+            <a:r>
+              <a:rPr lang="ru-RU" dirty="0" smtClean="0">
+                <a:ln w="0" cap="rnd">
+                  <a:noFill/>
+                  <a:bevel/>
+                </a:ln>
+                <a:gradFill>
+                  <a:gsLst>
+                    <a:gs pos="100000">
+                      <a:srgbClr val="0070C0">
+                        <a:alpha val="65000"/>
+                      </a:srgbClr>
+                    </a:gs>
+                    <a:gs pos="50000">
+                      <a:schemeClr val="accent1">
+                        <a:tint val="44500"/>
+                        <a:satMod val="160000"/>
+                      </a:schemeClr>
+                    </a:gs>
+                    <a:gs pos="100000">
+                      <a:schemeClr val="accent1">
+                        <a:tint val="23500"/>
+                        <a:satMod val="160000"/>
+                      </a:schemeClr>
+                    </a:gs>
+                  </a:gsLst>
+                  <a:lin ang="5400000" scaled="0"/>
+                </a:gradFill>
+                <a:effectLst>
+                  <a:outerShdw blurRad="50800" dist="38100" dir="5400000" algn="t" rotWithShape="0">
+                    <a:prstClr val="black">
+                      <a:alpha val="40000"/>
+                    </a:prstClr>
+                  </a:outerShdw>
+                </a:effectLst>
+                <a:latin typeface="Arial" pitchFamily="34" charset="0"/>
+                <a:cs typeface="Arial" pitchFamily="34" charset="0"/>
+              </a:rPr>
+              <a:t>Владимир Костюков, АлтГТУ</a:t>
+            </a:r>
+            <a:endParaRPr lang="ru-RU" dirty="0">
+              <a:ln w="0" cap="rnd">
+                <a:noFill/>
+                <a:bevel/>
+              </a:ln>
+              <a:gradFill>
+                <a:gsLst>
+                  <a:gs pos="100000">
+                    <a:srgbClr val="0070C0">
+                      <a:alpha val="65000"/>
+                    </a:srgbClr>
+                  </a:gs>
+                  <a:gs pos="50000">
+                    <a:schemeClr val="accent1">
+                      <a:tint val="44500"/>
+                      <a:satMod val="160000"/>
+                    </a:schemeClr>
+                  </a:gs>
+                  <a:gs pos="100000">
+                    <a:schemeClr val="accent1">
+                      <a:tint val="23500"/>
+                      <a:satMod val="160000"/>
+                    </a:schemeClr>
+                  </a:gs>
+                </a:gsLst>
+                <a:lin ang="5400000" scaled="0"/>
+              </a:gradFill>
+              <a:effectLst>
+                <a:outerShdw blurRad="50800" dist="38100" dir="5400000" algn="t" rotWithShape="0">
+                  <a:prstClr val="black">
+                    <a:alpha val="40000"/>
+                  </a:prstClr>
+                </a:outerShdw>
+              </a:effectLst>
               <a:latin typeface="Arial" pitchFamily="34" charset="0"/>
               <a:cs typeface="Arial" pitchFamily="34" charset="0"/>
             </a:endParaRPr>
@@ -5063,13 +5764,7 @@
               <a:rPr lang="ru-RU" sz="2000" dirty="0" smtClean="0">
                 <a:latin typeface="Calibri" pitchFamily="34" charset="0"/>
               </a:rPr>
-              <a:t> </a:t>
-            </a:r>
-            <a:r>
-              <a:rPr lang="ru-RU" sz="2000" dirty="0" smtClean="0">
-                <a:latin typeface="Calibri" pitchFamily="34" charset="0"/>
-              </a:rPr>
-              <a:t>исполнительная;</a:t>
+              <a:t> исполнительная;</a:t>
             </a:r>
             <a:endParaRPr lang="ru-RU" sz="2000" dirty="0">
               <a:latin typeface="Calibri" pitchFamily="34" charset="0"/>
@@ -5400,13 +6095,7 @@
               <a:rPr lang="ru-RU" sz="2000" b="1" dirty="0" smtClean="0">
                 <a:latin typeface="Calibri" pitchFamily="34" charset="0"/>
               </a:rPr>
-              <a:t>я</a:t>
-            </a:r>
-            <a:r>
-              <a:rPr lang="ru-RU" sz="2000" b="1" dirty="0" smtClean="0">
-                <a:latin typeface="Calibri" pitchFamily="34" charset="0"/>
-              </a:rPr>
-              <a:t>дра </a:t>
+              <a:t>ядра </a:t>
             </a:r>
             <a:r>
               <a:rPr lang="ru-RU" sz="2000" dirty="0" smtClean="0">
@@ -5697,13 +6386,7 @@
               <a:rPr lang="ru-RU" sz="2000" dirty="0" smtClean="0">
                 <a:latin typeface="Calibri" pitchFamily="34" charset="0"/>
               </a:rPr>
-              <a:t> </a:t>
-            </a:r>
-            <a:r>
-              <a:rPr lang="ru-RU" sz="2000" dirty="0" smtClean="0">
-                <a:latin typeface="Calibri" pitchFamily="34" charset="0"/>
-              </a:rPr>
-              <a:t>сетевое;</a:t>
+              <a:t> сетевое;</a:t>
             </a:r>
           </a:p>
           <a:p>
@@ -5715,13 +6398,7 @@
               <a:rPr lang="ru-RU" sz="2000" dirty="0" smtClean="0">
                 <a:latin typeface="Calibri" pitchFamily="34" charset="0"/>
               </a:rPr>
-              <a:t> </a:t>
-            </a:r>
-            <a:r>
-              <a:rPr lang="ru-RU" sz="2000" dirty="0" smtClean="0">
-                <a:latin typeface="Calibri" pitchFamily="34" charset="0"/>
-              </a:rPr>
-              <a:t>автономное;</a:t>
+              <a:t> автономное;</a:t>
             </a:r>
           </a:p>
           <a:p>
@@ -5733,13 +6410,7 @@
               <a:rPr lang="ru-RU" sz="2000" dirty="0" smtClean="0">
                 <a:latin typeface="Calibri" pitchFamily="34" charset="0"/>
               </a:rPr>
-              <a:t> </a:t>
-            </a:r>
-            <a:r>
-              <a:rPr lang="ru-RU" sz="2000" dirty="0" smtClean="0">
-                <a:latin typeface="Calibri" pitchFamily="34" charset="0"/>
-              </a:rPr>
-              <a:t>активное;</a:t>
+              <a:t> активное;</a:t>
             </a:r>
           </a:p>
           <a:p>
@@ -5751,13 +6422,7 @@
               <a:rPr lang="ru-RU" sz="2000" dirty="0" smtClean="0">
                 <a:latin typeface="Calibri" pitchFamily="34" charset="0"/>
               </a:rPr>
-              <a:t> </a:t>
-            </a:r>
-            <a:r>
-              <a:rPr lang="ru-RU" sz="2000" dirty="0" smtClean="0">
-                <a:latin typeface="Calibri" pitchFamily="34" charset="0"/>
-              </a:rPr>
-              <a:t>пассивное;</a:t>
+              <a:t> пассивное;</a:t>
             </a:r>
             <a:endParaRPr lang="ru-RU" sz="2000" dirty="0">
               <a:latin typeface="Calibri" pitchFamily="34" charset="0"/>
@@ -6280,53 +6945,6 @@
       </p:grpSpPr>
       <p:sp>
         <p:nvSpPr>
-          <p:cNvPr id="12290" name="Text Box 5"/>
-          <p:cNvSpPr txBox="1">
-            <a:spLocks noChangeArrowheads="1"/>
-          </p:cNvSpPr>
-          <p:nvPr/>
-        </p:nvSpPr>
-        <p:spPr bwMode="auto">
-          <a:xfrm>
-            <a:off x="450850" y="7263261"/>
-            <a:ext cx="2200275" cy="190052"/>
-          </a:xfrm>
-          <a:prstGeom prst="rect">
-            <a:avLst/>
-          </a:prstGeom>
-          <a:noFill/>
-          <a:ln w="9525">
-            <a:noFill/>
-            <a:miter lim="800000"/>
-            <a:headEnd/>
-            <a:tailEnd/>
-          </a:ln>
-        </p:spPr>
-        <p:txBody>
-          <a:bodyPr lIns="0" tIns="0" rIns="0" bIns="0" anchor="b">
-            <a:spAutoFit/>
-          </a:bodyPr>
-          <a:lstStyle/>
-          <a:p>
-            <a:pPr>
-              <a:lnSpc>
-                <a:spcPct val="95000"/>
-              </a:lnSpc>
-            </a:pPr>
-            <a:r>
-              <a:rPr lang="en-US" sz="1300" dirty="0" smtClean="0">
-                <a:solidFill>
-                  <a:srgbClr val="045C75"/>
-                </a:solidFill>
-                <a:latin typeface="Arial" charset="0"/>
-              </a:rPr>
-              <a:t>DICR’2010</a:t>
-            </a:r>
-          </a:p>
-        </p:txBody>
-      </p:sp>
-      <p:sp>
-        <p:nvSpPr>
           <p:cNvPr id="17" name="Rectangle 1"/>
           <p:cNvSpPr txBox="1">
             <a:spLocks noChangeArrowheads="1"/>
@@ -6783,7 +7401,7 @@
     <p:bg>
       <p:bgPr>
         <a:blipFill dpi="0" rotWithShape="0">
-          <a:blip r:embed="rId2" cstate="print"/>
+          <a:blip r:embed="rId3" cstate="print"/>
           <a:srcRect/>
           <a:stretch>
             <a:fillRect/>
@@ -7167,19 +7785,7 @@
               <a:rPr lang="ru-RU" sz="2000" dirty="0" smtClean="0">
                 <a:latin typeface="Calibri" pitchFamily="34" charset="0"/>
               </a:rPr>
-              <a:t> </a:t>
-            </a:r>
-            <a:r>
-              <a:rPr lang="ru-RU" sz="2000" dirty="0" smtClean="0">
-                <a:latin typeface="Calibri" pitchFamily="34" charset="0"/>
-              </a:rPr>
-              <a:t>не</a:t>
-            </a:r>
-            <a:r>
-              <a:rPr lang="ru-RU" sz="2000" dirty="0" smtClean="0">
-                <a:latin typeface="Calibri" pitchFamily="34" charset="0"/>
-              </a:rPr>
-              <a:t>гарантированная доставка сообщений (</a:t>
+              <a:t> негарантированная доставка сообщений (</a:t>
             </a:r>
             <a:r>
               <a:rPr lang="en-US" sz="2000" dirty="0" smtClean="0">
@@ -7246,7 +7852,7 @@
         <p:spPr bwMode="auto">
           <a:xfrm>
             <a:off x="687512" y="3737992"/>
-            <a:ext cx="5760640" cy="707886"/>
+            <a:ext cx="7128792" cy="2708434"/>
           </a:xfrm>
           <a:prstGeom prst="rect">
             <a:avLst/>
@@ -7275,9 +7881,17 @@
               <a:rPr lang="ru-RU" sz="2000" dirty="0" smtClean="0">
                 <a:latin typeface="Calibri" pitchFamily="34" charset="0"/>
               </a:rPr>
-              <a:t> алгоритма:</a:t>
-            </a:r>
-            <a:endParaRPr lang="en-US" sz="2000" dirty="0" smtClean="0">
+              <a:t> алгоритма</a:t>
+            </a:r>
+            <a:r>
+              <a:rPr lang="ru-RU" sz="2000" dirty="0" smtClean="0">
+                <a:latin typeface="Calibri" pitchFamily="34" charset="0"/>
+              </a:rPr>
+              <a:t>:</a:t>
+            </a:r>
+          </a:p>
+          <a:p>
+            <a:endParaRPr lang="en-US" sz="1000" dirty="0" smtClean="0">
               <a:latin typeface="Calibri" pitchFamily="34" charset="0"/>
             </a:endParaRPr>
           </a:p>
@@ -7290,7 +7904,55 @@
               <a:rPr lang="ru-RU" sz="2000" dirty="0" smtClean="0">
                 <a:latin typeface="Calibri" pitchFamily="34" charset="0"/>
               </a:rPr>
-              <a:t> тук прицип </a:t>
+              <a:t> </a:t>
+            </a:r>
+            <a:r>
+              <a:rPr lang="ru-RU" sz="2000" dirty="0" smtClean="0">
+                <a:latin typeface="Calibri" pitchFamily="34" charset="0"/>
+              </a:rPr>
+              <a:t>каждый узел системы посылает широковещательные запросы, инкапсулирующие его состояние;</a:t>
+            </a:r>
+          </a:p>
+          <a:p>
+            <a:pPr>
+              <a:buFont typeface="Arial" pitchFamily="34" charset="0"/>
+              <a:buChar char="•"/>
+            </a:pPr>
+            <a:r>
+              <a:rPr lang="ru-RU" sz="2000" dirty="0" smtClean="0">
+                <a:latin typeface="Calibri" pitchFamily="34" charset="0"/>
+              </a:rPr>
+              <a:t> </a:t>
+            </a:r>
+            <a:r>
+              <a:rPr lang="ru-RU" sz="2000" dirty="0" smtClean="0">
+                <a:latin typeface="Calibri" pitchFamily="34" charset="0"/>
+              </a:rPr>
+              <a:t>после стабилизации системы или таймаута, каждый узел выбирает себе лидера из локального еша;</a:t>
+            </a:r>
+            <a:r>
+              <a:rPr lang="ru-RU" sz="2000" dirty="0" smtClean="0">
+                <a:latin typeface="Calibri" pitchFamily="34" charset="0"/>
+              </a:rPr>
+              <a:t> </a:t>
+            </a:r>
+          </a:p>
+          <a:p>
+            <a:pPr>
+              <a:buFont typeface="Arial" pitchFamily="34" charset="0"/>
+              <a:buChar char="•"/>
+            </a:pPr>
+            <a:r>
+              <a:rPr lang="ru-RU" sz="2000" dirty="0" smtClean="0">
+                <a:latin typeface="Calibri" pitchFamily="34" charset="0"/>
+              </a:rPr>
+              <a:t> </a:t>
+            </a:r>
+            <a:r>
+              <a:rPr lang="ru-RU" sz="2000" dirty="0" smtClean="0">
+                <a:latin typeface="Calibri" pitchFamily="34" charset="0"/>
+              </a:rPr>
+              <a:t>поптытки подключения к лидерам с максимальным индексом производительности происходят циключески, до тех пор узел не перейдет в новое состояние – активное или пассивное.</a:t>
             </a:r>
             <a:endParaRPr lang="ru-RU" sz="2000" dirty="0">
               <a:latin typeface="Calibri" pitchFamily="34" charset="0"/>
@@ -8043,53 +8705,6 @@
       </p:grpSpPr>
       <p:sp>
         <p:nvSpPr>
-          <p:cNvPr id="12290" name="Text Box 5"/>
-          <p:cNvSpPr txBox="1">
-            <a:spLocks noChangeArrowheads="1"/>
-          </p:cNvSpPr>
-          <p:nvPr/>
-        </p:nvSpPr>
-        <p:spPr bwMode="auto">
-          <a:xfrm>
-            <a:off x="450850" y="7263261"/>
-            <a:ext cx="2200275" cy="190052"/>
-          </a:xfrm>
-          <a:prstGeom prst="rect">
-            <a:avLst/>
-          </a:prstGeom>
-          <a:noFill/>
-          <a:ln w="9525">
-            <a:noFill/>
-            <a:miter lim="800000"/>
-            <a:headEnd/>
-            <a:tailEnd/>
-          </a:ln>
-        </p:spPr>
-        <p:txBody>
-          <a:bodyPr lIns="0" tIns="0" rIns="0" bIns="0" anchor="b">
-            <a:spAutoFit/>
-          </a:bodyPr>
-          <a:lstStyle/>
-          <a:p>
-            <a:pPr>
-              <a:lnSpc>
-                <a:spcPct val="95000"/>
-              </a:lnSpc>
-            </a:pPr>
-            <a:r>
-              <a:rPr lang="en-US" sz="1300" dirty="0" smtClean="0">
-                <a:solidFill>
-                  <a:srgbClr val="045C75"/>
-                </a:solidFill>
-                <a:latin typeface="Arial" charset="0"/>
-              </a:rPr>
-              <a:t>DICR’2010</a:t>
-            </a:r>
-          </a:p>
-        </p:txBody>
-      </p:sp>
-      <p:sp>
-        <p:nvSpPr>
           <p:cNvPr id="17" name="Rectangle 1"/>
           <p:cNvSpPr txBox="1">
             <a:spLocks noChangeArrowheads="1"/>
@@ -8771,13 +9386,13 @@
       </p:sp>
       <p:sp>
         <p:nvSpPr>
-          <p:cNvPr id="5" name="TextBox 4"/>
+          <p:cNvPr id="7" name="TextBox 6"/>
           <p:cNvSpPr txBox="1"/>
           <p:nvPr/>
         </p:nvSpPr>
         <p:spPr>
           <a:xfrm>
-            <a:off x="759520" y="2945904"/>
+            <a:off x="831528" y="3017912"/>
             <a:ext cx="8640960" cy="1323439"/>
           </a:xfrm>
           <a:prstGeom prst="rect">
@@ -8794,12 +9409,39 @@
             <a:pPr algn="ctr"/>
             <a:r>
               <a:rPr lang="ru-RU" sz="4000" dirty="0" smtClean="0">
-                <a:solidFill>
-                  <a:schemeClr val="bg2">
-                    <a:lumMod val="20000"/>
-                    <a:lumOff val="80000"/>
-                  </a:schemeClr>
-                </a:solidFill>
+                <a:ln w="0" cap="rnd">
+                  <a:noFill/>
+                  <a:bevel/>
+                </a:ln>
+                <a:gradFill>
+                  <a:gsLst>
+                    <a:gs pos="100000">
+                      <a:srgbClr val="0070C0">
+                        <a:alpha val="65000"/>
+                      </a:srgbClr>
+                    </a:gs>
+                    <a:gs pos="50000">
+                      <a:schemeClr val="accent1">
+                        <a:tint val="44500"/>
+                        <a:satMod val="160000"/>
+                      </a:schemeClr>
+                    </a:gs>
+                    <a:gs pos="100000">
+                      <a:schemeClr val="accent1">
+                        <a:tint val="23500"/>
+                        <a:satMod val="160000"/>
+                      </a:schemeClr>
+                    </a:gs>
+                  </a:gsLst>
+                  <a:lin ang="5400000" scaled="0"/>
+                </a:gradFill>
+                <a:effectLst>
+                  <a:outerShdw blurRad="50800" dist="38100" dir="5400000" algn="t" rotWithShape="0">
+                    <a:prstClr val="black">
+                      <a:alpha val="40000"/>
+                    </a:prstClr>
+                  </a:outerShdw>
+                </a:effectLst>
                 <a:latin typeface="Arial" pitchFamily="34" charset="0"/>
                 <a:cs typeface="Arial" pitchFamily="34" charset="0"/>
               </a:rPr>
@@ -8810,24 +9452,78 @@
             <a:pPr algn="ctr"/>
             <a:r>
               <a:rPr lang="ru-RU" sz="4000" dirty="0" smtClean="0">
-                <a:solidFill>
-                  <a:schemeClr val="bg2">
-                    <a:lumMod val="20000"/>
-                    <a:lumOff val="80000"/>
-                  </a:schemeClr>
-                </a:solidFill>
+                <a:ln w="0" cap="rnd">
+                  <a:noFill/>
+                  <a:bevel/>
+                </a:ln>
+                <a:gradFill>
+                  <a:gsLst>
+                    <a:gs pos="100000">
+                      <a:srgbClr val="0070C0">
+                        <a:alpha val="65000"/>
+                      </a:srgbClr>
+                    </a:gs>
+                    <a:gs pos="50000">
+                      <a:schemeClr val="accent1">
+                        <a:tint val="44500"/>
+                        <a:satMod val="160000"/>
+                      </a:schemeClr>
+                    </a:gs>
+                    <a:gs pos="100000">
+                      <a:schemeClr val="accent1">
+                        <a:tint val="23500"/>
+                        <a:satMod val="160000"/>
+                      </a:schemeClr>
+                    </a:gs>
+                  </a:gsLst>
+                  <a:lin ang="5400000" scaled="0"/>
+                </a:gradFill>
+                <a:effectLst>
+                  <a:outerShdw blurRad="50800" dist="38100" dir="5400000" algn="t" rotWithShape="0">
+                    <a:prstClr val="black">
+                      <a:alpha val="40000"/>
+                    </a:prstClr>
+                  </a:outerShdw>
+                </a:effectLst>
                 <a:latin typeface="Arial" pitchFamily="34" charset="0"/>
                 <a:cs typeface="Arial" pitchFamily="34" charset="0"/>
               </a:rPr>
               <a:t>Вопросы?</a:t>
             </a:r>
             <a:endParaRPr lang="ru-RU" sz="4000" dirty="0">
-              <a:solidFill>
-                <a:schemeClr val="bg2">
-                  <a:lumMod val="20000"/>
-                  <a:lumOff val="80000"/>
-                </a:schemeClr>
-              </a:solidFill>
+              <a:ln w="0" cap="rnd">
+                <a:noFill/>
+                <a:bevel/>
+              </a:ln>
+              <a:gradFill>
+                <a:gsLst>
+                  <a:gs pos="100000">
+                    <a:srgbClr val="0070C0">
+                      <a:alpha val="65000"/>
+                    </a:srgbClr>
+                  </a:gs>
+                  <a:gs pos="50000">
+                    <a:schemeClr val="accent1">
+                      <a:tint val="44500"/>
+                      <a:satMod val="160000"/>
+                    </a:schemeClr>
+                  </a:gs>
+                  <a:gs pos="100000">
+                    <a:schemeClr val="accent1">
+                      <a:tint val="23500"/>
+                      <a:satMod val="160000"/>
+                    </a:schemeClr>
+                  </a:gs>
+                </a:gsLst>
+                <a:lin ang="5400000" scaled="0"/>
+              </a:gradFill>
+              <a:effectLst>
+                <a:outerShdw blurRad="50800" dist="38100" dir="5400000" algn="t" rotWithShape="0">
+                  <a:prstClr val="black">
+                    <a:alpha val="40000"/>
+                  </a:prstClr>
+                </a:outerShdw>
+              </a:effectLst>
               <a:latin typeface="Arial" pitchFamily="34" charset="0"/>
               <a:cs typeface="Arial" pitchFamily="34" charset="0"/>
             </a:endParaRPr>
@@ -9572,7 +10268,7 @@
         </p:nvSpPr>
         <p:spPr bwMode="auto">
           <a:xfrm>
-            <a:off x="327472" y="2657872"/>
+            <a:off x="327472" y="2441848"/>
             <a:ext cx="4282827" cy="2554545"/>
           </a:xfrm>
           <a:prstGeom prst="rect">
@@ -9847,7 +10543,7 @@
         </p:nvSpPr>
         <p:spPr bwMode="auto">
           <a:xfrm>
-            <a:off x="471488" y="5250160"/>
+            <a:off x="471488" y="5106144"/>
             <a:ext cx="9286875" cy="707886"/>
           </a:xfrm>
           <a:prstGeom prst="rect">
@@ -11832,4 +12528,570 @@
     </a:extraClrScheme>
   </a:extraClrSchemeLst>
 </a:theme>
+</file>
+
+<file path=ppt/theme/theme2.xml><?xml version="1.0" encoding="utf-8"?>
+<a:theme xmlns:a="http://schemas.openxmlformats.org/drawingml/2006/main" name="Office Theme">
+  <a:themeElements>
+    <a:clrScheme name="Office">
+      <a:dk1>
+        <a:sysClr val="windowText" lastClr="000000"/>
+      </a:dk1>
+      <a:lt1>
+        <a:sysClr val="window" lastClr="FFFFFF"/>
+      </a:lt1>
+      <a:dk2>
+        <a:srgbClr val="1F497D"/>
+      </a:dk2>
+      <a:lt2>
+        <a:srgbClr val="EEECE1"/>
+      </a:lt2>
+      <a:accent1>
+        <a:srgbClr val="4F81BD"/>
+      </a:accent1>
+      <a:accent2>
+        <a:srgbClr val="C0504D"/>
+      </a:accent2>
+      <a:accent3>
+        <a:srgbClr val="9BBB59"/>
+      </a:accent3>
+      <a:accent4>
+        <a:srgbClr val="8064A2"/>
+      </a:accent4>
+      <a:accent5>
+        <a:srgbClr val="4BACC6"/>
+      </a:accent5>
+      <a:accent6>
+        <a:srgbClr val="F79646"/>
+      </a:accent6>
+      <a:hlink>
+        <a:srgbClr val="0000FF"/>
+      </a:hlink>
+      <a:folHlink>
+        <a:srgbClr val="800080"/>
+      </a:folHlink>
+    </a:clrScheme>
+    <a:fontScheme name="Office">
+      <a:majorFont>
+        <a:latin typeface="Calibri"/>
+        <a:ea typeface=""/>
+        <a:cs typeface=""/>
+        <a:font script="Jpan" typeface="ＭＳ Ｐゴシック"/>
+        <a:font script="Hang" typeface="맑은 고딕"/>
+        <a:font script="Hans" typeface="宋体"/>
+        <a:font script="Hant" typeface="新細明體"/>
+        <a:font script="Arab" typeface="Times New Roman"/>
+        <a:font script="Hebr" typeface="Times New Roman"/>
+        <a:font script="Thai" typeface="Angsana New"/>
+        <a:font script="Ethi" typeface="Nyala"/>
+        <a:font script="Beng" typeface="Vrinda"/>
+        <a:font script="Gujr" typeface="Shruti"/>
+        <a:font script="Khmr" typeface="MoolBoran"/>
+        <a:font script="Knda" typeface="Tunga"/>
+        <a:font script="Guru" typeface="Raavi"/>
+        <a:font script="Cans" typeface="Euphemia"/>
+        <a:font script="Cher" typeface="Plantagenet Cherokee"/>
+        <a:font script="Yiii" typeface="Microsoft Yi Baiti"/>
+        <a:font script="Tibt" typeface="Microsoft Himalaya"/>
+        <a:font script="Thaa" typeface="MV Boli"/>
+        <a:font script="Deva" typeface="Mangal"/>
+        <a:font script="Telu" typeface="Gautami"/>
+        <a:font script="Taml" typeface="Latha"/>
+        <a:font script="Syrc" typeface="Estrangelo Edessa"/>
+        <a:font script="Orya" typeface="Kalinga"/>
+        <a:font script="Mlym" typeface="Kartika"/>
+        <a:font script="Laoo" typeface="DokChampa"/>
+        <a:font script="Sinh" typeface="Iskoola Pota"/>
+        <a:font script="Mong" typeface="Mongolian Baiti"/>
+        <a:font script="Viet" typeface="Times New Roman"/>
+        <a:font script="Uigh" typeface="Microsoft Uighur"/>
+      </a:majorFont>
+      <a:minorFont>
+        <a:latin typeface="Calibri"/>
+        <a:ea typeface=""/>
+        <a:cs typeface=""/>
+        <a:font script="Jpan" typeface="ＭＳ Ｐゴシック"/>
+        <a:font script="Hang" typeface="맑은 고딕"/>
+        <a:font script="Hans" typeface="宋体"/>
+        <a:font script="Hant" typeface="新細明體"/>
+        <a:font script="Arab" typeface="Arial"/>
+        <a:font script="Hebr" typeface="Arial"/>
+        <a:font script="Thai" typeface="Cordia New"/>
+        <a:font script="Ethi" typeface="Nyala"/>
+        <a:font script="Beng" typeface="Vrinda"/>
+        <a:font script="Gujr" typeface="Shruti"/>
+        <a:font script="Khmr" typeface="DaunPenh"/>
+        <a:font script="Knda" typeface="Tunga"/>
+        <a:font script="Guru" typeface="Raavi"/>
+        <a:font script="Cans" typeface="Euphemia"/>
+        <a:font script="Cher" typeface="Plantagenet Cherokee"/>
+        <a:font script="Yiii" typeface="Microsoft Yi Baiti"/>
+        <a:font script="Tibt" typeface="Microsoft Himalaya"/>
+        <a:font script="Thaa" typeface="MV Boli"/>
+        <a:font script="Deva" typeface="Mangal"/>
+        <a:font script="Telu" typeface="Gautami"/>
+        <a:font script="Taml" typeface="Latha"/>
+        <a:font script="Syrc" typeface="Estrangelo Edessa"/>
+        <a:font script="Orya" typeface="Kalinga"/>
+        <a:font script="Mlym" typeface="Kartika"/>
+        <a:font script="Laoo" typeface="DokChampa"/>
+        <a:font script="Sinh" typeface="Iskoola Pota"/>
+        <a:font script="Mong" typeface="Mongolian Baiti"/>
+        <a:font script="Viet" typeface="Arial"/>
+        <a:font script="Uigh" typeface="Microsoft Uighur"/>
+      </a:minorFont>
+    </a:fontScheme>
+    <a:fmtScheme name="Office">
+      <a:fillStyleLst>
+        <a:solidFill>
+          <a:schemeClr val="phClr"/>
+        </a:solidFill>
+        <a:gradFill rotWithShape="1">
+          <a:gsLst>
+            <a:gs pos="0">
+              <a:schemeClr val="phClr">
+                <a:tint val="50000"/>
+                <a:satMod val="300000"/>
+              </a:schemeClr>
+            </a:gs>
+            <a:gs pos="35000">
+              <a:schemeClr val="phClr">
+                <a:tint val="37000"/>
+                <a:satMod val="300000"/>
+              </a:schemeClr>
+            </a:gs>
+            <a:gs pos="100000">
+              <a:schemeClr val="phClr">
+                <a:tint val="15000"/>
+                <a:satMod val="350000"/>
+              </a:schemeClr>
+            </a:gs>
+          </a:gsLst>
+          <a:lin ang="16200000" scaled="1"/>
+        </a:gradFill>
+        <a:gradFill rotWithShape="1">
+          <a:gsLst>
+            <a:gs pos="0">
+              <a:schemeClr val="phClr">
+                <a:shade val="51000"/>
+                <a:satMod val="130000"/>
+              </a:schemeClr>
+            </a:gs>
+            <a:gs pos="80000">
+              <a:schemeClr val="phClr">
+                <a:shade val="93000"/>
+                <a:satMod val="130000"/>
+              </a:schemeClr>
+            </a:gs>
+            <a:gs pos="100000">
+              <a:schemeClr val="phClr">
+                <a:shade val="94000"/>
+                <a:satMod val="135000"/>
+              </a:schemeClr>
+            </a:gs>
+          </a:gsLst>
+          <a:lin ang="16200000" scaled="0"/>
+        </a:gradFill>
+      </a:fillStyleLst>
+      <a:lnStyleLst>
+        <a:ln w="9525" cap="flat" cmpd="sng" algn="ctr">
+          <a:solidFill>
+            <a:schemeClr val="phClr">
+              <a:shade val="95000"/>
+              <a:satMod val="105000"/>
+            </a:schemeClr>
+          </a:solidFill>
+          <a:prstDash val="solid"/>
+        </a:ln>
+        <a:ln w="25400" cap="flat" cmpd="sng" algn="ctr">
+          <a:solidFill>
+            <a:schemeClr val="phClr"/>
+          </a:solidFill>
+          <a:prstDash val="solid"/>
+        </a:ln>
+        <a:ln w="38100" cap="flat" cmpd="sng" algn="ctr">
+          <a:solidFill>
+            <a:schemeClr val="phClr"/>
+          </a:solidFill>
+          <a:prstDash val="solid"/>
+        </a:ln>
+      </a:lnStyleLst>
+      <a:effectStyleLst>
+        <a:effectStyle>
+          <a:effectLst>
+            <a:outerShdw blurRad="40000" dist="20000" dir="5400000" rotWithShape="0">
+              <a:srgbClr val="000000">
+                <a:alpha val="38000"/>
+              </a:srgbClr>
+            </a:outerShdw>
+          </a:effectLst>
+        </a:effectStyle>
+        <a:effectStyle>
+          <a:effectLst>
+            <a:outerShdw blurRad="40000" dist="23000" dir="5400000" rotWithShape="0">
+              <a:srgbClr val="000000">
+                <a:alpha val="35000"/>
+              </a:srgbClr>
+            </a:outerShdw>
+          </a:effectLst>
+        </a:effectStyle>
+        <a:effectStyle>
+          <a:effectLst>
+            <a:outerShdw blurRad="40000" dist="23000" dir="5400000" rotWithShape="0">
+              <a:srgbClr val="000000">
+                <a:alpha val="35000"/>
+              </a:srgbClr>
+            </a:outerShdw>
+          </a:effectLst>
+          <a:scene3d>
+            <a:camera prst="orthographicFront">
+              <a:rot lat="0" lon="0" rev="0"/>
+            </a:camera>
+            <a:lightRig rig="threePt" dir="t">
+              <a:rot lat="0" lon="0" rev="1200000"/>
+            </a:lightRig>
+          </a:scene3d>
+          <a:sp3d>
+            <a:bevelT w="63500" h="25400"/>
+          </a:sp3d>
+        </a:effectStyle>
+      </a:effectStyleLst>
+      <a:bgFillStyleLst>
+        <a:solidFill>
+          <a:schemeClr val="phClr"/>
+        </a:solidFill>
+        <a:gradFill rotWithShape="1">
+          <a:gsLst>
+            <a:gs pos="0">
+              <a:schemeClr val="phClr">
+                <a:tint val="40000"/>
+                <a:satMod val="350000"/>
+              </a:schemeClr>
+            </a:gs>
+            <a:gs pos="40000">
+              <a:schemeClr val="phClr">
+                <a:tint val="45000"/>
+                <a:shade val="99000"/>
+                <a:satMod val="350000"/>
+              </a:schemeClr>
+            </a:gs>
+            <a:gs pos="100000">
+              <a:schemeClr val="phClr">
+                <a:shade val="20000"/>
+                <a:satMod val="255000"/>
+              </a:schemeClr>
+            </a:gs>
+          </a:gsLst>
+          <a:path path="circle">
+            <a:fillToRect l="50000" t="-80000" r="50000" b="180000"/>
+          </a:path>
+        </a:gradFill>
+        <a:gradFill rotWithShape="1">
+          <a:gsLst>
+            <a:gs pos="0">
+              <a:schemeClr val="phClr">
+                <a:tint val="80000"/>
+                <a:satMod val="300000"/>
+              </a:schemeClr>
+            </a:gs>
+            <a:gs pos="100000">
+              <a:schemeClr val="phClr">
+                <a:shade val="30000"/>
+                <a:satMod val="200000"/>
+              </a:schemeClr>
+            </a:gs>
+          </a:gsLst>
+          <a:path path="circle">
+            <a:fillToRect l="50000" t="50000" r="50000" b="50000"/>
+          </a:path>
+        </a:gradFill>
+      </a:bgFillStyleLst>
+    </a:fmtScheme>
+  </a:themeElements>
+  <a:objectDefaults/>
+  <a:extraClrSchemeLst/>
+</a:theme>
+</file>
+
+<file path=ppt/theme/theme3.xml><?xml version="1.0" encoding="utf-8"?>
+<a:theme xmlns:a="http://schemas.openxmlformats.org/drawingml/2006/main" name="Office Theme">
+  <a:themeElements>
+    <a:clrScheme name="Office">
+      <a:dk1>
+        <a:sysClr val="windowText" lastClr="000000"/>
+      </a:dk1>
+      <a:lt1>
+        <a:sysClr val="window" lastClr="FFFFFF"/>
+      </a:lt1>
+      <a:dk2>
+        <a:srgbClr val="1F497D"/>
+      </a:dk2>
+      <a:lt2>
+        <a:srgbClr val="EEECE1"/>
+      </a:lt2>
+      <a:accent1>
+        <a:srgbClr val="4F81BD"/>
+      </a:accent1>
+      <a:accent2>
+        <a:srgbClr val="C0504D"/>
+      </a:accent2>
+      <a:accent3>
+        <a:srgbClr val="9BBB59"/>
+      </a:accent3>
+      <a:accent4>
+        <a:srgbClr val="8064A2"/>
+      </a:accent4>
+      <a:accent5>
+        <a:srgbClr val="4BACC6"/>
+      </a:accent5>
+      <a:accent6>
+        <a:srgbClr val="F79646"/>
+      </a:accent6>
+      <a:hlink>
+        <a:srgbClr val="0000FF"/>
+      </a:hlink>
+      <a:folHlink>
+        <a:srgbClr val="800080"/>
+      </a:folHlink>
+    </a:clrScheme>
+    <a:fontScheme name="Office">
+      <a:majorFont>
+        <a:latin typeface="Calibri"/>
+        <a:ea typeface=""/>
+        <a:cs typeface=""/>
+        <a:font script="Jpan" typeface="ＭＳ Ｐゴシック"/>
+        <a:font script="Hang" typeface="맑은 고딕"/>
+        <a:font script="Hans" typeface="宋体"/>
+        <a:font script="Hant" typeface="新細明體"/>
+        <a:font script="Arab" typeface="Times New Roman"/>
+        <a:font script="Hebr" typeface="Times New Roman"/>
+        <a:font script="Thai" typeface="Angsana New"/>
+        <a:font script="Ethi" typeface="Nyala"/>
+        <a:font script="Beng" typeface="Vrinda"/>
+        <a:font script="Gujr" typeface="Shruti"/>
+        <a:font script="Khmr" typeface="MoolBoran"/>
+        <a:font script="Knda" typeface="Tunga"/>
+        <a:font script="Guru" typeface="Raavi"/>
+        <a:font script="Cans" typeface="Euphemia"/>
+        <a:font script="Cher" typeface="Plantagenet Cherokee"/>
+        <a:font script="Yiii" typeface="Microsoft Yi Baiti"/>
+        <a:font script="Tibt" typeface="Microsoft Himalaya"/>
+        <a:font script="Thaa" typeface="MV Boli"/>
+        <a:font script="Deva" typeface="Mangal"/>
+        <a:font script="Telu" typeface="Gautami"/>
+        <a:font script="Taml" typeface="Latha"/>
+        <a:font script="Syrc" typeface="Estrangelo Edessa"/>
+        <a:font script="Orya" typeface="Kalinga"/>
+        <a:font script="Mlym" typeface="Kartika"/>
+        <a:font script="Laoo" typeface="DokChampa"/>
+        <a:font script="Sinh" typeface="Iskoola Pota"/>
+        <a:font script="Mong" typeface="Mongolian Baiti"/>
+        <a:font script="Viet" typeface="Times New Roman"/>
+        <a:font script="Uigh" typeface="Microsoft Uighur"/>
+      </a:majorFont>
+      <a:minorFont>
+        <a:latin typeface="Calibri"/>
+        <a:ea typeface=""/>
+        <a:cs typeface=""/>
+        <a:font script="Jpan" typeface="ＭＳ Ｐゴシック"/>
+        <a:font script="Hang" typeface="맑은 고딕"/>
+        <a:font script="Hans" typeface="宋体"/>
+        <a:font script="Hant" typeface="新細明體"/>
+        <a:font script="Arab" typeface="Arial"/>
+        <a:font script="Hebr" typeface="Arial"/>
+        <a:font script="Thai" typeface="Cordia New"/>
+        <a:font script="Ethi" typeface="Nyala"/>
+        <a:font script="Beng" typeface="Vrinda"/>
+        <a:font script="Gujr" typeface="Shruti"/>
+        <a:font script="Khmr" typeface="DaunPenh"/>
+        <a:font script="Knda" typeface="Tunga"/>
+        <a:font script="Guru" typeface="Raavi"/>
+        <a:font script="Cans" typeface="Euphemia"/>
+        <a:font script="Cher" typeface="Plantagenet Cherokee"/>
+        <a:font script="Yiii" typeface="Microsoft Yi Baiti"/>
+        <a:font script="Tibt" typeface="Microsoft Himalaya"/>
+        <a:font script="Thaa" typeface="MV Boli"/>
+        <a:font script="Deva" typeface="Mangal"/>
+        <a:font script="Telu" typeface="Gautami"/>
+        <a:font script="Taml" typeface="Latha"/>
+        <a:font script="Syrc" typeface="Estrangelo Edessa"/>
+        <a:font script="Orya" typeface="Kalinga"/>
+        <a:font script="Mlym" typeface="Kartika"/>
+        <a:font script="Laoo" typeface="DokChampa"/>
+        <a:font script="Sinh" typeface="Iskoola Pota"/>
+        <a:font script="Mong" typeface="Mongolian Baiti"/>
+        <a:font script="Viet" typeface="Arial"/>
+        <a:font script="Uigh" typeface="Microsoft Uighur"/>
+      </a:minorFont>
+    </a:fontScheme>
+    <a:fmtScheme name="Office">
+      <a:fillStyleLst>
+        <a:solidFill>
+          <a:schemeClr val="phClr"/>
+        </a:solidFill>
+        <a:gradFill rotWithShape="1">
+          <a:gsLst>
+            <a:gs pos="0">
+              <a:schemeClr val="phClr">
+                <a:tint val="50000"/>
+                <a:satMod val="300000"/>
+              </a:schemeClr>
+            </a:gs>
+            <a:gs pos="35000">
+              <a:schemeClr val="phClr">
+                <a:tint val="37000"/>
+                <a:satMod val="300000"/>
+              </a:schemeClr>
+            </a:gs>
+            <a:gs pos="100000">
+              <a:schemeClr val="phClr">
+                <a:tint val="15000"/>
+                <a:satMod val="350000"/>
+              </a:schemeClr>
+            </a:gs>
+          </a:gsLst>
+          <a:lin ang="16200000" scaled="1"/>
+        </a:gradFill>
+        <a:gradFill rotWithShape="1">
+          <a:gsLst>
+            <a:gs pos="0">
+              <a:schemeClr val="phClr">
+                <a:shade val="51000"/>
+                <a:satMod val="130000"/>
+              </a:schemeClr>
+            </a:gs>
+            <a:gs pos="80000">
+              <a:schemeClr val="phClr">
+                <a:shade val="93000"/>
+                <a:satMod val="130000"/>
+              </a:schemeClr>
+            </a:gs>
+            <a:gs pos="100000">
+              <a:schemeClr val="phClr">
+                <a:shade val="94000"/>
+                <a:satMod val="135000"/>
+              </a:schemeClr>
+            </a:gs>
+          </a:gsLst>
+          <a:lin ang="16200000" scaled="0"/>
+        </a:gradFill>
+      </a:fillStyleLst>
+      <a:lnStyleLst>
+        <a:ln w="9525" cap="flat" cmpd="sng" algn="ctr">
+          <a:solidFill>
+            <a:schemeClr val="phClr">
+              <a:shade val="95000"/>
+              <a:satMod val="105000"/>
+            </a:schemeClr>
+          </a:solidFill>
+          <a:prstDash val="solid"/>
+        </a:ln>
+        <a:ln w="25400" cap="flat" cmpd="sng" algn="ctr">
+          <a:solidFill>
+            <a:schemeClr val="phClr"/>
+          </a:solidFill>
+          <a:prstDash val="solid"/>
+        </a:ln>
+        <a:ln w="38100" cap="flat" cmpd="sng" algn="ctr">
+          <a:solidFill>
+            <a:schemeClr val="phClr"/>
+          </a:solidFill>
+          <a:prstDash val="solid"/>
+        </a:ln>
+      </a:lnStyleLst>
+      <a:effectStyleLst>
+        <a:effectStyle>
+          <a:effectLst>
+            <a:outerShdw blurRad="40000" dist="20000" dir="5400000" rotWithShape="0">
+              <a:srgbClr val="000000">
+                <a:alpha val="38000"/>
+              </a:srgbClr>
+            </a:outerShdw>
+          </a:effectLst>
+        </a:effectStyle>
+        <a:effectStyle>
+          <a:effectLst>
+            <a:outerShdw blurRad="40000" dist="23000" dir="5400000" rotWithShape="0">
+              <a:srgbClr val="000000">
+                <a:alpha val="35000"/>
+              </a:srgbClr>
+            </a:outerShdw>
+          </a:effectLst>
+        </a:effectStyle>
+        <a:effectStyle>
+          <a:effectLst>
+            <a:outerShdw blurRad="40000" dist="23000" dir="5400000" rotWithShape="0">
+              <a:srgbClr val="000000">
+                <a:alpha val="35000"/>
+              </a:srgbClr>
+            </a:outerShdw>
+          </a:effectLst>
+          <a:scene3d>
+            <a:camera prst="orthographicFront">
+              <a:rot lat="0" lon="0" rev="0"/>
+            </a:camera>
+            <a:lightRig rig="threePt" dir="t">
+              <a:rot lat="0" lon="0" rev="1200000"/>
+            </a:lightRig>
+          </a:scene3d>
+          <a:sp3d>
+            <a:bevelT w="63500" h="25400"/>
+          </a:sp3d>
+        </a:effectStyle>
+      </a:effectStyleLst>
+      <a:bgFillStyleLst>
+        <a:solidFill>
+          <a:schemeClr val="phClr"/>
+        </a:solidFill>
+        <a:gradFill rotWithShape="1">
+          <a:gsLst>
+            <a:gs pos="0">
+              <a:schemeClr val="phClr">
+                <a:tint val="40000"/>
+                <a:satMod val="350000"/>
+              </a:schemeClr>
+            </a:gs>
+            <a:gs pos="40000">
+              <a:schemeClr val="phClr">
+                <a:tint val="45000"/>
+                <a:shade val="99000"/>
+                <a:satMod val="350000"/>
+              </a:schemeClr>
+            </a:gs>
+            <a:gs pos="100000">
+              <a:schemeClr val="phClr">
+                <a:shade val="20000"/>
+                <a:satMod val="255000"/>
+              </a:schemeClr>
+            </a:gs>
+          </a:gsLst>
+          <a:path path="circle">
+            <a:fillToRect l="50000" t="-80000" r="50000" b="180000"/>
+          </a:path>
+        </a:gradFill>
+        <a:gradFill rotWithShape="1">
+          <a:gsLst>
+            <a:gs pos="0">
+              <a:schemeClr val="phClr">
+                <a:tint val="80000"/>
+                <a:satMod val="300000"/>
+              </a:schemeClr>
+            </a:gs>
+            <a:gs pos="100000">
+              <a:schemeClr val="phClr">
+                <a:shade val="30000"/>
+                <a:satMod val="200000"/>
+              </a:schemeClr>
+            </a:gs>
+          </a:gsLst>
+          <a:path path="circle">
+            <a:fillToRect l="50000" t="50000" r="50000" b="50000"/>
+          </a:path>
+        </a:gradFill>
+      </a:bgFillStyleLst>
+    </a:fmtScheme>
+  </a:themeElements>
+  <a:objectDefaults/>
+  <a:extraClrSchemeLst/>
+</a:theme>
 </file>
</xml_diff>

<commit_message>
2 slides needs. I beleave.
</commit_message>
<xml_diff>
--- a/diploma/trunk/ppt/kostyukov.pptx
+++ b/diploma/trunk/ppt/kostyukov.pptx
@@ -160,6 +160,3755 @@
     </a:lvl9pPr>
   </p:defaultTextStyle>
 </p:presentation>
+</file>
+
+<file path=ppt/diagrams/colors1.xml><?xml version="1.0" encoding="utf-8"?>
+<dgm:colorsDef xmlns:dgm="http://schemas.openxmlformats.org/drawingml/2006/diagram" xmlns:a="http://schemas.openxmlformats.org/drawingml/2006/main" uniqueId="urn:microsoft.com/office/officeart/2005/8/colors/accent2_5">
+  <dgm:title val=""/>
+  <dgm:desc val=""/>
+  <dgm:catLst>
+    <dgm:cat type="accent2" pri="11500"/>
+  </dgm:catLst>
+  <dgm:styleLbl name="node0">
+    <dgm:fillClrLst meth="cycle">
+      <a:schemeClr val="accent2">
+        <a:alpha val="80000"/>
+      </a:schemeClr>
+    </dgm:fillClrLst>
+    <dgm:linClrLst meth="repeat">
+      <a:schemeClr val="lt1"/>
+    </dgm:linClrLst>
+    <dgm:effectClrLst/>
+    <dgm:txLinClrLst/>
+    <dgm:txFillClrLst/>
+    <dgm:txEffectClrLst/>
+  </dgm:styleLbl>
+  <dgm:styleLbl name="node1">
+    <dgm:fillClrLst>
+      <a:schemeClr val="accent2">
+        <a:alpha val="90000"/>
+      </a:schemeClr>
+      <a:schemeClr val="accent2">
+        <a:alpha val="50000"/>
+      </a:schemeClr>
+    </dgm:fillClrLst>
+    <dgm:linClrLst meth="repeat">
+      <a:schemeClr val="lt1"/>
+    </dgm:linClrLst>
+    <dgm:effectClrLst/>
+    <dgm:txLinClrLst/>
+    <dgm:txFillClrLst/>
+    <dgm:txEffectClrLst/>
+  </dgm:styleLbl>
+  <dgm:styleLbl name="alignNode1">
+    <dgm:fillClrLst>
+      <a:schemeClr val="accent2">
+        <a:alpha val="90000"/>
+      </a:schemeClr>
+      <a:schemeClr val="accent2">
+        <a:alpha val="50000"/>
+      </a:schemeClr>
+    </dgm:fillClrLst>
+    <dgm:linClrLst>
+      <a:schemeClr val="accent2">
+        <a:alpha val="90000"/>
+      </a:schemeClr>
+      <a:schemeClr val="accent2">
+        <a:alpha val="50000"/>
+      </a:schemeClr>
+    </dgm:linClrLst>
+    <dgm:effectClrLst/>
+    <dgm:txLinClrLst/>
+    <dgm:txFillClrLst/>
+    <dgm:txEffectClrLst/>
+  </dgm:styleLbl>
+  <dgm:styleLbl name="lnNode1">
+    <dgm:fillClrLst>
+      <a:schemeClr val="accent2">
+        <a:shade val="90000"/>
+      </a:schemeClr>
+      <a:schemeClr val="accent2">
+        <a:alpha val="50000"/>
+        <a:tint val="50000"/>
+      </a:schemeClr>
+    </dgm:fillClrLst>
+    <dgm:linClrLst meth="repeat">
+      <a:schemeClr val="lt1"/>
+    </dgm:linClrLst>
+    <dgm:effectClrLst/>
+    <dgm:txLinClrLst/>
+    <dgm:txFillClrLst/>
+    <dgm:txEffectClrLst/>
+  </dgm:styleLbl>
+  <dgm:styleLbl name="vennNode1">
+    <dgm:fillClrLst>
+      <a:schemeClr val="accent2">
+        <a:shade val="80000"/>
+        <a:alpha val="50000"/>
+      </a:schemeClr>
+      <a:schemeClr val="accent2">
+        <a:alpha val="20000"/>
+      </a:schemeClr>
+    </dgm:fillClrLst>
+    <dgm:linClrLst meth="repeat">
+      <a:schemeClr val="lt1"/>
+    </dgm:linClrLst>
+    <dgm:effectClrLst/>
+    <dgm:txLinClrLst/>
+    <dgm:txFillClrLst/>
+    <dgm:txEffectClrLst/>
+  </dgm:styleLbl>
+  <dgm:styleLbl name="node2">
+    <dgm:fillClrLst>
+      <a:schemeClr val="accent2">
+        <a:alpha val="70000"/>
+      </a:schemeClr>
+    </dgm:fillClrLst>
+    <dgm:linClrLst meth="repeat">
+      <a:schemeClr val="lt1"/>
+    </dgm:linClrLst>
+    <dgm:effectClrLst/>
+    <dgm:txLinClrLst/>
+    <dgm:txFillClrLst/>
+    <dgm:txEffectClrLst/>
+  </dgm:styleLbl>
+  <dgm:styleLbl name="node3">
+    <dgm:fillClrLst>
+      <a:schemeClr val="accent2">
+        <a:alpha val="50000"/>
+      </a:schemeClr>
+    </dgm:fillClrLst>
+    <dgm:linClrLst meth="repeat">
+      <a:schemeClr val="lt1"/>
+    </dgm:linClrLst>
+    <dgm:effectClrLst/>
+    <dgm:txLinClrLst/>
+    <dgm:txFillClrLst/>
+    <dgm:txEffectClrLst/>
+  </dgm:styleLbl>
+  <dgm:styleLbl name="node4">
+    <dgm:fillClrLst>
+      <a:schemeClr val="accent2">
+        <a:alpha val="30000"/>
+      </a:schemeClr>
+    </dgm:fillClrLst>
+    <dgm:linClrLst meth="repeat">
+      <a:schemeClr val="lt1"/>
+    </dgm:linClrLst>
+    <dgm:effectClrLst/>
+    <dgm:txLinClrLst/>
+    <dgm:txFillClrLst/>
+    <dgm:txEffectClrLst/>
+  </dgm:styleLbl>
+  <dgm:styleLbl name="fgImgPlace1">
+    <dgm:fillClrLst>
+      <a:schemeClr val="accent2">
+        <a:tint val="50000"/>
+        <a:alpha val="90000"/>
+      </a:schemeClr>
+      <a:schemeClr val="accent2">
+        <a:tint val="20000"/>
+        <a:alpha val="50000"/>
+      </a:schemeClr>
+    </dgm:fillClrLst>
+    <dgm:linClrLst meth="repeat">
+      <a:schemeClr val="lt1"/>
+    </dgm:linClrLst>
+    <dgm:effectClrLst/>
+    <dgm:txLinClrLst/>
+    <dgm:txFillClrLst meth="repeat">
+      <a:schemeClr val="lt1"/>
+    </dgm:txFillClrLst>
+    <dgm:txEffectClrLst/>
+  </dgm:styleLbl>
+  <dgm:styleLbl name="alignImgPlace1">
+    <dgm:fillClrLst>
+      <a:schemeClr val="accent2">
+        <a:tint val="50000"/>
+      </a:schemeClr>
+      <a:schemeClr val="accent2">
+        <a:tint val="20000"/>
+      </a:schemeClr>
+    </dgm:fillClrLst>
+    <dgm:linClrLst meth="repeat">
+      <a:schemeClr val="lt1"/>
+    </dgm:linClrLst>
+    <dgm:effectClrLst/>
+    <dgm:txLinClrLst/>
+    <dgm:txFillClrLst meth="repeat">
+      <a:schemeClr val="lt1"/>
+    </dgm:txFillClrLst>
+    <dgm:txEffectClrLst/>
+  </dgm:styleLbl>
+  <dgm:styleLbl name="bgImgPlace1">
+    <dgm:fillClrLst>
+      <a:schemeClr val="accent2">
+        <a:tint val="50000"/>
+      </a:schemeClr>
+      <a:schemeClr val="accent2">
+        <a:tint val="20000"/>
+      </a:schemeClr>
+    </dgm:fillClrLst>
+    <dgm:linClrLst meth="repeat">
+      <a:schemeClr val="lt1"/>
+    </dgm:linClrLst>
+    <dgm:effectClrLst/>
+    <dgm:txLinClrLst/>
+    <dgm:txFillClrLst meth="repeat">
+      <a:schemeClr val="lt1"/>
+    </dgm:txFillClrLst>
+    <dgm:txEffectClrLst/>
+  </dgm:styleLbl>
+  <dgm:styleLbl name="sibTrans2D1">
+    <dgm:fillClrLst>
+      <a:schemeClr val="accent2">
+        <a:shade val="90000"/>
+      </a:schemeClr>
+      <a:schemeClr val="accent2">
+        <a:tint val="50000"/>
+      </a:schemeClr>
+    </dgm:fillClrLst>
+    <dgm:linClrLst>
+      <a:schemeClr val="accent2">
+        <a:shade val="90000"/>
+      </a:schemeClr>
+      <a:schemeClr val="accent2">
+        <a:tint val="50000"/>
+      </a:schemeClr>
+    </dgm:linClrLst>
+    <dgm:effectClrLst/>
+    <dgm:txLinClrLst/>
+    <dgm:txFillClrLst/>
+    <dgm:txEffectClrLst/>
+  </dgm:styleLbl>
+  <dgm:styleLbl name="fgSibTrans2D1">
+    <dgm:fillClrLst>
+      <a:schemeClr val="accent2">
+        <a:shade val="90000"/>
+      </a:schemeClr>
+      <a:schemeClr val="accent2">
+        <a:tint val="50000"/>
+      </a:schemeClr>
+    </dgm:fillClrLst>
+    <dgm:linClrLst>
+      <a:schemeClr val="accent2">
+        <a:shade val="90000"/>
+      </a:schemeClr>
+      <a:schemeClr val="accent2">
+        <a:tint val="50000"/>
+      </a:schemeClr>
+    </dgm:linClrLst>
+    <dgm:effectClrLst/>
+    <dgm:txLinClrLst/>
+    <dgm:txFillClrLst/>
+    <dgm:txEffectClrLst/>
+  </dgm:styleLbl>
+  <dgm:styleLbl name="bgSibTrans2D1">
+    <dgm:fillClrLst>
+      <a:schemeClr val="accent2">
+        <a:shade val="90000"/>
+      </a:schemeClr>
+      <a:schemeClr val="accent2">
+        <a:tint val="50000"/>
+      </a:schemeClr>
+    </dgm:fillClrLst>
+    <dgm:linClrLst>
+      <a:schemeClr val="accent2">
+        <a:shade val="90000"/>
+      </a:schemeClr>
+      <a:schemeClr val="accent2">
+        <a:tint val="50000"/>
+      </a:schemeClr>
+    </dgm:linClrLst>
+    <dgm:effectClrLst/>
+    <dgm:txLinClrLst/>
+    <dgm:txFillClrLst/>
+    <dgm:txEffectClrLst/>
+  </dgm:styleLbl>
+  <dgm:styleLbl name="sibTrans1D1">
+    <dgm:fillClrLst>
+      <a:schemeClr val="accent2">
+        <a:shade val="90000"/>
+      </a:schemeClr>
+      <a:schemeClr val="accent2">
+        <a:tint val="50000"/>
+      </a:schemeClr>
+    </dgm:fillClrLst>
+    <dgm:linClrLst>
+      <a:schemeClr val="accent2">
+        <a:shade val="90000"/>
+      </a:schemeClr>
+      <a:schemeClr val="accent2">
+        <a:tint val="50000"/>
+      </a:schemeClr>
+    </dgm:linClrLst>
+    <dgm:effectClrLst/>
+    <dgm:txLinClrLst/>
+    <dgm:txFillClrLst meth="repeat">
+      <a:schemeClr val="tx1"/>
+    </dgm:txFillClrLst>
+    <dgm:txEffectClrLst/>
+  </dgm:styleLbl>
+  <dgm:styleLbl name="callout">
+    <dgm:fillClrLst meth="repeat">
+      <a:schemeClr val="accent2"/>
+    </dgm:fillClrLst>
+    <dgm:linClrLst meth="repeat">
+      <a:schemeClr val="accent2"/>
+    </dgm:linClrLst>
+    <dgm:effectClrLst/>
+    <dgm:txLinClrLst/>
+    <dgm:txFillClrLst meth="repeat">
+      <a:schemeClr val="tx1"/>
+    </dgm:txFillClrLst>
+    <dgm:txEffectClrLst/>
+  </dgm:styleLbl>
+  <dgm:styleLbl name="asst0">
+    <dgm:fillClrLst meth="repeat">
+      <a:schemeClr val="accent2">
+        <a:alpha val="90000"/>
+      </a:schemeClr>
+    </dgm:fillClrLst>
+    <dgm:linClrLst meth="repeat">
+      <a:schemeClr val="lt1"/>
+    </dgm:linClrLst>
+    <dgm:effectClrLst/>
+    <dgm:txLinClrLst/>
+    <dgm:txFillClrLst/>
+    <dgm:txEffectClrLst/>
+  </dgm:styleLbl>
+  <dgm:styleLbl name="asst1">
+    <dgm:fillClrLst meth="repeat">
+      <a:schemeClr val="accent2">
+        <a:alpha val="90000"/>
+      </a:schemeClr>
+    </dgm:fillClrLst>
+    <dgm:linClrLst meth="repeat">
+      <a:schemeClr val="lt1"/>
+    </dgm:linClrLst>
+    <dgm:effectClrLst/>
+    <dgm:txLinClrLst/>
+    <dgm:txFillClrLst/>
+    <dgm:txEffectClrLst/>
+  </dgm:styleLbl>
+  <dgm:styleLbl name="asst2">
+    <dgm:fillClrLst>
+      <a:schemeClr val="accent2">
+        <a:alpha val="90000"/>
+      </a:schemeClr>
+    </dgm:fillClrLst>
+    <dgm:linClrLst meth="repeat">
+      <a:schemeClr val="lt1"/>
+    </dgm:linClrLst>
+    <dgm:effectClrLst/>
+    <dgm:txLinClrLst/>
+    <dgm:txFillClrLst/>
+    <dgm:txEffectClrLst/>
+  </dgm:styleLbl>
+  <dgm:styleLbl name="asst3">
+    <dgm:fillClrLst>
+      <a:schemeClr val="accent2">
+        <a:alpha val="70000"/>
+      </a:schemeClr>
+    </dgm:fillClrLst>
+    <dgm:linClrLst meth="repeat">
+      <a:schemeClr val="lt1"/>
+    </dgm:linClrLst>
+    <dgm:effectClrLst/>
+    <dgm:txLinClrLst/>
+    <dgm:txFillClrLst/>
+    <dgm:txEffectClrLst/>
+  </dgm:styleLbl>
+  <dgm:styleLbl name="asst4">
+    <dgm:fillClrLst>
+      <a:schemeClr val="accent2">
+        <a:alpha val="50000"/>
+      </a:schemeClr>
+    </dgm:fillClrLst>
+    <dgm:linClrLst meth="repeat">
+      <a:schemeClr val="lt1"/>
+    </dgm:linClrLst>
+    <dgm:effectClrLst/>
+    <dgm:txLinClrLst/>
+    <dgm:txFillClrLst/>
+    <dgm:txEffectClrLst/>
+  </dgm:styleLbl>
+  <dgm:styleLbl name="parChTrans2D1">
+    <dgm:fillClrLst meth="repeat">
+      <a:schemeClr val="accent2">
+        <a:shade val="80000"/>
+      </a:schemeClr>
+    </dgm:fillClrLst>
+    <dgm:linClrLst meth="repeat">
+      <a:schemeClr val="accent2">
+        <a:shade val="80000"/>
+      </a:schemeClr>
+    </dgm:linClrLst>
+    <dgm:effectClrLst/>
+    <dgm:txLinClrLst/>
+    <dgm:txFillClrLst/>
+    <dgm:txEffectClrLst/>
+  </dgm:styleLbl>
+  <dgm:styleLbl name="parChTrans2D2">
+    <dgm:fillClrLst meth="repeat">
+      <a:schemeClr val="accent2">
+        <a:tint val="90000"/>
+      </a:schemeClr>
+    </dgm:fillClrLst>
+    <dgm:linClrLst meth="repeat">
+      <a:schemeClr val="accent2">
+        <a:tint val="90000"/>
+      </a:schemeClr>
+    </dgm:linClrLst>
+    <dgm:effectClrLst/>
+    <dgm:txLinClrLst/>
+    <dgm:txFillClrLst/>
+    <dgm:txEffectClrLst/>
+  </dgm:styleLbl>
+  <dgm:styleLbl name="parChTrans2D3">
+    <dgm:fillClrLst meth="repeat">
+      <a:schemeClr val="accent2">
+        <a:tint val="70000"/>
+      </a:schemeClr>
+    </dgm:fillClrLst>
+    <dgm:linClrLst meth="repeat">
+      <a:schemeClr val="accent2">
+        <a:tint val="70000"/>
+      </a:schemeClr>
+    </dgm:linClrLst>
+    <dgm:effectClrLst/>
+    <dgm:txLinClrLst/>
+    <dgm:txFillClrLst/>
+    <dgm:txEffectClrLst/>
+  </dgm:styleLbl>
+  <dgm:styleLbl name="parChTrans2D4">
+    <dgm:fillClrLst meth="repeat">
+      <a:schemeClr val="accent2">
+        <a:tint val="50000"/>
+      </a:schemeClr>
+    </dgm:fillClrLst>
+    <dgm:linClrLst meth="repeat">
+      <a:schemeClr val="accent2">
+        <a:tint val="50000"/>
+      </a:schemeClr>
+    </dgm:linClrLst>
+    <dgm:effectClrLst/>
+    <dgm:txLinClrLst/>
+    <dgm:txFillClrLst meth="repeat">
+      <a:schemeClr val="dk1"/>
+    </dgm:txFillClrLst>
+    <dgm:txEffectClrLst/>
+  </dgm:styleLbl>
+  <dgm:styleLbl name="parChTrans1D1">
+    <dgm:fillClrLst meth="repeat">
+      <a:schemeClr val="accent2">
+        <a:shade val="80000"/>
+      </a:schemeClr>
+    </dgm:fillClrLst>
+    <dgm:linClrLst meth="repeat">
+      <a:schemeClr val="accent2">
+        <a:shade val="80000"/>
+      </a:schemeClr>
+    </dgm:linClrLst>
+    <dgm:effectClrLst/>
+    <dgm:txLinClrLst/>
+    <dgm:txFillClrLst meth="repeat">
+      <a:schemeClr val="tx1"/>
+    </dgm:txFillClrLst>
+    <dgm:txEffectClrLst/>
+  </dgm:styleLbl>
+  <dgm:styleLbl name="parChTrans1D2">
+    <dgm:fillClrLst meth="repeat">
+      <a:schemeClr val="accent2">
+        <a:tint val="90000"/>
+      </a:schemeClr>
+    </dgm:fillClrLst>
+    <dgm:linClrLst meth="repeat">
+      <a:schemeClr val="accent2">
+        <a:tint val="90000"/>
+      </a:schemeClr>
+    </dgm:linClrLst>
+    <dgm:effectClrLst/>
+    <dgm:txLinClrLst/>
+    <dgm:txFillClrLst meth="repeat">
+      <a:schemeClr val="tx1"/>
+    </dgm:txFillClrLst>
+    <dgm:txEffectClrLst/>
+  </dgm:styleLbl>
+  <dgm:styleLbl name="parChTrans1D3">
+    <dgm:fillClrLst meth="repeat">
+      <a:schemeClr val="accent2">
+        <a:tint val="70000"/>
+      </a:schemeClr>
+    </dgm:fillClrLst>
+    <dgm:linClrLst meth="repeat">
+      <a:schemeClr val="accent2">
+        <a:tint val="70000"/>
+      </a:schemeClr>
+    </dgm:linClrLst>
+    <dgm:effectClrLst/>
+    <dgm:txLinClrLst/>
+    <dgm:txFillClrLst meth="repeat">
+      <a:schemeClr val="tx1"/>
+    </dgm:txFillClrLst>
+    <dgm:txEffectClrLst/>
+  </dgm:styleLbl>
+  <dgm:styleLbl name="parChTrans1D4">
+    <dgm:fillClrLst meth="repeat">
+      <a:schemeClr val="accent2">
+        <a:tint val="50000"/>
+      </a:schemeClr>
+    </dgm:fillClrLst>
+    <dgm:linClrLst meth="repeat">
+      <a:schemeClr val="accent2">
+        <a:tint val="50000"/>
+      </a:schemeClr>
+    </dgm:linClrLst>
+    <dgm:effectClrLst/>
+    <dgm:txLinClrLst/>
+    <dgm:txFillClrLst meth="repeat">
+      <a:schemeClr val="tx1"/>
+    </dgm:txFillClrLst>
+    <dgm:txEffectClrLst/>
+  </dgm:styleLbl>
+  <dgm:styleLbl name="fgAcc1">
+    <dgm:fillClrLst meth="repeat">
+      <a:schemeClr val="lt1">
+        <a:alpha val="90000"/>
+      </a:schemeClr>
+    </dgm:fillClrLst>
+    <dgm:linClrLst>
+      <a:schemeClr val="accent2">
+        <a:alpha val="90000"/>
+      </a:schemeClr>
+      <a:schemeClr val="accent2">
+        <a:alpha val="50000"/>
+      </a:schemeClr>
+    </dgm:linClrLst>
+    <dgm:effectClrLst/>
+    <dgm:txLinClrLst/>
+    <dgm:txFillClrLst meth="repeat">
+      <a:schemeClr val="dk1"/>
+    </dgm:txFillClrLst>
+    <dgm:txEffectClrLst/>
+  </dgm:styleLbl>
+  <dgm:styleLbl name="conFgAcc1">
+    <dgm:fillClrLst meth="repeat">
+      <a:schemeClr val="lt1">
+        <a:alpha val="90000"/>
+      </a:schemeClr>
+    </dgm:fillClrLst>
+    <dgm:linClrLst>
+      <a:schemeClr val="accent2">
+        <a:alpha val="90000"/>
+      </a:schemeClr>
+      <a:schemeClr val="accent2">
+        <a:alpha val="50000"/>
+      </a:schemeClr>
+    </dgm:linClrLst>
+    <dgm:effectClrLst/>
+    <dgm:txLinClrLst/>
+    <dgm:txFillClrLst meth="repeat">
+      <a:schemeClr val="dk1"/>
+    </dgm:txFillClrLst>
+    <dgm:txEffectClrLst/>
+  </dgm:styleLbl>
+  <dgm:styleLbl name="alignAcc1">
+    <dgm:fillClrLst meth="repeat">
+      <a:schemeClr val="lt1">
+        <a:alpha val="90000"/>
+      </a:schemeClr>
+    </dgm:fillClrLst>
+    <dgm:linClrLst>
+      <a:schemeClr val="accent2">
+        <a:alpha val="90000"/>
+      </a:schemeClr>
+      <a:schemeClr val="accent2">
+        <a:alpha val="50000"/>
+      </a:schemeClr>
+    </dgm:linClrLst>
+    <dgm:effectClrLst/>
+    <dgm:txLinClrLst/>
+    <dgm:txFillClrLst meth="repeat">
+      <a:schemeClr val="dk1"/>
+    </dgm:txFillClrLst>
+    <dgm:txEffectClrLst/>
+  </dgm:styleLbl>
+  <dgm:styleLbl name="trAlignAcc1">
+    <dgm:fillClrLst meth="repeat">
+      <a:schemeClr val="lt1">
+        <a:alpha val="40000"/>
+      </a:schemeClr>
+    </dgm:fillClrLst>
+    <dgm:linClrLst>
+      <a:schemeClr val="accent2">
+        <a:alpha val="90000"/>
+      </a:schemeClr>
+      <a:schemeClr val="accent2">
+        <a:alpha val="50000"/>
+      </a:schemeClr>
+    </dgm:linClrLst>
+    <dgm:effectClrLst/>
+    <dgm:txLinClrLst/>
+    <dgm:txFillClrLst meth="repeat">
+      <a:schemeClr val="dk1"/>
+    </dgm:txFillClrLst>
+    <dgm:txEffectClrLst/>
+  </dgm:styleLbl>
+  <dgm:styleLbl name="bgAcc1">
+    <dgm:fillClrLst meth="repeat">
+      <a:schemeClr val="lt1">
+        <a:alpha val="90000"/>
+      </a:schemeClr>
+    </dgm:fillClrLst>
+    <dgm:linClrLst>
+      <a:schemeClr val="accent2">
+        <a:alpha val="90000"/>
+      </a:schemeClr>
+      <a:schemeClr val="accent2">
+        <a:alpha val="50000"/>
+      </a:schemeClr>
+    </dgm:linClrLst>
+    <dgm:effectClrLst/>
+    <dgm:txLinClrLst/>
+    <dgm:txFillClrLst meth="repeat">
+      <a:schemeClr val="dk1"/>
+    </dgm:txFillClrLst>
+    <dgm:txEffectClrLst/>
+  </dgm:styleLbl>
+  <dgm:styleLbl name="solidFgAcc1">
+    <dgm:fillClrLst meth="repeat">
+      <a:schemeClr val="lt1"/>
+    </dgm:fillClrLst>
+    <dgm:linClrLst>
+      <a:schemeClr val="accent2">
+        <a:alpha val="90000"/>
+      </a:schemeClr>
+      <a:schemeClr val="accent2">
+        <a:alpha val="50000"/>
+      </a:schemeClr>
+    </dgm:linClrLst>
+    <dgm:effectClrLst/>
+    <dgm:txLinClrLst/>
+    <dgm:txFillClrLst meth="repeat">
+      <a:schemeClr val="dk1"/>
+    </dgm:txFillClrLst>
+    <dgm:txEffectClrLst/>
+  </dgm:styleLbl>
+  <dgm:styleLbl name="solidAlignAcc1">
+    <dgm:fillClrLst meth="repeat">
+      <a:schemeClr val="lt1"/>
+    </dgm:fillClrLst>
+    <dgm:linClrLst meth="repeat">
+      <a:schemeClr val="accent2"/>
+    </dgm:linClrLst>
+    <dgm:effectClrLst/>
+    <dgm:txLinClrLst/>
+    <dgm:txFillClrLst meth="repeat">
+      <a:schemeClr val="dk1"/>
+    </dgm:txFillClrLst>
+    <dgm:txEffectClrLst/>
+  </dgm:styleLbl>
+  <dgm:styleLbl name="solidBgAcc1">
+    <dgm:fillClrLst meth="repeat">
+      <a:schemeClr val="lt1"/>
+    </dgm:fillClrLst>
+    <dgm:linClrLst meth="repeat">
+      <a:schemeClr val="accent2"/>
+    </dgm:linClrLst>
+    <dgm:effectClrLst/>
+    <dgm:txLinClrLst/>
+    <dgm:txFillClrLst meth="repeat">
+      <a:schemeClr val="dk1"/>
+    </dgm:txFillClrLst>
+    <dgm:txEffectClrLst/>
+  </dgm:styleLbl>
+  <dgm:styleLbl name="fgAccFollowNode1">
+    <dgm:fillClrLst>
+      <a:schemeClr val="accent2">
+        <a:alpha val="90000"/>
+        <a:tint val="40000"/>
+      </a:schemeClr>
+      <a:schemeClr val="accent2">
+        <a:alpha val="50000"/>
+        <a:tint val="40000"/>
+      </a:schemeClr>
+    </dgm:fillClrLst>
+    <dgm:linClrLst meth="repeat">
+      <a:schemeClr val="accent2">
+        <a:alpha val="90000"/>
+        <a:tint val="40000"/>
+      </a:schemeClr>
+    </dgm:linClrLst>
+    <dgm:effectClrLst/>
+    <dgm:txLinClrLst/>
+    <dgm:txFillClrLst meth="repeat">
+      <a:schemeClr val="dk1"/>
+    </dgm:txFillClrLst>
+    <dgm:txEffectClrLst/>
+  </dgm:styleLbl>
+  <dgm:styleLbl name="alignAccFollowNode1">
+    <dgm:fillClrLst meth="repeat">
+      <a:schemeClr val="accent2">
+        <a:alpha val="90000"/>
+        <a:tint val="40000"/>
+      </a:schemeClr>
+    </dgm:fillClrLst>
+    <dgm:linClrLst meth="repeat">
+      <a:schemeClr val="accent2">
+        <a:alpha val="90000"/>
+        <a:tint val="40000"/>
+      </a:schemeClr>
+    </dgm:linClrLst>
+    <dgm:effectClrLst/>
+    <dgm:txLinClrLst/>
+    <dgm:txFillClrLst meth="repeat">
+      <a:schemeClr val="dk1"/>
+    </dgm:txFillClrLst>
+    <dgm:txEffectClrLst/>
+  </dgm:styleLbl>
+  <dgm:styleLbl name="bgAccFollowNode1">
+    <dgm:fillClrLst meth="repeat">
+      <a:schemeClr val="accent2">
+        <a:alpha val="90000"/>
+        <a:tint val="40000"/>
+      </a:schemeClr>
+    </dgm:fillClrLst>
+    <dgm:linClrLst meth="repeat">
+      <a:schemeClr val="lt1"/>
+    </dgm:linClrLst>
+    <dgm:effectClrLst/>
+    <dgm:txLinClrLst/>
+    <dgm:txFillClrLst meth="repeat">
+      <a:schemeClr val="dk1"/>
+    </dgm:txFillClrLst>
+    <dgm:txEffectClrLst/>
+  </dgm:styleLbl>
+  <dgm:styleLbl name="fgAcc0">
+    <dgm:fillClrLst meth="repeat">
+      <a:schemeClr val="lt1">
+        <a:alpha val="90000"/>
+      </a:schemeClr>
+    </dgm:fillClrLst>
+    <dgm:linClrLst meth="repeat">
+      <a:schemeClr val="accent2">
+        <a:shade val="80000"/>
+      </a:schemeClr>
+    </dgm:linClrLst>
+    <dgm:effectClrLst/>
+    <dgm:txLinClrLst/>
+    <dgm:txFillClrLst meth="repeat">
+      <a:schemeClr val="dk1"/>
+    </dgm:txFillClrLst>
+    <dgm:txEffectClrLst/>
+  </dgm:styleLbl>
+  <dgm:styleLbl name="fgAcc2">
+    <dgm:fillClrLst meth="repeat">
+      <a:schemeClr val="lt1">
+        <a:alpha val="90000"/>
+      </a:schemeClr>
+    </dgm:fillClrLst>
+    <dgm:linClrLst meth="repeat">
+      <a:schemeClr val="accent2">
+        <a:tint val="90000"/>
+      </a:schemeClr>
+    </dgm:linClrLst>
+    <dgm:effectClrLst/>
+    <dgm:txLinClrLst/>
+    <dgm:txFillClrLst meth="repeat">
+      <a:schemeClr val="dk1"/>
+    </dgm:txFillClrLst>
+    <dgm:txEffectClrLst/>
+  </dgm:styleLbl>
+  <dgm:styleLbl name="fgAcc3">
+    <dgm:fillClrLst meth="repeat">
+      <a:schemeClr val="lt1">
+        <a:alpha val="90000"/>
+      </a:schemeClr>
+    </dgm:fillClrLst>
+    <dgm:linClrLst meth="repeat">
+      <a:schemeClr val="accent2">
+        <a:tint val="70000"/>
+      </a:schemeClr>
+    </dgm:linClrLst>
+    <dgm:effectClrLst/>
+    <dgm:txLinClrLst/>
+    <dgm:txFillClrLst meth="repeat">
+      <a:schemeClr val="dk1"/>
+    </dgm:txFillClrLst>
+    <dgm:txEffectClrLst/>
+  </dgm:styleLbl>
+  <dgm:styleLbl name="fgAcc4">
+    <dgm:fillClrLst meth="repeat">
+      <a:schemeClr val="lt1">
+        <a:alpha val="90000"/>
+      </a:schemeClr>
+    </dgm:fillClrLst>
+    <dgm:linClrLst meth="repeat">
+      <a:schemeClr val="accent2">
+        <a:tint val="50000"/>
+      </a:schemeClr>
+    </dgm:linClrLst>
+    <dgm:effectClrLst/>
+    <dgm:txLinClrLst/>
+    <dgm:txFillClrLst meth="repeat">
+      <a:schemeClr val="dk1"/>
+    </dgm:txFillClrLst>
+    <dgm:txEffectClrLst/>
+  </dgm:styleLbl>
+  <dgm:styleLbl name="bgShp">
+    <dgm:fillClrLst meth="repeat">
+      <a:schemeClr val="accent2">
+        <a:tint val="40000"/>
+      </a:schemeClr>
+    </dgm:fillClrLst>
+    <dgm:linClrLst meth="repeat">
+      <a:schemeClr val="dk1"/>
+    </dgm:linClrLst>
+    <dgm:effectClrLst/>
+    <dgm:txLinClrLst/>
+    <dgm:txFillClrLst meth="repeat">
+      <a:schemeClr val="dk1"/>
+    </dgm:txFillClrLst>
+    <dgm:txEffectClrLst/>
+  </dgm:styleLbl>
+  <dgm:styleLbl name="dkBgShp">
+    <dgm:fillClrLst meth="repeat">
+      <a:schemeClr val="accent2">
+        <a:shade val="90000"/>
+      </a:schemeClr>
+    </dgm:fillClrLst>
+    <dgm:linClrLst meth="repeat">
+      <a:schemeClr val="dk1"/>
+    </dgm:linClrLst>
+    <dgm:effectClrLst/>
+    <dgm:txLinClrLst/>
+    <dgm:txFillClrLst meth="repeat">
+      <a:schemeClr val="lt1"/>
+    </dgm:txFillClrLst>
+    <dgm:txEffectClrLst/>
+  </dgm:styleLbl>
+  <dgm:styleLbl name="trBgShp">
+    <dgm:fillClrLst meth="repeat">
+      <a:schemeClr val="accent2">
+        <a:tint val="50000"/>
+        <a:alpha val="40000"/>
+      </a:schemeClr>
+    </dgm:fillClrLst>
+    <dgm:linClrLst meth="repeat">
+      <a:schemeClr val="accent2"/>
+    </dgm:linClrLst>
+    <dgm:effectClrLst/>
+    <dgm:txLinClrLst/>
+    <dgm:txFillClrLst meth="repeat">
+      <a:schemeClr val="lt1"/>
+    </dgm:txFillClrLst>
+    <dgm:txEffectClrLst/>
+  </dgm:styleLbl>
+  <dgm:styleLbl name="fgShp">
+    <dgm:fillClrLst meth="repeat">
+      <a:schemeClr val="accent2">
+        <a:tint val="40000"/>
+      </a:schemeClr>
+    </dgm:fillClrLst>
+    <dgm:linClrLst meth="repeat">
+      <a:schemeClr val="lt1"/>
+    </dgm:linClrLst>
+    <dgm:effectClrLst/>
+    <dgm:txLinClrLst/>
+    <dgm:txFillClrLst meth="repeat">
+      <a:schemeClr val="dk1"/>
+    </dgm:txFillClrLst>
+    <dgm:txEffectClrLst/>
+  </dgm:styleLbl>
+  <dgm:styleLbl name="revTx">
+    <dgm:fillClrLst meth="repeat">
+      <a:schemeClr val="lt1">
+        <a:alpha val="0"/>
+      </a:schemeClr>
+    </dgm:fillClrLst>
+    <dgm:linClrLst meth="repeat">
+      <a:schemeClr val="dk1">
+        <a:alpha val="0"/>
+      </a:schemeClr>
+    </dgm:linClrLst>
+    <dgm:effectClrLst/>
+    <dgm:txLinClrLst/>
+    <dgm:txFillClrLst meth="repeat">
+      <a:schemeClr val="tx1"/>
+    </dgm:txFillClrLst>
+    <dgm:txEffectClrLst/>
+  </dgm:styleLbl>
+</dgm:colorsDef>
+</file>
+
+<file path=ppt/diagrams/data1.xml><?xml version="1.0" encoding="utf-8"?>
+<dgm:dataModel xmlns:dgm="http://schemas.openxmlformats.org/drawingml/2006/diagram" xmlns:a="http://schemas.openxmlformats.org/drawingml/2006/main">
+  <dgm:ptLst>
+    <dgm:pt modelId="{EA2D5F14-E40B-43F7-B0F3-B1D2E4B58E0D}" type="doc">
+      <dgm:prSet loTypeId="urn:microsoft.com/office/officeart/2005/8/layout/cycle3" loCatId="cycle" qsTypeId="urn:microsoft.com/office/officeart/2005/8/quickstyle/simple3" qsCatId="simple" csTypeId="urn:microsoft.com/office/officeart/2005/8/colors/accent2_5" csCatId="accent2" phldr="1"/>
+      <dgm:spPr/>
+      <dgm:t>
+        <a:bodyPr/>
+        <a:lstStyle/>
+        <a:p>
+          <a:endParaRPr lang="ru-RU"/>
+        </a:p>
+      </dgm:t>
+    </dgm:pt>
+    <dgm:pt modelId="{3A9A016C-67D7-41CC-80D1-4D968D88CFB4}">
+      <dgm:prSet phldrT="[Text]" custT="1"/>
+      <dgm:spPr>
+        <a:gradFill flip="none" rotWithShape="1">
+          <a:gsLst>
+            <a:gs pos="0">
+              <a:srgbClr val="0070C0">
+                <a:tint val="66000"/>
+                <a:satMod val="160000"/>
+              </a:srgbClr>
+            </a:gs>
+            <a:gs pos="50000">
+              <a:srgbClr val="0070C0">
+                <a:tint val="44500"/>
+                <a:satMod val="160000"/>
+              </a:srgbClr>
+            </a:gs>
+            <a:gs pos="100000">
+              <a:srgbClr val="0070C0">
+                <a:tint val="23500"/>
+                <a:satMod val="160000"/>
+              </a:srgbClr>
+            </a:gs>
+          </a:gsLst>
+          <a:lin ang="2700000" scaled="1"/>
+          <a:tileRect/>
+        </a:gradFill>
+      </dgm:spPr>
+      <dgm:t>
+        <a:bodyPr/>
+        <a:lstStyle/>
+        <a:p>
+          <a:r>
+            <a:rPr lang="ru-RU" sz="1800" b="0" cap="none" spc="0" dirty="0" smtClean="0">
+              <a:ln w="18415" cmpd="sng">
+                <a:prstDash val="solid"/>
+              </a:ln>
+              <a:effectLst>
+                <a:outerShdw blurRad="63500" dir="3600000" algn="tl" rotWithShape="0">
+                  <a:srgbClr val="000000">
+                    <a:alpha val="70000"/>
+                  </a:srgbClr>
+                </a:outerShdw>
+              </a:effectLst>
+              <a:latin typeface="Calibri" pitchFamily="34" charset="0"/>
+              <a:cs typeface="Calibri" pitchFamily="34" charset="0"/>
+            </a:rPr>
+            <a:t>отказоустойчивость</a:t>
+          </a:r>
+          <a:endParaRPr lang="ru-RU" sz="1800" b="0" cap="none" spc="0" dirty="0">
+            <a:ln w="18415" cmpd="sng">
+              <a:prstDash val="solid"/>
+            </a:ln>
+            <a:effectLst>
+              <a:outerShdw blurRad="63500" dir="3600000" algn="tl" rotWithShape="0">
+                <a:srgbClr val="000000">
+                  <a:alpha val="70000"/>
+                </a:srgbClr>
+              </a:outerShdw>
+            </a:effectLst>
+            <a:latin typeface="Calibri" pitchFamily="34" charset="0"/>
+            <a:cs typeface="Calibri" pitchFamily="34" charset="0"/>
+          </a:endParaRPr>
+        </a:p>
+      </dgm:t>
+    </dgm:pt>
+    <dgm:pt modelId="{1FEB9B99-DE8A-4412-9CF8-FFD804B169C3}" type="parTrans" cxnId="{031E5510-A153-4ED4-A3BC-614FBAF0B48C}">
+      <dgm:prSet/>
+      <dgm:spPr/>
+      <dgm:t>
+        <a:bodyPr/>
+        <a:lstStyle/>
+        <a:p>
+          <a:endParaRPr lang="ru-RU" b="0" cap="none" spc="0">
+            <a:ln w="18415" cmpd="sng">
+              <a:solidFill>
+                <a:srgbClr val="FFFFFF"/>
+              </a:solidFill>
+              <a:prstDash val="solid"/>
+            </a:ln>
+            <a:solidFill>
+              <a:schemeClr val="bg1"/>
+            </a:solidFill>
+            <a:effectLst>
+              <a:outerShdw blurRad="63500" dir="3600000" algn="tl" rotWithShape="0">
+                <a:srgbClr val="000000">
+                  <a:alpha val="70000"/>
+                </a:srgbClr>
+              </a:outerShdw>
+            </a:effectLst>
+          </a:endParaRPr>
+        </a:p>
+      </dgm:t>
+    </dgm:pt>
+    <dgm:pt modelId="{158D99C9-5EC3-411B-ADDE-B7019FF7A4A0}" type="sibTrans" cxnId="{031E5510-A153-4ED4-A3BC-614FBAF0B48C}">
+      <dgm:prSet/>
+      <dgm:spPr/>
+      <dgm:t>
+        <a:bodyPr/>
+        <a:lstStyle/>
+        <a:p>
+          <a:endParaRPr lang="ru-RU" b="0" cap="none" spc="0">
+            <a:ln w="18415" cmpd="sng">
+              <a:solidFill>
+                <a:srgbClr val="FFFFFF"/>
+              </a:solidFill>
+              <a:prstDash val="solid"/>
+            </a:ln>
+            <a:solidFill>
+              <a:schemeClr val="bg1"/>
+            </a:solidFill>
+            <a:effectLst>
+              <a:outerShdw blurRad="63500" dir="3600000" algn="tl" rotWithShape="0">
+                <a:srgbClr val="000000">
+                  <a:alpha val="70000"/>
+                </a:srgbClr>
+              </a:outerShdw>
+            </a:effectLst>
+          </a:endParaRPr>
+        </a:p>
+      </dgm:t>
+    </dgm:pt>
+    <dgm:pt modelId="{8F2EF5C7-67F6-4DFE-AFDE-CBB2A84E5CEC}">
+      <dgm:prSet phldrT="[Text]" custT="1"/>
+      <dgm:spPr>
+        <a:gradFill flip="none" rotWithShape="1">
+          <a:gsLst>
+            <a:gs pos="0">
+              <a:srgbClr val="0070C0">
+                <a:tint val="66000"/>
+                <a:satMod val="160000"/>
+              </a:srgbClr>
+            </a:gs>
+            <a:gs pos="50000">
+              <a:srgbClr val="0070C0">
+                <a:tint val="44500"/>
+                <a:satMod val="160000"/>
+              </a:srgbClr>
+            </a:gs>
+            <a:gs pos="100000">
+              <a:srgbClr val="0070C0">
+                <a:tint val="23500"/>
+                <a:satMod val="160000"/>
+              </a:srgbClr>
+            </a:gs>
+          </a:gsLst>
+          <a:lin ang="2700000" scaled="1"/>
+          <a:tileRect/>
+        </a:gradFill>
+      </dgm:spPr>
+      <dgm:t>
+        <a:bodyPr/>
+        <a:lstStyle/>
+        <a:p>
+          <a:r>
+            <a:rPr lang="ru-RU" sz="1800" b="0" cap="none" spc="0" smtClean="0">
+              <a:ln w="18415" cmpd="sng">
+                <a:prstDash val="solid"/>
+              </a:ln>
+              <a:effectLst>
+                <a:outerShdw blurRad="63500" dir="3600000" algn="tl" rotWithShape="0">
+                  <a:srgbClr val="000000">
+                    <a:alpha val="70000"/>
+                  </a:srgbClr>
+                </a:outerShdw>
+              </a:effectLst>
+              <a:latin typeface="Calibri" pitchFamily="34" charset="0"/>
+              <a:cs typeface="Calibri" pitchFamily="34" charset="0"/>
+            </a:rPr>
+            <a:t>масштабируемость</a:t>
+          </a:r>
+          <a:endParaRPr lang="ru-RU" sz="1800" b="0" cap="none" spc="0" dirty="0">
+            <a:ln w="18415" cmpd="sng">
+              <a:prstDash val="solid"/>
+            </a:ln>
+            <a:effectLst>
+              <a:outerShdw blurRad="63500" dir="3600000" algn="tl" rotWithShape="0">
+                <a:srgbClr val="000000">
+                  <a:alpha val="70000"/>
+                </a:srgbClr>
+              </a:outerShdw>
+            </a:effectLst>
+            <a:latin typeface="Calibri" pitchFamily="34" charset="0"/>
+            <a:cs typeface="Calibri" pitchFamily="34" charset="0"/>
+          </a:endParaRPr>
+        </a:p>
+      </dgm:t>
+    </dgm:pt>
+    <dgm:pt modelId="{E931768F-C92B-4BE5-A2BC-C697DE63173F}" type="parTrans" cxnId="{E3C6FC13-AFCE-4602-8C85-98FB41665837}">
+      <dgm:prSet/>
+      <dgm:spPr/>
+      <dgm:t>
+        <a:bodyPr/>
+        <a:lstStyle/>
+        <a:p>
+          <a:endParaRPr lang="ru-RU" b="0" cap="none" spc="0">
+            <a:ln w="18415" cmpd="sng">
+              <a:solidFill>
+                <a:srgbClr val="FFFFFF"/>
+              </a:solidFill>
+              <a:prstDash val="solid"/>
+            </a:ln>
+            <a:solidFill>
+              <a:schemeClr val="bg1"/>
+            </a:solidFill>
+            <a:effectLst>
+              <a:outerShdw blurRad="63500" dir="3600000" algn="tl" rotWithShape="0">
+                <a:srgbClr val="000000">
+                  <a:alpha val="70000"/>
+                </a:srgbClr>
+              </a:outerShdw>
+            </a:effectLst>
+          </a:endParaRPr>
+        </a:p>
+      </dgm:t>
+    </dgm:pt>
+    <dgm:pt modelId="{4FEFF33D-2342-4B0F-9B57-0A82D4DCE289}" type="sibTrans" cxnId="{E3C6FC13-AFCE-4602-8C85-98FB41665837}">
+      <dgm:prSet/>
+      <dgm:spPr/>
+      <dgm:t>
+        <a:bodyPr/>
+        <a:lstStyle/>
+        <a:p>
+          <a:endParaRPr lang="ru-RU" b="0" cap="none" spc="0">
+            <a:ln w="18415" cmpd="sng">
+              <a:solidFill>
+                <a:srgbClr val="FFFFFF"/>
+              </a:solidFill>
+              <a:prstDash val="solid"/>
+            </a:ln>
+            <a:solidFill>
+              <a:schemeClr val="bg1"/>
+            </a:solidFill>
+            <a:effectLst>
+              <a:outerShdw blurRad="63500" dir="3600000" algn="tl" rotWithShape="0">
+                <a:srgbClr val="000000">
+                  <a:alpha val="70000"/>
+                </a:srgbClr>
+              </a:outerShdw>
+            </a:effectLst>
+          </a:endParaRPr>
+        </a:p>
+      </dgm:t>
+    </dgm:pt>
+    <dgm:pt modelId="{D189C4D7-E8B0-4280-8691-C464124A0D3C}">
+      <dgm:prSet phldrT="[Text]" custT="1"/>
+      <dgm:spPr>
+        <a:gradFill flip="none" rotWithShape="1">
+          <a:gsLst>
+            <a:gs pos="0">
+              <a:srgbClr val="0070C0">
+                <a:tint val="66000"/>
+                <a:satMod val="160000"/>
+              </a:srgbClr>
+            </a:gs>
+            <a:gs pos="50000">
+              <a:srgbClr val="0070C0">
+                <a:tint val="44500"/>
+                <a:satMod val="160000"/>
+              </a:srgbClr>
+            </a:gs>
+            <a:gs pos="100000">
+              <a:srgbClr val="0070C0">
+                <a:tint val="23500"/>
+                <a:satMod val="160000"/>
+              </a:srgbClr>
+            </a:gs>
+          </a:gsLst>
+          <a:lin ang="2700000" scaled="1"/>
+          <a:tileRect/>
+        </a:gradFill>
+      </dgm:spPr>
+      <dgm:t>
+        <a:bodyPr/>
+        <a:lstStyle/>
+        <a:p>
+          <a:r>
+            <a:rPr lang="ru-RU" sz="1800" b="0" cap="none" spc="0" smtClean="0">
+              <a:ln w="18415" cmpd="sng">
+                <a:prstDash val="solid"/>
+              </a:ln>
+              <a:effectLst>
+                <a:outerShdw blurRad="63500" dir="3600000" algn="tl" rotWithShape="0">
+                  <a:srgbClr val="000000">
+                    <a:alpha val="70000"/>
+                  </a:srgbClr>
+                </a:outerShdw>
+              </a:effectLst>
+              <a:latin typeface="Calibri" pitchFamily="34" charset="0"/>
+              <a:cs typeface="Calibri" pitchFamily="34" charset="0"/>
+            </a:rPr>
+            <a:t>эффективность</a:t>
+          </a:r>
+          <a:endParaRPr lang="ru-RU" sz="1800" b="0" cap="none" spc="0" dirty="0">
+            <a:ln w="18415" cmpd="sng">
+              <a:prstDash val="solid"/>
+            </a:ln>
+            <a:effectLst>
+              <a:outerShdw blurRad="63500" dir="3600000" algn="tl" rotWithShape="0">
+                <a:srgbClr val="000000">
+                  <a:alpha val="70000"/>
+                </a:srgbClr>
+              </a:outerShdw>
+            </a:effectLst>
+            <a:latin typeface="Calibri" pitchFamily="34" charset="0"/>
+            <a:cs typeface="Calibri" pitchFamily="34" charset="0"/>
+          </a:endParaRPr>
+        </a:p>
+      </dgm:t>
+    </dgm:pt>
+    <dgm:pt modelId="{DA93A8CE-7045-4F6D-B4F9-99D035A07D8A}" type="parTrans" cxnId="{EF67F0F2-738B-4BEF-AB36-205E4CE04439}">
+      <dgm:prSet/>
+      <dgm:spPr/>
+      <dgm:t>
+        <a:bodyPr/>
+        <a:lstStyle/>
+        <a:p>
+          <a:endParaRPr lang="ru-RU" b="0" cap="none" spc="0">
+            <a:ln w="18415" cmpd="sng">
+              <a:solidFill>
+                <a:srgbClr val="FFFFFF"/>
+              </a:solidFill>
+              <a:prstDash val="solid"/>
+            </a:ln>
+            <a:solidFill>
+              <a:schemeClr val="bg1"/>
+            </a:solidFill>
+            <a:effectLst>
+              <a:outerShdw blurRad="63500" dir="3600000" algn="tl" rotWithShape="0">
+                <a:srgbClr val="000000">
+                  <a:alpha val="70000"/>
+                </a:srgbClr>
+              </a:outerShdw>
+            </a:effectLst>
+          </a:endParaRPr>
+        </a:p>
+      </dgm:t>
+    </dgm:pt>
+    <dgm:pt modelId="{5BA99EFD-E8E4-4716-BCD0-8199142323D3}" type="sibTrans" cxnId="{EF67F0F2-738B-4BEF-AB36-205E4CE04439}">
+      <dgm:prSet/>
+      <dgm:spPr/>
+      <dgm:t>
+        <a:bodyPr/>
+        <a:lstStyle/>
+        <a:p>
+          <a:endParaRPr lang="ru-RU" b="0" cap="none" spc="0">
+            <a:ln w="18415" cmpd="sng">
+              <a:solidFill>
+                <a:srgbClr val="FFFFFF"/>
+              </a:solidFill>
+              <a:prstDash val="solid"/>
+            </a:ln>
+            <a:solidFill>
+              <a:schemeClr val="bg1"/>
+            </a:solidFill>
+            <a:effectLst>
+              <a:outerShdw blurRad="63500" dir="3600000" algn="tl" rotWithShape="0">
+                <a:srgbClr val="000000">
+                  <a:alpha val="70000"/>
+                </a:srgbClr>
+              </a:outerShdw>
+            </a:effectLst>
+          </a:endParaRPr>
+        </a:p>
+      </dgm:t>
+    </dgm:pt>
+    <dgm:pt modelId="{6576CFC8-73C4-45BF-A198-7E1315F63B38}">
+      <dgm:prSet phldrT="[Text]" custT="1"/>
+      <dgm:spPr>
+        <a:gradFill flip="none" rotWithShape="1">
+          <a:gsLst>
+            <a:gs pos="0">
+              <a:srgbClr val="0070C0">
+                <a:tint val="66000"/>
+                <a:satMod val="160000"/>
+              </a:srgbClr>
+            </a:gs>
+            <a:gs pos="50000">
+              <a:srgbClr val="0070C0">
+                <a:tint val="44500"/>
+                <a:satMod val="160000"/>
+              </a:srgbClr>
+            </a:gs>
+            <a:gs pos="100000">
+              <a:srgbClr val="0070C0">
+                <a:tint val="23500"/>
+                <a:satMod val="160000"/>
+              </a:srgbClr>
+            </a:gs>
+          </a:gsLst>
+          <a:lin ang="2700000" scaled="1"/>
+          <a:tileRect/>
+        </a:gradFill>
+      </dgm:spPr>
+      <dgm:t>
+        <a:bodyPr/>
+        <a:lstStyle/>
+        <a:p>
+          <a:r>
+            <a:rPr lang="ru-RU" sz="1800" b="0" cap="none" spc="0" smtClean="0">
+              <a:ln w="18415" cmpd="sng">
+                <a:prstDash val="solid"/>
+              </a:ln>
+              <a:effectLst>
+                <a:outerShdw blurRad="63500" dir="3600000" algn="tl" rotWithShape="0">
+                  <a:srgbClr val="000000">
+                    <a:alpha val="70000"/>
+                  </a:srgbClr>
+                </a:outerShdw>
+              </a:effectLst>
+              <a:latin typeface="Calibri" pitchFamily="34" charset="0"/>
+              <a:cs typeface="Calibri" pitchFamily="34" charset="0"/>
+            </a:rPr>
+            <a:t>применимость</a:t>
+          </a:r>
+          <a:endParaRPr lang="ru-RU" sz="1800" b="0" cap="none" spc="0" dirty="0">
+            <a:ln w="18415" cmpd="sng">
+              <a:prstDash val="solid"/>
+            </a:ln>
+            <a:effectLst>
+              <a:outerShdw blurRad="63500" dir="3600000" algn="tl" rotWithShape="0">
+                <a:srgbClr val="000000">
+                  <a:alpha val="70000"/>
+                </a:srgbClr>
+              </a:outerShdw>
+            </a:effectLst>
+            <a:latin typeface="Calibri" pitchFamily="34" charset="0"/>
+            <a:cs typeface="Calibri" pitchFamily="34" charset="0"/>
+          </a:endParaRPr>
+        </a:p>
+      </dgm:t>
+    </dgm:pt>
+    <dgm:pt modelId="{022274A2-245B-43E6-A246-AAE2523DF846}" type="parTrans" cxnId="{4108B041-2E17-45DC-85C9-4589E808D983}">
+      <dgm:prSet/>
+      <dgm:spPr/>
+      <dgm:t>
+        <a:bodyPr/>
+        <a:lstStyle/>
+        <a:p>
+          <a:endParaRPr lang="ru-RU" b="0" cap="none" spc="0">
+            <a:ln w="18415" cmpd="sng">
+              <a:solidFill>
+                <a:srgbClr val="FFFFFF"/>
+              </a:solidFill>
+              <a:prstDash val="solid"/>
+            </a:ln>
+            <a:solidFill>
+              <a:schemeClr val="bg1"/>
+            </a:solidFill>
+            <a:effectLst>
+              <a:outerShdw blurRad="63500" dir="3600000" algn="tl" rotWithShape="0">
+                <a:srgbClr val="000000">
+                  <a:alpha val="70000"/>
+                </a:srgbClr>
+              </a:outerShdw>
+            </a:effectLst>
+          </a:endParaRPr>
+        </a:p>
+      </dgm:t>
+    </dgm:pt>
+    <dgm:pt modelId="{8B6EC9A2-F8A6-4D2A-8BFB-9CF15354753B}" type="sibTrans" cxnId="{4108B041-2E17-45DC-85C9-4589E808D983}">
+      <dgm:prSet/>
+      <dgm:spPr/>
+      <dgm:t>
+        <a:bodyPr/>
+        <a:lstStyle/>
+        <a:p>
+          <a:endParaRPr lang="ru-RU" b="0" cap="none" spc="0">
+            <a:ln w="18415" cmpd="sng">
+              <a:solidFill>
+                <a:srgbClr val="FFFFFF"/>
+              </a:solidFill>
+              <a:prstDash val="solid"/>
+            </a:ln>
+            <a:solidFill>
+              <a:schemeClr val="bg1"/>
+            </a:solidFill>
+            <a:effectLst>
+              <a:outerShdw blurRad="63500" dir="3600000" algn="tl" rotWithShape="0">
+                <a:srgbClr val="000000">
+                  <a:alpha val="70000"/>
+                </a:srgbClr>
+              </a:outerShdw>
+            </a:effectLst>
+          </a:endParaRPr>
+        </a:p>
+      </dgm:t>
+    </dgm:pt>
+    <dgm:pt modelId="{1F09E631-5A4C-4989-B151-9CA0C5B7C4D6}">
+      <dgm:prSet phldrT="[Text]" custT="1"/>
+      <dgm:spPr>
+        <a:gradFill flip="none" rotWithShape="1">
+          <a:gsLst>
+            <a:gs pos="0">
+              <a:srgbClr val="0070C0">
+                <a:tint val="66000"/>
+                <a:satMod val="160000"/>
+              </a:srgbClr>
+            </a:gs>
+            <a:gs pos="50000">
+              <a:srgbClr val="0070C0">
+                <a:tint val="44500"/>
+                <a:satMod val="160000"/>
+              </a:srgbClr>
+            </a:gs>
+            <a:gs pos="100000">
+              <a:srgbClr val="0070C0">
+                <a:tint val="23500"/>
+                <a:satMod val="160000"/>
+              </a:srgbClr>
+            </a:gs>
+          </a:gsLst>
+          <a:lin ang="2700000" scaled="1"/>
+          <a:tileRect/>
+        </a:gradFill>
+      </dgm:spPr>
+      <dgm:t>
+        <a:bodyPr/>
+        <a:lstStyle/>
+        <a:p>
+          <a:r>
+            <a:rPr lang="ru-RU" sz="1800" b="0" cap="none" spc="0" dirty="0" smtClean="0">
+              <a:ln w="18415" cmpd="sng">
+                <a:prstDash val="solid"/>
+              </a:ln>
+              <a:effectLst>
+                <a:outerShdw blurRad="63500" dir="3600000" algn="tl" rotWithShape="0">
+                  <a:srgbClr val="000000">
+                    <a:alpha val="70000"/>
+                  </a:srgbClr>
+                </a:outerShdw>
+              </a:effectLst>
+              <a:latin typeface="Calibri" pitchFamily="34" charset="0"/>
+              <a:cs typeface="Calibri" pitchFamily="34" charset="0"/>
+            </a:rPr>
+            <a:t>расширяемость</a:t>
+          </a:r>
+          <a:endParaRPr lang="ru-RU" sz="1800" b="0" cap="none" spc="0" dirty="0">
+            <a:ln w="18415" cmpd="sng">
+              <a:prstDash val="solid"/>
+            </a:ln>
+            <a:effectLst>
+              <a:outerShdw blurRad="63500" dir="3600000" algn="tl" rotWithShape="0">
+                <a:srgbClr val="000000">
+                  <a:alpha val="70000"/>
+                </a:srgbClr>
+              </a:outerShdw>
+            </a:effectLst>
+            <a:latin typeface="Calibri" pitchFamily="34" charset="0"/>
+            <a:cs typeface="Calibri" pitchFamily="34" charset="0"/>
+          </a:endParaRPr>
+        </a:p>
+      </dgm:t>
+    </dgm:pt>
+    <dgm:pt modelId="{CB600CC2-3A92-493D-9E9B-78F2F491C8BF}" type="parTrans" cxnId="{57B089F2-E13D-4741-94E2-11C4ACE690DD}">
+      <dgm:prSet/>
+      <dgm:spPr/>
+      <dgm:t>
+        <a:bodyPr/>
+        <a:lstStyle/>
+        <a:p>
+          <a:endParaRPr lang="ru-RU" b="0" cap="none" spc="0">
+            <a:ln w="18415" cmpd="sng">
+              <a:solidFill>
+                <a:srgbClr val="FFFFFF"/>
+              </a:solidFill>
+              <a:prstDash val="solid"/>
+            </a:ln>
+            <a:solidFill>
+              <a:schemeClr val="bg1"/>
+            </a:solidFill>
+            <a:effectLst>
+              <a:outerShdw blurRad="63500" dir="3600000" algn="tl" rotWithShape="0">
+                <a:srgbClr val="000000">
+                  <a:alpha val="70000"/>
+                </a:srgbClr>
+              </a:outerShdw>
+            </a:effectLst>
+          </a:endParaRPr>
+        </a:p>
+      </dgm:t>
+    </dgm:pt>
+    <dgm:pt modelId="{FFF37154-1D1D-48E5-8980-B6BB259282C4}" type="sibTrans" cxnId="{57B089F2-E13D-4741-94E2-11C4ACE690DD}">
+      <dgm:prSet/>
+      <dgm:spPr/>
+      <dgm:t>
+        <a:bodyPr/>
+        <a:lstStyle/>
+        <a:p>
+          <a:endParaRPr lang="ru-RU" b="0" cap="none" spc="0">
+            <a:ln w="18415" cmpd="sng">
+              <a:solidFill>
+                <a:srgbClr val="FFFFFF"/>
+              </a:solidFill>
+              <a:prstDash val="solid"/>
+            </a:ln>
+            <a:solidFill>
+              <a:schemeClr val="bg1"/>
+            </a:solidFill>
+            <a:effectLst>
+              <a:outerShdw blurRad="63500" dir="3600000" algn="tl" rotWithShape="0">
+                <a:srgbClr val="000000">
+                  <a:alpha val="70000"/>
+                </a:srgbClr>
+              </a:outerShdw>
+            </a:effectLst>
+          </a:endParaRPr>
+        </a:p>
+      </dgm:t>
+    </dgm:pt>
+    <dgm:pt modelId="{79088A5F-45AA-477D-8AB6-C33BDE1E9FF9}" type="pres">
+      <dgm:prSet presAssocID="{EA2D5F14-E40B-43F7-B0F3-B1D2E4B58E0D}" presName="Name0" presStyleCnt="0">
+        <dgm:presLayoutVars>
+          <dgm:dir/>
+          <dgm:resizeHandles val="exact"/>
+        </dgm:presLayoutVars>
+      </dgm:prSet>
+      <dgm:spPr/>
+    </dgm:pt>
+    <dgm:pt modelId="{1F00E8F9-10B8-47E7-B26B-18C3C3FBB55A}" type="pres">
+      <dgm:prSet presAssocID="{EA2D5F14-E40B-43F7-B0F3-B1D2E4B58E0D}" presName="cycle" presStyleCnt="0"/>
+      <dgm:spPr/>
+    </dgm:pt>
+    <dgm:pt modelId="{31D6C980-7E10-4AFD-A50C-7B724673B5D9}" type="pres">
+      <dgm:prSet presAssocID="{3A9A016C-67D7-41CC-80D1-4D968D88CFB4}" presName="nodeFirstNode" presStyleLbl="node1" presStyleIdx="0" presStyleCnt="5" custScaleX="103734">
+        <dgm:presLayoutVars>
+          <dgm:bulletEnabled val="1"/>
+        </dgm:presLayoutVars>
+      </dgm:prSet>
+      <dgm:spPr/>
+      <dgm:t>
+        <a:bodyPr/>
+        <a:lstStyle/>
+        <a:p>
+          <a:endParaRPr lang="ru-RU"/>
+        </a:p>
+      </dgm:t>
+    </dgm:pt>
+    <dgm:pt modelId="{082BBEE7-C909-44F5-9489-AE0FCC0AA970}" type="pres">
+      <dgm:prSet presAssocID="{158D99C9-5EC3-411B-ADDE-B7019FF7A4A0}" presName="sibTransFirstNode" presStyleLbl="bgShp" presStyleIdx="0" presStyleCnt="1" custLinFactNeighborY="-1079" custRadScaleRad="200061" custRadScaleInc="-2147483648"/>
+      <dgm:spPr/>
+    </dgm:pt>
+    <dgm:pt modelId="{1833E747-DC81-43C6-8515-CA3FEAA85E56}" type="pres">
+      <dgm:prSet presAssocID="{8F2EF5C7-67F6-4DFE-AFDE-CBB2A84E5CEC}" presName="nodeFollowingNodes" presStyleLbl="node1" presStyleIdx="1" presStyleCnt="5" custScaleX="100000" custScaleY="100000">
+        <dgm:presLayoutVars>
+          <dgm:bulletEnabled val="1"/>
+        </dgm:presLayoutVars>
+      </dgm:prSet>
+      <dgm:spPr/>
+    </dgm:pt>
+    <dgm:pt modelId="{6718B62E-BE18-4265-B6C2-9AC865C8C6A5}" type="pres">
+      <dgm:prSet presAssocID="{D189C4D7-E8B0-4280-8691-C464124A0D3C}" presName="nodeFollowingNodes" presStyleLbl="node1" presStyleIdx="2" presStyleCnt="5">
+        <dgm:presLayoutVars>
+          <dgm:bulletEnabled val="1"/>
+        </dgm:presLayoutVars>
+      </dgm:prSet>
+      <dgm:spPr/>
+    </dgm:pt>
+    <dgm:pt modelId="{ABF8D8AC-B028-4800-ABE4-AD01ACC99A4E}" type="pres">
+      <dgm:prSet presAssocID="{6576CFC8-73C4-45BF-A198-7E1315F63B38}" presName="nodeFollowingNodes" presStyleLbl="node1" presStyleIdx="3" presStyleCnt="5">
+        <dgm:presLayoutVars>
+          <dgm:bulletEnabled val="1"/>
+        </dgm:presLayoutVars>
+      </dgm:prSet>
+      <dgm:spPr/>
+    </dgm:pt>
+    <dgm:pt modelId="{CB521898-9F8A-4FE8-9859-43DB60555713}" type="pres">
+      <dgm:prSet presAssocID="{1F09E631-5A4C-4989-B151-9CA0C5B7C4D6}" presName="nodeFollowingNodes" presStyleLbl="node1" presStyleIdx="4" presStyleCnt="5">
+        <dgm:presLayoutVars>
+          <dgm:bulletEnabled val="1"/>
+        </dgm:presLayoutVars>
+      </dgm:prSet>
+      <dgm:spPr/>
+    </dgm:pt>
+  </dgm:ptLst>
+  <dgm:cxnLst>
+    <dgm:cxn modelId="{6B8B7EB5-2424-48FD-AA05-D9AB5E2B2EC1}" type="presOf" srcId="{D189C4D7-E8B0-4280-8691-C464124A0D3C}" destId="{6718B62E-BE18-4265-B6C2-9AC865C8C6A5}" srcOrd="0" destOrd="0" presId="urn:microsoft.com/office/officeart/2005/8/layout/cycle3"/>
+    <dgm:cxn modelId="{A973C6C0-B812-45B2-9309-FA1C5687F4F9}" type="presOf" srcId="{158D99C9-5EC3-411B-ADDE-B7019FF7A4A0}" destId="{082BBEE7-C909-44F5-9489-AE0FCC0AA970}" srcOrd="0" destOrd="0" presId="urn:microsoft.com/office/officeart/2005/8/layout/cycle3"/>
+    <dgm:cxn modelId="{73610230-4EEB-4B01-BDBB-B5EBD8595EE8}" type="presOf" srcId="{8F2EF5C7-67F6-4DFE-AFDE-CBB2A84E5CEC}" destId="{1833E747-DC81-43C6-8515-CA3FEAA85E56}" srcOrd="0" destOrd="0" presId="urn:microsoft.com/office/officeart/2005/8/layout/cycle3"/>
+    <dgm:cxn modelId="{57B089F2-E13D-4741-94E2-11C4ACE690DD}" srcId="{EA2D5F14-E40B-43F7-B0F3-B1D2E4B58E0D}" destId="{1F09E631-5A4C-4989-B151-9CA0C5B7C4D6}" srcOrd="4" destOrd="0" parTransId="{CB600CC2-3A92-493D-9E9B-78F2F491C8BF}" sibTransId="{FFF37154-1D1D-48E5-8980-B6BB259282C4}"/>
+    <dgm:cxn modelId="{E3C6FC13-AFCE-4602-8C85-98FB41665837}" srcId="{EA2D5F14-E40B-43F7-B0F3-B1D2E4B58E0D}" destId="{8F2EF5C7-67F6-4DFE-AFDE-CBB2A84E5CEC}" srcOrd="1" destOrd="0" parTransId="{E931768F-C92B-4BE5-A2BC-C697DE63173F}" sibTransId="{4FEFF33D-2342-4B0F-9B57-0A82D4DCE289}"/>
+    <dgm:cxn modelId="{7053E0F2-DB3B-4D39-8006-A768C5F1BB79}" type="presOf" srcId="{EA2D5F14-E40B-43F7-B0F3-B1D2E4B58E0D}" destId="{79088A5F-45AA-477D-8AB6-C33BDE1E9FF9}" srcOrd="0" destOrd="0" presId="urn:microsoft.com/office/officeart/2005/8/layout/cycle3"/>
+    <dgm:cxn modelId="{EF67F0F2-738B-4BEF-AB36-205E4CE04439}" srcId="{EA2D5F14-E40B-43F7-B0F3-B1D2E4B58E0D}" destId="{D189C4D7-E8B0-4280-8691-C464124A0D3C}" srcOrd="2" destOrd="0" parTransId="{DA93A8CE-7045-4F6D-B4F9-99D035A07D8A}" sibTransId="{5BA99EFD-E8E4-4716-BCD0-8199142323D3}"/>
+    <dgm:cxn modelId="{4108B041-2E17-45DC-85C9-4589E808D983}" srcId="{EA2D5F14-E40B-43F7-B0F3-B1D2E4B58E0D}" destId="{6576CFC8-73C4-45BF-A198-7E1315F63B38}" srcOrd="3" destOrd="0" parTransId="{022274A2-245B-43E6-A246-AAE2523DF846}" sibTransId="{8B6EC9A2-F8A6-4D2A-8BFB-9CF15354753B}"/>
+    <dgm:cxn modelId="{8668F225-65E5-4856-8393-C7E4F9D1F9D2}" type="presOf" srcId="{3A9A016C-67D7-41CC-80D1-4D968D88CFB4}" destId="{31D6C980-7E10-4AFD-A50C-7B724673B5D9}" srcOrd="0" destOrd="0" presId="urn:microsoft.com/office/officeart/2005/8/layout/cycle3"/>
+    <dgm:cxn modelId="{88AA8508-2940-4BBC-9655-7CCDF3CBF47D}" type="presOf" srcId="{1F09E631-5A4C-4989-B151-9CA0C5B7C4D6}" destId="{CB521898-9F8A-4FE8-9859-43DB60555713}" srcOrd="0" destOrd="0" presId="urn:microsoft.com/office/officeart/2005/8/layout/cycle3"/>
+    <dgm:cxn modelId="{031E5510-A153-4ED4-A3BC-614FBAF0B48C}" srcId="{EA2D5F14-E40B-43F7-B0F3-B1D2E4B58E0D}" destId="{3A9A016C-67D7-41CC-80D1-4D968D88CFB4}" srcOrd="0" destOrd="0" parTransId="{1FEB9B99-DE8A-4412-9CF8-FFD804B169C3}" sibTransId="{158D99C9-5EC3-411B-ADDE-B7019FF7A4A0}"/>
+    <dgm:cxn modelId="{F02955FC-DAB1-465D-950F-CEC6A7F7B7F8}" type="presOf" srcId="{6576CFC8-73C4-45BF-A198-7E1315F63B38}" destId="{ABF8D8AC-B028-4800-ABE4-AD01ACC99A4E}" srcOrd="0" destOrd="0" presId="urn:microsoft.com/office/officeart/2005/8/layout/cycle3"/>
+    <dgm:cxn modelId="{19BA99E4-F90B-4F25-985D-E2296D8B732F}" type="presParOf" srcId="{79088A5F-45AA-477D-8AB6-C33BDE1E9FF9}" destId="{1F00E8F9-10B8-47E7-B26B-18C3C3FBB55A}" srcOrd="0" destOrd="0" presId="urn:microsoft.com/office/officeart/2005/8/layout/cycle3"/>
+    <dgm:cxn modelId="{8599D4AC-2A96-4821-B2C2-BF21225E6356}" type="presParOf" srcId="{1F00E8F9-10B8-47E7-B26B-18C3C3FBB55A}" destId="{31D6C980-7E10-4AFD-A50C-7B724673B5D9}" srcOrd="0" destOrd="0" presId="urn:microsoft.com/office/officeart/2005/8/layout/cycle3"/>
+    <dgm:cxn modelId="{B39CECE2-1FE0-4623-9BFD-7A3CD51B2F17}" type="presParOf" srcId="{1F00E8F9-10B8-47E7-B26B-18C3C3FBB55A}" destId="{082BBEE7-C909-44F5-9489-AE0FCC0AA970}" srcOrd="1" destOrd="0" presId="urn:microsoft.com/office/officeart/2005/8/layout/cycle3"/>
+    <dgm:cxn modelId="{9DB3DD5F-5A00-45CB-BEC3-E07DC79C9363}" type="presParOf" srcId="{1F00E8F9-10B8-47E7-B26B-18C3C3FBB55A}" destId="{1833E747-DC81-43C6-8515-CA3FEAA85E56}" srcOrd="2" destOrd="0" presId="urn:microsoft.com/office/officeart/2005/8/layout/cycle3"/>
+    <dgm:cxn modelId="{BBB76163-5777-43D1-9897-7A381CB45B70}" type="presParOf" srcId="{1F00E8F9-10B8-47E7-B26B-18C3C3FBB55A}" destId="{6718B62E-BE18-4265-B6C2-9AC865C8C6A5}" srcOrd="3" destOrd="0" presId="urn:microsoft.com/office/officeart/2005/8/layout/cycle3"/>
+    <dgm:cxn modelId="{60E8E7D1-1848-4AAB-B95C-EE594A72D207}" type="presParOf" srcId="{1F00E8F9-10B8-47E7-B26B-18C3C3FBB55A}" destId="{ABF8D8AC-B028-4800-ABE4-AD01ACC99A4E}" srcOrd="4" destOrd="0" presId="urn:microsoft.com/office/officeart/2005/8/layout/cycle3"/>
+    <dgm:cxn modelId="{DE8378B8-B7C6-4F84-8415-AB41BAF1289B}" type="presParOf" srcId="{1F00E8F9-10B8-47E7-B26B-18C3C3FBB55A}" destId="{CB521898-9F8A-4FE8-9859-43DB60555713}" srcOrd="5" destOrd="0" presId="urn:microsoft.com/office/officeart/2005/8/layout/cycle3"/>
+  </dgm:cxnLst>
+  <dgm:bg>
+    <a:noFill/>
+  </dgm:bg>
+  <dgm:whole/>
+  <dgm:extLst>
+    <a:ext uri="http://schemas.microsoft.com/office/drawing/2008/diagram">
+      <dsp:dataModelExt xmlns:dsp="http://schemas.microsoft.com/office/drawing/2008/diagram" xmlns="" relId="rId7" minVer="http://schemas.openxmlformats.org/drawingml/2006/diagram"/>
+    </a:ext>
+  </dgm:extLst>
+</dgm:dataModel>
+</file>
+
+<file path=ppt/diagrams/drawing1.xml><?xml version="1.0" encoding="utf-8"?>
+<dsp:drawing xmlns:dgm="http://schemas.openxmlformats.org/drawingml/2006/diagram" xmlns:a="http://schemas.openxmlformats.org/drawingml/2006/main" xmlns:dsp="http://schemas.microsoft.com/office/drawing/2008/diagram">
+  <dsp:spTree>
+    <dsp:nvGrpSpPr>
+      <dsp:cNvPr id="0" name=""/>
+      <dsp:cNvGrpSpPr/>
+    </dsp:nvGrpSpPr>
+    <dsp:grpSpPr/>
+    <dsp:sp modelId="{082BBEE7-C909-44F5-9489-AE0FCC0AA970}">
+      <dsp:nvSpPr>
+        <dsp:cNvPr id="0" name=""/>
+        <dsp:cNvSpPr/>
+      </dsp:nvSpPr>
+      <dsp:spPr>
+        <a:xfrm>
+          <a:off x="1030924" y="-102970"/>
+          <a:ext cx="4711484" cy="4711484"/>
+        </a:xfrm>
+        <a:prstGeom prst="circularArrow">
+          <a:avLst>
+            <a:gd name="adj1" fmla="val 5544"/>
+            <a:gd name="adj2" fmla="val 330680"/>
+            <a:gd name="adj3" fmla="val 13710934"/>
+            <a:gd name="adj4" fmla="val 17425645"/>
+            <a:gd name="adj5" fmla="val 5757"/>
+          </a:avLst>
+        </a:prstGeom>
+        <a:solidFill>
+          <a:schemeClr val="accent2">
+            <a:tint val="40000"/>
+            <a:hueOff val="0"/>
+            <a:satOff val="0"/>
+            <a:lumOff val="0"/>
+            <a:alphaOff val="0"/>
+          </a:schemeClr>
+        </a:solidFill>
+        <a:ln>
+          <a:noFill/>
+        </a:ln>
+        <a:effectLst>
+          <a:outerShdw blurRad="40000" dist="20000" dir="5400000" rotWithShape="0">
+            <a:srgbClr val="000000">
+              <a:alpha val="38000"/>
+            </a:srgbClr>
+          </a:outerShdw>
+        </a:effectLst>
+      </dsp:spPr>
+      <dsp:style>
+        <a:lnRef idx="0">
+          <a:scrgbClr r="0" g="0" b="0"/>
+        </a:lnRef>
+        <a:fillRef idx="1">
+          <a:scrgbClr r="0" g="0" b="0"/>
+        </a:fillRef>
+        <a:effectRef idx="1">
+          <a:scrgbClr r="0" g="0" b="0"/>
+        </a:effectRef>
+        <a:fontRef idx="minor"/>
+      </dsp:style>
+    </dsp:sp>
+    <dsp:sp modelId="{31D6C980-7E10-4AFD-A50C-7B724673B5D9}">
+      <dsp:nvSpPr>
+        <dsp:cNvPr id="0" name=""/>
+        <dsp:cNvSpPr/>
+      </dsp:nvSpPr>
+      <dsp:spPr>
+        <a:xfrm>
+          <a:off x="2252791" y="1955"/>
+          <a:ext cx="2267749" cy="1093059"/>
+        </a:xfrm>
+        <a:prstGeom prst="roundRect">
+          <a:avLst/>
+        </a:prstGeom>
+        <a:gradFill flip="none" rotWithShape="1">
+          <a:gsLst>
+            <a:gs pos="0">
+              <a:srgbClr val="0070C0">
+                <a:tint val="66000"/>
+                <a:satMod val="160000"/>
+              </a:srgbClr>
+            </a:gs>
+            <a:gs pos="50000">
+              <a:srgbClr val="0070C0">
+                <a:tint val="44500"/>
+                <a:satMod val="160000"/>
+              </a:srgbClr>
+            </a:gs>
+            <a:gs pos="100000">
+              <a:srgbClr val="0070C0">
+                <a:tint val="23500"/>
+                <a:satMod val="160000"/>
+              </a:srgbClr>
+            </a:gs>
+          </a:gsLst>
+          <a:lin ang="2700000" scaled="1"/>
+          <a:tileRect/>
+        </a:gradFill>
+        <a:ln>
+          <a:noFill/>
+        </a:ln>
+        <a:effectLst>
+          <a:outerShdw blurRad="40000" dist="20000" dir="5400000" rotWithShape="0">
+            <a:srgbClr val="000000">
+              <a:alpha val="38000"/>
+            </a:srgbClr>
+          </a:outerShdw>
+        </a:effectLst>
+        <a:scene3d>
+          <a:camera prst="orthographicFront"/>
+          <a:lightRig rig="flat" dir="t"/>
+        </a:scene3d>
+        <a:sp3d prstMaterial="dkEdge">
+          <a:bevelT w="8200" h="38100"/>
+        </a:sp3d>
+      </dsp:spPr>
+      <dsp:style>
+        <a:lnRef idx="0">
+          <a:scrgbClr r="0" g="0" b="0"/>
+        </a:lnRef>
+        <a:fillRef idx="2">
+          <a:scrgbClr r="0" g="0" b="0"/>
+        </a:fillRef>
+        <a:effectRef idx="1">
+          <a:scrgbClr r="0" g="0" b="0"/>
+        </a:effectRef>
+        <a:fontRef idx="minor">
+          <a:schemeClr val="dk1"/>
+        </a:fontRef>
+      </dsp:style>
+      <dsp:txBody>
+        <a:bodyPr spcFirstLastPara="0" vert="horz" wrap="square" lIns="68580" tIns="68580" rIns="68580" bIns="68580" numCol="1" spcCol="1270" anchor="ctr" anchorCtr="0">
+          <a:noAutofit/>
+        </a:bodyPr>
+        <a:lstStyle/>
+        <a:p>
+          <a:pPr lvl="0" algn="ctr" defTabSz="800100">
+            <a:lnSpc>
+              <a:spcPct val="90000"/>
+            </a:lnSpc>
+            <a:spcBef>
+              <a:spcPct val="0"/>
+            </a:spcBef>
+            <a:spcAft>
+              <a:spcPct val="35000"/>
+            </a:spcAft>
+          </a:pPr>
+          <a:r>
+            <a:rPr lang="ru-RU" sz="1800" b="0" kern="1200" cap="none" spc="0" dirty="0" smtClean="0">
+              <a:ln w="18415" cmpd="sng">
+                <a:prstDash val="solid"/>
+              </a:ln>
+              <a:effectLst>
+                <a:outerShdw blurRad="63500" dir="3600000" algn="tl" rotWithShape="0">
+                  <a:srgbClr val="000000">
+                    <a:alpha val="70000"/>
+                  </a:srgbClr>
+                </a:outerShdw>
+              </a:effectLst>
+              <a:latin typeface="Calibri" pitchFamily="34" charset="0"/>
+              <a:cs typeface="Calibri" pitchFamily="34" charset="0"/>
+            </a:rPr>
+            <a:t>отказоустойчивость</a:t>
+          </a:r>
+          <a:endParaRPr lang="ru-RU" sz="1800" b="0" kern="1200" cap="none" spc="0" dirty="0">
+            <a:ln w="18415" cmpd="sng">
+              <a:prstDash val="solid"/>
+            </a:ln>
+            <a:effectLst>
+              <a:outerShdw blurRad="63500" dir="3600000" algn="tl" rotWithShape="0">
+                <a:srgbClr val="000000">
+                  <a:alpha val="70000"/>
+                </a:srgbClr>
+              </a:outerShdw>
+            </a:effectLst>
+            <a:latin typeface="Calibri" pitchFamily="34" charset="0"/>
+            <a:cs typeface="Calibri" pitchFamily="34" charset="0"/>
+          </a:endParaRPr>
+        </a:p>
+      </dsp:txBody>
+      <dsp:txXfrm>
+        <a:off x="2252791" y="1955"/>
+        <a:ext cx="2267749" cy="1093059"/>
+      </dsp:txXfrm>
+    </dsp:sp>
+    <dsp:sp modelId="{1833E747-DC81-43C6-8515-CA3FEAA85E56}">
+      <dsp:nvSpPr>
+        <dsp:cNvPr id="0" name=""/>
+        <dsp:cNvSpPr/>
+      </dsp:nvSpPr>
+      <dsp:spPr>
+        <a:xfrm>
+          <a:off x="4204433" y="1390252"/>
+          <a:ext cx="2186119" cy="1093059"/>
+        </a:xfrm>
+        <a:prstGeom prst="roundRect">
+          <a:avLst/>
+        </a:prstGeom>
+        <a:gradFill flip="none" rotWithShape="1">
+          <a:gsLst>
+            <a:gs pos="0">
+              <a:srgbClr val="0070C0">
+                <a:tint val="66000"/>
+                <a:satMod val="160000"/>
+              </a:srgbClr>
+            </a:gs>
+            <a:gs pos="50000">
+              <a:srgbClr val="0070C0">
+                <a:tint val="44500"/>
+                <a:satMod val="160000"/>
+              </a:srgbClr>
+            </a:gs>
+            <a:gs pos="100000">
+              <a:srgbClr val="0070C0">
+                <a:tint val="23500"/>
+                <a:satMod val="160000"/>
+              </a:srgbClr>
+            </a:gs>
+          </a:gsLst>
+          <a:lin ang="2700000" scaled="1"/>
+          <a:tileRect/>
+        </a:gradFill>
+        <a:ln>
+          <a:noFill/>
+        </a:ln>
+        <a:effectLst>
+          <a:outerShdw blurRad="40000" dist="20000" dir="5400000" rotWithShape="0">
+            <a:srgbClr val="000000">
+              <a:alpha val="38000"/>
+            </a:srgbClr>
+          </a:outerShdw>
+        </a:effectLst>
+        <a:scene3d>
+          <a:camera prst="orthographicFront"/>
+          <a:lightRig rig="flat" dir="t"/>
+        </a:scene3d>
+        <a:sp3d prstMaterial="dkEdge">
+          <a:bevelT w="8200" h="38100"/>
+        </a:sp3d>
+      </dsp:spPr>
+      <dsp:style>
+        <a:lnRef idx="0">
+          <a:scrgbClr r="0" g="0" b="0"/>
+        </a:lnRef>
+        <a:fillRef idx="2">
+          <a:scrgbClr r="0" g="0" b="0"/>
+        </a:fillRef>
+        <a:effectRef idx="1">
+          <a:scrgbClr r="0" g="0" b="0"/>
+        </a:effectRef>
+        <a:fontRef idx="minor">
+          <a:schemeClr val="dk1"/>
+        </a:fontRef>
+      </dsp:style>
+      <dsp:txBody>
+        <a:bodyPr spcFirstLastPara="0" vert="horz" wrap="square" lIns="68580" tIns="68580" rIns="68580" bIns="68580" numCol="1" spcCol="1270" anchor="ctr" anchorCtr="0">
+          <a:noAutofit/>
+        </a:bodyPr>
+        <a:lstStyle/>
+        <a:p>
+          <a:pPr lvl="0" algn="ctr" defTabSz="800100">
+            <a:lnSpc>
+              <a:spcPct val="90000"/>
+            </a:lnSpc>
+            <a:spcBef>
+              <a:spcPct val="0"/>
+            </a:spcBef>
+            <a:spcAft>
+              <a:spcPct val="35000"/>
+            </a:spcAft>
+          </a:pPr>
+          <a:r>
+            <a:rPr lang="ru-RU" sz="1800" b="0" kern="1200" cap="none" spc="0" smtClean="0">
+              <a:ln w="18415" cmpd="sng">
+                <a:prstDash val="solid"/>
+              </a:ln>
+              <a:effectLst>
+                <a:outerShdw blurRad="63500" dir="3600000" algn="tl" rotWithShape="0">
+                  <a:srgbClr val="000000">
+                    <a:alpha val="70000"/>
+                  </a:srgbClr>
+                </a:outerShdw>
+              </a:effectLst>
+              <a:latin typeface="Calibri" pitchFamily="34" charset="0"/>
+              <a:cs typeface="Calibri" pitchFamily="34" charset="0"/>
+            </a:rPr>
+            <a:t>масштабируемость</a:t>
+          </a:r>
+          <a:endParaRPr lang="ru-RU" sz="1800" b="0" kern="1200" cap="none" spc="0" dirty="0">
+            <a:ln w="18415" cmpd="sng">
+              <a:prstDash val="solid"/>
+            </a:ln>
+            <a:effectLst>
+              <a:outerShdw blurRad="63500" dir="3600000" algn="tl" rotWithShape="0">
+                <a:srgbClr val="000000">
+                  <a:alpha val="70000"/>
+                </a:srgbClr>
+              </a:outerShdw>
+            </a:effectLst>
+            <a:latin typeface="Calibri" pitchFamily="34" charset="0"/>
+            <a:cs typeface="Calibri" pitchFamily="34" charset="0"/>
+          </a:endParaRPr>
+        </a:p>
+      </dsp:txBody>
+      <dsp:txXfrm>
+        <a:off x="4204433" y="1390252"/>
+        <a:ext cx="2186119" cy="1093059"/>
+      </dsp:txXfrm>
+    </dsp:sp>
+    <dsp:sp modelId="{6718B62E-BE18-4265-B6C2-9AC865C8C6A5}">
+      <dsp:nvSpPr>
+        <dsp:cNvPr id="0" name=""/>
+        <dsp:cNvSpPr/>
+      </dsp:nvSpPr>
+      <dsp:spPr>
+        <a:xfrm>
+          <a:off x="3474562" y="3636564"/>
+          <a:ext cx="2186119" cy="1093059"/>
+        </a:xfrm>
+        <a:prstGeom prst="roundRect">
+          <a:avLst/>
+        </a:prstGeom>
+        <a:gradFill flip="none" rotWithShape="1">
+          <a:gsLst>
+            <a:gs pos="0">
+              <a:srgbClr val="0070C0">
+                <a:tint val="66000"/>
+                <a:satMod val="160000"/>
+              </a:srgbClr>
+            </a:gs>
+            <a:gs pos="50000">
+              <a:srgbClr val="0070C0">
+                <a:tint val="44500"/>
+                <a:satMod val="160000"/>
+              </a:srgbClr>
+            </a:gs>
+            <a:gs pos="100000">
+              <a:srgbClr val="0070C0">
+                <a:tint val="23500"/>
+                <a:satMod val="160000"/>
+              </a:srgbClr>
+            </a:gs>
+          </a:gsLst>
+          <a:lin ang="2700000" scaled="1"/>
+          <a:tileRect/>
+        </a:gradFill>
+        <a:ln>
+          <a:noFill/>
+        </a:ln>
+        <a:effectLst>
+          <a:outerShdw blurRad="40000" dist="20000" dir="5400000" rotWithShape="0">
+            <a:srgbClr val="000000">
+              <a:alpha val="38000"/>
+            </a:srgbClr>
+          </a:outerShdw>
+        </a:effectLst>
+        <a:scene3d>
+          <a:camera prst="orthographicFront"/>
+          <a:lightRig rig="flat" dir="t"/>
+        </a:scene3d>
+        <a:sp3d prstMaterial="dkEdge">
+          <a:bevelT w="8200" h="38100"/>
+        </a:sp3d>
+      </dsp:spPr>
+      <dsp:style>
+        <a:lnRef idx="0">
+          <a:scrgbClr r="0" g="0" b="0"/>
+        </a:lnRef>
+        <a:fillRef idx="2">
+          <a:scrgbClr r="0" g="0" b="0"/>
+        </a:fillRef>
+        <a:effectRef idx="1">
+          <a:scrgbClr r="0" g="0" b="0"/>
+        </a:effectRef>
+        <a:fontRef idx="minor">
+          <a:schemeClr val="dk1"/>
+        </a:fontRef>
+      </dsp:style>
+      <dsp:txBody>
+        <a:bodyPr spcFirstLastPara="0" vert="horz" wrap="square" lIns="68580" tIns="68580" rIns="68580" bIns="68580" numCol="1" spcCol="1270" anchor="ctr" anchorCtr="0">
+          <a:noAutofit/>
+        </a:bodyPr>
+        <a:lstStyle/>
+        <a:p>
+          <a:pPr lvl="0" algn="ctr" defTabSz="800100">
+            <a:lnSpc>
+              <a:spcPct val="90000"/>
+            </a:lnSpc>
+            <a:spcBef>
+              <a:spcPct val="0"/>
+            </a:spcBef>
+            <a:spcAft>
+              <a:spcPct val="35000"/>
+            </a:spcAft>
+          </a:pPr>
+          <a:r>
+            <a:rPr lang="ru-RU" sz="1800" b="0" kern="1200" cap="none" spc="0" smtClean="0">
+              <a:ln w="18415" cmpd="sng">
+                <a:prstDash val="solid"/>
+              </a:ln>
+              <a:effectLst>
+                <a:outerShdw blurRad="63500" dir="3600000" algn="tl" rotWithShape="0">
+                  <a:srgbClr val="000000">
+                    <a:alpha val="70000"/>
+                  </a:srgbClr>
+                </a:outerShdw>
+              </a:effectLst>
+              <a:latin typeface="Calibri" pitchFamily="34" charset="0"/>
+              <a:cs typeface="Calibri" pitchFamily="34" charset="0"/>
+            </a:rPr>
+            <a:t>эффективность</a:t>
+          </a:r>
+          <a:endParaRPr lang="ru-RU" sz="1800" b="0" kern="1200" cap="none" spc="0" dirty="0">
+            <a:ln w="18415" cmpd="sng">
+              <a:prstDash val="solid"/>
+            </a:ln>
+            <a:effectLst>
+              <a:outerShdw blurRad="63500" dir="3600000" algn="tl" rotWithShape="0">
+                <a:srgbClr val="000000">
+                  <a:alpha val="70000"/>
+                </a:srgbClr>
+              </a:outerShdw>
+            </a:effectLst>
+            <a:latin typeface="Calibri" pitchFamily="34" charset="0"/>
+            <a:cs typeface="Calibri" pitchFamily="34" charset="0"/>
+          </a:endParaRPr>
+        </a:p>
+      </dsp:txBody>
+      <dsp:txXfrm>
+        <a:off x="3474562" y="3636564"/>
+        <a:ext cx="2186119" cy="1093059"/>
+      </dsp:txXfrm>
+    </dsp:sp>
+    <dsp:sp modelId="{ABF8D8AC-B028-4800-ABE4-AD01ACC99A4E}">
+      <dsp:nvSpPr>
+        <dsp:cNvPr id="0" name=""/>
+        <dsp:cNvSpPr/>
+      </dsp:nvSpPr>
+      <dsp:spPr>
+        <a:xfrm>
+          <a:off x="1112650" y="3636564"/>
+          <a:ext cx="2186119" cy="1093059"/>
+        </a:xfrm>
+        <a:prstGeom prst="roundRect">
+          <a:avLst/>
+        </a:prstGeom>
+        <a:gradFill flip="none" rotWithShape="1">
+          <a:gsLst>
+            <a:gs pos="0">
+              <a:srgbClr val="0070C0">
+                <a:tint val="66000"/>
+                <a:satMod val="160000"/>
+              </a:srgbClr>
+            </a:gs>
+            <a:gs pos="50000">
+              <a:srgbClr val="0070C0">
+                <a:tint val="44500"/>
+                <a:satMod val="160000"/>
+              </a:srgbClr>
+            </a:gs>
+            <a:gs pos="100000">
+              <a:srgbClr val="0070C0">
+                <a:tint val="23500"/>
+                <a:satMod val="160000"/>
+              </a:srgbClr>
+            </a:gs>
+          </a:gsLst>
+          <a:lin ang="2700000" scaled="1"/>
+          <a:tileRect/>
+        </a:gradFill>
+        <a:ln>
+          <a:noFill/>
+        </a:ln>
+        <a:effectLst>
+          <a:outerShdw blurRad="40000" dist="20000" dir="5400000" rotWithShape="0">
+            <a:srgbClr val="000000">
+              <a:alpha val="38000"/>
+            </a:srgbClr>
+          </a:outerShdw>
+        </a:effectLst>
+        <a:scene3d>
+          <a:camera prst="orthographicFront"/>
+          <a:lightRig rig="flat" dir="t"/>
+        </a:scene3d>
+        <a:sp3d prstMaterial="dkEdge">
+          <a:bevelT w="8200" h="38100"/>
+        </a:sp3d>
+      </dsp:spPr>
+      <dsp:style>
+        <a:lnRef idx="0">
+          <a:scrgbClr r="0" g="0" b="0"/>
+        </a:lnRef>
+        <a:fillRef idx="2">
+          <a:scrgbClr r="0" g="0" b="0"/>
+        </a:fillRef>
+        <a:effectRef idx="1">
+          <a:scrgbClr r="0" g="0" b="0"/>
+        </a:effectRef>
+        <a:fontRef idx="minor">
+          <a:schemeClr val="dk1"/>
+        </a:fontRef>
+      </dsp:style>
+      <dsp:txBody>
+        <a:bodyPr spcFirstLastPara="0" vert="horz" wrap="square" lIns="68580" tIns="68580" rIns="68580" bIns="68580" numCol="1" spcCol="1270" anchor="ctr" anchorCtr="0">
+          <a:noAutofit/>
+        </a:bodyPr>
+        <a:lstStyle/>
+        <a:p>
+          <a:pPr lvl="0" algn="ctr" defTabSz="800100">
+            <a:lnSpc>
+              <a:spcPct val="90000"/>
+            </a:lnSpc>
+            <a:spcBef>
+              <a:spcPct val="0"/>
+            </a:spcBef>
+            <a:spcAft>
+              <a:spcPct val="35000"/>
+            </a:spcAft>
+          </a:pPr>
+          <a:r>
+            <a:rPr lang="ru-RU" sz="1800" b="0" kern="1200" cap="none" spc="0" smtClean="0">
+              <a:ln w="18415" cmpd="sng">
+                <a:prstDash val="solid"/>
+              </a:ln>
+              <a:effectLst>
+                <a:outerShdw blurRad="63500" dir="3600000" algn="tl" rotWithShape="0">
+                  <a:srgbClr val="000000">
+                    <a:alpha val="70000"/>
+                  </a:srgbClr>
+                </a:outerShdw>
+              </a:effectLst>
+              <a:latin typeface="Calibri" pitchFamily="34" charset="0"/>
+              <a:cs typeface="Calibri" pitchFamily="34" charset="0"/>
+            </a:rPr>
+            <a:t>применимость</a:t>
+          </a:r>
+          <a:endParaRPr lang="ru-RU" sz="1800" b="0" kern="1200" cap="none" spc="0" dirty="0">
+            <a:ln w="18415" cmpd="sng">
+              <a:prstDash val="solid"/>
+            </a:ln>
+            <a:effectLst>
+              <a:outerShdw blurRad="63500" dir="3600000" algn="tl" rotWithShape="0">
+                <a:srgbClr val="000000">
+                  <a:alpha val="70000"/>
+                </a:srgbClr>
+              </a:outerShdw>
+            </a:effectLst>
+            <a:latin typeface="Calibri" pitchFamily="34" charset="0"/>
+            <a:cs typeface="Calibri" pitchFamily="34" charset="0"/>
+          </a:endParaRPr>
+        </a:p>
+      </dsp:txBody>
+      <dsp:txXfrm>
+        <a:off x="1112650" y="3636564"/>
+        <a:ext cx="2186119" cy="1093059"/>
+      </dsp:txXfrm>
+    </dsp:sp>
+    <dsp:sp modelId="{CB521898-9F8A-4FE8-9859-43DB60555713}">
+      <dsp:nvSpPr>
+        <dsp:cNvPr id="0" name=""/>
+        <dsp:cNvSpPr/>
+      </dsp:nvSpPr>
+      <dsp:spPr>
+        <a:xfrm>
+          <a:off x="382780" y="1390252"/>
+          <a:ext cx="2186119" cy="1093059"/>
+        </a:xfrm>
+        <a:prstGeom prst="roundRect">
+          <a:avLst/>
+        </a:prstGeom>
+        <a:gradFill flip="none" rotWithShape="1">
+          <a:gsLst>
+            <a:gs pos="0">
+              <a:srgbClr val="0070C0">
+                <a:tint val="66000"/>
+                <a:satMod val="160000"/>
+              </a:srgbClr>
+            </a:gs>
+            <a:gs pos="50000">
+              <a:srgbClr val="0070C0">
+                <a:tint val="44500"/>
+                <a:satMod val="160000"/>
+              </a:srgbClr>
+            </a:gs>
+            <a:gs pos="100000">
+              <a:srgbClr val="0070C0">
+                <a:tint val="23500"/>
+                <a:satMod val="160000"/>
+              </a:srgbClr>
+            </a:gs>
+          </a:gsLst>
+          <a:lin ang="2700000" scaled="1"/>
+          <a:tileRect/>
+        </a:gradFill>
+        <a:ln>
+          <a:noFill/>
+        </a:ln>
+        <a:effectLst>
+          <a:outerShdw blurRad="40000" dist="20000" dir="5400000" rotWithShape="0">
+            <a:srgbClr val="000000">
+              <a:alpha val="38000"/>
+            </a:srgbClr>
+          </a:outerShdw>
+        </a:effectLst>
+        <a:scene3d>
+          <a:camera prst="orthographicFront"/>
+          <a:lightRig rig="flat" dir="t"/>
+        </a:scene3d>
+        <a:sp3d prstMaterial="dkEdge">
+          <a:bevelT w="8200" h="38100"/>
+        </a:sp3d>
+      </dsp:spPr>
+      <dsp:style>
+        <a:lnRef idx="0">
+          <a:scrgbClr r="0" g="0" b="0"/>
+        </a:lnRef>
+        <a:fillRef idx="2">
+          <a:scrgbClr r="0" g="0" b="0"/>
+        </a:fillRef>
+        <a:effectRef idx="1">
+          <a:scrgbClr r="0" g="0" b="0"/>
+        </a:effectRef>
+        <a:fontRef idx="minor">
+          <a:schemeClr val="dk1"/>
+        </a:fontRef>
+      </dsp:style>
+      <dsp:txBody>
+        <a:bodyPr spcFirstLastPara="0" vert="horz" wrap="square" lIns="68580" tIns="68580" rIns="68580" bIns="68580" numCol="1" spcCol="1270" anchor="ctr" anchorCtr="0">
+          <a:noAutofit/>
+        </a:bodyPr>
+        <a:lstStyle/>
+        <a:p>
+          <a:pPr lvl="0" algn="ctr" defTabSz="800100">
+            <a:lnSpc>
+              <a:spcPct val="90000"/>
+            </a:lnSpc>
+            <a:spcBef>
+              <a:spcPct val="0"/>
+            </a:spcBef>
+            <a:spcAft>
+              <a:spcPct val="35000"/>
+            </a:spcAft>
+          </a:pPr>
+          <a:r>
+            <a:rPr lang="ru-RU" sz="1800" b="0" kern="1200" cap="none" spc="0" dirty="0" smtClean="0">
+              <a:ln w="18415" cmpd="sng">
+                <a:prstDash val="solid"/>
+              </a:ln>
+              <a:effectLst>
+                <a:outerShdw blurRad="63500" dir="3600000" algn="tl" rotWithShape="0">
+                  <a:srgbClr val="000000">
+                    <a:alpha val="70000"/>
+                  </a:srgbClr>
+                </a:outerShdw>
+              </a:effectLst>
+              <a:latin typeface="Calibri" pitchFamily="34" charset="0"/>
+              <a:cs typeface="Calibri" pitchFamily="34" charset="0"/>
+            </a:rPr>
+            <a:t>расширяемость</a:t>
+          </a:r>
+          <a:endParaRPr lang="ru-RU" sz="1800" b="0" kern="1200" cap="none" spc="0" dirty="0">
+            <a:ln w="18415" cmpd="sng">
+              <a:prstDash val="solid"/>
+            </a:ln>
+            <a:effectLst>
+              <a:outerShdw blurRad="63500" dir="3600000" algn="tl" rotWithShape="0">
+                <a:srgbClr val="000000">
+                  <a:alpha val="70000"/>
+                </a:srgbClr>
+              </a:outerShdw>
+            </a:effectLst>
+            <a:latin typeface="Calibri" pitchFamily="34" charset="0"/>
+            <a:cs typeface="Calibri" pitchFamily="34" charset="0"/>
+          </a:endParaRPr>
+        </a:p>
+      </dsp:txBody>
+      <dsp:txXfrm>
+        <a:off x="382780" y="1390252"/>
+        <a:ext cx="2186119" cy="1093059"/>
+      </dsp:txXfrm>
+    </dsp:sp>
+  </dsp:spTree>
+</dsp:drawing>
+</file>
+
+<file path=ppt/diagrams/layout1.xml><?xml version="1.0" encoding="utf-8"?>
+<dgm:layoutDef xmlns:dgm="http://schemas.openxmlformats.org/drawingml/2006/diagram" xmlns:a="http://schemas.openxmlformats.org/drawingml/2006/main" uniqueId="urn:microsoft.com/office/officeart/2005/8/layout/cycle3">
+  <dgm:title val=""/>
+  <dgm:desc val=""/>
+  <dgm:catLst>
+    <dgm:cat type="cycle" pri="5000"/>
+  </dgm:catLst>
+  <dgm:sampData>
+    <dgm:dataModel>
+      <dgm:ptLst>
+        <dgm:pt modelId="0" type="doc"/>
+        <dgm:pt modelId="1">
+          <dgm:prSet phldr="1"/>
+        </dgm:pt>
+        <dgm:pt modelId="2">
+          <dgm:prSet phldr="1"/>
+        </dgm:pt>
+        <dgm:pt modelId="3">
+          <dgm:prSet phldr="1"/>
+        </dgm:pt>
+        <dgm:pt modelId="4">
+          <dgm:prSet phldr="1"/>
+        </dgm:pt>
+        <dgm:pt modelId="5">
+          <dgm:prSet phldr="1"/>
+        </dgm:pt>
+      </dgm:ptLst>
+      <dgm:cxnLst>
+        <dgm:cxn modelId="6" srcId="0" destId="1" srcOrd="0" destOrd="0"/>
+        <dgm:cxn modelId="7" srcId="0" destId="2" srcOrd="1" destOrd="0"/>
+        <dgm:cxn modelId="8" srcId="0" destId="3" srcOrd="2" destOrd="0"/>
+        <dgm:cxn modelId="9" srcId="0" destId="4" srcOrd="3" destOrd="0"/>
+        <dgm:cxn modelId="10" srcId="0" destId="5" srcOrd="4" destOrd="0"/>
+      </dgm:cxnLst>
+      <dgm:bg/>
+      <dgm:whole/>
+    </dgm:dataModel>
+  </dgm:sampData>
+  <dgm:styleData>
+    <dgm:dataModel>
+      <dgm:ptLst>
+        <dgm:pt modelId="0" type="doc"/>
+        <dgm:pt modelId="1"/>
+        <dgm:pt modelId="2"/>
+        <dgm:pt modelId="3"/>
+      </dgm:ptLst>
+      <dgm:cxnLst>
+        <dgm:cxn modelId="4" srcId="0" destId="1" srcOrd="0" destOrd="0"/>
+        <dgm:cxn modelId="5" srcId="0" destId="2" srcOrd="1" destOrd="0"/>
+        <dgm:cxn modelId="6" srcId="0" destId="3" srcOrd="2" destOrd="0"/>
+      </dgm:cxnLst>
+      <dgm:bg/>
+      <dgm:whole/>
+    </dgm:dataModel>
+  </dgm:styleData>
+  <dgm:clrData>
+    <dgm:dataModel>
+      <dgm:ptLst>
+        <dgm:pt modelId="0" type="doc"/>
+        <dgm:pt modelId="1"/>
+        <dgm:pt modelId="2"/>
+        <dgm:pt modelId="3"/>
+        <dgm:pt modelId="4"/>
+        <dgm:pt modelId="5"/>
+        <dgm:pt modelId="6"/>
+      </dgm:ptLst>
+      <dgm:cxnLst>
+        <dgm:cxn modelId="7" srcId="0" destId="1" srcOrd="0" destOrd="0"/>
+        <dgm:cxn modelId="8" srcId="0" destId="2" srcOrd="1" destOrd="0"/>
+        <dgm:cxn modelId="9" srcId="0" destId="3" srcOrd="2" destOrd="0"/>
+        <dgm:cxn modelId="10" srcId="0" destId="4" srcOrd="3" destOrd="0"/>
+        <dgm:cxn modelId="11" srcId="0" destId="5" srcOrd="4" destOrd="0"/>
+        <dgm:cxn modelId="12" srcId="0" destId="6" srcOrd="5" destOrd="0"/>
+      </dgm:cxnLst>
+      <dgm:bg/>
+      <dgm:whole/>
+    </dgm:dataModel>
+  </dgm:clrData>
+  <dgm:layoutNode name="Name0">
+    <dgm:varLst>
+      <dgm:dir/>
+      <dgm:resizeHandles val="exact"/>
+    </dgm:varLst>
+    <dgm:choose name="Name1">
+      <dgm:if name="Name2" axis="ch" ptType="node" func="cnt" op="equ" val="2">
+        <dgm:alg type="composite">
+          <dgm:param type="ar" val="0.9"/>
+        </dgm:alg>
+        <dgm:shape xmlns:r="http://schemas.openxmlformats.org/officeDocument/2006/relationships" r:blip="">
+          <dgm:adjLst/>
+        </dgm:shape>
+        <dgm:presOf/>
+        <dgm:constrLst>
+          <dgm:constr type="primFontSz" for="ch" ptType="node" op="equ" val="65"/>
+          <dgm:constr type="ctrX" for="ch" forName="node1" refType="w" fact="0.5"/>
+          <dgm:constr type="t" for="ch" forName="node1"/>
+          <dgm:constr type="w" for="ch" forName="node1" refType="w" fact="0.8"/>
+          <dgm:constr type="h" for="ch" forName="node1" refType="w" refFor="ch" refForName="node1" fact="0.5"/>
+          <dgm:constr type="ctrX" for="ch" forName="sibTrans" refType="w" fact="0.5"/>
+          <dgm:constr type="t" for="ch" forName="sibTrans"/>
+          <dgm:constr type="w" for="ch" forName="sibTrans" refType="w" fact="0.8"/>
+          <dgm:constr type="h" for="ch" forName="sibTrans" refType="w" refFor="ch" refForName="node1" fact="0.5"/>
+          <dgm:constr type="userA" for="ch" forName="sibTrans" refType="w" fact="1.07"/>
+          <dgm:constr type="ctrX" for="ch" forName="node2" refType="w" fact="0.5"/>
+          <dgm:constr type="b" for="ch" forName="node2" refType="h"/>
+          <dgm:constr type="w" for="ch" forName="node2" refType="w" fact="0.8"/>
+          <dgm:constr type="h" for="ch" forName="node2" refType="w" refFor="ch" refForName="node1" fact="0.5"/>
+          <dgm:constr type="l" for="ch" forName="sp1"/>
+          <dgm:constr type="t" for="ch" forName="sp1" refType="h" fact="0.5"/>
+          <dgm:constr type="w" for="ch" forName="sp1" val="1"/>
+          <dgm:constr type="h" for="ch" forName="sp1" val="1"/>
+          <dgm:constr type="r" for="ch" forName="sp2" refType="w"/>
+          <dgm:constr type="t" for="ch" forName="sp2" refType="h" fact="0.5"/>
+          <dgm:constr type="w" for="ch" forName="sp2" val="1"/>
+          <dgm:constr type="h" for="ch" forName="sp2" val="1"/>
+        </dgm:constrLst>
+        <dgm:ruleLst/>
+      </dgm:if>
+      <dgm:else name="Name3">
+        <dgm:alg type="composite"/>
+        <dgm:shape xmlns:r="http://schemas.openxmlformats.org/officeDocument/2006/relationships" r:blip="">
+          <dgm:adjLst/>
+        </dgm:shape>
+        <dgm:presOf/>
+        <dgm:constrLst>
+          <dgm:constr type="primFontSz" for="ch" ptType="node" op="equ" val="65"/>
+        </dgm:constrLst>
+        <dgm:ruleLst/>
+      </dgm:else>
+    </dgm:choose>
+    <dgm:choose name="Name4">
+      <dgm:if name="Name5" axis="ch" ptType="node" func="cnt" op="equ" val="2">
+        <dgm:layoutNode name="node1">
+          <dgm:varLst>
+            <dgm:bulletEnabled val="1"/>
+          </dgm:varLst>
+          <dgm:alg type="tx"/>
+          <dgm:shape xmlns:r="http://schemas.openxmlformats.org/officeDocument/2006/relationships" type="roundRect" r:blip="">
+            <dgm:adjLst/>
+          </dgm:shape>
+          <dgm:presOf axis="ch desOrSelf" ptType="node node" st="1 1" cnt="1 0"/>
+          <dgm:constrLst>
+            <dgm:constr type="tMarg" refType="primFontSz" fact="0.3"/>
+            <dgm:constr type="bMarg" refType="primFontSz" fact="0.3"/>
+            <dgm:constr type="lMarg" refType="primFontSz" fact="0.3"/>
+            <dgm:constr type="rMarg" refType="primFontSz" fact="0.3"/>
+          </dgm:constrLst>
+          <dgm:ruleLst>
+            <dgm:rule type="primFontSz" val="5" fact="NaN" max="NaN"/>
+          </dgm:ruleLst>
+        </dgm:layoutNode>
+        <dgm:layoutNode name="sibTrans" styleLbl="bgShp">
+          <dgm:choose name="Name6">
+            <dgm:if name="Name7" func="var" arg="dir" op="equ" val="norm">
+              <dgm:alg type="conn">
+                <dgm:param type="connRout" val="longCurve"/>
+                <dgm:param type="begPts" val="midR"/>
+                <dgm:param type="endPts" val="midL"/>
+                <dgm:param type="dstNode" val="node1"/>
+              </dgm:alg>
+              <dgm:shape xmlns:r="http://schemas.openxmlformats.org/officeDocument/2006/relationships" type="conn" r:blip="" zOrderOff="-2">
+                <dgm:adjLst/>
+              </dgm:shape>
+              <dgm:presOf axis="ch" ptType="sibTrans"/>
+              <dgm:constrLst>
+                <dgm:constr type="userA"/>
+                <dgm:constr type="diam" refType="userA" fact="-1"/>
+                <dgm:constr type="wArH" refType="userA" fact="0.05"/>
+                <dgm:constr type="hArH" refType="userA" fact="0.1"/>
+                <dgm:constr type="stemThick" refType="userA" fact="0.06"/>
+                <dgm:constr type="begPad" refType="connDist" fact="-0.2"/>
+                <dgm:constr type="endPad" refType="connDist" fact="0.05"/>
+              </dgm:constrLst>
+            </dgm:if>
+            <dgm:else name="Name8">
+              <dgm:alg type="conn">
+                <dgm:param type="connRout" val="longCurve"/>
+                <dgm:param type="begPts" val="midL"/>
+                <dgm:param type="endPts" val="midR"/>
+                <dgm:param type="dstNode" val="node1"/>
+              </dgm:alg>
+              <dgm:shape xmlns:r="http://schemas.openxmlformats.org/officeDocument/2006/relationships" type="conn" r:blip="" zOrderOff="-2">
+                <dgm:adjLst/>
+              </dgm:shape>
+              <dgm:presOf axis="ch" ptType="sibTrans"/>
+              <dgm:constrLst>
+                <dgm:constr type="userA"/>
+                <dgm:constr type="diam" refType="userA"/>
+                <dgm:constr type="wArH" refType="userA" fact="0.05"/>
+                <dgm:constr type="hArH" refType="userA" fact="0.1"/>
+                <dgm:constr type="stemThick" refType="userA" fact="0.06"/>
+                <dgm:constr type="begPad" refType="connDist" fact="-0.2"/>
+                <dgm:constr type="endPad" refType="connDist" fact="0.05"/>
+              </dgm:constrLst>
+            </dgm:else>
+          </dgm:choose>
+          <dgm:ruleLst/>
+        </dgm:layoutNode>
+        <dgm:layoutNode name="node2">
+          <dgm:varLst>
+            <dgm:bulletEnabled val="1"/>
+          </dgm:varLst>
+          <dgm:alg type="tx"/>
+          <dgm:shape xmlns:r="http://schemas.openxmlformats.org/officeDocument/2006/relationships" type="roundRect" r:blip="">
+            <dgm:adjLst/>
+          </dgm:shape>
+          <dgm:presOf axis="ch desOrSelf" ptType="node node" st="2 1" cnt="1 0"/>
+          <dgm:constrLst>
+            <dgm:constr type="tMarg" refType="primFontSz" fact="0.3"/>
+            <dgm:constr type="bMarg" refType="primFontSz" fact="0.3"/>
+            <dgm:constr type="lMarg" refType="primFontSz" fact="0.3"/>
+            <dgm:constr type="rMarg" refType="primFontSz" fact="0.3"/>
+          </dgm:constrLst>
+          <dgm:ruleLst>
+            <dgm:rule type="primFontSz" val="5" fact="NaN" max="NaN"/>
+          </dgm:ruleLst>
+        </dgm:layoutNode>
+        <dgm:layoutNode name="sp1">
+          <dgm:alg type="sp"/>
+          <dgm:shape xmlns:r="http://schemas.openxmlformats.org/officeDocument/2006/relationships" r:blip="">
+            <dgm:adjLst/>
+          </dgm:shape>
+          <dgm:presOf/>
+          <dgm:constrLst/>
+          <dgm:ruleLst/>
+        </dgm:layoutNode>
+        <dgm:layoutNode name="sp2">
+          <dgm:alg type="sp"/>
+          <dgm:shape xmlns:r="http://schemas.openxmlformats.org/officeDocument/2006/relationships" r:blip="">
+            <dgm:adjLst/>
+          </dgm:shape>
+          <dgm:presOf/>
+          <dgm:constrLst/>
+          <dgm:ruleLst/>
+        </dgm:layoutNode>
+      </dgm:if>
+      <dgm:else name="Name9">
+        <dgm:layoutNode name="cycle">
+          <dgm:choose name="Name10">
+            <dgm:if name="Name11" func="var" arg="dir" op="equ" val="norm">
+              <dgm:alg type="cycle">
+                <dgm:param type="stAng" val="0"/>
+                <dgm:param type="spanAng" val="360"/>
+              </dgm:alg>
+              <dgm:shape xmlns:r="http://schemas.openxmlformats.org/officeDocument/2006/relationships" r:blip="">
+                <dgm:adjLst/>
+              </dgm:shape>
+              <dgm:presOf/>
+              <dgm:constrLst>
+                <dgm:constr type="diam" refType="w"/>
+                <dgm:constr type="w" for="ch" ptType="node" refType="w"/>
+                <dgm:constr type="sibSp" val="15"/>
+                <dgm:constr type="userA" for="ch" ptType="sibTrans" refType="diam" op="equ" fact="-1"/>
+                <dgm:constr type="wArH" for="ch" ptType="sibTrans" refType="diam" op="equ" fact="0.05"/>
+                <dgm:constr type="hArH" for="ch" ptType="sibTrans" refType="diam" op="equ" fact="0.1"/>
+                <dgm:constr type="stemThick" for="ch" ptType="sibTrans" refType="diam" op="equ" fact="0.065"/>
+                <dgm:constr type="primFontSz" for="ch" ptType="node" op="equ"/>
+              </dgm:constrLst>
+            </dgm:if>
+            <dgm:else name="Name12">
+              <dgm:alg type="cycle">
+                <dgm:param type="stAng" val="0"/>
+                <dgm:param type="spanAng" val="-360"/>
+              </dgm:alg>
+              <dgm:shape xmlns:r="http://schemas.openxmlformats.org/officeDocument/2006/relationships" r:blip="">
+                <dgm:adjLst/>
+              </dgm:shape>
+              <dgm:presOf/>
+              <dgm:constrLst>
+                <dgm:constr type="diam" refType="w"/>
+                <dgm:constr type="w" for="ch" ptType="node" refType="w"/>
+                <dgm:constr type="sibSp" val="15"/>
+                <dgm:constr type="userA" for="ch" ptType="sibTrans" refType="diam" op="equ"/>
+                <dgm:constr type="wArH" for="ch" ptType="sibTrans" refType="diam" op="equ" fact="0.05"/>
+                <dgm:constr type="hArH" for="ch" ptType="sibTrans" refType="diam" op="equ" fact="0.1"/>
+                <dgm:constr type="stemThick" for="ch" ptType="sibTrans" refType="diam" op="equ" fact="0.065"/>
+                <dgm:constr type="primFontSz" for="ch" ptType="node" op="equ"/>
+              </dgm:constrLst>
+            </dgm:else>
+          </dgm:choose>
+          <dgm:ruleLst/>
+          <dgm:forEach name="nodesFirstNodeForEach" axis="ch" ptType="node" cnt="1">
+            <dgm:layoutNode name="nodeFirstNode">
+              <dgm:varLst>
+                <dgm:bulletEnabled val="1"/>
+              </dgm:varLst>
+              <dgm:alg type="tx"/>
+              <dgm:shape xmlns:r="http://schemas.openxmlformats.org/officeDocument/2006/relationships" type="roundRect" r:blip="">
+                <dgm:adjLst/>
+              </dgm:shape>
+              <dgm:presOf axis="desOrSelf" ptType="node"/>
+              <dgm:constrLst>
+                <dgm:constr type="h" refType="w" fact="0.5"/>
+                <dgm:constr type="primFontSz" val="65"/>
+                <dgm:constr type="tMarg" refType="primFontSz" fact="0.3"/>
+                <dgm:constr type="bMarg" refType="primFontSz" fact="0.3"/>
+                <dgm:constr type="lMarg" refType="primFontSz" fact="0.3"/>
+                <dgm:constr type="rMarg" refType="primFontSz" fact="0.3"/>
+              </dgm:constrLst>
+              <dgm:ruleLst>
+                <dgm:rule type="primFontSz" val="5" fact="NaN" max="NaN"/>
+              </dgm:ruleLst>
+            </dgm:layoutNode>
+            <dgm:forEach name="sibTransForEach" axis="followSib" ptType="sibTrans" cnt="1">
+              <dgm:layoutNode name="sibTransFirstNode" styleLbl="bgShp">
+                <dgm:choose name="Name13">
+                  <dgm:if name="Name14" func="var" arg="dir" op="equ" val="norm">
+                    <dgm:alg type="conn">
+                      <dgm:param type="connRout" val="longCurve"/>
+                      <dgm:param type="begPts" val="midR"/>
+                      <dgm:param type="endPts" val="midL"/>
+                      <dgm:param type="dstNode" val="nodeFirstNode"/>
+                    </dgm:alg>
+                  </dgm:if>
+                  <dgm:else name="Name15">
+                    <dgm:alg type="conn">
+                      <dgm:param type="connRout" val="longCurve"/>
+                      <dgm:param type="begPts" val="midL"/>
+                      <dgm:param type="endPts" val="midR"/>
+                      <dgm:param type="dstNode" val="nodeFirstNode"/>
+                    </dgm:alg>
+                  </dgm:else>
+                </dgm:choose>
+                <dgm:shape xmlns:r="http://schemas.openxmlformats.org/officeDocument/2006/relationships" type="conn" r:blip="" zOrderOff="-2">
+                  <dgm:adjLst/>
+                </dgm:shape>
+                <dgm:presOf axis="self"/>
+                <dgm:choose name="Name16">
+                  <dgm:if name="Name17" axis="par ch" ptType="doc node" func="cnt" op="equ" val="3">
+                    <dgm:constrLst>
+                      <dgm:constr type="userA"/>
+                      <dgm:constr type="diam" refType="userA" fact="1.01"/>
+                      <dgm:constr type="begPad" refType="connDist" fact="-0.2"/>
+                      <dgm:constr type="endPad" refType="connDist" fact="0.05"/>
+                    </dgm:constrLst>
+                  </dgm:if>
+                  <dgm:if name="Name18" axis="par ch" ptType="doc node" func="cnt" op="equ" val="4">
+                    <dgm:constrLst>
+                      <dgm:constr type="userA"/>
+                      <dgm:constr type="diam" refType="userA" fact="1.26"/>
+                      <dgm:constr type="begPad" refType="connDist" fact="-0.2"/>
+                      <dgm:constr type="endPad" refType="connDist" fact="0.05"/>
+                    </dgm:constrLst>
+                  </dgm:if>
+                  <dgm:if name="Name19" axis="par ch" ptType="doc node" func="cnt" op="equ" val="5">
+                    <dgm:constrLst>
+                      <dgm:constr type="userA"/>
+                      <dgm:constr type="diam" refType="userA" fact="1.04"/>
+                      <dgm:constr type="begPad" refType="connDist" fact="-0.2"/>
+                      <dgm:constr type="endPad" refType="connDist" fact="0.05"/>
+                    </dgm:constrLst>
+                  </dgm:if>
+                  <dgm:if name="Name20" axis="par ch" ptType="doc node" func="cnt" op="equ" val="6">
+                    <dgm:constrLst>
+                      <dgm:constr type="userA"/>
+                      <dgm:constr type="diam" refType="userA" fact="1.1"/>
+                      <dgm:constr type="begPad" refType="connDist" fact="-0.2"/>
+                      <dgm:constr type="endPad" refType="connDist" fact="0.05"/>
+                    </dgm:constrLst>
+                  </dgm:if>
+                  <dgm:else name="Name21">
+                    <dgm:constrLst>
+                      <dgm:constr type="userA"/>
+                      <dgm:constr type="diam" refType="userA" fact="1.04"/>
+                      <dgm:constr type="begPad" refType="connDist" fact="-0.2"/>
+                      <dgm:constr type="endPad" refType="connDist" fact="0.05"/>
+                    </dgm:constrLst>
+                  </dgm:else>
+                </dgm:choose>
+                <dgm:ruleLst/>
+              </dgm:layoutNode>
+            </dgm:forEach>
+          </dgm:forEach>
+          <dgm:forEach name="followingNodesForEach" axis="ch" ptType="node" st="2">
+            <dgm:layoutNode name="nodeFollowingNodes">
+              <dgm:varLst>
+                <dgm:bulletEnabled val="1"/>
+              </dgm:varLst>
+              <dgm:alg type="tx"/>
+              <dgm:shape xmlns:r="http://schemas.openxmlformats.org/officeDocument/2006/relationships" type="roundRect" r:blip="">
+                <dgm:adjLst/>
+              </dgm:shape>
+              <dgm:presOf axis="desOrSelf" ptType="node"/>
+              <dgm:constrLst>
+                <dgm:constr type="h" refType="w" fact="0.5"/>
+                <dgm:constr type="primFontSz" val="65"/>
+                <dgm:constr type="tMarg" refType="primFontSz" fact="0.3"/>
+                <dgm:constr type="bMarg" refType="primFontSz" fact="0.3"/>
+                <dgm:constr type="lMarg" refType="primFontSz" fact="0.3"/>
+                <dgm:constr type="rMarg" refType="primFontSz" fact="0.3"/>
+              </dgm:constrLst>
+              <dgm:ruleLst>
+                <dgm:rule type="primFontSz" val="5" fact="NaN" max="NaN"/>
+              </dgm:ruleLst>
+            </dgm:layoutNode>
+          </dgm:forEach>
+        </dgm:layoutNode>
+      </dgm:else>
+    </dgm:choose>
+  </dgm:layoutNode>
+</dgm:layoutDef>
+</file>
+
+<file path=ppt/diagrams/quickStyle1.xml><?xml version="1.0" encoding="utf-8"?>
+<dgm:styleDef xmlns:dgm="http://schemas.openxmlformats.org/drawingml/2006/diagram" xmlns:a="http://schemas.openxmlformats.org/drawingml/2006/main" uniqueId="urn:microsoft.com/office/officeart/2005/8/quickstyle/simple3">
+  <dgm:title val=""/>
+  <dgm:desc val=""/>
+  <dgm:catLst>
+    <dgm:cat type="simple" pri="10300"/>
+  </dgm:catLst>
+  <dgm:scene3d>
+    <a:camera prst="orthographicFront"/>
+    <a:lightRig rig="threePt" dir="t"/>
+  </dgm:scene3d>
+  <dgm:styleLbl name="node0">
+    <dgm:scene3d>
+      <a:camera prst="orthographicFront"/>
+      <a:lightRig rig="flat" dir="t"/>
+    </dgm:scene3d>
+    <dgm:sp3d prstMaterial="dkEdge">
+      <a:bevelT w="8200" h="38100"/>
+    </dgm:sp3d>
+    <dgm:txPr/>
+    <dgm:style>
+      <a:lnRef idx="0">
+        <a:scrgbClr r="0" g="0" b="0"/>
+      </a:lnRef>
+      <a:fillRef idx="2">
+        <a:scrgbClr r="0" g="0" b="0"/>
+      </a:fillRef>
+      <a:effectRef idx="1">
+        <a:scrgbClr r="0" g="0" b="0"/>
+      </a:effectRef>
+      <a:fontRef idx="minor">
+        <a:schemeClr val="dk1"/>
+      </a:fontRef>
+    </dgm:style>
+  </dgm:styleLbl>
+  <dgm:styleLbl name="lnNode1">
+    <dgm:scene3d>
+      <a:camera prst="orthographicFront"/>
+      <a:lightRig rig="flat" dir="t"/>
+    </dgm:scene3d>
+    <dgm:sp3d prstMaterial="dkEdge">
+      <a:bevelT w="8200" h="38100"/>
+    </dgm:sp3d>
+    <dgm:txPr/>
+    <dgm:style>
+      <a:lnRef idx="1">
+        <a:scrgbClr r="0" g="0" b="0"/>
+      </a:lnRef>
+      <a:fillRef idx="2">
+        <a:scrgbClr r="0" g="0" b="0"/>
+      </a:fillRef>
+      <a:effectRef idx="0">
+        <a:scrgbClr r="0" g="0" b="0"/>
+      </a:effectRef>
+      <a:fontRef idx="minor">
+        <a:schemeClr val="dk1"/>
+      </a:fontRef>
+    </dgm:style>
+  </dgm:styleLbl>
+  <dgm:styleLbl name="vennNode1">
+    <dgm:scene3d>
+      <a:camera prst="orthographicFront"/>
+      <a:lightRig rig="flat" dir="t"/>
+    </dgm:scene3d>
+    <dgm:sp3d prstMaterial="dkEdge">
+      <a:bevelT w="8200" h="38100"/>
+    </dgm:sp3d>
+    <dgm:txPr/>
+    <dgm:style>
+      <a:lnRef idx="0">
+        <a:scrgbClr r="0" g="0" b="0"/>
+      </a:lnRef>
+      <a:fillRef idx="2">
+        <a:scrgbClr r="0" g="0" b="0"/>
+      </a:fillRef>
+      <a:effectRef idx="0">
+        <a:scrgbClr r="0" g="0" b="0"/>
+      </a:effectRef>
+      <a:fontRef idx="minor">
+        <a:schemeClr val="tx1"/>
+      </a:fontRef>
+    </dgm:style>
+  </dgm:styleLbl>
+  <dgm:styleLbl name="alignNode1">
+    <dgm:scene3d>
+      <a:camera prst="orthographicFront"/>
+      <a:lightRig rig="threePt" dir="t"/>
+    </dgm:scene3d>
+    <dgm:sp3d/>
+    <dgm:txPr/>
+    <dgm:style>
+      <a:lnRef idx="1">
+        <a:scrgbClr r="0" g="0" b="0"/>
+      </a:lnRef>
+      <a:fillRef idx="2">
+        <a:scrgbClr r="0" g="0" b="0"/>
+      </a:fillRef>
+      <a:effectRef idx="1">
+        <a:scrgbClr r="0" g="0" b="0"/>
+      </a:effectRef>
+      <a:fontRef idx="minor">
+        <a:schemeClr val="dk1"/>
+      </a:fontRef>
+    </dgm:style>
+  </dgm:styleLbl>
+  <dgm:styleLbl name="node1">
+    <dgm:scene3d>
+      <a:camera prst="orthographicFront"/>
+      <a:lightRig rig="flat" dir="t"/>
+    </dgm:scene3d>
+    <dgm:sp3d prstMaterial="dkEdge">
+      <a:bevelT w="8200" h="38100"/>
+    </dgm:sp3d>
+    <dgm:txPr/>
+    <dgm:style>
+      <a:lnRef idx="0">
+        <a:scrgbClr r="0" g="0" b="0"/>
+      </a:lnRef>
+      <a:fillRef idx="2">
+        <a:scrgbClr r="0" g="0" b="0"/>
+      </a:fillRef>
+      <a:effectRef idx="1">
+        <a:scrgbClr r="0" g="0" b="0"/>
+      </a:effectRef>
+      <a:fontRef idx="minor">
+        <a:schemeClr val="dk1"/>
+      </a:fontRef>
+    </dgm:style>
+  </dgm:styleLbl>
+  <dgm:styleLbl name="node2">
+    <dgm:scene3d>
+      <a:camera prst="orthographicFront"/>
+      <a:lightRig rig="flat" dir="t"/>
+    </dgm:scene3d>
+    <dgm:sp3d prstMaterial="dkEdge">
+      <a:bevelT w="8200" h="38100"/>
+    </dgm:sp3d>
+    <dgm:txPr/>
+    <dgm:style>
+      <a:lnRef idx="0">
+        <a:scrgbClr r="0" g="0" b="0"/>
+      </a:lnRef>
+      <a:fillRef idx="2">
+        <a:scrgbClr r="0" g="0" b="0"/>
+      </a:fillRef>
+      <a:effectRef idx="1">
+        <a:scrgbClr r="0" g="0" b="0"/>
+      </a:effectRef>
+      <a:fontRef idx="minor">
+        <a:schemeClr val="dk1"/>
+      </a:fontRef>
+    </dgm:style>
+  </dgm:styleLbl>
+  <dgm:styleLbl name="node3">
+    <dgm:scene3d>
+      <a:camera prst="orthographicFront"/>
+      <a:lightRig rig="flat" dir="t"/>
+    </dgm:scene3d>
+    <dgm:sp3d prstMaterial="dkEdge">
+      <a:bevelT w="8200" h="38100"/>
+    </dgm:sp3d>
+    <dgm:txPr/>
+    <dgm:style>
+      <a:lnRef idx="0">
+        <a:scrgbClr r="0" g="0" b="0"/>
+      </a:lnRef>
+      <a:fillRef idx="2">
+        <a:scrgbClr r="0" g="0" b="0"/>
+      </a:fillRef>
+      <a:effectRef idx="1">
+        <a:scrgbClr r="0" g="0" b="0"/>
+      </a:effectRef>
+      <a:fontRef idx="minor">
+        <a:schemeClr val="dk1"/>
+      </a:fontRef>
+    </dgm:style>
+  </dgm:styleLbl>
+  <dgm:styleLbl name="node4">
+    <dgm:scene3d>
+      <a:camera prst="orthographicFront"/>
+      <a:lightRig rig="flat" dir="t"/>
+    </dgm:scene3d>
+    <dgm:sp3d prstMaterial="dkEdge">
+      <a:bevelT w="8200" h="38100"/>
+    </dgm:sp3d>
+    <dgm:txPr/>
+    <dgm:style>
+      <a:lnRef idx="0">
+        <a:scrgbClr r="0" g="0" b="0"/>
+      </a:lnRef>
+      <a:fillRef idx="2">
+        <a:scrgbClr r="0" g="0" b="0"/>
+      </a:fillRef>
+      <a:effectRef idx="1">
+        <a:scrgbClr r="0" g="0" b="0"/>
+      </a:effectRef>
+      <a:fontRef idx="minor">
+        <a:schemeClr val="dk1"/>
+      </a:fontRef>
+    </dgm:style>
+  </dgm:styleLbl>
+  <dgm:styleLbl name="fgImgPlace1">
+    <dgm:scene3d>
+      <a:camera prst="orthographicFront"/>
+      <a:lightRig rig="threePt" dir="t"/>
+    </dgm:scene3d>
+    <dgm:sp3d/>
+    <dgm:txPr/>
+    <dgm:style>
+      <a:lnRef idx="1">
+        <a:scrgbClr r="0" g="0" b="0"/>
+      </a:lnRef>
+      <a:fillRef idx="1">
+        <a:scrgbClr r="0" g="0" b="0"/>
+      </a:fillRef>
+      <a:effectRef idx="1">
+        <a:scrgbClr r="0" g="0" b="0"/>
+      </a:effectRef>
+      <a:fontRef idx="minor"/>
+    </dgm:style>
+  </dgm:styleLbl>
+  <dgm:styleLbl name="alignImgPlace1">
+    <dgm:scene3d>
+      <a:camera prst="orthographicFront"/>
+      <a:lightRig rig="threePt" dir="t"/>
+    </dgm:scene3d>
+    <dgm:sp3d/>
+    <dgm:txPr/>
+    <dgm:style>
+      <a:lnRef idx="1">
+        <a:scrgbClr r="0" g="0" b="0"/>
+      </a:lnRef>
+      <a:fillRef idx="1">
+        <a:scrgbClr r="0" g="0" b="0"/>
+      </a:fillRef>
+      <a:effectRef idx="1">
+        <a:scrgbClr r="0" g="0" b="0"/>
+      </a:effectRef>
+      <a:fontRef idx="minor"/>
+    </dgm:style>
+  </dgm:styleLbl>
+  <dgm:styleLbl name="bgImgPlace1">
+    <dgm:scene3d>
+      <a:camera prst="orthographicFront"/>
+      <a:lightRig rig="threePt" dir="t"/>
+    </dgm:scene3d>
+    <dgm:sp3d/>
+    <dgm:txPr/>
+    <dgm:style>
+      <a:lnRef idx="1">
+        <a:scrgbClr r="0" g="0" b="0"/>
+      </a:lnRef>
+      <a:fillRef idx="1">
+        <a:scrgbClr r="0" g="0" b="0"/>
+      </a:fillRef>
+      <a:effectRef idx="1">
+        <a:scrgbClr r="0" g="0" b="0"/>
+      </a:effectRef>
+      <a:fontRef idx="minor"/>
+    </dgm:style>
+  </dgm:styleLbl>
+  <dgm:styleLbl name="sibTrans2D1">
+    <dgm:scene3d>
+      <a:camera prst="orthographicFront"/>
+      <a:lightRig rig="threePt" dir="t"/>
+    </dgm:scene3d>
+    <dgm:sp3d/>
+    <dgm:txPr/>
+    <dgm:style>
+      <a:lnRef idx="0">
+        <a:scrgbClr r="0" g="0" b="0"/>
+      </a:lnRef>
+      <a:fillRef idx="2">
+        <a:scrgbClr r="0" g="0" b="0"/>
+      </a:fillRef>
+      <a:effectRef idx="1">
+        <a:scrgbClr r="0" g="0" b="0"/>
+      </a:effectRef>
+      <a:fontRef idx="minor">
+        <a:schemeClr val="dk1"/>
+      </a:fontRef>
+    </dgm:style>
+  </dgm:styleLbl>
+  <dgm:styleLbl name="fgSibTrans2D1">
+    <dgm:scene3d>
+      <a:camera prst="orthographicFront"/>
+      <a:lightRig rig="threePt" dir="t"/>
+    </dgm:scene3d>
+    <dgm:sp3d/>
+    <dgm:txPr/>
+    <dgm:style>
+      <a:lnRef idx="0">
+        <a:scrgbClr r="0" g="0" b="0"/>
+      </a:lnRef>
+      <a:fillRef idx="2">
+        <a:scrgbClr r="0" g="0" b="0"/>
+      </a:fillRef>
+      <a:effectRef idx="1">
+        <a:scrgbClr r="0" g="0" b="0"/>
+      </a:effectRef>
+      <a:fontRef idx="minor">
+        <a:schemeClr val="dk1"/>
+      </a:fontRef>
+    </dgm:style>
+  </dgm:styleLbl>
+  <dgm:styleLbl name="bgSibTrans2D1">
+    <dgm:scene3d>
+      <a:camera prst="orthographicFront"/>
+      <a:lightRig rig="threePt" dir="t"/>
+    </dgm:scene3d>
+    <dgm:sp3d/>
+    <dgm:txPr/>
+    <dgm:style>
+      <a:lnRef idx="0">
+        <a:scrgbClr r="0" g="0" b="0"/>
+      </a:lnRef>
+      <a:fillRef idx="2">
+        <a:scrgbClr r="0" g="0" b="0"/>
+      </a:fillRef>
+      <a:effectRef idx="1">
+        <a:scrgbClr r="0" g="0" b="0"/>
+      </a:effectRef>
+      <a:fontRef idx="minor">
+        <a:schemeClr val="dk1"/>
+      </a:fontRef>
+    </dgm:style>
+  </dgm:styleLbl>
+  <dgm:styleLbl name="sibTrans1D1">
+    <dgm:scene3d>
+      <a:camera prst="orthographicFront"/>
+      <a:lightRig rig="threePt" dir="t"/>
+    </dgm:scene3d>
+    <dgm:sp3d/>
+    <dgm:txPr/>
+    <dgm:style>
+      <a:lnRef idx="1">
+        <a:scrgbClr r="0" g="0" b="0"/>
+      </a:lnRef>
+      <a:fillRef idx="0">
+        <a:scrgbClr r="0" g="0" b="0"/>
+      </a:fillRef>
+      <a:effectRef idx="0">
+        <a:scrgbClr r="0" g="0" b="0"/>
+      </a:effectRef>
+      <a:fontRef idx="minor"/>
+    </dgm:style>
+  </dgm:styleLbl>
+  <dgm:styleLbl name="callout">
+    <dgm:scene3d>
+      <a:camera prst="orthographicFront"/>
+      <a:lightRig rig="threePt" dir="t"/>
+    </dgm:scene3d>
+    <dgm:sp3d/>
+    <dgm:txPr/>
+    <dgm:style>
+      <a:lnRef idx="1">
+        <a:scrgbClr r="0" g="0" b="0"/>
+      </a:lnRef>
+      <a:fillRef idx="2">
+        <a:scrgbClr r="0" g="0" b="0"/>
+      </a:fillRef>
+      <a:effectRef idx="1">
+        <a:scrgbClr r="0" g="0" b="0"/>
+      </a:effectRef>
+      <a:fontRef idx="minor"/>
+    </dgm:style>
+  </dgm:styleLbl>
+  <dgm:styleLbl name="asst0">
+    <dgm:scene3d>
+      <a:camera prst="orthographicFront"/>
+      <a:lightRig rig="flat" dir="t"/>
+    </dgm:scene3d>
+    <dgm:sp3d prstMaterial="dkEdge">
+      <a:bevelT w="8200" h="38100"/>
+    </dgm:sp3d>
+    <dgm:txPr/>
+    <dgm:style>
+      <a:lnRef idx="0">
+        <a:scrgbClr r="0" g="0" b="0"/>
+      </a:lnRef>
+      <a:fillRef idx="2">
+        <a:scrgbClr r="0" g="0" b="0"/>
+      </a:fillRef>
+      <a:effectRef idx="1">
+        <a:scrgbClr r="0" g="0" b="0"/>
+      </a:effectRef>
+      <a:fontRef idx="minor">
+        <a:schemeClr val="dk1"/>
+      </a:fontRef>
+    </dgm:style>
+  </dgm:styleLbl>
+  <dgm:styleLbl name="asst1">
+    <dgm:scene3d>
+      <a:camera prst="orthographicFront"/>
+      <a:lightRig rig="flat" dir="t"/>
+    </dgm:scene3d>
+    <dgm:sp3d prstMaterial="dkEdge">
+      <a:bevelT w="8200" h="38100"/>
+    </dgm:sp3d>
+    <dgm:txPr/>
+    <dgm:style>
+      <a:lnRef idx="0">
+        <a:scrgbClr r="0" g="0" b="0"/>
+      </a:lnRef>
+      <a:fillRef idx="2">
+        <a:scrgbClr r="0" g="0" b="0"/>
+      </a:fillRef>
+      <a:effectRef idx="1">
+        <a:scrgbClr r="0" g="0" b="0"/>
+      </a:effectRef>
+      <a:fontRef idx="minor">
+        <a:schemeClr val="dk1"/>
+      </a:fontRef>
+    </dgm:style>
+  </dgm:styleLbl>
+  <dgm:styleLbl name="asst2">
+    <dgm:scene3d>
+      <a:camera prst="orthographicFront"/>
+      <a:lightRig rig="flat" dir="t"/>
+    </dgm:scene3d>
+    <dgm:sp3d prstMaterial="dkEdge">
+      <a:bevelT w="8200" h="38100"/>
+    </dgm:sp3d>
+    <dgm:txPr/>
+    <dgm:style>
+      <a:lnRef idx="0">
+        <a:scrgbClr r="0" g="0" b="0"/>
+      </a:lnRef>
+      <a:fillRef idx="2">
+        <a:scrgbClr r="0" g="0" b="0"/>
+      </a:fillRef>
+      <a:effectRef idx="1">
+        <a:scrgbClr r="0" g="0" b="0"/>
+      </a:effectRef>
+      <a:fontRef idx="minor">
+        <a:schemeClr val="dk1"/>
+      </a:fontRef>
+    </dgm:style>
+  </dgm:styleLbl>
+  <dgm:styleLbl name="asst3">
+    <dgm:scene3d>
+      <a:camera prst="orthographicFront"/>
+      <a:lightRig rig="flat" dir="t"/>
+    </dgm:scene3d>
+    <dgm:sp3d prstMaterial="dkEdge">
+      <a:bevelT w="8200" h="38100"/>
+    </dgm:sp3d>
+    <dgm:txPr/>
+    <dgm:style>
+      <a:lnRef idx="0">
+        <a:scrgbClr r="0" g="0" b="0"/>
+      </a:lnRef>
+      <a:fillRef idx="2">
+        <a:scrgbClr r="0" g="0" b="0"/>
+      </a:fillRef>
+      <a:effectRef idx="1">
+        <a:scrgbClr r="0" g="0" b="0"/>
+      </a:effectRef>
+      <a:fontRef idx="minor">
+        <a:schemeClr val="dk1"/>
+      </a:fontRef>
+    </dgm:style>
+  </dgm:styleLbl>
+  <dgm:styleLbl name="asst4">
+    <dgm:scene3d>
+      <a:camera prst="orthographicFront"/>
+      <a:lightRig rig="flat" dir="t"/>
+    </dgm:scene3d>
+    <dgm:sp3d prstMaterial="dkEdge">
+      <a:bevelT w="8200" h="38100"/>
+    </dgm:sp3d>
+    <dgm:txPr/>
+    <dgm:style>
+      <a:lnRef idx="0">
+        <a:scrgbClr r="0" g="0" b="0"/>
+      </a:lnRef>
+      <a:fillRef idx="2">
+        <a:scrgbClr r="0" g="0" b="0"/>
+      </a:fillRef>
+      <a:effectRef idx="1">
+        <a:scrgbClr r="0" g="0" b="0"/>
+      </a:effectRef>
+      <a:fontRef idx="minor">
+        <a:schemeClr val="dk1"/>
+      </a:fontRef>
+    </dgm:style>
+  </dgm:styleLbl>
+  <dgm:styleLbl name="parChTrans2D1">
+    <dgm:scene3d>
+      <a:camera prst="orthographicFront"/>
+      <a:lightRig rig="threePt" dir="t"/>
+    </dgm:scene3d>
+    <dgm:sp3d/>
+    <dgm:txPr/>
+    <dgm:style>
+      <a:lnRef idx="1">
+        <a:scrgbClr r="0" g="0" b="0"/>
+      </a:lnRef>
+      <a:fillRef idx="2">
+        <a:scrgbClr r="0" g="0" b="0"/>
+      </a:fillRef>
+      <a:effectRef idx="1">
+        <a:scrgbClr r="0" g="0" b="0"/>
+      </a:effectRef>
+      <a:fontRef idx="minor">
+        <a:schemeClr val="dk1"/>
+      </a:fontRef>
+    </dgm:style>
+  </dgm:styleLbl>
+  <dgm:styleLbl name="parChTrans2D2">
+    <dgm:scene3d>
+      <a:camera prst="orthographicFront"/>
+      <a:lightRig rig="threePt" dir="t"/>
+    </dgm:scene3d>
+    <dgm:sp3d/>
+    <dgm:txPr/>
+    <dgm:style>
+      <a:lnRef idx="1">
+        <a:scrgbClr r="0" g="0" b="0"/>
+      </a:lnRef>
+      <a:fillRef idx="2">
+        <a:scrgbClr r="0" g="0" b="0"/>
+      </a:fillRef>
+      <a:effectRef idx="1">
+        <a:scrgbClr r="0" g="0" b="0"/>
+      </a:effectRef>
+      <a:fontRef idx="minor">
+        <a:schemeClr val="dk1"/>
+      </a:fontRef>
+    </dgm:style>
+  </dgm:styleLbl>
+  <dgm:styleLbl name="parChTrans2D3">
+    <dgm:scene3d>
+      <a:camera prst="orthographicFront"/>
+      <a:lightRig rig="threePt" dir="t"/>
+    </dgm:scene3d>
+    <dgm:sp3d/>
+    <dgm:txPr/>
+    <dgm:style>
+      <a:lnRef idx="1">
+        <a:scrgbClr r="0" g="0" b="0"/>
+      </a:lnRef>
+      <a:fillRef idx="2">
+        <a:scrgbClr r="0" g="0" b="0"/>
+      </a:fillRef>
+      <a:effectRef idx="1">
+        <a:scrgbClr r="0" g="0" b="0"/>
+      </a:effectRef>
+      <a:fontRef idx="minor">
+        <a:schemeClr val="dk1"/>
+      </a:fontRef>
+    </dgm:style>
+  </dgm:styleLbl>
+  <dgm:styleLbl name="parChTrans2D4">
+    <dgm:scene3d>
+      <a:camera prst="orthographicFront"/>
+      <a:lightRig rig="threePt" dir="t"/>
+    </dgm:scene3d>
+    <dgm:sp3d/>
+    <dgm:txPr/>
+    <dgm:style>
+      <a:lnRef idx="1">
+        <a:scrgbClr r="0" g="0" b="0"/>
+      </a:lnRef>
+      <a:fillRef idx="2">
+        <a:scrgbClr r="0" g="0" b="0"/>
+      </a:fillRef>
+      <a:effectRef idx="1">
+        <a:scrgbClr r="0" g="0" b="0"/>
+      </a:effectRef>
+      <a:fontRef idx="minor">
+        <a:schemeClr val="dk1"/>
+      </a:fontRef>
+    </dgm:style>
+  </dgm:styleLbl>
+  <dgm:styleLbl name="parChTrans1D1">
+    <dgm:scene3d>
+      <a:camera prst="orthographicFront"/>
+      <a:lightRig rig="threePt" dir="t"/>
+    </dgm:scene3d>
+    <dgm:sp3d/>
+    <dgm:txPr/>
+    <dgm:style>
+      <a:lnRef idx="2">
+        <a:scrgbClr r="0" g="0" b="0"/>
+      </a:lnRef>
+      <a:fillRef idx="0">
+        <a:scrgbClr r="0" g="0" b="0"/>
+      </a:fillRef>
+      <a:effectRef idx="0">
+        <a:scrgbClr r="0" g="0" b="0"/>
+      </a:effectRef>
+      <a:fontRef idx="minor"/>
+    </dgm:style>
+  </dgm:styleLbl>
+  <dgm:styleLbl name="parChTrans1D2">
+    <dgm:scene3d>
+      <a:camera prst="orthographicFront"/>
+      <a:lightRig rig="threePt" dir="t"/>
+    </dgm:scene3d>
+    <dgm:sp3d/>
+    <dgm:txPr/>
+    <dgm:style>
+      <a:lnRef idx="2">
+        <a:scrgbClr r="0" g="0" b="0"/>
+      </a:lnRef>
+      <a:fillRef idx="0">
+        <a:scrgbClr r="0" g="0" b="0"/>
+      </a:fillRef>
+      <a:effectRef idx="0">
+        <a:scrgbClr r="0" g="0" b="0"/>
+      </a:effectRef>
+      <a:fontRef idx="minor"/>
+    </dgm:style>
+  </dgm:styleLbl>
+  <dgm:styleLbl name="parChTrans1D3">
+    <dgm:scene3d>
+      <a:camera prst="orthographicFront"/>
+      <a:lightRig rig="threePt" dir="t"/>
+    </dgm:scene3d>
+    <dgm:sp3d/>
+    <dgm:txPr/>
+    <dgm:style>
+      <a:lnRef idx="2">
+        <a:scrgbClr r="0" g="0" b="0"/>
+      </a:lnRef>
+      <a:fillRef idx="0">
+        <a:scrgbClr r="0" g="0" b="0"/>
+      </a:fillRef>
+      <a:effectRef idx="0">
+        <a:scrgbClr r="0" g="0" b="0"/>
+      </a:effectRef>
+      <a:fontRef idx="minor"/>
+    </dgm:style>
+  </dgm:styleLbl>
+  <dgm:styleLbl name="parChTrans1D4">
+    <dgm:scene3d>
+      <a:camera prst="orthographicFront"/>
+      <a:lightRig rig="threePt" dir="t"/>
+    </dgm:scene3d>
+    <dgm:sp3d/>
+    <dgm:txPr/>
+    <dgm:style>
+      <a:lnRef idx="2">
+        <a:scrgbClr r="0" g="0" b="0"/>
+      </a:lnRef>
+      <a:fillRef idx="0">
+        <a:scrgbClr r="0" g="0" b="0"/>
+      </a:fillRef>
+      <a:effectRef idx="0">
+        <a:scrgbClr r="0" g="0" b="0"/>
+      </a:effectRef>
+      <a:fontRef idx="minor"/>
+    </dgm:style>
+  </dgm:styleLbl>
+  <dgm:styleLbl name="fgAcc1">
+    <dgm:scene3d>
+      <a:camera prst="orthographicFront"/>
+      <a:lightRig rig="threePt" dir="t"/>
+    </dgm:scene3d>
+    <dgm:sp3d/>
+    <dgm:txPr/>
+    <dgm:style>
+      <a:lnRef idx="1">
+        <a:scrgbClr r="0" g="0" b="0"/>
+      </a:lnRef>
+      <a:fillRef idx="1">
+        <a:scrgbClr r="0" g="0" b="0"/>
+      </a:fillRef>
+      <a:effectRef idx="0">
+        <a:scrgbClr r="0" g="0" b="0"/>
+      </a:effectRef>
+      <a:fontRef idx="minor"/>
+    </dgm:style>
+  </dgm:styleLbl>
+  <dgm:styleLbl name="conFgAcc1">
+    <dgm:scene3d>
+      <a:camera prst="orthographicFront"/>
+      <a:lightRig rig="threePt" dir="t"/>
+    </dgm:scene3d>
+    <dgm:sp3d/>
+    <dgm:txPr/>
+    <dgm:style>
+      <a:lnRef idx="1">
+        <a:scrgbClr r="0" g="0" b="0"/>
+      </a:lnRef>
+      <a:fillRef idx="1">
+        <a:scrgbClr r="0" g="0" b="0"/>
+      </a:fillRef>
+      <a:effectRef idx="0">
+        <a:scrgbClr r="0" g="0" b="0"/>
+      </a:effectRef>
+      <a:fontRef idx="minor"/>
+    </dgm:style>
+  </dgm:styleLbl>
+  <dgm:styleLbl name="alignAcc1">
+    <dgm:scene3d>
+      <a:camera prst="orthographicFront"/>
+      <a:lightRig rig="threePt" dir="t"/>
+    </dgm:scene3d>
+    <dgm:sp3d/>
+    <dgm:txPr/>
+    <dgm:style>
+      <a:lnRef idx="1">
+        <a:scrgbClr r="0" g="0" b="0"/>
+      </a:lnRef>
+      <a:fillRef idx="1">
+        <a:scrgbClr r="0" g="0" b="0"/>
+      </a:fillRef>
+      <a:effectRef idx="0">
+        <a:scrgbClr r="0" g="0" b="0"/>
+      </a:effectRef>
+      <a:fontRef idx="minor"/>
+    </dgm:style>
+  </dgm:styleLbl>
+  <dgm:styleLbl name="trAlignAcc1">
+    <dgm:scene3d>
+      <a:camera prst="orthographicFront"/>
+      <a:lightRig rig="threePt" dir="t"/>
+    </dgm:scene3d>
+    <dgm:sp3d/>
+    <dgm:txPr/>
+    <dgm:style>
+      <a:lnRef idx="1">
+        <a:scrgbClr r="0" g="0" b="0"/>
+      </a:lnRef>
+      <a:fillRef idx="1">
+        <a:scrgbClr r="0" g="0" b="0"/>
+      </a:fillRef>
+      <a:effectRef idx="0">
+        <a:scrgbClr r="0" g="0" b="0"/>
+      </a:effectRef>
+      <a:fontRef idx="minor"/>
+    </dgm:style>
+  </dgm:styleLbl>
+  <dgm:styleLbl name="bgAcc1">
+    <dgm:scene3d>
+      <a:camera prst="orthographicFront"/>
+      <a:lightRig rig="threePt" dir="t"/>
+    </dgm:scene3d>
+    <dgm:sp3d/>
+    <dgm:txPr/>
+    <dgm:style>
+      <a:lnRef idx="1">
+        <a:scrgbClr r="0" g="0" b="0"/>
+      </a:lnRef>
+      <a:fillRef idx="1">
+        <a:scrgbClr r="0" g="0" b="0"/>
+      </a:fillRef>
+      <a:effectRef idx="0">
+        <a:scrgbClr r="0" g="0" b="0"/>
+      </a:effectRef>
+      <a:fontRef idx="minor"/>
+    </dgm:style>
+  </dgm:styleLbl>
+  <dgm:styleLbl name="solidFgAcc1">
+    <dgm:scene3d>
+      <a:camera prst="orthographicFront"/>
+      <a:lightRig rig="threePt" dir="t"/>
+    </dgm:scene3d>
+    <dgm:sp3d/>
+    <dgm:txPr/>
+    <dgm:style>
+      <a:lnRef idx="1">
+        <a:scrgbClr r="0" g="0" b="0"/>
+      </a:lnRef>
+      <a:fillRef idx="2">
+        <a:scrgbClr r="0" g="0" b="0"/>
+      </a:fillRef>
+      <a:effectRef idx="0">
+        <a:scrgbClr r="0" g="0" b="0"/>
+      </a:effectRef>
+      <a:fontRef idx="minor"/>
+    </dgm:style>
+  </dgm:styleLbl>
+  <dgm:styleLbl name="solidAlignAcc1">
+    <dgm:scene3d>
+      <a:camera prst="orthographicFront"/>
+      <a:lightRig rig="threePt" dir="t"/>
+    </dgm:scene3d>
+    <dgm:sp3d/>
+    <dgm:txPr/>
+    <dgm:style>
+      <a:lnRef idx="1">
+        <a:scrgbClr r="0" g="0" b="0"/>
+      </a:lnRef>
+      <a:fillRef idx="1">
+        <a:scrgbClr r="0" g="0" b="0"/>
+      </a:fillRef>
+      <a:effectRef idx="0">
+        <a:scrgbClr r="0" g="0" b="0"/>
+      </a:effectRef>
+      <a:fontRef idx="minor"/>
+    </dgm:style>
+  </dgm:styleLbl>
+  <dgm:styleLbl name="solidBgAcc1">
+    <dgm:scene3d>
+      <a:camera prst="orthographicFront"/>
+      <a:lightRig rig="threePt" dir="t"/>
+    </dgm:scene3d>
+    <dgm:sp3d/>
+    <dgm:txPr/>
+    <dgm:style>
+      <a:lnRef idx="1">
+        <a:scrgbClr r="0" g="0" b="0"/>
+      </a:lnRef>
+      <a:fillRef idx="1">
+        <a:scrgbClr r="0" g="0" b="0"/>
+      </a:fillRef>
+      <a:effectRef idx="0">
+        <a:scrgbClr r="0" g="0" b="0"/>
+      </a:effectRef>
+      <a:fontRef idx="minor"/>
+    </dgm:style>
+  </dgm:styleLbl>
+  <dgm:styleLbl name="fgAccFollowNode1">
+    <dgm:scene3d>
+      <a:camera prst="orthographicFront"/>
+      <a:lightRig rig="threePt" dir="t"/>
+    </dgm:scene3d>
+    <dgm:sp3d/>
+    <dgm:txPr/>
+    <dgm:style>
+      <a:lnRef idx="1">
+        <a:scrgbClr r="0" g="0" b="0"/>
+      </a:lnRef>
+      <a:fillRef idx="1">
+        <a:scrgbClr r="0" g="0" b="0"/>
+      </a:fillRef>
+      <a:effectRef idx="0">
+        <a:scrgbClr r="0" g="0" b="0"/>
+      </a:effectRef>
+      <a:fontRef idx="minor"/>
+    </dgm:style>
+  </dgm:styleLbl>
+  <dgm:styleLbl name="alignAccFollowNode1">
+    <dgm:scene3d>
+      <a:camera prst="orthographicFront"/>
+      <a:lightRig rig="threePt" dir="t"/>
+    </dgm:scene3d>
+    <dgm:sp3d/>
+    <dgm:txPr/>
+    <dgm:style>
+      <a:lnRef idx="1">
+        <a:scrgbClr r="0" g="0" b="0"/>
+      </a:lnRef>
+      <a:fillRef idx="1">
+        <a:scrgbClr r="0" g="0" b="0"/>
+      </a:fillRef>
+      <a:effectRef idx="0">
+        <a:scrgbClr r="0" g="0" b="0"/>
+      </a:effectRef>
+      <a:fontRef idx="minor"/>
+    </dgm:style>
+  </dgm:styleLbl>
+  <dgm:styleLbl name="bgAccFollowNode1">
+    <dgm:scene3d>
+      <a:camera prst="orthographicFront"/>
+      <a:lightRig rig="threePt" dir="t"/>
+    </dgm:scene3d>
+    <dgm:sp3d/>
+    <dgm:txPr/>
+    <dgm:style>
+      <a:lnRef idx="1">
+        <a:scrgbClr r="0" g="0" b="0"/>
+      </a:lnRef>
+      <a:fillRef idx="1">
+        <a:scrgbClr r="0" g="0" b="0"/>
+      </a:fillRef>
+      <a:effectRef idx="0">
+        <a:scrgbClr r="0" g="0" b="0"/>
+      </a:effectRef>
+      <a:fontRef idx="minor"/>
+    </dgm:style>
+  </dgm:styleLbl>
+  <dgm:styleLbl name="fgAcc0">
+    <dgm:scene3d>
+      <a:camera prst="orthographicFront"/>
+      <a:lightRig rig="threePt" dir="t"/>
+    </dgm:scene3d>
+    <dgm:sp3d/>
+    <dgm:txPr/>
+    <dgm:style>
+      <a:lnRef idx="1">
+        <a:scrgbClr r="0" g="0" b="0"/>
+      </a:lnRef>
+      <a:fillRef idx="1">
+        <a:scrgbClr r="0" g="0" b="0"/>
+      </a:fillRef>
+      <a:effectRef idx="0">
+        <a:scrgbClr r="0" g="0" b="0"/>
+      </a:effectRef>
+      <a:fontRef idx="minor"/>
+    </dgm:style>
+  </dgm:styleLbl>
+  <dgm:styleLbl name="fgAcc2">
+    <dgm:scene3d>
+      <a:camera prst="orthographicFront"/>
+      <a:lightRig rig="threePt" dir="t"/>
+    </dgm:scene3d>
+    <dgm:sp3d/>
+    <dgm:txPr/>
+    <dgm:style>
+      <a:lnRef idx="1">
+        <a:scrgbClr r="0" g="0" b="0"/>
+      </a:lnRef>
+      <a:fillRef idx="1">
+        <a:scrgbClr r="0" g="0" b="0"/>
+      </a:fillRef>
+      <a:effectRef idx="0">
+        <a:scrgbClr r="0" g="0" b="0"/>
+      </a:effectRef>
+      <a:fontRef idx="minor"/>
+    </dgm:style>
+  </dgm:styleLbl>
+  <dgm:styleLbl name="fgAcc3">
+    <dgm:scene3d>
+      <a:camera prst="orthographicFront"/>
+      <a:lightRig rig="threePt" dir="t"/>
+    </dgm:scene3d>
+    <dgm:sp3d/>
+    <dgm:txPr/>
+    <dgm:style>
+      <a:lnRef idx="1">
+        <a:scrgbClr r="0" g="0" b="0"/>
+      </a:lnRef>
+      <a:fillRef idx="1">
+        <a:scrgbClr r="0" g="0" b="0"/>
+      </a:fillRef>
+      <a:effectRef idx="0">
+        <a:scrgbClr r="0" g="0" b="0"/>
+      </a:effectRef>
+      <a:fontRef idx="minor"/>
+    </dgm:style>
+  </dgm:styleLbl>
+  <dgm:styleLbl name="fgAcc4">
+    <dgm:scene3d>
+      <a:camera prst="orthographicFront"/>
+      <a:lightRig rig="threePt" dir="t"/>
+    </dgm:scene3d>
+    <dgm:sp3d/>
+    <dgm:txPr/>
+    <dgm:style>
+      <a:lnRef idx="1">
+        <a:scrgbClr r="0" g="0" b="0"/>
+      </a:lnRef>
+      <a:fillRef idx="1">
+        <a:scrgbClr r="0" g="0" b="0"/>
+      </a:fillRef>
+      <a:effectRef idx="0">
+        <a:scrgbClr r="0" g="0" b="0"/>
+      </a:effectRef>
+      <a:fontRef idx="minor"/>
+    </dgm:style>
+  </dgm:styleLbl>
+  <dgm:styleLbl name="bgShp">
+    <dgm:scene3d>
+      <a:camera prst="orthographicFront"/>
+      <a:lightRig rig="threePt" dir="t"/>
+    </dgm:scene3d>
+    <dgm:sp3d/>
+    <dgm:txPr/>
+    <dgm:style>
+      <a:lnRef idx="0">
+        <a:scrgbClr r="0" g="0" b="0"/>
+      </a:lnRef>
+      <a:fillRef idx="1">
+        <a:scrgbClr r="0" g="0" b="0"/>
+      </a:fillRef>
+      <a:effectRef idx="1">
+        <a:scrgbClr r="0" g="0" b="0"/>
+      </a:effectRef>
+      <a:fontRef idx="minor"/>
+    </dgm:style>
+  </dgm:styleLbl>
+  <dgm:styleLbl name="dkBgShp">
+    <dgm:scene3d>
+      <a:camera prst="orthographicFront"/>
+      <a:lightRig rig="threePt" dir="t"/>
+    </dgm:scene3d>
+    <dgm:sp3d/>
+    <dgm:txPr/>
+    <dgm:style>
+      <a:lnRef idx="0">
+        <a:scrgbClr r="0" g="0" b="0"/>
+      </a:lnRef>
+      <a:fillRef idx="1">
+        <a:scrgbClr r="0" g="0" b="0"/>
+      </a:fillRef>
+      <a:effectRef idx="1">
+        <a:scrgbClr r="0" g="0" b="0"/>
+      </a:effectRef>
+      <a:fontRef idx="minor"/>
+    </dgm:style>
+  </dgm:styleLbl>
+  <dgm:styleLbl name="trBgShp">
+    <dgm:scene3d>
+      <a:camera prst="orthographicFront"/>
+      <a:lightRig rig="threePt" dir="t"/>
+    </dgm:scene3d>
+    <dgm:sp3d/>
+    <dgm:txPr/>
+    <dgm:style>
+      <a:lnRef idx="0">
+        <a:scrgbClr r="0" g="0" b="0"/>
+      </a:lnRef>
+      <a:fillRef idx="1">
+        <a:scrgbClr r="0" g="0" b="0"/>
+      </a:fillRef>
+      <a:effectRef idx="0">
+        <a:scrgbClr r="0" g="0" b="0"/>
+      </a:effectRef>
+      <a:fontRef idx="minor"/>
+    </dgm:style>
+  </dgm:styleLbl>
+  <dgm:styleLbl name="fgShp">
+    <dgm:scene3d>
+      <a:camera prst="orthographicFront"/>
+      <a:lightRig rig="flat" dir="t"/>
+    </dgm:scene3d>
+    <dgm:sp3d prstMaterial="dkEdge">
+      <a:bevelT w="8200" h="38100"/>
+    </dgm:sp3d>
+    <dgm:txPr/>
+    <dgm:style>
+      <a:lnRef idx="1">
+        <a:scrgbClr r="0" g="0" b="0"/>
+      </a:lnRef>
+      <a:fillRef idx="2">
+        <a:scrgbClr r="0" g="0" b="0"/>
+      </a:fillRef>
+      <a:effectRef idx="1">
+        <a:scrgbClr r="0" g="0" b="0"/>
+      </a:effectRef>
+      <a:fontRef idx="minor"/>
+    </dgm:style>
+  </dgm:styleLbl>
+  <dgm:styleLbl name="revTx">
+    <dgm:scene3d>
+      <a:camera prst="orthographicFront"/>
+      <a:lightRig rig="threePt" dir="t"/>
+    </dgm:scene3d>
+    <dgm:sp3d/>
+    <dgm:txPr/>
+    <dgm:style>
+      <a:lnRef idx="0">
+        <a:scrgbClr r="0" g="0" b="0"/>
+      </a:lnRef>
+      <a:fillRef idx="0">
+        <a:scrgbClr r="0" g="0" b="0"/>
+      </a:fillRef>
+      <a:effectRef idx="0">
+        <a:scrgbClr r="0" g="0" b="0"/>
+      </a:effectRef>
+      <a:fontRef idx="minor"/>
+    </dgm:style>
+  </dgm:styleLbl>
+</dgm:styleDef>
 </file>
 
 <file path=ppt/handoutMasters/handoutMaster1.xml><?xml version="1.0" encoding="utf-8"?>
@@ -4439,7 +8188,7 @@
         </p:nvSpPr>
         <p:spPr bwMode="auto">
           <a:xfrm>
-            <a:off x="759520" y="2369840"/>
+            <a:off x="759520" y="2081808"/>
             <a:ext cx="3096344" cy="2277547"/>
           </a:xfrm>
           <a:prstGeom prst="rect">
@@ -5548,235 +9297,6 @@
           </a:p>
         </p:txBody>
       </p:sp>
-      <p:pic>
-        <p:nvPicPr>
-          <p:cNvPr id="4" name="Picture 3" descr="algo.png"/>
-          <p:cNvPicPr>
-            <a:picLocks noChangeAspect="1"/>
-          </p:cNvPicPr>
-          <p:nvPr/>
-        </p:nvPicPr>
-        <p:blipFill>
-          <a:blip r:embed="rId3" cstate="print"/>
-          <a:stretch>
-            <a:fillRect/>
-          </a:stretch>
-        </p:blipFill>
-        <p:spPr>
-          <a:xfrm>
-            <a:off x="6880200" y="2657872"/>
-            <a:ext cx="2324100" cy="2181225"/>
-          </a:xfrm>
-          <a:prstGeom prst="rect">
-            <a:avLst/>
-          </a:prstGeom>
-        </p:spPr>
-      </p:pic>
-      <p:sp>
-        <p:nvSpPr>
-          <p:cNvPr id="5" name="TextBox 13"/>
-          <p:cNvSpPr txBox="1">
-            <a:spLocks noChangeArrowheads="1"/>
-          </p:cNvSpPr>
-          <p:nvPr/>
-        </p:nvSpPr>
-        <p:spPr bwMode="auto">
-          <a:xfrm>
-            <a:off x="471488" y="2009800"/>
-            <a:ext cx="6696744" cy="1477328"/>
-          </a:xfrm>
-          <a:prstGeom prst="rect">
-            <a:avLst/>
-          </a:prstGeom>
-          <a:noFill/>
-          <a:ln w="9525">
-            <a:noFill/>
-            <a:miter lim="800000"/>
-            <a:headEnd/>
-            <a:tailEnd/>
-          </a:ln>
-        </p:spPr>
-        <p:txBody>
-          <a:bodyPr wrap="square">
-            <a:spAutoFit/>
-          </a:bodyPr>
-          <a:lstStyle/>
-          <a:p>
-            <a:r>
-              <a:rPr lang="ru-RU" sz="2000" b="1" dirty="0" smtClean="0">
-                <a:latin typeface="Calibri" pitchFamily="34" charset="0"/>
-              </a:rPr>
-              <a:t>Алгоритм выбора лидера </a:t>
-            </a:r>
-            <a:r>
-              <a:rPr lang="ru-RU" sz="2000" dirty="0" smtClean="0">
-                <a:latin typeface="Calibri" pitchFamily="34" charset="0"/>
-              </a:rPr>
-              <a:t>основана на использовании возможностей современных сетевых протоколов:</a:t>
-            </a:r>
-            <a:endParaRPr lang="en-US" sz="2000" dirty="0" smtClean="0">
-              <a:latin typeface="Calibri" pitchFamily="34" charset="0"/>
-            </a:endParaRPr>
-          </a:p>
-          <a:p>
-            <a:endParaRPr lang="en-US" sz="1000" b="1" dirty="0" smtClean="0">
-              <a:latin typeface="Calibri" pitchFamily="34" charset="0"/>
-            </a:endParaRPr>
-          </a:p>
-          <a:p>
-            <a:pPr>
-              <a:buFont typeface="Arial" pitchFamily="34" charset="0"/>
-              <a:buChar char="•"/>
-            </a:pPr>
-            <a:r>
-              <a:rPr lang="ru-RU" sz="2000" dirty="0" smtClean="0">
-                <a:latin typeface="Calibri" pitchFamily="34" charset="0"/>
-              </a:rPr>
-              <a:t> негарантированная доставка сообщений (</a:t>
-            </a:r>
-            <a:r>
-              <a:rPr lang="en-US" sz="2000" dirty="0" smtClean="0">
-                <a:latin typeface="Calibri" pitchFamily="34" charset="0"/>
-              </a:rPr>
-              <a:t>UDP</a:t>
-            </a:r>
-            <a:r>
-              <a:rPr lang="ru-RU" sz="2000" dirty="0" smtClean="0">
-                <a:latin typeface="Calibri" pitchFamily="34" charset="0"/>
-              </a:rPr>
-              <a:t>)</a:t>
-            </a:r>
-            <a:r>
-              <a:rPr lang="en-US" sz="2000" dirty="0" smtClean="0">
-                <a:latin typeface="Calibri" pitchFamily="34" charset="0"/>
-              </a:rPr>
-              <a:t>;</a:t>
-            </a:r>
-          </a:p>
-          <a:p>
-            <a:pPr>
-              <a:buFont typeface="Arial" pitchFamily="34" charset="0"/>
-              <a:buChar char="•"/>
-            </a:pPr>
-            <a:r>
-              <a:rPr lang="ru-RU" sz="2000" dirty="0" smtClean="0">
-                <a:latin typeface="Calibri" pitchFamily="34" charset="0"/>
-              </a:rPr>
-              <a:t> широковещательные запросы (</a:t>
-            </a:r>
-            <a:r>
-              <a:rPr lang="en-US" sz="2000" dirty="0" smtClean="0">
-                <a:latin typeface="Calibri" pitchFamily="34" charset="0"/>
-              </a:rPr>
-              <a:t>broadcast/multicast</a:t>
-            </a:r>
-            <a:r>
-              <a:rPr lang="ru-RU" sz="2000" dirty="0" smtClean="0">
-                <a:latin typeface="Calibri" pitchFamily="34" charset="0"/>
-              </a:rPr>
-              <a:t>)</a:t>
-            </a:r>
-            <a:r>
-              <a:rPr lang="en-US" sz="2000" dirty="0" smtClean="0">
-                <a:latin typeface="Calibri" pitchFamily="34" charset="0"/>
-              </a:rPr>
-              <a:t>;</a:t>
-            </a:r>
-            <a:endParaRPr lang="ru-RU" sz="2000" dirty="0">
-              <a:latin typeface="Calibri" pitchFamily="34" charset="0"/>
-            </a:endParaRPr>
-          </a:p>
-        </p:txBody>
-      </p:sp>
-      <p:sp>
-        <p:nvSpPr>
-          <p:cNvPr id="6" name="TextBox 13"/>
-          <p:cNvSpPr txBox="1">
-            <a:spLocks noChangeArrowheads="1"/>
-          </p:cNvSpPr>
-          <p:nvPr/>
-        </p:nvSpPr>
-        <p:spPr bwMode="auto">
-          <a:xfrm>
-            <a:off x="687512" y="3737992"/>
-            <a:ext cx="7128792" cy="2708434"/>
-          </a:xfrm>
-          <a:prstGeom prst="rect">
-            <a:avLst/>
-          </a:prstGeom>
-          <a:noFill/>
-          <a:ln w="9525">
-            <a:noFill/>
-            <a:miter lim="800000"/>
-            <a:headEnd/>
-            <a:tailEnd/>
-          </a:ln>
-        </p:spPr>
-        <p:txBody>
-          <a:bodyPr wrap="square">
-            <a:spAutoFit/>
-          </a:bodyPr>
-          <a:lstStyle/>
-          <a:p>
-            <a:r>
-              <a:rPr lang="ru-RU" sz="2000" b="1" dirty="0" smtClean="0">
-                <a:latin typeface="Calibri" pitchFamily="34" charset="0"/>
-              </a:rPr>
-              <a:t>Принцип работы</a:t>
-            </a:r>
-            <a:r>
-              <a:rPr lang="ru-RU" sz="2000" dirty="0" smtClean="0">
-                <a:latin typeface="Calibri" pitchFamily="34" charset="0"/>
-              </a:rPr>
-              <a:t> алгоритма:</a:t>
-            </a:r>
-          </a:p>
-          <a:p>
-            <a:endParaRPr lang="en-US" sz="1000" dirty="0" smtClean="0">
-              <a:latin typeface="Calibri" pitchFamily="34" charset="0"/>
-            </a:endParaRPr>
-          </a:p>
-          <a:p>
-            <a:pPr>
-              <a:buFont typeface="Arial" pitchFamily="34" charset="0"/>
-              <a:buChar char="•"/>
-            </a:pPr>
-            <a:r>
-              <a:rPr lang="ru-RU" sz="2000" dirty="0" smtClean="0">
-                <a:latin typeface="Calibri" pitchFamily="34" charset="0"/>
-              </a:rPr>
-              <a:t> каждый узел системы посылает широковещательные запросы, инкапсулирующие его состояние;</a:t>
-            </a:r>
-          </a:p>
-          <a:p>
-            <a:pPr>
-              <a:buFont typeface="Arial" pitchFamily="34" charset="0"/>
-              <a:buChar char="•"/>
-            </a:pPr>
-            <a:r>
-              <a:rPr lang="ru-RU" sz="2000" dirty="0" smtClean="0">
-                <a:latin typeface="Calibri" pitchFamily="34" charset="0"/>
-              </a:rPr>
-              <a:t> после стабилизации системы или таймаута, каждый узел выбирает себе лидера из локального еша; </a:t>
-            </a:r>
-          </a:p>
-          <a:p>
-            <a:pPr>
-              <a:buFont typeface="Arial" pitchFamily="34" charset="0"/>
-              <a:buChar char="•"/>
-            </a:pPr>
-            <a:r>
-              <a:rPr lang="ru-RU" sz="2000" dirty="0" smtClean="0">
-                <a:latin typeface="Calibri" pitchFamily="34" charset="0"/>
-              </a:rPr>
-              <a:t> поптытки подключения к лидерам с максимальным индексом производительности происходят циключески, до тех пор узел не перейдет в новое состояние – активное или пассивное.</a:t>
-            </a:r>
-            <a:endParaRPr lang="ru-RU" sz="2000" dirty="0">
-              <a:latin typeface="Calibri" pitchFamily="34" charset="0"/>
-            </a:endParaRPr>
-          </a:p>
-        </p:txBody>
-      </p:sp>
       <p:sp>
         <p:nvSpPr>
           <p:cNvPr id="7" name="Text Box 5"/>
@@ -5892,6 +9412,30 @@
           </a:p>
         </p:txBody>
       </p:sp>
+      <p:pic>
+        <p:nvPicPr>
+          <p:cNvPr id="12" name="Picture 11" descr="leader.png"/>
+          <p:cNvPicPr>
+            <a:picLocks noChangeAspect="1"/>
+          </p:cNvPicPr>
+          <p:nvPr/>
+        </p:nvPicPr>
+        <p:blipFill>
+          <a:blip r:embed="rId3" cstate="print"/>
+          <a:stretch>
+            <a:fillRect/>
+          </a:stretch>
+        </p:blipFill>
+        <p:spPr>
+          <a:xfrm>
+            <a:off x="471488" y="1865784"/>
+            <a:ext cx="9191625" cy="4857750"/>
+          </a:xfrm>
+          <a:prstGeom prst="rect">
+            <a:avLst/>
+          </a:prstGeom>
+        </p:spPr>
+      </p:pic>
     </p:spTree>
   </p:cSld>
   <p:clrMapOvr>
@@ -8206,60 +11750,13 @@
                 </a:solidFill>
                 <a:latin typeface="Arial" charset="0"/>
               </a:rPr>
-              <a:t>Проблемы</a:t>
+              <a:t>Требования</a:t>
             </a:r>
             <a:endParaRPr lang="en-US" sz="4000" dirty="0" smtClean="0">
               <a:solidFill>
                 <a:srgbClr val="04617B"/>
               </a:solidFill>
               <a:latin typeface="Arial" charset="0"/>
-            </a:endParaRPr>
-          </a:p>
-        </p:txBody>
-      </p:sp>
-      <p:sp>
-        <p:nvSpPr>
-          <p:cNvPr id="3077" name="TextBox 8"/>
-          <p:cNvSpPr txBox="1">
-            <a:spLocks noChangeArrowheads="1"/>
-          </p:cNvSpPr>
-          <p:nvPr/>
-        </p:nvSpPr>
-        <p:spPr bwMode="auto">
-          <a:xfrm>
-            <a:off x="722313" y="2309813"/>
-            <a:ext cx="8858250" cy="784830"/>
-          </a:xfrm>
-          <a:prstGeom prst="rect">
-            <a:avLst/>
-          </a:prstGeom>
-          <a:noFill/>
-          <a:ln w="9525">
-            <a:noFill/>
-            <a:miter lim="800000"/>
-            <a:headEnd/>
-            <a:tailEnd/>
-          </a:ln>
-        </p:spPr>
-        <p:txBody>
-          <a:bodyPr>
-            <a:spAutoFit/>
-          </a:bodyPr>
-          <a:lstStyle/>
-          <a:p>
-            <a:r>
-              <a:rPr lang="ru-RU" sz="2300" dirty="0" smtClean="0">
-                <a:latin typeface="Calibri" pitchFamily="34" charset="0"/>
-              </a:rPr>
-              <a:t>Текст</a:t>
-            </a:r>
-            <a:endParaRPr lang="ru-RU" sz="2200" dirty="0">
-              <a:latin typeface="Calibri" pitchFamily="34" charset="0"/>
-            </a:endParaRPr>
-          </a:p>
-          <a:p>
-            <a:endParaRPr lang="ru-RU" sz="2200" dirty="0">
-              <a:latin typeface="Calibri" pitchFamily="34" charset="0"/>
             </a:endParaRPr>
           </a:p>
         </p:txBody>
@@ -8317,6 +11814,22 @@
           </a:p>
         </p:txBody>
       </p:sp>
+      <p:graphicFrame>
+        <p:nvGraphicFramePr>
+          <p:cNvPr id="9" name="Diagram 8"/>
+          <p:cNvGraphicFramePr/>
+          <p:nvPr/>
+        </p:nvGraphicFramePr>
+        <p:xfrm>
+          <a:off x="1767632" y="1958740"/>
+          <a:ext cx="6773333" cy="4731580"/>
+        </p:xfrm>
+        <a:graphic>
+          <a:graphicData uri="http://schemas.openxmlformats.org/drawingml/2006/diagram">
+            <dgm:relIds xmlns:dgm="http://schemas.openxmlformats.org/drawingml/2006/diagram" xmlns:r="http://schemas.openxmlformats.org/officeDocument/2006/relationships" r:dm="rId3" r:lo="rId4" r:qs="rId5" r:cs="rId6"/>
+          </a:graphicData>
+        </a:graphic>
+      </p:graphicFrame>
     </p:spTree>
   </p:cSld>
   <p:clrMapOvr>
@@ -8648,60 +12161,13 @@
                 </a:solidFill>
                 <a:latin typeface="Arial" charset="0"/>
               </a:rPr>
-              <a:t>Аналоги</a:t>
+              <a:t>Классификация</a:t>
             </a:r>
             <a:endParaRPr lang="en-US" sz="4000" dirty="0" smtClean="0">
               <a:solidFill>
                 <a:srgbClr val="04617B"/>
               </a:solidFill>
               <a:latin typeface="Arial" charset="0"/>
-            </a:endParaRPr>
-          </a:p>
-        </p:txBody>
-      </p:sp>
-      <p:sp>
-        <p:nvSpPr>
-          <p:cNvPr id="3077" name="TextBox 8"/>
-          <p:cNvSpPr txBox="1">
-            <a:spLocks noChangeArrowheads="1"/>
-          </p:cNvSpPr>
-          <p:nvPr/>
-        </p:nvSpPr>
-        <p:spPr bwMode="auto">
-          <a:xfrm>
-            <a:off x="722313" y="2309813"/>
-            <a:ext cx="8858250" cy="784830"/>
-          </a:xfrm>
-          <a:prstGeom prst="rect">
-            <a:avLst/>
-          </a:prstGeom>
-          <a:noFill/>
-          <a:ln w="9525">
-            <a:noFill/>
-            <a:miter lim="800000"/>
-            <a:headEnd/>
-            <a:tailEnd/>
-          </a:ln>
-        </p:spPr>
-        <p:txBody>
-          <a:bodyPr>
-            <a:spAutoFit/>
-          </a:bodyPr>
-          <a:lstStyle/>
-          <a:p>
-            <a:r>
-              <a:rPr lang="ru-RU" sz="2300" dirty="0" smtClean="0">
-                <a:latin typeface="Calibri" pitchFamily="34" charset="0"/>
-              </a:rPr>
-              <a:t>Текст</a:t>
-            </a:r>
-            <a:endParaRPr lang="ru-RU" sz="2200" dirty="0">
-              <a:latin typeface="Calibri" pitchFamily="34" charset="0"/>
-            </a:endParaRPr>
-          </a:p>
-          <a:p>
-            <a:endParaRPr lang="ru-RU" sz="2200" dirty="0">
-              <a:latin typeface="Calibri" pitchFamily="34" charset="0"/>
             </a:endParaRPr>
           </a:p>
         </p:txBody>
@@ -8821,6 +12287,30 @@
           </a:p>
         </p:txBody>
       </p:sp>
+      <p:pic>
+        <p:nvPicPr>
+          <p:cNvPr id="8" name="Picture 7" descr="classify.png"/>
+          <p:cNvPicPr>
+            <a:picLocks noChangeAspect="1"/>
+          </p:cNvPicPr>
+          <p:nvPr/>
+        </p:nvPicPr>
+        <p:blipFill>
+          <a:blip r:embed="rId3" cstate="print"/>
+          <a:stretch>
+            <a:fillRect/>
+          </a:stretch>
+        </p:blipFill>
+        <p:spPr>
+          <a:xfrm>
+            <a:off x="1283667" y="1845146"/>
+            <a:ext cx="7324725" cy="4629150"/>
+          </a:xfrm>
+          <a:prstGeom prst="rect">
+            <a:avLst/>
+          </a:prstGeom>
+        </p:spPr>
+      </p:pic>
     </p:spTree>
   </p:cSld>
   <p:clrMapOvr>
@@ -9636,7 +13126,7 @@
               <a:rPr lang="ru-RU" sz="1800" dirty="0" smtClean="0">
                 <a:latin typeface="Calibri" pitchFamily="34" charset="0"/>
               </a:rPr>
-              <a:t>возможность исполнения в ОС,</a:t>
+              <a:t>(возможность исполнения в ОС),</a:t>
             </a:r>
           </a:p>
           <a:p>
@@ -9747,7 +13237,7 @@
               <a:rPr lang="ru-RU" sz="1800" dirty="0" smtClean="0">
                 <a:latin typeface="Calibri" pitchFamily="34" charset="0"/>
               </a:rPr>
-              <a:t>входные и выходные данные,</a:t>
+              <a:t>(входные и выходные данные),</a:t>
             </a:r>
           </a:p>
           <a:p>
@@ -9846,7 +13336,7 @@
               <a:rPr lang="ru-RU" sz="1800" dirty="0" smtClean="0">
                 <a:latin typeface="Calibri" pitchFamily="34" charset="0"/>
               </a:rPr>
-              <a:t>интерфейс модуля,</a:t>
+              <a:t>(интерфейс модуля),</a:t>
             </a:r>
           </a:p>
           <a:p>
@@ -9885,13 +13375,13 @@
               <a:rPr lang="ru-RU" sz="1800" dirty="0" smtClean="0">
                 <a:latin typeface="Calibri" pitchFamily="34" charset="0"/>
               </a:rPr>
-              <a:t>р</a:t>
+              <a:t>(р</a:t>
             </a:r>
             <a:r>
               <a:rPr lang="ru-RU" sz="1800" dirty="0" smtClean="0">
                 <a:latin typeface="Calibri" pitchFamily="34" charset="0"/>
               </a:rPr>
-              <a:t>еализация модуля</a:t>
+              <a:t>еализация модуля)</a:t>
             </a:r>
             <a:endParaRPr lang="ru-RU" sz="1800" dirty="0"/>
           </a:p>
@@ -10555,7 +14045,7 @@
         </p:nvSpPr>
         <p:spPr bwMode="auto">
           <a:xfrm>
-            <a:off x="436563" y="993775"/>
+            <a:off x="436563" y="641648"/>
             <a:ext cx="9258300" cy="673100"/>
           </a:xfrm>
           <a:prstGeom prst="rect">
@@ -10682,14 +14172,270 @@
         </p:blipFill>
         <p:spPr>
           <a:xfrm>
-            <a:off x="183456" y="1073696"/>
-            <a:ext cx="9915525" cy="6372225"/>
+            <a:off x="399480" y="1145704"/>
+            <a:ext cx="9412060" cy="6048672"/>
           </a:xfrm>
           <a:prstGeom prst="rect">
             <a:avLst/>
           </a:prstGeom>
         </p:spPr>
       </p:pic>
+      <p:sp>
+        <p:nvSpPr>
+          <p:cNvPr id="12" name="Text Box 5"/>
+          <p:cNvSpPr txBox="1">
+            <a:spLocks noChangeArrowheads="1"/>
+          </p:cNvSpPr>
+          <p:nvPr/>
+        </p:nvSpPr>
+        <p:spPr bwMode="auto">
+          <a:xfrm>
+            <a:off x="183456" y="7266384"/>
+            <a:ext cx="5886970" cy="190052"/>
+          </a:xfrm>
+          <a:prstGeom prst="rect">
+            <a:avLst/>
+          </a:prstGeom>
+          <a:noFill/>
+          <a:ln w="9525">
+            <a:noFill/>
+            <a:miter lim="800000"/>
+            <a:headEnd/>
+            <a:tailEnd/>
+          </a:ln>
+        </p:spPr>
+        <p:txBody>
+          <a:bodyPr wrap="square" lIns="0" tIns="0" rIns="0" bIns="0" anchor="b">
+            <a:spAutoFit/>
+          </a:bodyPr>
+          <a:lstStyle/>
+          <a:p>
+            <a:pPr>
+              <a:lnSpc>
+                <a:spcPct val="95000"/>
+              </a:lnSpc>
+            </a:pPr>
+            <a:r>
+              <a:rPr lang="ru-RU" sz="1300" dirty="0">
+                <a:solidFill>
+                  <a:srgbClr val="045C75"/>
+                </a:solidFill>
+                <a:latin typeface="Arial" charset="0"/>
+              </a:rPr>
+              <a:t>АлтГТУ им. И. И. </a:t>
+            </a:r>
+            <a:r>
+              <a:rPr lang="ru-RU" sz="1300" dirty="0" smtClean="0">
+                <a:solidFill>
+                  <a:srgbClr val="045C75"/>
+                </a:solidFill>
+                <a:latin typeface="Arial" charset="0"/>
+              </a:rPr>
+              <a:t>Ползунова / ПОВТ, Владимир Костюков</a:t>
+            </a:r>
+            <a:endParaRPr lang="en-US" sz="1300" dirty="0">
+              <a:solidFill>
+                <a:srgbClr val="045C75"/>
+              </a:solidFill>
+              <a:latin typeface="Arial" charset="0"/>
+            </a:endParaRPr>
+          </a:p>
+        </p:txBody>
+      </p:sp>
+      <p:sp>
+        <p:nvSpPr>
+          <p:cNvPr id="13" name="TextBox 11"/>
+          <p:cNvSpPr txBox="1">
+            <a:spLocks noChangeArrowheads="1"/>
+          </p:cNvSpPr>
+          <p:nvPr/>
+        </p:nvSpPr>
+        <p:spPr bwMode="auto">
+          <a:xfrm>
+            <a:off x="6088112" y="6762328"/>
+            <a:ext cx="2664296" cy="338554"/>
+          </a:xfrm>
+          <a:prstGeom prst="rect">
+            <a:avLst/>
+          </a:prstGeom>
+          <a:noFill/>
+          <a:ln w="9525">
+            <a:noFill/>
+            <a:miter lim="800000"/>
+            <a:headEnd/>
+            <a:tailEnd/>
+          </a:ln>
+        </p:spPr>
+        <p:txBody>
+          <a:bodyPr wrap="square">
+            <a:spAutoFit/>
+          </a:bodyPr>
+          <a:lstStyle/>
+          <a:p>
+            <a:r>
+              <a:rPr lang="ru-RU" sz="1600" dirty="0" smtClean="0">
+                <a:latin typeface="Calibri" pitchFamily="34" charset="0"/>
+              </a:rPr>
+              <a:t>← </a:t>
+            </a:r>
+            <a:r>
+              <a:rPr lang="ru-RU" sz="1600" dirty="0" smtClean="0">
+                <a:latin typeface="Calibri" pitchFamily="34" charset="0"/>
+              </a:rPr>
+              <a:t>Панель управления</a:t>
+            </a:r>
+            <a:endParaRPr lang="ru-RU" sz="1600" dirty="0">
+              <a:latin typeface="Calibri" pitchFamily="34" charset="0"/>
+            </a:endParaRPr>
+          </a:p>
+        </p:txBody>
+      </p:sp>
+      <p:sp>
+        <p:nvSpPr>
+          <p:cNvPr id="14" name="TextBox 11"/>
+          <p:cNvSpPr txBox="1">
+            <a:spLocks noChangeArrowheads="1"/>
+          </p:cNvSpPr>
+          <p:nvPr/>
+        </p:nvSpPr>
+        <p:spPr bwMode="auto">
+          <a:xfrm>
+            <a:off x="4647952" y="2001089"/>
+            <a:ext cx="1656184" cy="584775"/>
+          </a:xfrm>
+          <a:prstGeom prst="rect">
+            <a:avLst/>
+          </a:prstGeom>
+          <a:noFill/>
+          <a:ln w="9525">
+            <a:noFill/>
+            <a:miter lim="800000"/>
+            <a:headEnd/>
+            <a:tailEnd/>
+          </a:ln>
+        </p:spPr>
+        <p:txBody>
+          <a:bodyPr wrap="square">
+            <a:spAutoFit/>
+          </a:bodyPr>
+          <a:lstStyle/>
+          <a:p>
+            <a:r>
+              <a:rPr lang="ru-RU" sz="1600" dirty="0" smtClean="0">
+                <a:latin typeface="Calibri" pitchFamily="34" charset="0"/>
+              </a:rPr>
+              <a:t>Служба мониторинга →</a:t>
+            </a:r>
+            <a:endParaRPr lang="ru-RU" sz="1600" dirty="0">
+              <a:latin typeface="Calibri" pitchFamily="34" charset="0"/>
+            </a:endParaRPr>
+          </a:p>
+        </p:txBody>
+      </p:sp>
+      <p:sp>
+        <p:nvSpPr>
+          <p:cNvPr id="15" name="TextBox 11"/>
+          <p:cNvSpPr txBox="1">
+            <a:spLocks noChangeArrowheads="1"/>
+          </p:cNvSpPr>
+          <p:nvPr/>
+        </p:nvSpPr>
+        <p:spPr bwMode="auto">
+          <a:xfrm>
+            <a:off x="255464" y="4962128"/>
+            <a:ext cx="1944216" cy="584775"/>
+          </a:xfrm>
+          <a:prstGeom prst="rect">
+            <a:avLst/>
+          </a:prstGeom>
+          <a:noFill/>
+          <a:ln w="9525">
+            <a:noFill/>
+            <a:miter lim="800000"/>
+            <a:headEnd/>
+            <a:tailEnd/>
+          </a:ln>
+        </p:spPr>
+        <p:txBody>
+          <a:bodyPr wrap="square">
+            <a:spAutoFit/>
+          </a:bodyPr>
+          <a:lstStyle/>
+          <a:p>
+            <a:r>
+              <a:rPr lang="ru-RU" sz="1600" dirty="0" smtClean="0">
+                <a:latin typeface="Calibri" pitchFamily="34" charset="0"/>
+              </a:rPr>
+              <a:t>               ↑</a:t>
+            </a:r>
+          </a:p>
+          <a:p>
+            <a:r>
+              <a:rPr lang="ru-RU" sz="1600" dirty="0" smtClean="0">
+                <a:latin typeface="Calibri" pitchFamily="34" charset="0"/>
+              </a:rPr>
+              <a:t>Менеджер модулей</a:t>
+            </a:r>
+            <a:endParaRPr lang="ru-RU" sz="1600" dirty="0">
+              <a:latin typeface="Calibri" pitchFamily="34" charset="0"/>
+            </a:endParaRPr>
+          </a:p>
+        </p:txBody>
+      </p:sp>
+      <p:sp>
+        <p:nvSpPr>
+          <p:cNvPr id="16" name="TextBox 11"/>
+          <p:cNvSpPr txBox="1">
+            <a:spLocks noChangeArrowheads="1"/>
+          </p:cNvSpPr>
+          <p:nvPr/>
+        </p:nvSpPr>
+        <p:spPr bwMode="auto">
+          <a:xfrm>
+            <a:off x="2703736" y="1433736"/>
+            <a:ext cx="1944216" cy="338554"/>
+          </a:xfrm>
+          <a:prstGeom prst="rect">
+            <a:avLst/>
+          </a:prstGeom>
+          <a:noFill/>
+          <a:ln w="9525">
+            <a:noFill/>
+            <a:miter lim="800000"/>
+            <a:headEnd/>
+            <a:tailEnd/>
+          </a:ln>
+        </p:spPr>
+        <p:txBody>
+          <a:bodyPr wrap="square">
+            <a:spAutoFit/>
+          </a:bodyPr>
+          <a:lstStyle/>
+          <a:p>
+            <a:r>
+              <a:rPr lang="ru-RU" sz="1600" dirty="0" smtClean="0">
+                <a:latin typeface="Calibri" pitchFamily="34" charset="0"/>
+              </a:rPr>
+              <a:t>← </a:t>
+            </a:r>
+            <a:r>
+              <a:rPr lang="en-US" sz="1600" dirty="0" smtClean="0">
+                <a:latin typeface="Calibri" pitchFamily="34" charset="0"/>
+              </a:rPr>
+              <a:t>API</a:t>
+            </a:r>
+            <a:r>
+              <a:rPr lang="ru-RU" sz="1600" dirty="0" smtClean="0">
+                <a:latin typeface="Calibri" pitchFamily="34" charset="0"/>
+              </a:rPr>
+              <a:t> модулей</a:t>
+            </a:r>
+            <a:endParaRPr lang="ru-RU" sz="1600" dirty="0">
+              <a:latin typeface="Calibri" pitchFamily="34" charset="0"/>
+            </a:endParaRPr>
+          </a:p>
+        </p:txBody>
+      </p:sp>
     </p:spTree>
   </p:cSld>
   <p:clrMapOvr>

</xml_diff>

<commit_message>
Just 1 slide left!
</commit_message>
<xml_diff>
--- a/diploma/trunk/ppt/kostyukov.pptx
+++ b/diploma/trunk/ppt/kostyukov.pptx
@@ -5,10 +5,10 @@
     <p:sldMasterId id="2147483648" r:id="rId1"/>
   </p:sldMasterIdLst>
   <p:notesMasterIdLst>
-    <p:notesMasterId r:id="rId22"/>
+    <p:notesMasterId r:id="rId21"/>
   </p:notesMasterIdLst>
   <p:handoutMasterIdLst>
-    <p:handoutMasterId r:id="rId23"/>
+    <p:handoutMasterId r:id="rId22"/>
   </p:handoutMasterIdLst>
   <p:sldIdLst>
     <p:sldId id="256" r:id="rId2"/>
@@ -21,16 +21,15 @@
     <p:sldId id="267" r:id="rId9"/>
     <p:sldId id="272" r:id="rId10"/>
     <p:sldId id="273" r:id="rId11"/>
-    <p:sldId id="275" r:id="rId12"/>
-    <p:sldId id="276" r:id="rId13"/>
-    <p:sldId id="277" r:id="rId14"/>
-    <p:sldId id="280" r:id="rId15"/>
-    <p:sldId id="281" r:id="rId16"/>
-    <p:sldId id="283" r:id="rId17"/>
-    <p:sldId id="287" r:id="rId18"/>
-    <p:sldId id="284" r:id="rId19"/>
-    <p:sldId id="266" r:id="rId20"/>
-    <p:sldId id="268" r:id="rId21"/>
+    <p:sldId id="276" r:id="rId12"/>
+    <p:sldId id="277" r:id="rId13"/>
+    <p:sldId id="280" r:id="rId14"/>
+    <p:sldId id="281" r:id="rId15"/>
+    <p:sldId id="283" r:id="rId16"/>
+    <p:sldId id="287" r:id="rId17"/>
+    <p:sldId id="284" r:id="rId18"/>
+    <p:sldId id="266" r:id="rId19"/>
+    <p:sldId id="268" r:id="rId20"/>
   </p:sldIdLst>
   <p:sldSz cx="10160000" cy="7620000"/>
   <p:notesSz cx="6858000" cy="9144000"/>
@@ -8188,7 +8187,7 @@
         </p:nvSpPr>
         <p:spPr bwMode="auto">
           <a:xfrm>
-            <a:off x="759520" y="2081808"/>
+            <a:off x="471488" y="1937792"/>
             <a:ext cx="3096344" cy="2277547"/>
           </a:xfrm>
           <a:prstGeom prst="rect">
@@ -8464,7 +8463,7 @@
         </p:blipFill>
         <p:spPr>
           <a:xfrm>
-            <a:off x="3122736" y="2945904"/>
+            <a:off x="2919760" y="2729880"/>
             <a:ext cx="6781800" cy="3771900"/>
           </a:xfrm>
           <a:prstGeom prst="rect">
@@ -8560,7 +8559,7 @@
                 <a:ea typeface="+mj-ea"/>
                 <a:cs typeface="+mj-cs"/>
               </a:rPr>
-              <a:t>Драйверы ядра</a:t>
+              <a:t>Транспортная подсистема</a:t>
             </a:r>
             <a:endParaRPr lang="en-US" sz="4000" kern="0" dirty="0">
               <a:solidFill>
@@ -8575,7 +8574,275 @@
       </p:sp>
       <p:sp>
         <p:nvSpPr>
-          <p:cNvPr id="5" name="Text Box 5"/>
+          <p:cNvPr id="6" name="TextBox 13"/>
+          <p:cNvSpPr txBox="1">
+            <a:spLocks noChangeArrowheads="1"/>
+          </p:cNvSpPr>
+          <p:nvPr/>
+        </p:nvSpPr>
+        <p:spPr bwMode="auto">
+          <a:xfrm>
+            <a:off x="5584056" y="3161928"/>
+            <a:ext cx="4392488" cy="2400657"/>
+          </a:xfrm>
+          <a:prstGeom prst="rect">
+            <a:avLst/>
+          </a:prstGeom>
+          <a:noFill/>
+          <a:ln w="9525">
+            <a:noFill/>
+            <a:miter lim="800000"/>
+            <a:headEnd/>
+            <a:tailEnd/>
+          </a:ln>
+        </p:spPr>
+        <p:txBody>
+          <a:bodyPr wrap="square">
+            <a:spAutoFit/>
+          </a:bodyPr>
+          <a:lstStyle/>
+          <a:p>
+            <a:pPr lvl="1">
+              <a:buFont typeface="Arial" pitchFamily="34" charset="0"/>
+              <a:buChar char="•"/>
+            </a:pPr>
+            <a:r>
+              <a:rPr lang="en-US" sz="2000" dirty="0" smtClean="0">
+                <a:latin typeface="Calibri" pitchFamily="34" charset="0"/>
+              </a:rPr>
+              <a:t> </a:t>
+            </a:r>
+            <a:r>
+              <a:rPr lang="ru-RU" sz="2000" b="1" dirty="0" smtClean="0">
+                <a:latin typeface="Calibri" pitchFamily="34" charset="0"/>
+              </a:rPr>
+              <a:t>управление</a:t>
+            </a:r>
+            <a:r>
+              <a:rPr lang="ru-RU" sz="2000" dirty="0" smtClean="0">
+                <a:latin typeface="Calibri" pitchFamily="34" charset="0"/>
+              </a:rPr>
+              <a:t> сессиями</a:t>
+            </a:r>
+            <a:r>
+              <a:rPr lang="ru-RU" sz="2000" dirty="0" smtClean="0">
+                <a:latin typeface="Calibri" pitchFamily="34" charset="0"/>
+              </a:rPr>
+              <a:t>;</a:t>
+            </a:r>
+            <a:endParaRPr lang="en-US" sz="2000" dirty="0" smtClean="0">
+              <a:latin typeface="Calibri" pitchFamily="34" charset="0"/>
+            </a:endParaRPr>
+          </a:p>
+          <a:p>
+            <a:pPr lvl="1">
+              <a:buFont typeface="Arial" pitchFamily="34" charset="0"/>
+              <a:buChar char="•"/>
+            </a:pPr>
+            <a:endParaRPr lang="ru-RU" sz="600" dirty="0" smtClean="0">
+              <a:latin typeface="Calibri" pitchFamily="34" charset="0"/>
+            </a:endParaRPr>
+          </a:p>
+          <a:p>
+            <a:pPr lvl="1">
+              <a:buFont typeface="Arial" pitchFamily="34" charset="0"/>
+              <a:buChar char="•"/>
+            </a:pPr>
+            <a:r>
+              <a:rPr lang="ru-RU" sz="2000" dirty="0" smtClean="0">
+                <a:latin typeface="Calibri" pitchFamily="34" charset="0"/>
+              </a:rPr>
+              <a:t> </a:t>
+            </a:r>
+            <a:r>
+              <a:rPr lang="ru-RU" sz="2000" b="1" dirty="0" smtClean="0">
+                <a:latin typeface="Calibri" pitchFamily="34" charset="0"/>
+              </a:rPr>
+              <a:t>мониторинг</a:t>
+            </a:r>
+            <a:r>
+              <a:rPr lang="ru-RU" sz="2000" dirty="0" smtClean="0">
+                <a:latin typeface="Calibri" pitchFamily="34" charset="0"/>
+              </a:rPr>
+              <a:t> сетевой активности</a:t>
+            </a:r>
+            <a:r>
+              <a:rPr lang="ru-RU" sz="2000" dirty="0" smtClean="0">
+                <a:latin typeface="Calibri" pitchFamily="34" charset="0"/>
+              </a:rPr>
+              <a:t>;</a:t>
+            </a:r>
+            <a:endParaRPr lang="en-US" sz="2000" dirty="0" smtClean="0">
+              <a:latin typeface="Calibri" pitchFamily="34" charset="0"/>
+            </a:endParaRPr>
+          </a:p>
+          <a:p>
+            <a:pPr lvl="1">
+              <a:buFont typeface="Arial" pitchFamily="34" charset="0"/>
+              <a:buChar char="•"/>
+            </a:pPr>
+            <a:endParaRPr lang="ru-RU" sz="600" dirty="0" smtClean="0">
+              <a:latin typeface="Calibri" pitchFamily="34" charset="0"/>
+            </a:endParaRPr>
+          </a:p>
+          <a:p>
+            <a:pPr lvl="1">
+              <a:buFont typeface="Arial" pitchFamily="34" charset="0"/>
+              <a:buChar char="•"/>
+            </a:pPr>
+            <a:r>
+              <a:rPr lang="ru-RU" sz="2000" dirty="0" smtClean="0">
+                <a:latin typeface="Calibri" pitchFamily="34" charset="0"/>
+              </a:rPr>
+              <a:t> </a:t>
+            </a:r>
+            <a:r>
+              <a:rPr lang="ru-RU" sz="2000" b="1" dirty="0" smtClean="0">
+                <a:latin typeface="Calibri" pitchFamily="34" charset="0"/>
+              </a:rPr>
+              <a:t>именование</a:t>
+            </a:r>
+            <a:r>
+              <a:rPr lang="ru-RU" sz="2000" dirty="0" smtClean="0">
+                <a:latin typeface="Calibri" pitchFamily="34" charset="0"/>
+              </a:rPr>
+              <a:t> объектов</a:t>
+            </a:r>
+            <a:r>
+              <a:rPr lang="ru-RU" sz="2000" dirty="0" smtClean="0">
+                <a:latin typeface="Calibri" pitchFamily="34" charset="0"/>
+              </a:rPr>
+              <a:t>;</a:t>
+            </a:r>
+            <a:endParaRPr lang="en-US" sz="2000" dirty="0" smtClean="0">
+              <a:latin typeface="Calibri" pitchFamily="34" charset="0"/>
+            </a:endParaRPr>
+          </a:p>
+          <a:p>
+            <a:pPr lvl="1">
+              <a:buFont typeface="Arial" pitchFamily="34" charset="0"/>
+              <a:buChar char="•"/>
+            </a:pPr>
+            <a:endParaRPr lang="ru-RU" sz="600" dirty="0" smtClean="0">
+              <a:latin typeface="Calibri" pitchFamily="34" charset="0"/>
+            </a:endParaRPr>
+          </a:p>
+          <a:p>
+            <a:pPr lvl="1">
+              <a:buFont typeface="Arial" pitchFamily="34" charset="0"/>
+              <a:buChar char="•"/>
+            </a:pPr>
+            <a:r>
+              <a:rPr lang="ru-RU" sz="2000" dirty="0" smtClean="0">
+                <a:latin typeface="Calibri" pitchFamily="34" charset="0"/>
+              </a:rPr>
+              <a:t> </a:t>
+            </a:r>
+            <a:r>
+              <a:rPr lang="ru-RU" sz="2000" b="1" dirty="0" smtClean="0">
+                <a:latin typeface="Calibri" pitchFamily="34" charset="0"/>
+              </a:rPr>
+              <a:t>адресация</a:t>
+            </a:r>
+            <a:r>
+              <a:rPr lang="ru-RU" sz="2000" dirty="0" smtClean="0">
+                <a:latin typeface="Calibri" pitchFamily="34" charset="0"/>
+              </a:rPr>
+              <a:t>;</a:t>
+            </a:r>
+            <a:endParaRPr lang="en-US" sz="2000" dirty="0" smtClean="0">
+              <a:latin typeface="Calibri" pitchFamily="34" charset="0"/>
+            </a:endParaRPr>
+          </a:p>
+          <a:p>
+            <a:pPr lvl="1">
+              <a:buFont typeface="Arial" pitchFamily="34" charset="0"/>
+              <a:buChar char="•"/>
+            </a:pPr>
+            <a:endParaRPr lang="ru-RU" sz="600" dirty="0" smtClean="0">
+              <a:latin typeface="Calibri" pitchFamily="34" charset="0"/>
+            </a:endParaRPr>
+          </a:p>
+          <a:p>
+            <a:pPr lvl="1">
+              <a:buFont typeface="Arial" pitchFamily="34" charset="0"/>
+              <a:buChar char="•"/>
+            </a:pPr>
+            <a:r>
+              <a:rPr lang="ru-RU" sz="2000" b="1" dirty="0" smtClean="0">
+                <a:latin typeface="Calibri" pitchFamily="34" charset="0"/>
+              </a:rPr>
+              <a:t> балансировка </a:t>
+            </a:r>
+            <a:r>
+              <a:rPr lang="ru-RU" sz="2000" dirty="0" smtClean="0">
+                <a:latin typeface="Calibri" pitchFamily="34" charset="0"/>
+              </a:rPr>
+              <a:t>нагрузки</a:t>
+            </a:r>
+            <a:r>
+              <a:rPr lang="ru-RU" sz="2000" dirty="0" smtClean="0">
+                <a:latin typeface="Calibri" pitchFamily="34" charset="0"/>
+              </a:rPr>
+              <a:t>;</a:t>
+            </a:r>
+            <a:endParaRPr lang="en-US" sz="2000" dirty="0" smtClean="0">
+              <a:latin typeface="Calibri" pitchFamily="34" charset="0"/>
+            </a:endParaRPr>
+          </a:p>
+          <a:p>
+            <a:pPr lvl="1">
+              <a:buFont typeface="Arial" pitchFamily="34" charset="0"/>
+              <a:buChar char="•"/>
+            </a:pPr>
+            <a:endParaRPr lang="ru-RU" sz="600" dirty="0" smtClean="0">
+              <a:latin typeface="Calibri" pitchFamily="34" charset="0"/>
+            </a:endParaRPr>
+          </a:p>
+          <a:p>
+            <a:pPr lvl="1">
+              <a:buFont typeface="Arial" pitchFamily="34" charset="0"/>
+              <a:buChar char="•"/>
+            </a:pPr>
+            <a:r>
+              <a:rPr lang="ru-RU" sz="2000" dirty="0" smtClean="0">
+                <a:latin typeface="Calibri" pitchFamily="34" charset="0"/>
+              </a:rPr>
+              <a:t> </a:t>
+            </a:r>
+            <a:r>
+              <a:rPr lang="ru-RU" sz="2000" b="1" dirty="0" smtClean="0">
+                <a:latin typeface="Calibri" pitchFamily="34" charset="0"/>
+              </a:rPr>
+              <a:t>выбор </a:t>
+            </a:r>
+            <a:r>
+              <a:rPr lang="ru-RU" sz="2000" b="1" dirty="0" smtClean="0">
+                <a:latin typeface="Calibri" pitchFamily="34" charset="0"/>
+              </a:rPr>
+              <a:t>лидеро</a:t>
+            </a:r>
+            <a:r>
+              <a:rPr lang="ru-RU" sz="2000" b="1" dirty="0" smtClean="0">
+                <a:latin typeface="Calibri" pitchFamily="34" charset="0"/>
+              </a:rPr>
+              <a:t>в</a:t>
+            </a:r>
+            <a:r>
+              <a:rPr lang="ru-RU" sz="2000" dirty="0" smtClean="0">
+                <a:latin typeface="Calibri" pitchFamily="34" charset="0"/>
+              </a:rPr>
+              <a:t>;</a:t>
+            </a:r>
+            <a:endParaRPr lang="ru-RU" sz="2000" dirty="0">
+              <a:latin typeface="Calibri" pitchFamily="34" charset="0"/>
+            </a:endParaRPr>
+          </a:p>
+        </p:txBody>
+      </p:sp>
+      <p:sp>
+        <p:nvSpPr>
+          <p:cNvPr id="7" name="Text Box 5"/>
           <p:cNvSpPr txBox="1">
             <a:spLocks noChangeArrowheads="1"/>
           </p:cNvSpPr>
@@ -8635,9 +8902,33 @@
           </a:p>
         </p:txBody>
       </p:sp>
+      <p:pic>
+        <p:nvPicPr>
+          <p:cNvPr id="8" name="Picture 7" descr="transport.png"/>
+          <p:cNvPicPr>
+            <a:picLocks noChangeAspect="1"/>
+          </p:cNvPicPr>
+          <p:nvPr/>
+        </p:nvPicPr>
+        <p:blipFill>
+          <a:blip r:embed="rId3" cstate="print"/>
+          <a:stretch>
+            <a:fillRect/>
+          </a:stretch>
+        </p:blipFill>
+        <p:spPr>
+          <a:xfrm>
+            <a:off x="180330" y="2441848"/>
+            <a:ext cx="5619750" cy="3771900"/>
+          </a:xfrm>
+          <a:prstGeom prst="rect">
+            <a:avLst/>
+          </a:prstGeom>
+        </p:spPr>
+      </p:pic>
       <p:sp>
         <p:nvSpPr>
-          <p:cNvPr id="6" name="Text Box 5"/>
+          <p:cNvPr id="9" name="Text Box 5"/>
           <p:cNvSpPr txBox="1">
             <a:spLocks noChangeArrowheads="1"/>
           </p:cNvSpPr>
@@ -8776,7 +9067,7 @@
                 <a:ea typeface="+mj-ea"/>
                 <a:cs typeface="+mj-cs"/>
               </a:rPr>
-              <a:t>Транспортная подсистема</a:t>
+              <a:t>Алгоритм выбора лидера</a:t>
             </a:r>
             <a:endParaRPr lang="en-US" sz="4000" kern="0" dirty="0">
               <a:solidFill>
@@ -8785,274 +9076,6 @@
               <a:latin typeface="Arial" charset="0"/>
               <a:ea typeface="+mj-ea"/>
               <a:cs typeface="+mj-cs"/>
-            </a:endParaRPr>
-          </a:p>
-        </p:txBody>
-      </p:sp>
-      <p:sp>
-        <p:nvSpPr>
-          <p:cNvPr id="6" name="TextBox 13"/>
-          <p:cNvSpPr txBox="1">
-            <a:spLocks noChangeArrowheads="1"/>
-          </p:cNvSpPr>
-          <p:nvPr/>
-        </p:nvSpPr>
-        <p:spPr bwMode="auto">
-          <a:xfrm>
-            <a:off x="5584056" y="3161928"/>
-            <a:ext cx="4392488" cy="2400657"/>
-          </a:xfrm>
-          <a:prstGeom prst="rect">
-            <a:avLst/>
-          </a:prstGeom>
-          <a:noFill/>
-          <a:ln w="9525">
-            <a:noFill/>
-            <a:miter lim="800000"/>
-            <a:headEnd/>
-            <a:tailEnd/>
-          </a:ln>
-        </p:spPr>
-        <p:txBody>
-          <a:bodyPr wrap="square">
-            <a:spAutoFit/>
-          </a:bodyPr>
-          <a:lstStyle/>
-          <a:p>
-            <a:pPr lvl="1">
-              <a:buFont typeface="Arial" pitchFamily="34" charset="0"/>
-              <a:buChar char="•"/>
-            </a:pPr>
-            <a:r>
-              <a:rPr lang="en-US" sz="2000" dirty="0" smtClean="0">
-                <a:latin typeface="Calibri" pitchFamily="34" charset="0"/>
-              </a:rPr>
-              <a:t> </a:t>
-            </a:r>
-            <a:r>
-              <a:rPr lang="ru-RU" sz="2000" b="1" dirty="0" smtClean="0">
-                <a:latin typeface="Calibri" pitchFamily="34" charset="0"/>
-              </a:rPr>
-              <a:t>управление</a:t>
-            </a:r>
-            <a:r>
-              <a:rPr lang="ru-RU" sz="2000" dirty="0" smtClean="0">
-                <a:latin typeface="Calibri" pitchFamily="34" charset="0"/>
-              </a:rPr>
-              <a:t> сессиями</a:t>
-            </a:r>
-            <a:r>
-              <a:rPr lang="ru-RU" sz="2000" dirty="0" smtClean="0">
-                <a:latin typeface="Calibri" pitchFamily="34" charset="0"/>
-              </a:rPr>
-              <a:t>;</a:t>
-            </a:r>
-            <a:endParaRPr lang="en-US" sz="2000" dirty="0" smtClean="0">
-              <a:latin typeface="Calibri" pitchFamily="34" charset="0"/>
-            </a:endParaRPr>
-          </a:p>
-          <a:p>
-            <a:pPr lvl="1">
-              <a:buFont typeface="Arial" pitchFamily="34" charset="0"/>
-              <a:buChar char="•"/>
-            </a:pPr>
-            <a:endParaRPr lang="ru-RU" sz="600" dirty="0" smtClean="0">
-              <a:latin typeface="Calibri" pitchFamily="34" charset="0"/>
-            </a:endParaRPr>
-          </a:p>
-          <a:p>
-            <a:pPr lvl="1">
-              <a:buFont typeface="Arial" pitchFamily="34" charset="0"/>
-              <a:buChar char="•"/>
-            </a:pPr>
-            <a:r>
-              <a:rPr lang="ru-RU" sz="2000" dirty="0" smtClean="0">
-                <a:latin typeface="Calibri" pitchFamily="34" charset="0"/>
-              </a:rPr>
-              <a:t> </a:t>
-            </a:r>
-            <a:r>
-              <a:rPr lang="ru-RU" sz="2000" b="1" dirty="0" smtClean="0">
-                <a:latin typeface="Calibri" pitchFamily="34" charset="0"/>
-              </a:rPr>
-              <a:t>мониторинг</a:t>
-            </a:r>
-            <a:r>
-              <a:rPr lang="ru-RU" sz="2000" dirty="0" smtClean="0">
-                <a:latin typeface="Calibri" pitchFamily="34" charset="0"/>
-              </a:rPr>
-              <a:t> сетевой активности</a:t>
-            </a:r>
-            <a:r>
-              <a:rPr lang="ru-RU" sz="2000" dirty="0" smtClean="0">
-                <a:latin typeface="Calibri" pitchFamily="34" charset="0"/>
-              </a:rPr>
-              <a:t>;</a:t>
-            </a:r>
-            <a:endParaRPr lang="en-US" sz="2000" dirty="0" smtClean="0">
-              <a:latin typeface="Calibri" pitchFamily="34" charset="0"/>
-            </a:endParaRPr>
-          </a:p>
-          <a:p>
-            <a:pPr lvl="1">
-              <a:buFont typeface="Arial" pitchFamily="34" charset="0"/>
-              <a:buChar char="•"/>
-            </a:pPr>
-            <a:endParaRPr lang="ru-RU" sz="600" dirty="0" smtClean="0">
-              <a:latin typeface="Calibri" pitchFamily="34" charset="0"/>
-            </a:endParaRPr>
-          </a:p>
-          <a:p>
-            <a:pPr lvl="1">
-              <a:buFont typeface="Arial" pitchFamily="34" charset="0"/>
-              <a:buChar char="•"/>
-            </a:pPr>
-            <a:r>
-              <a:rPr lang="ru-RU" sz="2000" dirty="0" smtClean="0">
-                <a:latin typeface="Calibri" pitchFamily="34" charset="0"/>
-              </a:rPr>
-              <a:t> </a:t>
-            </a:r>
-            <a:r>
-              <a:rPr lang="ru-RU" sz="2000" b="1" dirty="0" smtClean="0">
-                <a:latin typeface="Calibri" pitchFamily="34" charset="0"/>
-              </a:rPr>
-              <a:t>именование</a:t>
-            </a:r>
-            <a:r>
-              <a:rPr lang="ru-RU" sz="2000" dirty="0" smtClean="0">
-                <a:latin typeface="Calibri" pitchFamily="34" charset="0"/>
-              </a:rPr>
-              <a:t> объектов</a:t>
-            </a:r>
-            <a:r>
-              <a:rPr lang="ru-RU" sz="2000" dirty="0" smtClean="0">
-                <a:latin typeface="Calibri" pitchFamily="34" charset="0"/>
-              </a:rPr>
-              <a:t>;</a:t>
-            </a:r>
-            <a:endParaRPr lang="en-US" sz="2000" dirty="0" smtClean="0">
-              <a:latin typeface="Calibri" pitchFamily="34" charset="0"/>
-            </a:endParaRPr>
-          </a:p>
-          <a:p>
-            <a:pPr lvl="1">
-              <a:buFont typeface="Arial" pitchFamily="34" charset="0"/>
-              <a:buChar char="•"/>
-            </a:pPr>
-            <a:endParaRPr lang="ru-RU" sz="600" dirty="0" smtClean="0">
-              <a:latin typeface="Calibri" pitchFamily="34" charset="0"/>
-            </a:endParaRPr>
-          </a:p>
-          <a:p>
-            <a:pPr lvl="1">
-              <a:buFont typeface="Arial" pitchFamily="34" charset="0"/>
-              <a:buChar char="•"/>
-            </a:pPr>
-            <a:r>
-              <a:rPr lang="ru-RU" sz="2000" dirty="0" smtClean="0">
-                <a:latin typeface="Calibri" pitchFamily="34" charset="0"/>
-              </a:rPr>
-              <a:t> </a:t>
-            </a:r>
-            <a:r>
-              <a:rPr lang="ru-RU" sz="2000" b="1" dirty="0" smtClean="0">
-                <a:latin typeface="Calibri" pitchFamily="34" charset="0"/>
-              </a:rPr>
-              <a:t>адресация</a:t>
-            </a:r>
-            <a:r>
-              <a:rPr lang="ru-RU" sz="2000" dirty="0" smtClean="0">
-                <a:latin typeface="Calibri" pitchFamily="34" charset="0"/>
-              </a:rPr>
-              <a:t>;</a:t>
-            </a:r>
-            <a:endParaRPr lang="en-US" sz="2000" dirty="0" smtClean="0">
-              <a:latin typeface="Calibri" pitchFamily="34" charset="0"/>
-            </a:endParaRPr>
-          </a:p>
-          <a:p>
-            <a:pPr lvl="1">
-              <a:buFont typeface="Arial" pitchFamily="34" charset="0"/>
-              <a:buChar char="•"/>
-            </a:pPr>
-            <a:endParaRPr lang="ru-RU" sz="600" dirty="0" smtClean="0">
-              <a:latin typeface="Calibri" pitchFamily="34" charset="0"/>
-            </a:endParaRPr>
-          </a:p>
-          <a:p>
-            <a:pPr lvl="1">
-              <a:buFont typeface="Arial" pitchFamily="34" charset="0"/>
-              <a:buChar char="•"/>
-            </a:pPr>
-            <a:r>
-              <a:rPr lang="ru-RU" sz="2000" b="1" dirty="0" smtClean="0">
-                <a:latin typeface="Calibri" pitchFamily="34" charset="0"/>
-              </a:rPr>
-              <a:t> балансировка </a:t>
-            </a:r>
-            <a:r>
-              <a:rPr lang="ru-RU" sz="2000" dirty="0" smtClean="0">
-                <a:latin typeface="Calibri" pitchFamily="34" charset="0"/>
-              </a:rPr>
-              <a:t>нагрузки</a:t>
-            </a:r>
-            <a:r>
-              <a:rPr lang="ru-RU" sz="2000" dirty="0" smtClean="0">
-                <a:latin typeface="Calibri" pitchFamily="34" charset="0"/>
-              </a:rPr>
-              <a:t>;</a:t>
-            </a:r>
-            <a:endParaRPr lang="en-US" sz="2000" dirty="0" smtClean="0">
-              <a:latin typeface="Calibri" pitchFamily="34" charset="0"/>
-            </a:endParaRPr>
-          </a:p>
-          <a:p>
-            <a:pPr lvl="1">
-              <a:buFont typeface="Arial" pitchFamily="34" charset="0"/>
-              <a:buChar char="•"/>
-            </a:pPr>
-            <a:endParaRPr lang="ru-RU" sz="600" dirty="0" smtClean="0">
-              <a:latin typeface="Calibri" pitchFamily="34" charset="0"/>
-            </a:endParaRPr>
-          </a:p>
-          <a:p>
-            <a:pPr lvl="1">
-              <a:buFont typeface="Arial" pitchFamily="34" charset="0"/>
-              <a:buChar char="•"/>
-            </a:pPr>
-            <a:r>
-              <a:rPr lang="ru-RU" sz="2000" dirty="0" smtClean="0">
-                <a:latin typeface="Calibri" pitchFamily="34" charset="0"/>
-              </a:rPr>
-              <a:t> </a:t>
-            </a:r>
-            <a:r>
-              <a:rPr lang="ru-RU" sz="2000" b="1" dirty="0" smtClean="0">
-                <a:latin typeface="Calibri" pitchFamily="34" charset="0"/>
-              </a:rPr>
-              <a:t>выбор </a:t>
-            </a:r>
-            <a:r>
-              <a:rPr lang="ru-RU" sz="2000" b="1" dirty="0" smtClean="0">
-                <a:latin typeface="Calibri" pitchFamily="34" charset="0"/>
-              </a:rPr>
-              <a:t>лидеро</a:t>
-            </a:r>
-            <a:r>
-              <a:rPr lang="ru-RU" sz="2000" b="1" dirty="0" smtClean="0">
-                <a:latin typeface="Calibri" pitchFamily="34" charset="0"/>
-              </a:rPr>
-              <a:t>в</a:t>
-            </a:r>
-            <a:r>
-              <a:rPr lang="ru-RU" sz="2000" dirty="0" smtClean="0">
-                <a:latin typeface="Calibri" pitchFamily="34" charset="0"/>
-              </a:rPr>
-              <a:t>;</a:t>
-            </a:r>
-            <a:endParaRPr lang="ru-RU" sz="2000" dirty="0">
-              <a:latin typeface="Calibri" pitchFamily="34" charset="0"/>
             </a:endParaRPr>
           </a:p>
         </p:txBody>
@@ -9119,33 +9142,9 @@
           </a:p>
         </p:txBody>
       </p:sp>
-      <p:pic>
-        <p:nvPicPr>
-          <p:cNvPr id="8" name="Picture 7" descr="transport.png"/>
-          <p:cNvPicPr>
-            <a:picLocks noChangeAspect="1"/>
-          </p:cNvPicPr>
-          <p:nvPr/>
-        </p:nvPicPr>
-        <p:blipFill>
-          <a:blip r:embed="rId3" cstate="print"/>
-          <a:stretch>
-            <a:fillRect/>
-          </a:stretch>
-        </p:blipFill>
-        <p:spPr>
-          <a:xfrm>
-            <a:off x="180330" y="2441848"/>
-            <a:ext cx="5619750" cy="3771900"/>
-          </a:xfrm>
-          <a:prstGeom prst="rect">
-            <a:avLst/>
-          </a:prstGeom>
-        </p:spPr>
-      </p:pic>
       <p:sp>
         <p:nvSpPr>
-          <p:cNvPr id="9" name="Text Box 5"/>
+          <p:cNvPr id="8" name="Text Box 5"/>
           <p:cNvSpPr txBox="1">
             <a:spLocks noChangeArrowheads="1"/>
           </p:cNvSpPr>
@@ -9196,6 +9195,30 @@
           </a:p>
         </p:txBody>
       </p:sp>
+      <p:pic>
+        <p:nvPicPr>
+          <p:cNvPr id="12" name="Picture 11" descr="leader.png"/>
+          <p:cNvPicPr>
+            <a:picLocks noChangeAspect="1"/>
+          </p:cNvPicPr>
+          <p:nvPr/>
+        </p:nvPicPr>
+        <p:blipFill>
+          <a:blip r:embed="rId3" cstate="print"/>
+          <a:stretch>
+            <a:fillRect/>
+          </a:stretch>
+        </p:blipFill>
+        <p:spPr>
+          <a:xfrm>
+            <a:off x="471488" y="1865784"/>
+            <a:ext cx="9191625" cy="4857750"/>
+          </a:xfrm>
+          <a:prstGeom prst="rect">
+            <a:avLst/>
+          </a:prstGeom>
+        </p:spPr>
+      </p:pic>
     </p:spTree>
   </p:cSld>
   <p:clrMapOvr>
@@ -9284,7 +9307,7 @@
                 <a:ea typeface="+mj-ea"/>
                 <a:cs typeface="+mj-cs"/>
               </a:rPr>
-              <a:t>Алгоритм выбора лидера</a:t>
+              <a:t>Подсистема исполнения</a:t>
             </a:r>
             <a:endParaRPr lang="en-US" sz="4000" kern="0" dirty="0">
               <a:solidFill>
@@ -9299,7 +9322,175 @@
       </p:sp>
       <p:sp>
         <p:nvSpPr>
-          <p:cNvPr id="7" name="Text Box 5"/>
+          <p:cNvPr id="5" name="TextBox 8"/>
+          <p:cNvSpPr txBox="1">
+            <a:spLocks noChangeArrowheads="1"/>
+          </p:cNvSpPr>
+          <p:nvPr/>
+        </p:nvSpPr>
+        <p:spPr bwMode="auto">
+          <a:xfrm>
+            <a:off x="687512" y="3161928"/>
+            <a:ext cx="3744416" cy="2285241"/>
+          </a:xfrm>
+          <a:prstGeom prst="rect">
+            <a:avLst/>
+          </a:prstGeom>
+          <a:noFill/>
+          <a:ln w="9525">
+            <a:noFill/>
+            <a:miter lim="800000"/>
+            <a:headEnd/>
+            <a:tailEnd/>
+          </a:ln>
+        </p:spPr>
+        <p:txBody>
+          <a:bodyPr wrap="square">
+            <a:spAutoFit/>
+          </a:bodyPr>
+          <a:lstStyle/>
+          <a:p>
+            <a:endParaRPr lang="ru-RU" sz="1000" dirty="0" smtClean="0">
+              <a:latin typeface="Calibri" pitchFamily="34" charset="0"/>
+            </a:endParaRPr>
+          </a:p>
+          <a:p>
+            <a:pPr>
+              <a:buFont typeface="Arial" pitchFamily="34" charset="0"/>
+              <a:buChar char="•"/>
+            </a:pPr>
+            <a:r>
+              <a:rPr lang="ru-RU" sz="2000" dirty="0" smtClean="0">
+                <a:latin typeface="Calibri" pitchFamily="34" charset="0"/>
+              </a:rPr>
+              <a:t> </a:t>
+            </a:r>
+            <a:r>
+              <a:rPr lang="ru-RU" sz="2000" b="1" dirty="0" smtClean="0">
+                <a:latin typeface="Calibri" pitchFamily="34" charset="0"/>
+              </a:rPr>
+              <a:t>планирование</a:t>
+            </a:r>
+            <a:r>
+              <a:rPr lang="ru-RU" sz="2000" dirty="0" smtClean="0">
+                <a:latin typeface="Calibri" pitchFamily="34" charset="0"/>
+              </a:rPr>
+              <a:t> запусков;</a:t>
+            </a:r>
+          </a:p>
+          <a:p>
+            <a:pPr>
+              <a:buFont typeface="Arial" pitchFamily="34" charset="0"/>
+              <a:buChar char="•"/>
+            </a:pPr>
+            <a:endParaRPr lang="ru-RU" sz="1000" dirty="0" smtClean="0">
+              <a:latin typeface="Calibri" pitchFamily="34" charset="0"/>
+            </a:endParaRPr>
+          </a:p>
+          <a:p>
+            <a:pPr>
+              <a:buFont typeface="Arial" pitchFamily="34" charset="0"/>
+              <a:buChar char="•"/>
+            </a:pPr>
+            <a:r>
+              <a:rPr lang="ru-RU" sz="2000" dirty="0" smtClean="0">
+                <a:latin typeface="Calibri" pitchFamily="34" charset="0"/>
+              </a:rPr>
+              <a:t> </a:t>
+            </a:r>
+            <a:r>
+              <a:rPr lang="ru-RU" sz="2000" b="1" dirty="0" smtClean="0">
+                <a:latin typeface="Calibri" pitchFamily="34" charset="0"/>
+              </a:rPr>
+              <a:t>запуск</a:t>
+            </a:r>
+            <a:r>
+              <a:rPr lang="ru-RU" sz="2000" dirty="0" smtClean="0">
+                <a:latin typeface="Calibri" pitchFamily="34" charset="0"/>
+              </a:rPr>
+              <a:t> модулей мониторига;</a:t>
+            </a:r>
+          </a:p>
+          <a:p>
+            <a:pPr>
+              <a:buFont typeface="Arial" pitchFamily="34" charset="0"/>
+              <a:buChar char="•"/>
+            </a:pPr>
+            <a:endParaRPr lang="ru-RU" sz="1000" dirty="0" smtClean="0">
+              <a:latin typeface="Calibri" pitchFamily="34" charset="0"/>
+            </a:endParaRPr>
+          </a:p>
+          <a:p>
+            <a:pPr>
+              <a:buFont typeface="Arial" pitchFamily="34" charset="0"/>
+              <a:buChar char="•"/>
+            </a:pPr>
+            <a:r>
+              <a:rPr lang="ru-RU" sz="2000" dirty="0" smtClean="0">
+                <a:latin typeface="Calibri" pitchFamily="34" charset="0"/>
+              </a:rPr>
+              <a:t> </a:t>
+            </a:r>
+            <a:r>
+              <a:rPr lang="ru-RU" sz="2000" b="1" dirty="0" smtClean="0">
+                <a:latin typeface="Calibri" pitchFamily="34" charset="0"/>
+              </a:rPr>
+              <a:t>обработка</a:t>
+            </a:r>
+            <a:r>
+              <a:rPr lang="ru-RU" sz="2000" dirty="0" smtClean="0">
+                <a:latin typeface="Calibri" pitchFamily="34" charset="0"/>
+              </a:rPr>
+              <a:t> результатов;</a:t>
+            </a:r>
+          </a:p>
+          <a:p>
+            <a:pPr>
+              <a:buFont typeface="Arial" pitchFamily="34" charset="0"/>
+              <a:buChar char="•"/>
+            </a:pPr>
+            <a:endParaRPr lang="ru-RU" sz="1050" dirty="0" smtClean="0">
+              <a:latin typeface="Calibri" pitchFamily="34" charset="0"/>
+            </a:endParaRPr>
+          </a:p>
+          <a:p>
+            <a:pPr>
+              <a:buFont typeface="Arial" pitchFamily="34" charset="0"/>
+              <a:buChar char="•"/>
+            </a:pPr>
+            <a:r>
+              <a:rPr lang="ru-RU" sz="2000" dirty="0" smtClean="0">
+                <a:latin typeface="Calibri" pitchFamily="34" charset="0"/>
+              </a:rPr>
+              <a:t> </a:t>
+            </a:r>
+            <a:r>
+              <a:rPr lang="ru-RU" sz="2000" b="1" dirty="0" smtClean="0">
+                <a:latin typeface="Calibri" pitchFamily="34" charset="0"/>
+              </a:rPr>
+              <a:t>развертывание</a:t>
+            </a:r>
+            <a:r>
+              <a:rPr lang="ru-RU" sz="2000" dirty="0" smtClean="0">
+                <a:latin typeface="Calibri" pitchFamily="34" charset="0"/>
+              </a:rPr>
+              <a:t> модулей;</a:t>
+            </a:r>
+          </a:p>
+          <a:p>
+            <a:pPr>
+              <a:buFont typeface="Arial" pitchFamily="34" charset="0"/>
+              <a:buChar char="•"/>
+            </a:pPr>
+            <a:endParaRPr lang="ru-RU" sz="2200" dirty="0" smtClean="0">
+              <a:latin typeface="Calibri" pitchFamily="34" charset="0"/>
+            </a:endParaRPr>
+          </a:p>
+        </p:txBody>
+      </p:sp>
+      <p:sp>
+        <p:nvSpPr>
+          <p:cNvPr id="6" name="Text Box 5"/>
           <p:cNvSpPr txBox="1">
             <a:spLocks noChangeArrowheads="1"/>
           </p:cNvSpPr>
@@ -9361,7 +9552,7 @@
       </p:sp>
       <p:sp>
         <p:nvSpPr>
-          <p:cNvPr id="8" name="Text Box 5"/>
+          <p:cNvPr id="7" name="Text Box 5"/>
           <p:cNvSpPr txBox="1">
             <a:spLocks noChangeArrowheads="1"/>
           </p:cNvSpPr>
@@ -9414,7 +9605,7 @@
       </p:sp>
       <p:pic>
         <p:nvPicPr>
-          <p:cNvPr id="12" name="Picture 11" descr="leader.png"/>
+          <p:cNvPr id="8" name="Picture 7" descr="execution-subsystem.png"/>
           <p:cNvPicPr>
             <a:picLocks noChangeAspect="1"/>
           </p:cNvPicPr>
@@ -9428,8 +9619,8 @@
         </p:blipFill>
         <p:spPr>
           <a:xfrm>
-            <a:off x="471488" y="1865784"/>
-            <a:ext cx="9191625" cy="4857750"/>
+            <a:off x="4359920" y="2297832"/>
+            <a:ext cx="5248275" cy="3971925"/>
           </a:xfrm>
           <a:prstGeom prst="rect">
             <a:avLst/>
@@ -9524,7 +9715,7 @@
                 <a:ea typeface="+mj-ea"/>
                 <a:cs typeface="+mj-cs"/>
               </a:rPr>
-              <a:t>Подсистема исполнения</a:t>
+              <a:t>Планировщик подсистемы исполнения</a:t>
             </a:r>
             <a:endParaRPr lang="en-US" sz="4000" kern="0" dirty="0">
               <a:solidFill>
@@ -9539,175 +9730,7 @@
       </p:sp>
       <p:sp>
         <p:nvSpPr>
-          <p:cNvPr id="5" name="TextBox 8"/>
-          <p:cNvSpPr txBox="1">
-            <a:spLocks noChangeArrowheads="1"/>
-          </p:cNvSpPr>
-          <p:nvPr/>
-        </p:nvSpPr>
-        <p:spPr bwMode="auto">
-          <a:xfrm>
-            <a:off x="687512" y="3161928"/>
-            <a:ext cx="3744416" cy="2285241"/>
-          </a:xfrm>
-          <a:prstGeom prst="rect">
-            <a:avLst/>
-          </a:prstGeom>
-          <a:noFill/>
-          <a:ln w="9525">
-            <a:noFill/>
-            <a:miter lim="800000"/>
-            <a:headEnd/>
-            <a:tailEnd/>
-          </a:ln>
-        </p:spPr>
-        <p:txBody>
-          <a:bodyPr wrap="square">
-            <a:spAutoFit/>
-          </a:bodyPr>
-          <a:lstStyle/>
-          <a:p>
-            <a:endParaRPr lang="ru-RU" sz="1000" dirty="0" smtClean="0">
-              <a:latin typeface="Calibri" pitchFamily="34" charset="0"/>
-            </a:endParaRPr>
-          </a:p>
-          <a:p>
-            <a:pPr>
-              <a:buFont typeface="Arial" pitchFamily="34" charset="0"/>
-              <a:buChar char="•"/>
-            </a:pPr>
-            <a:r>
-              <a:rPr lang="ru-RU" sz="2000" dirty="0" smtClean="0">
-                <a:latin typeface="Calibri" pitchFamily="34" charset="0"/>
-              </a:rPr>
-              <a:t> </a:t>
-            </a:r>
-            <a:r>
-              <a:rPr lang="ru-RU" sz="2000" b="1" dirty="0" smtClean="0">
-                <a:latin typeface="Calibri" pitchFamily="34" charset="0"/>
-              </a:rPr>
-              <a:t>планирование</a:t>
-            </a:r>
-            <a:r>
-              <a:rPr lang="ru-RU" sz="2000" dirty="0" smtClean="0">
-                <a:latin typeface="Calibri" pitchFamily="34" charset="0"/>
-              </a:rPr>
-              <a:t> запусков;</a:t>
-            </a:r>
-          </a:p>
-          <a:p>
-            <a:pPr>
-              <a:buFont typeface="Arial" pitchFamily="34" charset="0"/>
-              <a:buChar char="•"/>
-            </a:pPr>
-            <a:endParaRPr lang="ru-RU" sz="1000" dirty="0" smtClean="0">
-              <a:latin typeface="Calibri" pitchFamily="34" charset="0"/>
-            </a:endParaRPr>
-          </a:p>
-          <a:p>
-            <a:pPr>
-              <a:buFont typeface="Arial" pitchFamily="34" charset="0"/>
-              <a:buChar char="•"/>
-            </a:pPr>
-            <a:r>
-              <a:rPr lang="ru-RU" sz="2000" dirty="0" smtClean="0">
-                <a:latin typeface="Calibri" pitchFamily="34" charset="0"/>
-              </a:rPr>
-              <a:t> </a:t>
-            </a:r>
-            <a:r>
-              <a:rPr lang="ru-RU" sz="2000" b="1" dirty="0" smtClean="0">
-                <a:latin typeface="Calibri" pitchFamily="34" charset="0"/>
-              </a:rPr>
-              <a:t>запуск</a:t>
-            </a:r>
-            <a:r>
-              <a:rPr lang="ru-RU" sz="2000" dirty="0" smtClean="0">
-                <a:latin typeface="Calibri" pitchFamily="34" charset="0"/>
-              </a:rPr>
-              <a:t> модулей мониторига;</a:t>
-            </a:r>
-          </a:p>
-          <a:p>
-            <a:pPr>
-              <a:buFont typeface="Arial" pitchFamily="34" charset="0"/>
-              <a:buChar char="•"/>
-            </a:pPr>
-            <a:endParaRPr lang="ru-RU" sz="1000" dirty="0" smtClean="0">
-              <a:latin typeface="Calibri" pitchFamily="34" charset="0"/>
-            </a:endParaRPr>
-          </a:p>
-          <a:p>
-            <a:pPr>
-              <a:buFont typeface="Arial" pitchFamily="34" charset="0"/>
-              <a:buChar char="•"/>
-            </a:pPr>
-            <a:r>
-              <a:rPr lang="ru-RU" sz="2000" dirty="0" smtClean="0">
-                <a:latin typeface="Calibri" pitchFamily="34" charset="0"/>
-              </a:rPr>
-              <a:t> </a:t>
-            </a:r>
-            <a:r>
-              <a:rPr lang="ru-RU" sz="2000" b="1" dirty="0" smtClean="0">
-                <a:latin typeface="Calibri" pitchFamily="34" charset="0"/>
-              </a:rPr>
-              <a:t>обработка</a:t>
-            </a:r>
-            <a:r>
-              <a:rPr lang="ru-RU" sz="2000" dirty="0" smtClean="0">
-                <a:latin typeface="Calibri" pitchFamily="34" charset="0"/>
-              </a:rPr>
-              <a:t> результатов;</a:t>
-            </a:r>
-          </a:p>
-          <a:p>
-            <a:pPr>
-              <a:buFont typeface="Arial" pitchFamily="34" charset="0"/>
-              <a:buChar char="•"/>
-            </a:pPr>
-            <a:endParaRPr lang="ru-RU" sz="1050" dirty="0" smtClean="0">
-              <a:latin typeface="Calibri" pitchFamily="34" charset="0"/>
-            </a:endParaRPr>
-          </a:p>
-          <a:p>
-            <a:pPr>
-              <a:buFont typeface="Arial" pitchFamily="34" charset="0"/>
-              <a:buChar char="•"/>
-            </a:pPr>
-            <a:r>
-              <a:rPr lang="ru-RU" sz="2000" dirty="0" smtClean="0">
-                <a:latin typeface="Calibri" pitchFamily="34" charset="0"/>
-              </a:rPr>
-              <a:t> </a:t>
-            </a:r>
-            <a:r>
-              <a:rPr lang="ru-RU" sz="2000" b="1" dirty="0" smtClean="0">
-                <a:latin typeface="Calibri" pitchFamily="34" charset="0"/>
-              </a:rPr>
-              <a:t>развертывание</a:t>
-            </a:r>
-            <a:r>
-              <a:rPr lang="ru-RU" sz="2000" dirty="0" smtClean="0">
-                <a:latin typeface="Calibri" pitchFamily="34" charset="0"/>
-              </a:rPr>
-              <a:t> модулей;</a:t>
-            </a:r>
-          </a:p>
-          <a:p>
-            <a:pPr>
-              <a:buFont typeface="Arial" pitchFamily="34" charset="0"/>
-              <a:buChar char="•"/>
-            </a:pPr>
-            <a:endParaRPr lang="ru-RU" sz="2200" dirty="0" smtClean="0">
-              <a:latin typeface="Calibri" pitchFamily="34" charset="0"/>
-            </a:endParaRPr>
-          </a:p>
-        </p:txBody>
-      </p:sp>
-      <p:sp>
-        <p:nvSpPr>
-          <p:cNvPr id="6" name="Text Box 5"/>
+          <p:cNvPr id="4" name="Text Box 5"/>
           <p:cNvSpPr txBox="1">
             <a:spLocks noChangeArrowheads="1"/>
           </p:cNvSpPr>
@@ -9769,7 +9792,7 @@
       </p:sp>
       <p:sp>
         <p:nvSpPr>
-          <p:cNvPr id="7" name="Text Box 5"/>
+          <p:cNvPr id="5" name="Text Box 5"/>
           <p:cNvSpPr txBox="1">
             <a:spLocks noChangeArrowheads="1"/>
           </p:cNvSpPr>
@@ -9820,30 +9843,6 @@
           </a:p>
         </p:txBody>
       </p:sp>
-      <p:pic>
-        <p:nvPicPr>
-          <p:cNvPr id="8" name="Picture 7" descr="execution-subsystem.png"/>
-          <p:cNvPicPr>
-            <a:picLocks noChangeAspect="1"/>
-          </p:cNvPicPr>
-          <p:nvPr/>
-        </p:nvPicPr>
-        <p:blipFill>
-          <a:blip r:embed="rId3" cstate="print"/>
-          <a:stretch>
-            <a:fillRect/>
-          </a:stretch>
-        </p:blipFill>
-        <p:spPr>
-          <a:xfrm>
-            <a:off x="4359920" y="2297832"/>
-            <a:ext cx="5248275" cy="3971925"/>
-          </a:xfrm>
-          <a:prstGeom prst="rect">
-            <a:avLst/>
-          </a:prstGeom>
-        </p:spPr>
-      </p:pic>
     </p:spTree>
   </p:cSld>
   <p:clrMapOvr>
@@ -9932,7 +9931,7 @@
                 <a:ea typeface="+mj-ea"/>
                 <a:cs typeface="+mj-cs"/>
               </a:rPr>
-              <a:t>Планировщик подсистемы исполнения</a:t>
+              <a:t>Менеджер модулей монторинга</a:t>
             </a:r>
             <a:endParaRPr lang="en-US" sz="4000" kern="0" dirty="0">
               <a:solidFill>
@@ -9947,7 +9946,143 @@
       </p:sp>
       <p:sp>
         <p:nvSpPr>
-          <p:cNvPr id="4" name="Text Box 5"/>
+          <p:cNvPr id="6" name="TextBox 8"/>
+          <p:cNvSpPr txBox="1">
+            <a:spLocks noChangeArrowheads="1"/>
+          </p:cNvSpPr>
+          <p:nvPr/>
+        </p:nvSpPr>
+        <p:spPr bwMode="auto">
+          <a:xfrm>
+            <a:off x="5584056" y="4746104"/>
+            <a:ext cx="4248472" cy="1323439"/>
+          </a:xfrm>
+          <a:prstGeom prst="rect">
+            <a:avLst/>
+          </a:prstGeom>
+          <a:noFill/>
+          <a:ln w="9525">
+            <a:noFill/>
+            <a:miter lim="800000"/>
+            <a:headEnd/>
+            <a:tailEnd/>
+          </a:ln>
+        </p:spPr>
+        <p:txBody>
+          <a:bodyPr wrap="square">
+            <a:spAutoFit/>
+          </a:bodyPr>
+          <a:lstStyle/>
+          <a:p>
+            <a:pPr>
+              <a:buFont typeface="Arial" pitchFamily="34" charset="0"/>
+              <a:buChar char="•"/>
+            </a:pPr>
+            <a:r>
+              <a:rPr lang="ru-RU" sz="2000" dirty="0" smtClean="0">
+                <a:latin typeface="Calibri" pitchFamily="34" charset="0"/>
+              </a:rPr>
+              <a:t> </a:t>
+            </a:r>
+            <a:r>
+              <a:rPr lang="ru-RU" sz="2000" b="1" dirty="0" smtClean="0">
+                <a:latin typeface="Calibri" pitchFamily="34" charset="0"/>
+              </a:rPr>
+              <a:t>генерация</a:t>
+            </a:r>
+            <a:r>
+              <a:rPr lang="ru-RU" sz="2000" dirty="0" smtClean="0">
+                <a:latin typeface="Calibri" pitchFamily="34" charset="0"/>
+              </a:rPr>
+              <a:t> </a:t>
+            </a:r>
+            <a:r>
+              <a:rPr lang="ru-RU" sz="2000" dirty="0" smtClean="0">
+                <a:latin typeface="Calibri" pitchFamily="34" charset="0"/>
+              </a:rPr>
+              <a:t>кода каркаса;</a:t>
+            </a:r>
+          </a:p>
+          <a:p>
+            <a:pPr>
+              <a:buFont typeface="Arial" pitchFamily="34" charset="0"/>
+              <a:buChar char="•"/>
+            </a:pPr>
+            <a:endParaRPr lang="ru-RU" sz="1000" dirty="0" smtClean="0">
+              <a:latin typeface="Calibri" pitchFamily="34" charset="0"/>
+            </a:endParaRPr>
+          </a:p>
+          <a:p>
+            <a:pPr>
+              <a:buFont typeface="Arial" pitchFamily="34" charset="0"/>
+              <a:buChar char="•"/>
+            </a:pPr>
+            <a:r>
+              <a:rPr lang="ru-RU" sz="2000" dirty="0" smtClean="0">
+                <a:latin typeface="Calibri" pitchFamily="34" charset="0"/>
+              </a:rPr>
+              <a:t> </a:t>
+            </a:r>
+            <a:r>
+              <a:rPr lang="ru-RU" sz="2000" b="1" dirty="0" smtClean="0">
+                <a:latin typeface="Calibri" pitchFamily="34" charset="0"/>
+              </a:rPr>
+              <a:t>исполнение</a:t>
+            </a:r>
+            <a:r>
+              <a:rPr lang="ru-RU" sz="2000" dirty="0" smtClean="0">
+                <a:latin typeface="Calibri" pitchFamily="34" charset="0"/>
+              </a:rPr>
+              <a:t> модулей в ОС;</a:t>
+            </a:r>
+          </a:p>
+          <a:p>
+            <a:pPr>
+              <a:buFont typeface="Arial" pitchFamily="34" charset="0"/>
+              <a:buChar char="•"/>
+            </a:pPr>
+            <a:endParaRPr lang="ru-RU" sz="1000" dirty="0" smtClean="0">
+              <a:latin typeface="Calibri" pitchFamily="34" charset="0"/>
+            </a:endParaRPr>
+          </a:p>
+          <a:p>
+            <a:pPr>
+              <a:buFont typeface="Arial" pitchFamily="34" charset="0"/>
+              <a:buChar char="•"/>
+            </a:pPr>
+            <a:r>
+              <a:rPr lang="ru-RU" sz="2000" dirty="0" smtClean="0">
+                <a:latin typeface="Calibri" pitchFamily="34" charset="0"/>
+              </a:rPr>
+              <a:t> </a:t>
+            </a:r>
+            <a:r>
+              <a:rPr lang="ru-RU" sz="2000" b="1" dirty="0" smtClean="0">
+                <a:latin typeface="Calibri" pitchFamily="34" charset="0"/>
+              </a:rPr>
+              <a:t>выполнение</a:t>
+            </a:r>
+            <a:r>
+              <a:rPr lang="ru-RU" sz="2000" dirty="0" smtClean="0">
+                <a:latin typeface="Calibri" pitchFamily="34" charset="0"/>
+              </a:rPr>
+              <a:t> файловых операций</a:t>
+            </a:r>
+            <a:r>
+              <a:rPr lang="ru-RU" sz="2000" dirty="0" smtClean="0">
+                <a:latin typeface="Calibri" pitchFamily="34" charset="0"/>
+              </a:rPr>
+              <a:t>;</a:t>
+            </a:r>
+            <a:endParaRPr lang="ru-RU" sz="2200" dirty="0" smtClean="0">
+              <a:latin typeface="Calibri" pitchFamily="34" charset="0"/>
+            </a:endParaRPr>
+          </a:p>
+        </p:txBody>
+      </p:sp>
+      <p:sp>
+        <p:nvSpPr>
+          <p:cNvPr id="8" name="Text Box 5"/>
           <p:cNvSpPr txBox="1">
             <a:spLocks noChangeArrowheads="1"/>
           </p:cNvSpPr>
@@ -10009,7 +10144,7 @@
       </p:sp>
       <p:sp>
         <p:nvSpPr>
-          <p:cNvPr id="5" name="Text Box 5"/>
+          <p:cNvPr id="9" name="Text Box 5"/>
           <p:cNvSpPr txBox="1">
             <a:spLocks noChangeArrowheads="1"/>
           </p:cNvSpPr>
@@ -10060,6 +10195,30 @@
           </a:p>
         </p:txBody>
       </p:sp>
+      <p:pic>
+        <p:nvPicPr>
+          <p:cNvPr id="10" name="Picture 9" descr="snoopymm.png"/>
+          <p:cNvPicPr>
+            <a:picLocks noChangeAspect="1"/>
+          </p:cNvPicPr>
+          <p:nvPr/>
+        </p:nvPicPr>
+        <p:blipFill>
+          <a:blip r:embed="rId3" cstate="print"/>
+          <a:stretch>
+            <a:fillRect/>
+          </a:stretch>
+        </p:blipFill>
+        <p:spPr>
+          <a:xfrm>
+            <a:off x="759520" y="2441848"/>
+            <a:ext cx="6867525" cy="3057525"/>
+          </a:xfrm>
+          <a:prstGeom prst="rect">
+            <a:avLst/>
+          </a:prstGeom>
+        </p:spPr>
+      </p:pic>
     </p:spTree>
   </p:cSld>
   <p:clrMapOvr>
@@ -10114,7 +10273,7 @@
         </p:nvSpPr>
         <p:spPr bwMode="auto">
           <a:xfrm>
-            <a:off x="436563" y="993775"/>
+            <a:off x="436563" y="616620"/>
             <a:ext cx="9258300" cy="673100"/>
           </a:xfrm>
           <a:prstGeom prst="rect">
@@ -10148,7 +10307,7 @@
                 <a:ea typeface="+mj-ea"/>
                 <a:cs typeface="+mj-cs"/>
               </a:rPr>
-              <a:t>Менеджер модулей монторинга</a:t>
+              <a:t>Архитектура службы мониторинга</a:t>
             </a:r>
             <a:endParaRPr lang="en-US" sz="4000" kern="0" dirty="0">
               <a:solidFill>
@@ -10157,142 +10316,6 @@
               <a:latin typeface="Arial" charset="0"/>
               <a:ea typeface="+mj-ea"/>
               <a:cs typeface="+mj-cs"/>
-            </a:endParaRPr>
-          </a:p>
-        </p:txBody>
-      </p:sp>
-      <p:sp>
-        <p:nvSpPr>
-          <p:cNvPr id="6" name="TextBox 8"/>
-          <p:cNvSpPr txBox="1">
-            <a:spLocks noChangeArrowheads="1"/>
-          </p:cNvSpPr>
-          <p:nvPr/>
-        </p:nvSpPr>
-        <p:spPr bwMode="auto">
-          <a:xfrm>
-            <a:off x="5584056" y="4746104"/>
-            <a:ext cx="4248472" cy="1323439"/>
-          </a:xfrm>
-          <a:prstGeom prst="rect">
-            <a:avLst/>
-          </a:prstGeom>
-          <a:noFill/>
-          <a:ln w="9525">
-            <a:noFill/>
-            <a:miter lim="800000"/>
-            <a:headEnd/>
-            <a:tailEnd/>
-          </a:ln>
-        </p:spPr>
-        <p:txBody>
-          <a:bodyPr wrap="square">
-            <a:spAutoFit/>
-          </a:bodyPr>
-          <a:lstStyle/>
-          <a:p>
-            <a:pPr>
-              <a:buFont typeface="Arial" pitchFamily="34" charset="0"/>
-              <a:buChar char="•"/>
-            </a:pPr>
-            <a:r>
-              <a:rPr lang="ru-RU" sz="2000" dirty="0" smtClean="0">
-                <a:latin typeface="Calibri" pitchFamily="34" charset="0"/>
-              </a:rPr>
-              <a:t> </a:t>
-            </a:r>
-            <a:r>
-              <a:rPr lang="ru-RU" sz="2000" b="1" dirty="0" smtClean="0">
-                <a:latin typeface="Calibri" pitchFamily="34" charset="0"/>
-              </a:rPr>
-              <a:t>генерация</a:t>
-            </a:r>
-            <a:r>
-              <a:rPr lang="ru-RU" sz="2000" dirty="0" smtClean="0">
-                <a:latin typeface="Calibri" pitchFamily="34" charset="0"/>
-              </a:rPr>
-              <a:t> </a:t>
-            </a:r>
-            <a:r>
-              <a:rPr lang="ru-RU" sz="2000" dirty="0" smtClean="0">
-                <a:latin typeface="Calibri" pitchFamily="34" charset="0"/>
-              </a:rPr>
-              <a:t>кода каркаса;</a:t>
-            </a:r>
-          </a:p>
-          <a:p>
-            <a:pPr>
-              <a:buFont typeface="Arial" pitchFamily="34" charset="0"/>
-              <a:buChar char="•"/>
-            </a:pPr>
-            <a:endParaRPr lang="ru-RU" sz="1000" dirty="0" smtClean="0">
-              <a:latin typeface="Calibri" pitchFamily="34" charset="0"/>
-            </a:endParaRPr>
-          </a:p>
-          <a:p>
-            <a:pPr>
-              <a:buFont typeface="Arial" pitchFamily="34" charset="0"/>
-              <a:buChar char="•"/>
-            </a:pPr>
-            <a:r>
-              <a:rPr lang="ru-RU" sz="2000" dirty="0" smtClean="0">
-                <a:latin typeface="Calibri" pitchFamily="34" charset="0"/>
-              </a:rPr>
-              <a:t> </a:t>
-            </a:r>
-            <a:r>
-              <a:rPr lang="ru-RU" sz="2000" b="1" dirty="0" smtClean="0">
-                <a:latin typeface="Calibri" pitchFamily="34" charset="0"/>
-              </a:rPr>
-              <a:t>исполнение</a:t>
-            </a:r>
-            <a:r>
-              <a:rPr lang="ru-RU" sz="2000" dirty="0" smtClean="0">
-                <a:latin typeface="Calibri" pitchFamily="34" charset="0"/>
-              </a:rPr>
-              <a:t> модулей в ОС;</a:t>
-            </a:r>
-          </a:p>
-          <a:p>
-            <a:pPr>
-              <a:buFont typeface="Arial" pitchFamily="34" charset="0"/>
-              <a:buChar char="•"/>
-            </a:pPr>
-            <a:endParaRPr lang="ru-RU" sz="1000" dirty="0" smtClean="0">
-              <a:latin typeface="Calibri" pitchFamily="34" charset="0"/>
-            </a:endParaRPr>
-          </a:p>
-          <a:p>
-            <a:pPr>
-              <a:buFont typeface="Arial" pitchFamily="34" charset="0"/>
-              <a:buChar char="•"/>
-            </a:pPr>
-            <a:r>
-              <a:rPr lang="ru-RU" sz="2000" dirty="0" smtClean="0">
-                <a:latin typeface="Calibri" pitchFamily="34" charset="0"/>
-              </a:rPr>
-              <a:t> </a:t>
-            </a:r>
-            <a:r>
-              <a:rPr lang="ru-RU" sz="2000" b="1" dirty="0" smtClean="0">
-                <a:latin typeface="Calibri" pitchFamily="34" charset="0"/>
-              </a:rPr>
-              <a:t>выполнение</a:t>
-            </a:r>
-            <a:r>
-              <a:rPr lang="ru-RU" sz="2000" dirty="0" smtClean="0">
-                <a:latin typeface="Calibri" pitchFamily="34" charset="0"/>
-              </a:rPr>
-              <a:t> файловых операций</a:t>
-            </a:r>
-            <a:r>
-              <a:rPr lang="ru-RU" sz="2000" dirty="0" smtClean="0">
-                <a:latin typeface="Calibri" pitchFamily="34" charset="0"/>
-              </a:rPr>
-              <a:t>;</a:t>
-            </a:r>
-            <a:endParaRPr lang="ru-RU" sz="2200" dirty="0" smtClean="0">
-              <a:latin typeface="Calibri" pitchFamily="34" charset="0"/>
             </a:endParaRPr>
           </a:p>
         </p:txBody>
@@ -10414,7 +10437,7 @@
       </p:sp>
       <p:pic>
         <p:nvPicPr>
-          <p:cNvPr id="10" name="Picture 9" descr="snoopymm.png"/>
+          <p:cNvPr id="7" name="Picture 6" descr="service-cd.png"/>
           <p:cNvPicPr>
             <a:picLocks noChangeAspect="1"/>
           </p:cNvPicPr>
@@ -10428,8 +10451,8 @@
         </p:blipFill>
         <p:spPr>
           <a:xfrm>
-            <a:off x="759520" y="2441848"/>
-            <a:ext cx="6867525" cy="3057525"/>
+            <a:off x="327472" y="1361728"/>
+            <a:ext cx="9660429" cy="5771048"/>
           </a:xfrm>
           <a:prstGeom prst="rect">
             <a:avLst/>
@@ -10490,246 +10513,6 @@
         </p:nvSpPr>
         <p:spPr bwMode="auto">
           <a:xfrm>
-            <a:off x="436563" y="616620"/>
-            <a:ext cx="9258300" cy="673100"/>
-          </a:xfrm>
-          <a:prstGeom prst="rect">
-            <a:avLst/>
-          </a:prstGeom>
-          <a:noFill/>
-          <a:ln w="9525">
-            <a:noFill/>
-            <a:miter lim="800000"/>
-            <a:headEnd/>
-            <a:tailEnd/>
-          </a:ln>
-          <a:effectLst/>
-        </p:spPr>
-        <p:txBody>
-          <a:bodyPr lIns="0" tIns="0" rIns="0" bIns="0" anchor="b"/>
-          <a:lstStyle/>
-          <a:p>
-            <a:pPr algn="ctr">
-              <a:lnSpc>
-                <a:spcPct val="95000"/>
-              </a:lnSpc>
-              <a:defRPr/>
-            </a:pPr>
-            <a:r>
-              <a:rPr lang="ru-RU" sz="4000" kern="0" dirty="0" smtClean="0">
-                <a:solidFill>
-                  <a:srgbClr val="04617B"/>
-                </a:solidFill>
-                <a:latin typeface="Arial" charset="0"/>
-                <a:ea typeface="+mj-ea"/>
-                <a:cs typeface="+mj-cs"/>
-              </a:rPr>
-              <a:t>Архитектура службы мониторинга</a:t>
-            </a:r>
-            <a:endParaRPr lang="en-US" sz="4000" kern="0" dirty="0">
-              <a:solidFill>
-                <a:srgbClr val="04617B"/>
-              </a:solidFill>
-              <a:latin typeface="Arial" charset="0"/>
-              <a:ea typeface="+mj-ea"/>
-              <a:cs typeface="+mj-cs"/>
-            </a:endParaRPr>
-          </a:p>
-        </p:txBody>
-      </p:sp>
-      <p:sp>
-        <p:nvSpPr>
-          <p:cNvPr id="8" name="Text Box 5"/>
-          <p:cNvSpPr txBox="1">
-            <a:spLocks noChangeArrowheads="1"/>
-          </p:cNvSpPr>
-          <p:nvPr/>
-        </p:nvSpPr>
-        <p:spPr bwMode="auto">
-          <a:xfrm>
-            <a:off x="183456" y="7266384"/>
-            <a:ext cx="5886970" cy="190052"/>
-          </a:xfrm>
-          <a:prstGeom prst="rect">
-            <a:avLst/>
-          </a:prstGeom>
-          <a:noFill/>
-          <a:ln w="9525">
-            <a:noFill/>
-            <a:miter lim="800000"/>
-            <a:headEnd/>
-            <a:tailEnd/>
-          </a:ln>
-        </p:spPr>
-        <p:txBody>
-          <a:bodyPr wrap="square" lIns="0" tIns="0" rIns="0" bIns="0" anchor="b">
-            <a:spAutoFit/>
-          </a:bodyPr>
-          <a:lstStyle/>
-          <a:p>
-            <a:pPr>
-              <a:lnSpc>
-                <a:spcPct val="95000"/>
-              </a:lnSpc>
-            </a:pPr>
-            <a:r>
-              <a:rPr lang="ru-RU" sz="1300" dirty="0">
-                <a:solidFill>
-                  <a:srgbClr val="045C75"/>
-                </a:solidFill>
-                <a:latin typeface="Arial" charset="0"/>
-              </a:rPr>
-              <a:t>АлтГТУ им. И. И. </a:t>
-            </a:r>
-            <a:r>
-              <a:rPr lang="ru-RU" sz="1300" dirty="0" smtClean="0">
-                <a:solidFill>
-                  <a:srgbClr val="045C75"/>
-                </a:solidFill>
-                <a:latin typeface="Arial" charset="0"/>
-              </a:rPr>
-              <a:t>Ползунова / ПОВТ, Владимир Костюков</a:t>
-            </a:r>
-            <a:endParaRPr lang="en-US" sz="1300" dirty="0">
-              <a:solidFill>
-                <a:srgbClr val="045C75"/>
-              </a:solidFill>
-              <a:latin typeface="Arial" charset="0"/>
-            </a:endParaRPr>
-          </a:p>
-        </p:txBody>
-      </p:sp>
-      <p:sp>
-        <p:nvSpPr>
-          <p:cNvPr id="9" name="Text Box 5"/>
-          <p:cNvSpPr txBox="1">
-            <a:spLocks noChangeArrowheads="1"/>
-          </p:cNvSpPr>
-          <p:nvPr/>
-        </p:nvSpPr>
-        <p:spPr bwMode="auto">
-          <a:xfrm>
-            <a:off x="9688512" y="7266384"/>
-            <a:ext cx="360040" cy="190052"/>
-          </a:xfrm>
-          <a:prstGeom prst="rect">
-            <a:avLst/>
-          </a:prstGeom>
-          <a:noFill/>
-          <a:ln w="9525">
-            <a:noFill/>
-            <a:miter lim="800000"/>
-            <a:headEnd/>
-            <a:tailEnd/>
-          </a:ln>
-        </p:spPr>
-        <p:txBody>
-          <a:bodyPr wrap="square" lIns="0" tIns="0" rIns="0" bIns="0" anchor="b">
-            <a:spAutoFit/>
-          </a:bodyPr>
-          <a:lstStyle/>
-          <a:p>
-            <a:pPr>
-              <a:lnSpc>
-                <a:spcPct val="95000"/>
-              </a:lnSpc>
-            </a:pPr>
-            <a:r>
-              <a:rPr lang="ru-RU" sz="1300" dirty="0" smtClean="0">
-                <a:solidFill>
-                  <a:srgbClr val="045C75"/>
-                </a:solidFill>
-                <a:latin typeface="Arial" charset="0"/>
-              </a:rPr>
-              <a:t> 17</a:t>
-            </a:r>
-            <a:endParaRPr lang="en-US" sz="1300" dirty="0">
-              <a:solidFill>
-                <a:srgbClr val="045C75"/>
-              </a:solidFill>
-              <a:latin typeface="Arial" charset="0"/>
-            </a:endParaRPr>
-          </a:p>
-        </p:txBody>
-      </p:sp>
-      <p:pic>
-        <p:nvPicPr>
-          <p:cNvPr id="7" name="Picture 6" descr="service-cd.png"/>
-          <p:cNvPicPr>
-            <a:picLocks noChangeAspect="1"/>
-          </p:cNvPicPr>
-          <p:nvPr/>
-        </p:nvPicPr>
-        <p:blipFill>
-          <a:blip r:embed="rId3" cstate="print"/>
-          <a:stretch>
-            <a:fillRect/>
-          </a:stretch>
-        </p:blipFill>
-        <p:spPr>
-          <a:xfrm>
-            <a:off x="327472" y="1361728"/>
-            <a:ext cx="9660429" cy="5771048"/>
-          </a:xfrm>
-          <a:prstGeom prst="rect">
-            <a:avLst/>
-          </a:prstGeom>
-        </p:spPr>
-      </p:pic>
-    </p:spTree>
-  </p:cSld>
-  <p:clrMapOvr>
-    <a:masterClrMapping/>
-  </p:clrMapOvr>
-  <p:timing>
-    <p:tnLst>
-      <p:par>
-        <p:cTn id="1" dur="indefinite" restart="never" nodeType="tmRoot"/>
-      </p:par>
-    </p:tnLst>
-  </p:timing>
-</p:sld>
-</file>
-
-<file path=ppt/slides/slide18.xml><?xml version="1.0" encoding="utf-8"?>
-<p:sld xmlns:a="http://schemas.openxmlformats.org/drawingml/2006/main" xmlns:r="http://schemas.openxmlformats.org/officeDocument/2006/relationships" xmlns:p="http://schemas.openxmlformats.org/presentationml/2006/main">
-  <p:cSld>
-    <p:bg>
-      <p:bgPr>
-        <a:blipFill dpi="0" rotWithShape="0">
-          <a:blip r:embed="rId2" cstate="print"/>
-          <a:srcRect/>
-          <a:stretch>
-            <a:fillRect/>
-          </a:stretch>
-        </a:blipFill>
-        <a:effectLst/>
-      </p:bgPr>
-    </p:bg>
-    <p:spTree>
-      <p:nvGrpSpPr>
-        <p:cNvPr id="1" name=""/>
-        <p:cNvGrpSpPr/>
-        <p:nvPr/>
-      </p:nvGrpSpPr>
-      <p:grpSpPr>
-        <a:xfrm>
-          <a:off x="0" y="0"/>
-          <a:ext cx="0" cy="0"/>
-          <a:chOff x="0" y="0"/>
-          <a:chExt cx="0" cy="0"/>
-        </a:xfrm>
-      </p:grpSpPr>
-      <p:sp>
-        <p:nvSpPr>
-          <p:cNvPr id="17" name="Rectangle 1"/>
-          <p:cNvSpPr txBox="1">
-            <a:spLocks noChangeArrowheads="1"/>
-          </p:cNvSpPr>
-          <p:nvPr/>
-        </p:nvSpPr>
-        <p:spPr bwMode="auto">
-          <a:xfrm>
             <a:off x="436563" y="993775"/>
             <a:ext cx="9258300" cy="673100"/>
           </a:xfrm>
@@ -11221,6 +11004,386 @@
                 </a:solidFill>
                 <a:latin typeface="Arial" charset="0"/>
               </a:rPr>
+              <a:t> 17</a:t>
+            </a:r>
+            <a:endParaRPr lang="en-US" sz="1300" dirty="0">
+              <a:solidFill>
+                <a:srgbClr val="045C75"/>
+              </a:solidFill>
+              <a:latin typeface="Arial" charset="0"/>
+            </a:endParaRPr>
+          </a:p>
+        </p:txBody>
+      </p:sp>
+    </p:spTree>
+  </p:cSld>
+  <p:clrMapOvr>
+    <a:masterClrMapping/>
+  </p:clrMapOvr>
+  <p:timing>
+    <p:tnLst>
+      <p:par>
+        <p:cTn id="1" dur="indefinite" restart="never" nodeType="tmRoot"/>
+      </p:par>
+    </p:tnLst>
+  </p:timing>
+</p:sld>
+</file>
+
+<file path=ppt/slides/slide18.xml><?xml version="1.0" encoding="utf-8"?>
+<p:sld xmlns:a="http://schemas.openxmlformats.org/drawingml/2006/main" xmlns:r="http://schemas.openxmlformats.org/officeDocument/2006/relationships" xmlns:p="http://schemas.openxmlformats.org/presentationml/2006/main">
+  <p:cSld>
+    <p:bg>
+      <p:bgPr>
+        <a:blipFill dpi="0" rotWithShape="0">
+          <a:blip r:embed="rId2" cstate="print"/>
+          <a:srcRect/>
+          <a:stretch>
+            <a:fillRect/>
+          </a:stretch>
+        </a:blipFill>
+        <a:effectLst/>
+      </p:bgPr>
+    </p:bg>
+    <p:spTree>
+      <p:nvGrpSpPr>
+        <p:cNvPr id="1" name=""/>
+        <p:cNvGrpSpPr/>
+        <p:nvPr/>
+      </p:nvGrpSpPr>
+      <p:grpSpPr>
+        <a:xfrm>
+          <a:off x="0" y="0"/>
+          <a:ext cx="0" cy="0"/>
+          <a:chOff x="0" y="0"/>
+          <a:chExt cx="0" cy="0"/>
+        </a:xfrm>
+      </p:grpSpPr>
+      <p:sp>
+        <p:nvSpPr>
+          <p:cNvPr id="13314" name="Rectangle 1"/>
+          <p:cNvSpPr>
+            <a:spLocks noGrp="1" noChangeArrowheads="1"/>
+          </p:cNvSpPr>
+          <p:nvPr>
+            <p:ph type="ctrTitle"/>
+          </p:nvPr>
+        </p:nvSpPr>
+        <p:spPr>
+          <a:xfrm>
+            <a:off x="2436813" y="523875"/>
+            <a:ext cx="5619750" cy="1135063"/>
+          </a:xfrm>
+        </p:spPr>
+        <p:txBody>
+          <a:bodyPr lIns="0" tIns="0" rIns="0" bIns="0" anchor="b"/>
+          <a:lstStyle/>
+          <a:p>
+            <a:pPr algn="l" eaLnBrk="1" hangingPunct="1">
+              <a:lnSpc>
+                <a:spcPct val="95000"/>
+              </a:lnSpc>
+            </a:pPr>
+            <a:r>
+              <a:rPr lang="ru-RU" sz="4000" smtClean="0">
+                <a:solidFill>
+                  <a:srgbClr val="04617B"/>
+                </a:solidFill>
+                <a:latin typeface="Arial" charset="0"/>
+              </a:rPr>
+              <a:t>Пути развития проекта</a:t>
+            </a:r>
+            <a:endParaRPr lang="en-US" sz="4000" smtClean="0">
+              <a:solidFill>
+                <a:srgbClr val="04617B"/>
+              </a:solidFill>
+              <a:latin typeface="Arial" charset="0"/>
+            </a:endParaRPr>
+          </a:p>
+        </p:txBody>
+      </p:sp>
+      <p:sp>
+        <p:nvSpPr>
+          <p:cNvPr id="13316" name="TextBox 8"/>
+          <p:cNvSpPr txBox="1">
+            <a:spLocks noChangeArrowheads="1"/>
+          </p:cNvSpPr>
+          <p:nvPr/>
+        </p:nvSpPr>
+        <p:spPr bwMode="auto">
+          <a:xfrm>
+            <a:off x="687512" y="2153816"/>
+            <a:ext cx="9217024" cy="4493538"/>
+          </a:xfrm>
+          <a:prstGeom prst="rect">
+            <a:avLst/>
+          </a:prstGeom>
+          <a:noFill/>
+          <a:ln w="9525">
+            <a:noFill/>
+            <a:miter lim="800000"/>
+            <a:headEnd/>
+            <a:tailEnd/>
+          </a:ln>
+        </p:spPr>
+        <p:txBody>
+          <a:bodyPr wrap="square">
+            <a:spAutoFit/>
+          </a:bodyPr>
+          <a:lstStyle/>
+          <a:p>
+            <a:pPr>
+              <a:buFont typeface="Arial" charset="0"/>
+              <a:buChar char="•"/>
+            </a:pPr>
+            <a:r>
+              <a:rPr lang="ru-RU" sz="2200" dirty="0" smtClean="0">
+                <a:latin typeface="Calibri" pitchFamily="34" charset="0"/>
+              </a:rPr>
+              <a:t> </a:t>
+            </a:r>
+            <a:r>
+              <a:rPr lang="ru-RU" sz="2200" b="1" dirty="0" smtClean="0">
+                <a:latin typeface="Calibri" pitchFamily="34" charset="0"/>
+              </a:rPr>
+              <a:t>разработка</a:t>
+            </a:r>
+            <a:r>
+              <a:rPr lang="ru-RU" sz="2200" dirty="0" smtClean="0">
+                <a:latin typeface="Calibri" pitchFamily="34" charset="0"/>
+              </a:rPr>
+              <a:t> </a:t>
+            </a:r>
+            <a:r>
+              <a:rPr lang="ru-RU" sz="2200" dirty="0">
+                <a:latin typeface="Calibri" pitchFamily="34" charset="0"/>
+              </a:rPr>
+              <a:t>шаблонных модулей мониторинга для решения круга повседневных задач (анализ сетевого трафика, загрузка и температура процессора, количество свободной памяти и </a:t>
+            </a:r>
+            <a:r>
+              <a:rPr lang="ru-RU" sz="2200" dirty="0" smtClean="0">
+                <a:latin typeface="Calibri" pitchFamily="34" charset="0"/>
+              </a:rPr>
+              <a:t>т.д.);</a:t>
+            </a:r>
+            <a:endParaRPr lang="ru-RU" sz="2200" dirty="0" smtClean="0">
+              <a:latin typeface="Calibri" pitchFamily="34" charset="0"/>
+            </a:endParaRPr>
+          </a:p>
+          <a:p>
+            <a:pPr>
+              <a:buFont typeface="Arial" charset="0"/>
+              <a:buChar char="•"/>
+            </a:pPr>
+            <a:endParaRPr lang="ru-RU" sz="2200" dirty="0" smtClean="0">
+              <a:latin typeface="Calibri" pitchFamily="34" charset="0"/>
+            </a:endParaRPr>
+          </a:p>
+          <a:p>
+            <a:pPr>
+              <a:buFont typeface="Arial" charset="0"/>
+              <a:buChar char="•"/>
+            </a:pPr>
+            <a:r>
+              <a:rPr lang="ru-RU" sz="2200" dirty="0" smtClean="0">
+                <a:latin typeface="Calibri" pitchFamily="34" charset="0"/>
+              </a:rPr>
+              <a:t> </a:t>
+            </a:r>
+            <a:r>
+              <a:rPr lang="ru-RU" sz="2200" b="1" dirty="0" smtClean="0">
+                <a:latin typeface="Calibri" pitchFamily="34" charset="0"/>
+              </a:rPr>
+              <a:t>оформление</a:t>
+            </a:r>
+            <a:r>
+              <a:rPr lang="ru-RU" sz="2200" dirty="0" smtClean="0">
+                <a:latin typeface="Calibri" pitchFamily="34" charset="0"/>
+              </a:rPr>
+              <a:t> технической документации </a:t>
+            </a:r>
+            <a:r>
+              <a:rPr lang="en-US" sz="2200" dirty="0" smtClean="0">
+                <a:latin typeface="Calibri" pitchFamily="34" charset="0"/>
+              </a:rPr>
+              <a:t> </a:t>
+            </a:r>
+            <a:r>
+              <a:rPr lang="ru-RU" sz="2200" dirty="0" smtClean="0">
+                <a:latin typeface="Calibri" pitchFamily="34" charset="0"/>
+              </a:rPr>
+              <a:t>и спецификаций программного кода;</a:t>
+            </a:r>
+          </a:p>
+          <a:p>
+            <a:pPr>
+              <a:buFont typeface="Arial" charset="0"/>
+              <a:buChar char="•"/>
+            </a:pPr>
+            <a:endParaRPr lang="ru-RU" sz="2200" dirty="0" smtClean="0">
+              <a:latin typeface="Calibri" pitchFamily="34" charset="0"/>
+            </a:endParaRPr>
+          </a:p>
+          <a:p>
+            <a:pPr>
+              <a:buFont typeface="Arial" charset="0"/>
+              <a:buChar char="•"/>
+            </a:pPr>
+            <a:r>
+              <a:rPr lang="ru-RU" sz="2200" b="1" dirty="0" smtClean="0">
+                <a:latin typeface="Calibri" pitchFamily="34" charset="0"/>
+              </a:rPr>
+              <a:t> совершенствование </a:t>
+            </a:r>
+            <a:r>
+              <a:rPr lang="ru-RU" sz="2200" dirty="0" smtClean="0">
+                <a:latin typeface="Calibri" pitchFamily="34" charset="0"/>
+              </a:rPr>
+              <a:t>компонентов и оптимизация алгоритмов базовой платформы;</a:t>
+            </a:r>
+          </a:p>
+          <a:p>
+            <a:pPr>
+              <a:buFont typeface="Arial" charset="0"/>
+              <a:buChar char="•"/>
+            </a:pPr>
+            <a:endParaRPr lang="ru-RU" sz="2200" dirty="0" smtClean="0">
+              <a:latin typeface="Calibri" pitchFamily="34" charset="0"/>
+            </a:endParaRPr>
+          </a:p>
+          <a:p>
+            <a:pPr>
+              <a:buFont typeface="Arial" charset="0"/>
+              <a:buChar char="•"/>
+            </a:pPr>
+            <a:r>
+              <a:rPr lang="ru-RU" sz="2200" dirty="0" smtClean="0">
+                <a:latin typeface="Calibri" pitchFamily="34" charset="0"/>
+              </a:rPr>
+              <a:t>  полномасштабное </a:t>
+            </a:r>
+            <a:r>
+              <a:rPr lang="ru-RU" sz="2200" b="1" dirty="0" smtClean="0">
+                <a:latin typeface="Calibri" pitchFamily="34" charset="0"/>
+              </a:rPr>
+              <a:t>внедрение</a:t>
+            </a:r>
+            <a:r>
+              <a:rPr lang="ru-RU" sz="2200" dirty="0" smtClean="0">
+                <a:latin typeface="Calibri" pitchFamily="34" charset="0"/>
+              </a:rPr>
+              <a:t> и нагрузочное тестирование системы на базе существующей инфраструктуры предприятия, например лаборатории МикроЭВМ АлтГТУ;</a:t>
+            </a:r>
+            <a:endParaRPr lang="en-US" sz="2200" dirty="0">
+              <a:latin typeface="Calibri" pitchFamily="34" charset="0"/>
+            </a:endParaRPr>
+          </a:p>
+        </p:txBody>
+      </p:sp>
+      <p:sp>
+        <p:nvSpPr>
+          <p:cNvPr id="6" name="Text Box 5"/>
+          <p:cNvSpPr txBox="1">
+            <a:spLocks noChangeArrowheads="1"/>
+          </p:cNvSpPr>
+          <p:nvPr/>
+        </p:nvSpPr>
+        <p:spPr bwMode="auto">
+          <a:xfrm>
+            <a:off x="183456" y="7266384"/>
+            <a:ext cx="5886970" cy="190052"/>
+          </a:xfrm>
+          <a:prstGeom prst="rect">
+            <a:avLst/>
+          </a:prstGeom>
+          <a:noFill/>
+          <a:ln w="9525">
+            <a:noFill/>
+            <a:miter lim="800000"/>
+            <a:headEnd/>
+            <a:tailEnd/>
+          </a:ln>
+        </p:spPr>
+        <p:txBody>
+          <a:bodyPr wrap="square" lIns="0" tIns="0" rIns="0" bIns="0" anchor="b">
+            <a:spAutoFit/>
+          </a:bodyPr>
+          <a:lstStyle/>
+          <a:p>
+            <a:pPr>
+              <a:lnSpc>
+                <a:spcPct val="95000"/>
+              </a:lnSpc>
+            </a:pPr>
+            <a:r>
+              <a:rPr lang="ru-RU" sz="1300" dirty="0">
+                <a:solidFill>
+                  <a:srgbClr val="045C75"/>
+                </a:solidFill>
+                <a:latin typeface="Arial" charset="0"/>
+              </a:rPr>
+              <a:t>АлтГТУ им. И. И. </a:t>
+            </a:r>
+            <a:r>
+              <a:rPr lang="ru-RU" sz="1300" dirty="0" smtClean="0">
+                <a:solidFill>
+                  <a:srgbClr val="045C75"/>
+                </a:solidFill>
+                <a:latin typeface="Arial" charset="0"/>
+              </a:rPr>
+              <a:t>Ползунова / ПОВТ, Владимир Костюков</a:t>
+            </a:r>
+            <a:endParaRPr lang="en-US" sz="1300" dirty="0">
+              <a:solidFill>
+                <a:srgbClr val="045C75"/>
+              </a:solidFill>
+              <a:latin typeface="Arial" charset="0"/>
+            </a:endParaRPr>
+          </a:p>
+        </p:txBody>
+      </p:sp>
+      <p:sp>
+        <p:nvSpPr>
+          <p:cNvPr id="7" name="Text Box 5"/>
+          <p:cNvSpPr txBox="1">
+            <a:spLocks noChangeArrowheads="1"/>
+          </p:cNvSpPr>
+          <p:nvPr/>
+        </p:nvSpPr>
+        <p:spPr bwMode="auto">
+          <a:xfrm>
+            <a:off x="9688512" y="7266384"/>
+            <a:ext cx="360040" cy="190052"/>
+          </a:xfrm>
+          <a:prstGeom prst="rect">
+            <a:avLst/>
+          </a:prstGeom>
+          <a:noFill/>
+          <a:ln w="9525">
+            <a:noFill/>
+            <a:miter lim="800000"/>
+            <a:headEnd/>
+            <a:tailEnd/>
+          </a:ln>
+        </p:spPr>
+        <p:txBody>
+          <a:bodyPr wrap="square" lIns="0" tIns="0" rIns="0" bIns="0" anchor="b">
+            <a:spAutoFit/>
+          </a:bodyPr>
+          <a:lstStyle/>
+          <a:p>
+            <a:pPr>
+              <a:lnSpc>
+                <a:spcPct val="95000"/>
+              </a:lnSpc>
+            </a:pPr>
+            <a:r>
+              <a:rPr lang="ru-RU" sz="1300" dirty="0" smtClean="0">
+                <a:solidFill>
+                  <a:srgbClr val="045C75"/>
+                </a:solidFill>
+                <a:latin typeface="Arial" charset="0"/>
+              </a:rPr>
               <a:t> 18</a:t>
             </a:r>
             <a:endParaRPr lang="en-US" sz="1300" dirty="0">
@@ -11278,336 +11441,211 @@
       </p:grpSpPr>
       <p:sp>
         <p:nvSpPr>
-          <p:cNvPr id="13314" name="Rectangle 1"/>
-          <p:cNvSpPr>
-            <a:spLocks noGrp="1" noChangeArrowheads="1"/>
-          </p:cNvSpPr>
-          <p:nvPr>
-            <p:ph type="ctrTitle"/>
-          </p:nvPr>
+          <p:cNvPr id="7" name="TextBox 6"/>
+          <p:cNvSpPr txBox="1"/>
+          <p:nvPr/>
         </p:nvSpPr>
         <p:spPr>
           <a:xfrm>
-            <a:off x="2436813" y="523875"/>
-            <a:ext cx="5619750" cy="1135063"/>
-          </a:xfrm>
-        </p:spPr>
-        <p:txBody>
-          <a:bodyPr lIns="0" tIns="0" rIns="0" bIns="0" anchor="b"/>
-          <a:lstStyle/>
-          <a:p>
-            <a:pPr algn="l" eaLnBrk="1" hangingPunct="1">
-              <a:lnSpc>
-                <a:spcPct val="95000"/>
-              </a:lnSpc>
-            </a:pPr>
-            <a:r>
-              <a:rPr lang="ru-RU" sz="4000" smtClean="0">
-                <a:solidFill>
-                  <a:srgbClr val="04617B"/>
-                </a:solidFill>
-                <a:latin typeface="Arial" charset="0"/>
-              </a:rPr>
-              <a:t>Пути развития проекта</a:t>
-            </a:r>
-            <a:endParaRPr lang="en-US" sz="4000" smtClean="0">
-              <a:solidFill>
-                <a:srgbClr val="04617B"/>
-              </a:solidFill>
-              <a:latin typeface="Arial" charset="0"/>
-            </a:endParaRPr>
-          </a:p>
-        </p:txBody>
-      </p:sp>
-      <p:sp>
-        <p:nvSpPr>
-          <p:cNvPr id="13316" name="TextBox 8"/>
-          <p:cNvSpPr txBox="1">
-            <a:spLocks noChangeArrowheads="1"/>
-          </p:cNvSpPr>
-          <p:nvPr/>
-        </p:nvSpPr>
-        <p:spPr bwMode="auto">
-          <a:xfrm>
-            <a:off x="687512" y="2153816"/>
-            <a:ext cx="9217024" cy="4493538"/>
+            <a:off x="831528" y="3017912"/>
+            <a:ext cx="8640960" cy="1323439"/>
           </a:xfrm>
           <a:prstGeom prst="rect">
             <a:avLst/>
           </a:prstGeom>
           <a:noFill/>
-          <a:ln w="9525">
-            <a:noFill/>
-            <a:miter lim="800000"/>
-            <a:headEnd/>
-            <a:tailEnd/>
-          </a:ln>
         </p:spPr>
         <p:txBody>
-          <a:bodyPr wrap="square">
+          <a:bodyPr wrap="square" rtlCol="0">
             <a:spAutoFit/>
           </a:bodyPr>
           <a:lstStyle/>
           <a:p>
-            <a:pPr>
-              <a:buFont typeface="Arial" charset="0"/>
-              <a:buChar char="•"/>
-            </a:pPr>
-            <a:r>
-              <a:rPr lang="ru-RU" sz="2200" dirty="0" smtClean="0">
-                <a:latin typeface="Calibri" pitchFamily="34" charset="0"/>
-              </a:rPr>
-              <a:t> </a:t>
-            </a:r>
-            <a:r>
-              <a:rPr lang="ru-RU" sz="2200" b="1" dirty="0" smtClean="0">
-                <a:latin typeface="Calibri" pitchFamily="34" charset="0"/>
-              </a:rPr>
-              <a:t>разработка</a:t>
-            </a:r>
-            <a:r>
-              <a:rPr lang="ru-RU" sz="2200" dirty="0" smtClean="0">
-                <a:latin typeface="Calibri" pitchFamily="34" charset="0"/>
-              </a:rPr>
-              <a:t> </a:t>
-            </a:r>
-            <a:r>
-              <a:rPr lang="ru-RU" sz="2200" dirty="0">
-                <a:latin typeface="Calibri" pitchFamily="34" charset="0"/>
-              </a:rPr>
-              <a:t>шаблонных модулей мониторинга для решения круга повседневных задач (анализ сетевого трафика, загрузка и температура процессора, количество свободной памяти и </a:t>
-            </a:r>
-            <a:r>
-              <a:rPr lang="ru-RU" sz="2200" dirty="0" smtClean="0">
-                <a:latin typeface="Calibri" pitchFamily="34" charset="0"/>
-              </a:rPr>
-              <a:t>т.д.);</a:t>
-            </a:r>
-            <a:endParaRPr lang="ru-RU" sz="2200" dirty="0" smtClean="0">
-              <a:latin typeface="Calibri" pitchFamily="34" charset="0"/>
-            </a:endParaRPr>
-          </a:p>
-          <a:p>
-            <a:pPr>
-              <a:buFont typeface="Arial" charset="0"/>
-              <a:buChar char="•"/>
-            </a:pPr>
-            <a:endParaRPr lang="ru-RU" sz="2200" dirty="0" smtClean="0">
-              <a:latin typeface="Calibri" pitchFamily="34" charset="0"/>
-            </a:endParaRPr>
-          </a:p>
-          <a:p>
-            <a:pPr>
-              <a:buFont typeface="Arial" charset="0"/>
-              <a:buChar char="•"/>
-            </a:pPr>
-            <a:r>
-              <a:rPr lang="ru-RU" sz="2200" dirty="0" smtClean="0">
-                <a:latin typeface="Calibri" pitchFamily="34" charset="0"/>
-              </a:rPr>
-              <a:t> </a:t>
-            </a:r>
-            <a:r>
-              <a:rPr lang="ru-RU" sz="2200" b="1" dirty="0" smtClean="0">
-                <a:latin typeface="Calibri" pitchFamily="34" charset="0"/>
-              </a:rPr>
-              <a:t>оформление</a:t>
-            </a:r>
-            <a:r>
-              <a:rPr lang="ru-RU" sz="2200" dirty="0" smtClean="0">
-                <a:latin typeface="Calibri" pitchFamily="34" charset="0"/>
-              </a:rPr>
-              <a:t> технической документации </a:t>
-            </a:r>
-            <a:r>
-              <a:rPr lang="en-US" sz="2200" dirty="0" smtClean="0">
-                <a:latin typeface="Calibri" pitchFamily="34" charset="0"/>
-              </a:rPr>
-              <a:t> </a:t>
-            </a:r>
-            <a:r>
-              <a:rPr lang="ru-RU" sz="2200" dirty="0" smtClean="0">
-                <a:latin typeface="Calibri" pitchFamily="34" charset="0"/>
-              </a:rPr>
-              <a:t>и спецификаций программного кода;</a:t>
-            </a:r>
-          </a:p>
-          <a:p>
-            <a:pPr>
-              <a:buFont typeface="Arial" charset="0"/>
-              <a:buChar char="•"/>
-            </a:pPr>
-            <a:endParaRPr lang="ru-RU" sz="2200" dirty="0" smtClean="0">
-              <a:latin typeface="Calibri" pitchFamily="34" charset="0"/>
-            </a:endParaRPr>
-          </a:p>
-          <a:p>
-            <a:pPr>
-              <a:buFont typeface="Arial" charset="0"/>
-              <a:buChar char="•"/>
-            </a:pPr>
-            <a:r>
-              <a:rPr lang="ru-RU" sz="2200" b="1" dirty="0" smtClean="0">
-                <a:latin typeface="Calibri" pitchFamily="34" charset="0"/>
-              </a:rPr>
-              <a:t> совершенствование </a:t>
-            </a:r>
-            <a:r>
-              <a:rPr lang="ru-RU" sz="2200" dirty="0" smtClean="0">
-                <a:latin typeface="Calibri" pitchFamily="34" charset="0"/>
-              </a:rPr>
-              <a:t>компонентов и оптимизация алгоритмов базовой платформы;</a:t>
-            </a:r>
-          </a:p>
-          <a:p>
-            <a:pPr>
-              <a:buFont typeface="Arial" charset="0"/>
-              <a:buChar char="•"/>
-            </a:pPr>
-            <a:endParaRPr lang="ru-RU" sz="2200" dirty="0" smtClean="0">
-              <a:latin typeface="Calibri" pitchFamily="34" charset="0"/>
-            </a:endParaRPr>
-          </a:p>
-          <a:p>
-            <a:pPr>
-              <a:buFont typeface="Arial" charset="0"/>
-              <a:buChar char="•"/>
-            </a:pPr>
-            <a:r>
-              <a:rPr lang="ru-RU" sz="2200" dirty="0" smtClean="0">
-                <a:latin typeface="Calibri" pitchFamily="34" charset="0"/>
-              </a:rPr>
-              <a:t>  полномасштабное </a:t>
-            </a:r>
-            <a:r>
-              <a:rPr lang="ru-RU" sz="2200" b="1" dirty="0" smtClean="0">
-                <a:latin typeface="Calibri" pitchFamily="34" charset="0"/>
-              </a:rPr>
-              <a:t>внедрение</a:t>
-            </a:r>
-            <a:r>
-              <a:rPr lang="ru-RU" sz="2200" dirty="0" smtClean="0">
-                <a:latin typeface="Calibri" pitchFamily="34" charset="0"/>
-              </a:rPr>
-              <a:t> и нагрузочное тестирование системы на базе существующей инфраструктуры предприятия, например лаборатории МикроЭВМ АлтГТУ;</a:t>
-            </a:r>
-            <a:endParaRPr lang="en-US" sz="2200" dirty="0">
-              <a:latin typeface="Calibri" pitchFamily="34" charset="0"/>
+            <a:pPr algn="ctr"/>
+            <a:r>
+              <a:rPr lang="ru-RU" sz="4000" dirty="0" smtClean="0">
+                <a:ln w="0" cap="rnd">
+                  <a:noFill/>
+                  <a:bevel/>
+                </a:ln>
+                <a:gradFill>
+                  <a:gsLst>
+                    <a:gs pos="100000">
+                      <a:srgbClr val="0070C0">
+                        <a:alpha val="65000"/>
+                      </a:srgbClr>
+                    </a:gs>
+                    <a:gs pos="50000">
+                      <a:schemeClr val="accent1">
+                        <a:tint val="44500"/>
+                        <a:satMod val="160000"/>
+                      </a:schemeClr>
+                    </a:gs>
+                    <a:gs pos="100000">
+                      <a:schemeClr val="accent1">
+                        <a:tint val="23500"/>
+                        <a:satMod val="160000"/>
+                      </a:schemeClr>
+                    </a:gs>
+                  </a:gsLst>
+                  <a:lin ang="5400000" scaled="0"/>
+                </a:gradFill>
+                <a:effectLst>
+                  <a:outerShdw blurRad="50800" dist="38100" dir="5400000" algn="t" rotWithShape="0">
+                    <a:prstClr val="black">
+                      <a:alpha val="40000"/>
+                    </a:prstClr>
+                  </a:outerShdw>
+                </a:effectLst>
+                <a:latin typeface="Arial" pitchFamily="34" charset="0"/>
+                <a:cs typeface="Arial" pitchFamily="34" charset="0"/>
+              </a:rPr>
+              <a:t>Спасибо!</a:t>
+            </a:r>
+          </a:p>
+          <a:p>
+            <a:pPr algn="ctr"/>
+            <a:r>
+              <a:rPr lang="ru-RU" sz="4000" dirty="0" smtClean="0">
+                <a:ln w="0" cap="rnd">
+                  <a:noFill/>
+                  <a:bevel/>
+                </a:ln>
+                <a:gradFill>
+                  <a:gsLst>
+                    <a:gs pos="100000">
+                      <a:srgbClr val="0070C0">
+                        <a:alpha val="65000"/>
+                      </a:srgbClr>
+                    </a:gs>
+                    <a:gs pos="50000">
+                      <a:schemeClr val="accent1">
+                        <a:tint val="44500"/>
+                        <a:satMod val="160000"/>
+                      </a:schemeClr>
+                    </a:gs>
+                    <a:gs pos="100000">
+                      <a:schemeClr val="accent1">
+                        <a:tint val="23500"/>
+                        <a:satMod val="160000"/>
+                      </a:schemeClr>
+                    </a:gs>
+                  </a:gsLst>
+                  <a:lin ang="5400000" scaled="0"/>
+                </a:gradFill>
+                <a:effectLst>
+                  <a:outerShdw blurRad="50800" dist="38100" dir="5400000" algn="t" rotWithShape="0">
+                    <a:prstClr val="black">
+                      <a:alpha val="40000"/>
+                    </a:prstClr>
+                  </a:outerShdw>
+                </a:effectLst>
+                <a:latin typeface="Arial" pitchFamily="34" charset="0"/>
+                <a:cs typeface="Arial" pitchFamily="34" charset="0"/>
+              </a:rPr>
+              <a:t>Вопросы?</a:t>
+            </a:r>
+            <a:endParaRPr lang="ru-RU" sz="4000" dirty="0">
+              <a:ln w="0" cap="rnd">
+                <a:noFill/>
+                <a:bevel/>
+              </a:ln>
+              <a:gradFill>
+                <a:gsLst>
+                  <a:gs pos="100000">
+                    <a:srgbClr val="0070C0">
+                      <a:alpha val="65000"/>
+                    </a:srgbClr>
+                  </a:gs>
+                  <a:gs pos="50000">
+                    <a:schemeClr val="accent1">
+                      <a:tint val="44500"/>
+                      <a:satMod val="160000"/>
+                    </a:schemeClr>
+                  </a:gs>
+                  <a:gs pos="100000">
+                    <a:schemeClr val="accent1">
+                      <a:tint val="23500"/>
+                      <a:satMod val="160000"/>
+                    </a:schemeClr>
+                  </a:gs>
+                </a:gsLst>
+                <a:lin ang="5400000" scaled="0"/>
+              </a:gradFill>
+              <a:effectLst>
+                <a:outerShdw blurRad="50800" dist="38100" dir="5400000" algn="t" rotWithShape="0">
+                  <a:prstClr val="black">
+                    <a:alpha val="40000"/>
+                  </a:prstClr>
+                </a:outerShdw>
+              </a:effectLst>
+              <a:latin typeface="Arial" pitchFamily="34" charset="0"/>
+              <a:cs typeface="Arial" pitchFamily="34" charset="0"/>
             </a:endParaRPr>
           </a:p>
         </p:txBody>
       </p:sp>
       <p:sp>
         <p:nvSpPr>
-          <p:cNvPr id="6" name="Text Box 5"/>
-          <p:cNvSpPr txBox="1">
-            <a:spLocks noChangeArrowheads="1"/>
-          </p:cNvSpPr>
+          <p:cNvPr id="4" name="TextBox 3"/>
+          <p:cNvSpPr txBox="1"/>
           <p:nvPr/>
         </p:nvSpPr>
-        <p:spPr bwMode="auto">
+        <p:spPr>
           <a:xfrm>
-            <a:off x="183456" y="7266384"/>
-            <a:ext cx="5886970" cy="190052"/>
+            <a:off x="975544" y="6978352"/>
+            <a:ext cx="8640960" cy="461665"/>
           </a:xfrm>
           <a:prstGeom prst="rect">
             <a:avLst/>
           </a:prstGeom>
           <a:noFill/>
-          <a:ln w="9525">
-            <a:noFill/>
-            <a:miter lim="800000"/>
-            <a:headEnd/>
-            <a:tailEnd/>
-          </a:ln>
         </p:spPr>
         <p:txBody>
-          <a:bodyPr wrap="square" lIns="0" tIns="0" rIns="0" bIns="0" anchor="b">
+          <a:bodyPr wrap="square" rtlCol="0">
             <a:spAutoFit/>
           </a:bodyPr>
           <a:lstStyle/>
           <a:p>
-            <a:pPr>
-              <a:lnSpc>
-                <a:spcPct val="95000"/>
-              </a:lnSpc>
-            </a:pPr>
-            <a:r>
-              <a:rPr lang="ru-RU" sz="1300" dirty="0">
+            <a:pPr algn="ctr"/>
+            <a:r>
+              <a:rPr lang="en-US" dirty="0" smtClean="0">
+                <a:ln w="0" cap="rnd">
+                  <a:noFill/>
+                  <a:bevel/>
+                </a:ln>
                 <a:solidFill>
-                  <a:srgbClr val="045C75"/>
+                  <a:srgbClr val="0070C0"/>
                 </a:solidFill>
-                <a:latin typeface="Arial" charset="0"/>
-              </a:rPr>
-              <a:t>АлтГТУ им. И. И. </a:t>
-            </a:r>
-            <a:r>
-              <a:rPr lang="ru-RU" sz="1300" dirty="0" smtClean="0">
-                <a:solidFill>
-                  <a:srgbClr val="045C75"/>
-                </a:solidFill>
-                <a:latin typeface="Arial" charset="0"/>
-              </a:rPr>
-              <a:t>Ползунова / ПОВТ, Владимир Костюков</a:t>
-            </a:r>
-            <a:endParaRPr lang="en-US" sz="1300" dirty="0">
+                <a:effectLst>
+                  <a:outerShdw blurRad="50800" dist="38100" dir="5400000" algn="t" rotWithShape="0">
+                    <a:srgbClr val="0070C0">
+                      <a:alpha val="40000"/>
+                    </a:srgbClr>
+                  </a:outerShdw>
+                </a:effectLst>
+                <a:latin typeface="Arial" pitchFamily="34" charset="0"/>
+                <a:cs typeface="Arial" pitchFamily="34" charset="0"/>
+              </a:rPr>
+              <a:t>http://snoopy.googlecode.com</a:t>
+            </a:r>
+            <a:endParaRPr lang="ru-RU" dirty="0">
+              <a:ln w="0" cap="rnd">
+                <a:noFill/>
+                <a:bevel/>
+              </a:ln>
               <a:solidFill>
-                <a:srgbClr val="045C75"/>
+                <a:srgbClr val="0070C0"/>
               </a:solidFill>
-              <a:latin typeface="Arial" charset="0"/>
-            </a:endParaRPr>
-          </a:p>
-        </p:txBody>
-      </p:sp>
-      <p:sp>
-        <p:nvSpPr>
-          <p:cNvPr id="7" name="Text Box 5"/>
-          <p:cNvSpPr txBox="1">
-            <a:spLocks noChangeArrowheads="1"/>
-          </p:cNvSpPr>
-          <p:nvPr/>
-        </p:nvSpPr>
-        <p:spPr bwMode="auto">
-          <a:xfrm>
-            <a:off x="9688512" y="7266384"/>
-            <a:ext cx="360040" cy="190052"/>
-          </a:xfrm>
-          <a:prstGeom prst="rect">
-            <a:avLst/>
-          </a:prstGeom>
-          <a:noFill/>
-          <a:ln w="9525">
-            <a:noFill/>
-            <a:miter lim="800000"/>
-            <a:headEnd/>
-            <a:tailEnd/>
-          </a:ln>
-        </p:spPr>
-        <p:txBody>
-          <a:bodyPr wrap="square" lIns="0" tIns="0" rIns="0" bIns="0" anchor="b">
-            <a:spAutoFit/>
-          </a:bodyPr>
-          <a:lstStyle/>
-          <a:p>
-            <a:pPr>
-              <a:lnSpc>
-                <a:spcPct val="95000"/>
-              </a:lnSpc>
-            </a:pPr>
-            <a:r>
-              <a:rPr lang="ru-RU" sz="1300" dirty="0" smtClean="0">
-                <a:solidFill>
-                  <a:srgbClr val="045C75"/>
-                </a:solidFill>
-                <a:latin typeface="Arial" charset="0"/>
-              </a:rPr>
-              <a:t> 19</a:t>
-            </a:r>
-            <a:endParaRPr lang="en-US" sz="1300" dirty="0">
-              <a:solidFill>
-                <a:srgbClr val="045C75"/>
-              </a:solidFill>
-              <a:latin typeface="Arial" charset="0"/>
+              <a:effectLst>
+                <a:outerShdw blurRad="50800" dist="38100" dir="5400000" algn="t" rotWithShape="0">
+                  <a:srgbClr val="0070C0">
+                    <a:alpha val="40000"/>
+                  </a:srgbClr>
+                </a:outerShdw>
+              </a:effectLst>
+              <a:latin typeface="Arial" pitchFamily="34" charset="0"/>
+              <a:cs typeface="Arial" pitchFamily="34" charset="0"/>
             </a:endParaRPr>
           </a:p>
         </p:txBody>
@@ -11830,261 +11868,6 @@
           </a:graphicData>
         </a:graphic>
       </p:graphicFrame>
-    </p:spTree>
-  </p:cSld>
-  <p:clrMapOvr>
-    <a:masterClrMapping/>
-  </p:clrMapOvr>
-  <p:timing>
-    <p:tnLst>
-      <p:par>
-        <p:cTn id="1" dur="indefinite" restart="never" nodeType="tmRoot"/>
-      </p:par>
-    </p:tnLst>
-  </p:timing>
-</p:sld>
-</file>
-
-<file path=ppt/slides/slide20.xml><?xml version="1.0" encoding="utf-8"?>
-<p:sld xmlns:a="http://schemas.openxmlformats.org/drawingml/2006/main" xmlns:r="http://schemas.openxmlformats.org/officeDocument/2006/relationships" xmlns:p="http://schemas.openxmlformats.org/presentationml/2006/main">
-  <p:cSld>
-    <p:bg>
-      <p:bgPr>
-        <a:blipFill dpi="0" rotWithShape="0">
-          <a:blip r:embed="rId2" cstate="print"/>
-          <a:srcRect/>
-          <a:stretch>
-            <a:fillRect/>
-          </a:stretch>
-        </a:blipFill>
-        <a:effectLst/>
-      </p:bgPr>
-    </p:bg>
-    <p:spTree>
-      <p:nvGrpSpPr>
-        <p:cNvPr id="1" name=""/>
-        <p:cNvGrpSpPr/>
-        <p:nvPr/>
-      </p:nvGrpSpPr>
-      <p:grpSpPr>
-        <a:xfrm>
-          <a:off x="0" y="0"/>
-          <a:ext cx="0" cy="0"/>
-          <a:chOff x="0" y="0"/>
-          <a:chExt cx="0" cy="0"/>
-        </a:xfrm>
-      </p:grpSpPr>
-      <p:sp>
-        <p:nvSpPr>
-          <p:cNvPr id="7" name="TextBox 6"/>
-          <p:cNvSpPr txBox="1"/>
-          <p:nvPr/>
-        </p:nvSpPr>
-        <p:spPr>
-          <a:xfrm>
-            <a:off x="831528" y="3017912"/>
-            <a:ext cx="8640960" cy="1323439"/>
-          </a:xfrm>
-          <a:prstGeom prst="rect">
-            <a:avLst/>
-          </a:prstGeom>
-          <a:noFill/>
-        </p:spPr>
-        <p:txBody>
-          <a:bodyPr wrap="square" rtlCol="0">
-            <a:spAutoFit/>
-          </a:bodyPr>
-          <a:lstStyle/>
-          <a:p>
-            <a:pPr algn="ctr"/>
-            <a:r>
-              <a:rPr lang="ru-RU" sz="4000" dirty="0" smtClean="0">
-                <a:ln w="0" cap="rnd">
-                  <a:noFill/>
-                  <a:bevel/>
-                </a:ln>
-                <a:gradFill>
-                  <a:gsLst>
-                    <a:gs pos="100000">
-                      <a:srgbClr val="0070C0">
-                        <a:alpha val="65000"/>
-                      </a:srgbClr>
-                    </a:gs>
-                    <a:gs pos="50000">
-                      <a:schemeClr val="accent1">
-                        <a:tint val="44500"/>
-                        <a:satMod val="160000"/>
-                      </a:schemeClr>
-                    </a:gs>
-                    <a:gs pos="100000">
-                      <a:schemeClr val="accent1">
-                        <a:tint val="23500"/>
-                        <a:satMod val="160000"/>
-                      </a:schemeClr>
-                    </a:gs>
-                  </a:gsLst>
-                  <a:lin ang="5400000" scaled="0"/>
-                </a:gradFill>
-                <a:effectLst>
-                  <a:outerShdw blurRad="50800" dist="38100" dir="5400000" algn="t" rotWithShape="0">
-                    <a:prstClr val="black">
-                      <a:alpha val="40000"/>
-                    </a:prstClr>
-                  </a:outerShdw>
-                </a:effectLst>
-                <a:latin typeface="Arial" pitchFamily="34" charset="0"/>
-                <a:cs typeface="Arial" pitchFamily="34" charset="0"/>
-              </a:rPr>
-              <a:t>Спасибо!</a:t>
-            </a:r>
-          </a:p>
-          <a:p>
-            <a:pPr algn="ctr"/>
-            <a:r>
-              <a:rPr lang="ru-RU" sz="4000" dirty="0" smtClean="0">
-                <a:ln w="0" cap="rnd">
-                  <a:noFill/>
-                  <a:bevel/>
-                </a:ln>
-                <a:gradFill>
-                  <a:gsLst>
-                    <a:gs pos="100000">
-                      <a:srgbClr val="0070C0">
-                        <a:alpha val="65000"/>
-                      </a:srgbClr>
-                    </a:gs>
-                    <a:gs pos="50000">
-                      <a:schemeClr val="accent1">
-                        <a:tint val="44500"/>
-                        <a:satMod val="160000"/>
-                      </a:schemeClr>
-                    </a:gs>
-                    <a:gs pos="100000">
-                      <a:schemeClr val="accent1">
-                        <a:tint val="23500"/>
-                        <a:satMod val="160000"/>
-                      </a:schemeClr>
-                    </a:gs>
-                  </a:gsLst>
-                  <a:lin ang="5400000" scaled="0"/>
-                </a:gradFill>
-                <a:effectLst>
-                  <a:outerShdw blurRad="50800" dist="38100" dir="5400000" algn="t" rotWithShape="0">
-                    <a:prstClr val="black">
-                      <a:alpha val="40000"/>
-                    </a:prstClr>
-                  </a:outerShdw>
-                </a:effectLst>
-                <a:latin typeface="Arial" pitchFamily="34" charset="0"/>
-                <a:cs typeface="Arial" pitchFamily="34" charset="0"/>
-              </a:rPr>
-              <a:t>Вопросы?</a:t>
-            </a:r>
-            <a:endParaRPr lang="ru-RU" sz="4000" dirty="0">
-              <a:ln w="0" cap="rnd">
-                <a:noFill/>
-                <a:bevel/>
-              </a:ln>
-              <a:gradFill>
-                <a:gsLst>
-                  <a:gs pos="100000">
-                    <a:srgbClr val="0070C0">
-                      <a:alpha val="65000"/>
-                    </a:srgbClr>
-                  </a:gs>
-                  <a:gs pos="50000">
-                    <a:schemeClr val="accent1">
-                      <a:tint val="44500"/>
-                      <a:satMod val="160000"/>
-                    </a:schemeClr>
-                  </a:gs>
-                  <a:gs pos="100000">
-                    <a:schemeClr val="accent1">
-                      <a:tint val="23500"/>
-                      <a:satMod val="160000"/>
-                    </a:schemeClr>
-                  </a:gs>
-                </a:gsLst>
-                <a:lin ang="5400000" scaled="0"/>
-              </a:gradFill>
-              <a:effectLst>
-                <a:outerShdw blurRad="50800" dist="38100" dir="5400000" algn="t" rotWithShape="0">
-                  <a:prstClr val="black">
-                    <a:alpha val="40000"/>
-                  </a:prstClr>
-                </a:outerShdw>
-              </a:effectLst>
-              <a:latin typeface="Arial" pitchFamily="34" charset="0"/>
-              <a:cs typeface="Arial" pitchFamily="34" charset="0"/>
-            </a:endParaRPr>
-          </a:p>
-        </p:txBody>
-      </p:sp>
-      <p:sp>
-        <p:nvSpPr>
-          <p:cNvPr id="4" name="TextBox 3"/>
-          <p:cNvSpPr txBox="1"/>
-          <p:nvPr/>
-        </p:nvSpPr>
-        <p:spPr>
-          <a:xfrm>
-            <a:off x="975544" y="6978352"/>
-            <a:ext cx="8640960" cy="461665"/>
-          </a:xfrm>
-          <a:prstGeom prst="rect">
-            <a:avLst/>
-          </a:prstGeom>
-          <a:noFill/>
-        </p:spPr>
-        <p:txBody>
-          <a:bodyPr wrap="square" rtlCol="0">
-            <a:spAutoFit/>
-          </a:bodyPr>
-          <a:lstStyle/>
-          <a:p>
-            <a:pPr algn="ctr"/>
-            <a:r>
-              <a:rPr lang="en-US" dirty="0" smtClean="0">
-                <a:ln w="0" cap="rnd">
-                  <a:noFill/>
-                  <a:bevel/>
-                </a:ln>
-                <a:solidFill>
-                  <a:srgbClr val="0070C0"/>
-                </a:solidFill>
-                <a:effectLst>
-                  <a:outerShdw blurRad="50800" dist="38100" dir="5400000" algn="t" rotWithShape="0">
-                    <a:srgbClr val="0070C0">
-                      <a:alpha val="40000"/>
-                    </a:srgbClr>
-                  </a:outerShdw>
-                </a:effectLst>
-                <a:latin typeface="Arial" pitchFamily="34" charset="0"/>
-                <a:cs typeface="Arial" pitchFamily="34" charset="0"/>
-              </a:rPr>
-              <a:t>http://snoopy.googlecode.com</a:t>
-            </a:r>
-            <a:endParaRPr lang="ru-RU" dirty="0">
-              <a:ln w="0" cap="rnd">
-                <a:noFill/>
-                <a:bevel/>
-              </a:ln>
-              <a:solidFill>
-                <a:srgbClr val="0070C0"/>
-              </a:solidFill>
-              <a:effectLst>
-                <a:outerShdw blurRad="50800" dist="38100" dir="5400000" algn="t" rotWithShape="0">
-                  <a:srgbClr val="0070C0">
-                    <a:alpha val="40000"/>
-                  </a:srgbClr>
-                </a:outerShdw>
-              </a:effectLst>
-              <a:latin typeface="Arial" pitchFamily="34" charset="0"/>
-              <a:cs typeface="Arial" pitchFamily="34" charset="0"/>
-            </a:endParaRPr>
-          </a:p>
-        </p:txBody>
-      </p:sp>
     </p:spTree>
   </p:cSld>
   <p:clrMapOvr>
@@ -14998,7 +14781,7 @@
         </p:nvSpPr>
         <p:spPr bwMode="auto">
           <a:xfrm>
-            <a:off x="327472" y="2434297"/>
+            <a:off x="327472" y="2009800"/>
             <a:ext cx="4176464" cy="1015663"/>
           </a:xfrm>
           <a:prstGeom prst="rect">
@@ -15028,7 +14811,7 @@
               <a:rPr lang="ru-RU" sz="2000" dirty="0" smtClean="0">
                 <a:latin typeface="Calibri" pitchFamily="34" charset="0"/>
               </a:rPr>
-              <a:t> – набор примитивов и механизмов используемых подсистемами службы: </a:t>
+              <a:t> – набор примитивов и механизмов используемых подсистемами службы. </a:t>
             </a:r>
             <a:endParaRPr lang="ru-RU" sz="2000" dirty="0">
               <a:latin typeface="Calibri" pitchFamily="34" charset="0"/>
@@ -15046,8 +14829,8 @@
         </p:nvSpPr>
         <p:spPr bwMode="auto">
           <a:xfrm>
-            <a:off x="471488" y="3810000"/>
-            <a:ext cx="4176464" cy="1938992"/>
+            <a:off x="615504" y="3089920"/>
+            <a:ext cx="3816424" cy="2123658"/>
           </a:xfrm>
           <a:prstGeom prst="rect">
             <a:avLst/>
@@ -15080,13 +14863,19 @@
               <a:rPr lang="ru-RU" sz="2000" b="1" dirty="0" smtClean="0">
                 <a:latin typeface="Calibri" pitchFamily="34" charset="0"/>
               </a:rPr>
-              <a:t>генерация</a:t>
+              <a:t>управление </a:t>
             </a:r>
             <a:r>
               <a:rPr lang="ru-RU" sz="2000" dirty="0" smtClean="0">
                 <a:latin typeface="Calibri" pitchFamily="34" charset="0"/>
               </a:rPr>
-              <a:t> событий;</a:t>
+              <a:t>драйверами</a:t>
+            </a:r>
+            <a:r>
+              <a:rPr lang="ru-RU" sz="2000" b="1" dirty="0" smtClean="0">
+                <a:latin typeface="Calibri" pitchFamily="34" charset="0"/>
+              </a:rPr>
+              <a:t>;</a:t>
             </a:r>
           </a:p>
           <a:p>
@@ -15094,36 +14883,9 @@
               <a:buFont typeface="Arial" pitchFamily="34" charset="0"/>
               <a:buChar char="•"/>
             </a:pPr>
-            <a:r>
-              <a:rPr lang="ru-RU" sz="2000" dirty="0" smtClean="0">
-                <a:latin typeface="Calibri" pitchFamily="34" charset="0"/>
-              </a:rPr>
-              <a:t> </a:t>
-            </a:r>
-            <a:r>
-              <a:rPr lang="ru-RU" sz="2000" b="1" dirty="0" smtClean="0">
-                <a:latin typeface="Calibri" pitchFamily="34" charset="0"/>
-              </a:rPr>
-              <a:t>загрузка</a:t>
-            </a:r>
-            <a:r>
-              <a:rPr lang="ru-RU" sz="2000" dirty="0" smtClean="0">
-                <a:latin typeface="Calibri" pitchFamily="34" charset="0"/>
-              </a:rPr>
-              <a:t>/</a:t>
-            </a:r>
-            <a:r>
-              <a:rPr lang="ru-RU" sz="2000" b="1" dirty="0" smtClean="0">
-                <a:latin typeface="Calibri" pitchFamily="34" charset="0"/>
-              </a:rPr>
-              <a:t>выгрузка</a:t>
-            </a:r>
-            <a:r>
-              <a:rPr lang="ru-RU" sz="2000" dirty="0" smtClean="0">
-                <a:latin typeface="Calibri" pitchFamily="34" charset="0"/>
-              </a:rPr>
-              <a:t> драйверов;</a:t>
-            </a:r>
+            <a:endParaRPr lang="ru-RU" sz="800" dirty="0" smtClean="0">
+              <a:latin typeface="Calibri" pitchFamily="34" charset="0"/>
+            </a:endParaRPr>
           </a:p>
           <a:p>
             <a:pPr>
@@ -15131,22 +14893,16 @@
               <a:buChar char="•"/>
             </a:pPr>
             <a:r>
+              <a:rPr lang="ru-RU" sz="2000" b="1" dirty="0" smtClean="0">
+                <a:latin typeface="Calibri" pitchFamily="34" charset="0"/>
+              </a:rPr>
+              <a:t> генерация</a:t>
+            </a:r>
+            <a:r>
               <a:rPr lang="ru-RU" sz="2000" dirty="0" smtClean="0">
                 <a:latin typeface="Calibri" pitchFamily="34" charset="0"/>
               </a:rPr>
-              <a:t> </a:t>
-            </a:r>
-            <a:r>
-              <a:rPr lang="ru-RU" sz="2000" b="1" dirty="0" smtClean="0">
-                <a:latin typeface="Calibri" pitchFamily="34" charset="0"/>
-              </a:rPr>
-              <a:t>управление</a:t>
-            </a:r>
-            <a:r>
-              <a:rPr lang="ru-RU" sz="2000" dirty="0" smtClean="0">
-                <a:latin typeface="Calibri" pitchFamily="34" charset="0"/>
-              </a:rPr>
-              <a:t> адаптерами;</a:t>
+              <a:t> событий;</a:t>
             </a:r>
           </a:p>
           <a:p>
@@ -15154,24 +14910,9 @@
               <a:buFont typeface="Arial" pitchFamily="34" charset="0"/>
               <a:buChar char="•"/>
             </a:pPr>
-            <a:r>
-              <a:rPr lang="ru-RU" sz="2000" dirty="0" smtClean="0">
-                <a:latin typeface="Calibri" pitchFamily="34" charset="0"/>
-              </a:rPr>
-              <a:t> </a:t>
-            </a:r>
-            <a:r>
-              <a:rPr lang="ru-RU" sz="2000" b="1" dirty="0" smtClean="0">
-                <a:latin typeface="Calibri" pitchFamily="34" charset="0"/>
-              </a:rPr>
-              <a:t>инициализация</a:t>
-            </a:r>
-            <a:r>
-              <a:rPr lang="ru-RU" sz="2000" dirty="0" smtClean="0">
-                <a:latin typeface="Calibri" pitchFamily="34" charset="0"/>
-              </a:rPr>
-              <a:t> сессий;</a:t>
-            </a:r>
+            <a:endParaRPr lang="ru-RU" sz="800" dirty="0" smtClean="0">
+              <a:latin typeface="Calibri" pitchFamily="34" charset="0"/>
+            </a:endParaRPr>
           </a:p>
           <a:p>
             <a:pPr>
@@ -15179,22 +14920,16 @@
               <a:buChar char="•"/>
             </a:pPr>
             <a:r>
+              <a:rPr lang="ru-RU" sz="2000" b="1" dirty="0" smtClean="0">
+                <a:latin typeface="Calibri" pitchFamily="34" charset="0"/>
+              </a:rPr>
+              <a:t> управление</a:t>
+            </a:r>
+            <a:r>
               <a:rPr lang="ru-RU" sz="2000" dirty="0" smtClean="0">
                 <a:latin typeface="Calibri" pitchFamily="34" charset="0"/>
               </a:rPr>
-              <a:t> </a:t>
-            </a:r>
-            <a:r>
-              <a:rPr lang="ru-RU" sz="2000" b="1" dirty="0" smtClean="0">
-                <a:latin typeface="Calibri" pitchFamily="34" charset="0"/>
-              </a:rPr>
-              <a:t>синхронизация</a:t>
-            </a:r>
-            <a:r>
-              <a:rPr lang="ru-RU" sz="2000" dirty="0" smtClean="0">
-                <a:latin typeface="Calibri" pitchFamily="34" charset="0"/>
-              </a:rPr>
-              <a:t> потоков;</a:t>
+              <a:t> адаптерами;</a:t>
             </a:r>
           </a:p>
           <a:p>
@@ -15202,9 +14937,66 @@
               <a:buFont typeface="Arial" pitchFamily="34" charset="0"/>
               <a:buChar char="•"/>
             </a:pPr>
-            <a:endParaRPr lang="ru-RU" sz="2000" dirty="0" smtClean="0">
+            <a:endParaRPr lang="ru-RU" sz="800" dirty="0" smtClean="0">
               <a:latin typeface="Calibri" pitchFamily="34" charset="0"/>
             </a:endParaRPr>
+          </a:p>
+          <a:p>
+            <a:pPr>
+              <a:buFont typeface="Arial" pitchFamily="34" charset="0"/>
+              <a:buChar char="•"/>
+            </a:pPr>
+            <a:r>
+              <a:rPr lang="ru-RU" sz="2000" dirty="0" smtClean="0">
+                <a:latin typeface="Calibri" pitchFamily="34" charset="0"/>
+              </a:rPr>
+              <a:t> </a:t>
+            </a:r>
+            <a:r>
+              <a:rPr lang="ru-RU" sz="2000" b="1" dirty="0" smtClean="0">
+                <a:latin typeface="Calibri" pitchFamily="34" charset="0"/>
+              </a:rPr>
+              <a:t>инициализация</a:t>
+            </a:r>
+            <a:r>
+              <a:rPr lang="ru-RU" sz="2000" dirty="0" smtClean="0">
+                <a:latin typeface="Calibri" pitchFamily="34" charset="0"/>
+              </a:rPr>
+              <a:t> сессий;</a:t>
+            </a:r>
+          </a:p>
+          <a:p>
+            <a:pPr>
+              <a:buFont typeface="Arial" pitchFamily="34" charset="0"/>
+              <a:buChar char="•"/>
+            </a:pPr>
+            <a:endParaRPr lang="ru-RU" sz="800" dirty="0" smtClean="0">
+              <a:latin typeface="Calibri" pitchFamily="34" charset="0"/>
+            </a:endParaRPr>
+          </a:p>
+          <a:p>
+            <a:pPr>
+              <a:buFont typeface="Arial" pitchFamily="34" charset="0"/>
+              <a:buChar char="•"/>
+            </a:pPr>
+            <a:r>
+              <a:rPr lang="ru-RU" sz="2000" dirty="0" smtClean="0">
+                <a:latin typeface="Calibri" pitchFamily="34" charset="0"/>
+              </a:rPr>
+              <a:t> </a:t>
+            </a:r>
+            <a:r>
+              <a:rPr lang="ru-RU" sz="2000" b="1" dirty="0" smtClean="0">
+                <a:latin typeface="Calibri" pitchFamily="34" charset="0"/>
+              </a:rPr>
+              <a:t>синхронизация</a:t>
+            </a:r>
+            <a:r>
+              <a:rPr lang="ru-RU" sz="2000" dirty="0" smtClean="0">
+                <a:latin typeface="Calibri" pitchFamily="34" charset="0"/>
+              </a:rPr>
+              <a:t> потоков;</a:t>
+            </a:r>
           </a:p>
         </p:txBody>
       </p:sp>
@@ -15343,6 +15135,132 @@
                 <a:srgbClr val="045C75"/>
               </a:solidFill>
               <a:latin typeface="Arial" charset="0"/>
+            </a:endParaRPr>
+          </a:p>
+        </p:txBody>
+      </p:sp>
+      <p:sp>
+        <p:nvSpPr>
+          <p:cNvPr id="13" name="TextBox 13"/>
+          <p:cNvSpPr txBox="1">
+            <a:spLocks noChangeArrowheads="1"/>
+          </p:cNvSpPr>
+          <p:nvPr/>
+        </p:nvSpPr>
+        <p:spPr bwMode="auto">
+          <a:xfrm>
+            <a:off x="327472" y="5322168"/>
+            <a:ext cx="4176464" cy="707886"/>
+          </a:xfrm>
+          <a:prstGeom prst="rect">
+            <a:avLst/>
+          </a:prstGeom>
+          <a:noFill/>
+          <a:ln w="9525">
+            <a:noFill/>
+            <a:miter lim="800000"/>
+            <a:headEnd/>
+            <a:tailEnd/>
+          </a:ln>
+        </p:spPr>
+        <p:txBody>
+          <a:bodyPr wrap="square">
+            <a:spAutoFit/>
+          </a:bodyPr>
+          <a:lstStyle/>
+          <a:p>
+            <a:r>
+              <a:rPr lang="ru-RU" sz="2000" b="1" dirty="0" smtClean="0">
+                <a:latin typeface="Calibri" pitchFamily="34" charset="0"/>
+              </a:rPr>
+              <a:t>Драйвер </a:t>
+            </a:r>
+            <a:r>
+              <a:rPr lang="ru-RU" sz="2000" dirty="0" smtClean="0">
+                <a:latin typeface="Calibri" pitchFamily="34" charset="0"/>
+              </a:rPr>
+              <a:t>– сущность расширяющая функционал ядра.</a:t>
+            </a:r>
+            <a:endParaRPr lang="ru-RU" sz="2000" dirty="0">
+              <a:latin typeface="Calibri" pitchFamily="34" charset="0"/>
+            </a:endParaRPr>
+          </a:p>
+        </p:txBody>
+      </p:sp>
+      <p:sp>
+        <p:nvSpPr>
+          <p:cNvPr id="14" name="TextBox 13"/>
+          <p:cNvSpPr txBox="1">
+            <a:spLocks noChangeArrowheads="1"/>
+          </p:cNvSpPr>
+          <p:nvPr/>
+        </p:nvSpPr>
+        <p:spPr bwMode="auto">
+          <a:xfrm>
+            <a:off x="327472" y="6114256"/>
+            <a:ext cx="9073008" cy="1015663"/>
+          </a:xfrm>
+          <a:prstGeom prst="rect">
+            <a:avLst/>
+          </a:prstGeom>
+          <a:noFill/>
+          <a:ln w="9525">
+            <a:noFill/>
+            <a:miter lim="800000"/>
+            <a:headEnd/>
+            <a:tailEnd/>
+          </a:ln>
+        </p:spPr>
+        <p:txBody>
+          <a:bodyPr wrap="square">
+            <a:spAutoFit/>
+          </a:bodyPr>
+          <a:lstStyle/>
+          <a:p>
+            <a:r>
+              <a:rPr lang="ru-RU" sz="2000" b="1" dirty="0" smtClean="0">
+                <a:latin typeface="Calibri" pitchFamily="34" charset="0"/>
+              </a:rPr>
+              <a:t>Событие </a:t>
+            </a:r>
+            <a:r>
+              <a:rPr lang="ru-RU" sz="2000" dirty="0" smtClean="0">
+                <a:latin typeface="Calibri" pitchFamily="34" charset="0"/>
+              </a:rPr>
+              <a:t>– </a:t>
+            </a:r>
+          </a:p>
+          <a:p>
+            <a:pPr lvl="1">
+              <a:buFont typeface="Arial" pitchFamily="34" charset="0"/>
+              <a:buChar char="•"/>
+            </a:pPr>
+            <a:r>
+              <a:rPr lang="ru-RU" sz="2000" dirty="0" smtClean="0">
+                <a:latin typeface="Calibri" pitchFamily="34" charset="0"/>
+              </a:rPr>
+              <a:t> </a:t>
+            </a:r>
+            <a:r>
+              <a:rPr lang="ru-RU" sz="2000" dirty="0" smtClean="0">
+                <a:latin typeface="Calibri" pitchFamily="34" charset="0"/>
+              </a:rPr>
+              <a:t>унифицированный протокол обмена данными между драйверами;</a:t>
+            </a:r>
+          </a:p>
+          <a:p>
+            <a:pPr lvl="1">
+              <a:buFont typeface="Arial" pitchFamily="34" charset="0"/>
+              <a:buChar char="•"/>
+            </a:pPr>
+            <a:r>
+              <a:rPr lang="ru-RU" sz="2000" dirty="0" smtClean="0">
+                <a:latin typeface="Calibri" pitchFamily="34" charset="0"/>
+              </a:rPr>
+              <a:t> меманизм изменения состояния ядра;</a:t>
+            </a:r>
+            <a:endParaRPr lang="ru-RU" sz="2000" dirty="0">
+              <a:latin typeface="Calibri" pitchFamily="34" charset="0"/>
             </a:endParaRPr>
           </a:p>
         </p:txBody>

</xml_diff>

<commit_message>
More problems was fixed
</commit_message>
<xml_diff>
--- a/diploma/trunk/ppt/kostyukov.pptx
+++ b/diploma/trunk/ppt/kostyukov.pptx
@@ -8023,8 +8023,8 @@
         </p:nvSpPr>
         <p:spPr bwMode="auto">
           <a:xfrm>
-            <a:off x="471488" y="1937792"/>
-            <a:ext cx="3096344" cy="2277547"/>
+            <a:off x="399480" y="2297832"/>
+            <a:ext cx="3096344" cy="2585323"/>
           </a:xfrm>
           <a:prstGeom prst="rect">
             <a:avLst/>
@@ -8043,12 +8043,26 @@
           </a:bodyPr>
           <a:lstStyle/>
           <a:p>
+            <a:r>
+              <a:rPr lang="ru-RU" sz="2000" b="1" dirty="0" smtClean="0">
+                <a:latin typeface="Calibri" pitchFamily="34" charset="0"/>
+              </a:rPr>
+              <a:t>Типы</a:t>
+            </a:r>
+            <a:r>
+              <a:rPr lang="ru-RU" sz="2000" dirty="0" smtClean="0">
+                <a:latin typeface="Calibri" pitchFamily="34" charset="0"/>
+              </a:rPr>
+              <a:t> состояний: </a:t>
+            </a:r>
+          </a:p>
+          <a:p>
             <a:endParaRPr lang="ru-RU" sz="1000" dirty="0" smtClean="0">
               <a:latin typeface="Calibri" pitchFamily="34" charset="0"/>
             </a:endParaRPr>
           </a:p>
           <a:p>
-            <a:pPr>
+            <a:pPr lvl="1">
               <a:buFont typeface="Arial" pitchFamily="34" charset="0"/>
               <a:buChar char="•"/>
             </a:pPr>
@@ -8062,16 +8076,20 @@
               <a:rPr lang="ru-RU" sz="2000" dirty="0" smtClean="0">
                 <a:latin typeface="Calibri" pitchFamily="34" charset="0"/>
               </a:rPr>
-              <a:t>неопределенное;</a:t>
-            </a:r>
-          </a:p>
-          <a:p>
+              <a:t>неопределенное</a:t>
+            </a:r>
+            <a:endParaRPr lang="ru-RU" sz="2000" dirty="0" smtClean="0">
+              <a:latin typeface="Calibri" pitchFamily="34" charset="0"/>
+            </a:endParaRPr>
+          </a:p>
+          <a:p>
+            <a:pPr lvl="1"/>
             <a:endParaRPr lang="ru-RU" sz="800" dirty="0" smtClean="0">
               <a:latin typeface="Calibri" pitchFamily="34" charset="0"/>
             </a:endParaRPr>
           </a:p>
           <a:p>
-            <a:pPr>
+            <a:pPr lvl="1">
               <a:buFont typeface="Arial" pitchFamily="34" charset="0"/>
               <a:buChar char="•"/>
             </a:pPr>
@@ -8079,16 +8097,26 @@
               <a:rPr lang="ru-RU" sz="2000" dirty="0" smtClean="0">
                 <a:latin typeface="Calibri" pitchFamily="34" charset="0"/>
               </a:rPr>
-              <a:t> сетевое;</a:t>
-            </a:r>
-          </a:p>
-          <a:p>
+              <a:t> </a:t>
+            </a:r>
+            <a:r>
+              <a:rPr lang="ru-RU" sz="2000" dirty="0" smtClean="0">
+                <a:latin typeface="Calibri" pitchFamily="34" charset="0"/>
+              </a:rPr>
+              <a:t>сетевое</a:t>
+            </a:r>
+            <a:endParaRPr lang="ru-RU" sz="2000" dirty="0" smtClean="0">
+              <a:latin typeface="Calibri" pitchFamily="34" charset="0"/>
+            </a:endParaRPr>
+          </a:p>
+          <a:p>
+            <a:pPr lvl="1"/>
             <a:endParaRPr lang="ru-RU" sz="800" dirty="0" smtClean="0">
               <a:latin typeface="Calibri" pitchFamily="34" charset="0"/>
             </a:endParaRPr>
           </a:p>
           <a:p>
-            <a:pPr>
+            <a:pPr lvl="1">
               <a:buFont typeface="Arial" pitchFamily="34" charset="0"/>
               <a:buChar char="•"/>
             </a:pPr>
@@ -8096,16 +8124,26 @@
               <a:rPr lang="ru-RU" sz="2000" dirty="0" smtClean="0">
                 <a:latin typeface="Calibri" pitchFamily="34" charset="0"/>
               </a:rPr>
-              <a:t> автономное;</a:t>
-            </a:r>
-          </a:p>
-          <a:p>
+              <a:t> </a:t>
+            </a:r>
+            <a:r>
+              <a:rPr lang="ru-RU" sz="2000" dirty="0" smtClean="0">
+                <a:latin typeface="Calibri" pitchFamily="34" charset="0"/>
+              </a:rPr>
+              <a:t>автономное</a:t>
+            </a:r>
+            <a:endParaRPr lang="ru-RU" sz="2000" dirty="0" smtClean="0">
+              <a:latin typeface="Calibri" pitchFamily="34" charset="0"/>
+            </a:endParaRPr>
+          </a:p>
+          <a:p>
+            <a:pPr lvl="1"/>
             <a:endParaRPr lang="ru-RU" sz="800" dirty="0" smtClean="0">
               <a:latin typeface="Calibri" pitchFamily="34" charset="0"/>
             </a:endParaRPr>
           </a:p>
           <a:p>
-            <a:pPr>
+            <a:pPr lvl="1">
               <a:buFont typeface="Arial" pitchFamily="34" charset="0"/>
               <a:buChar char="•"/>
             </a:pPr>
@@ -8113,16 +8151,26 @@
               <a:rPr lang="ru-RU" sz="2000" dirty="0" smtClean="0">
                 <a:latin typeface="Calibri" pitchFamily="34" charset="0"/>
               </a:rPr>
-              <a:t> активное;</a:t>
-            </a:r>
-          </a:p>
-          <a:p>
+              <a:t> </a:t>
+            </a:r>
+            <a:r>
+              <a:rPr lang="ru-RU" sz="2000" dirty="0" smtClean="0">
+                <a:latin typeface="Calibri" pitchFamily="34" charset="0"/>
+              </a:rPr>
+              <a:t>активное</a:t>
+            </a:r>
+            <a:endParaRPr lang="ru-RU" sz="2000" dirty="0" smtClean="0">
+              <a:latin typeface="Calibri" pitchFamily="34" charset="0"/>
+            </a:endParaRPr>
+          </a:p>
+          <a:p>
+            <a:pPr lvl="1"/>
             <a:endParaRPr lang="ru-RU" sz="800" dirty="0" smtClean="0">
               <a:latin typeface="Calibri" pitchFamily="34" charset="0"/>
             </a:endParaRPr>
           </a:p>
           <a:p>
-            <a:pPr>
+            <a:pPr lvl="1">
               <a:buFont typeface="Arial" pitchFamily="34" charset="0"/>
               <a:buChar char="•"/>
             </a:pPr>
@@ -8130,7 +8178,13 @@
               <a:rPr lang="ru-RU" sz="2000" dirty="0" smtClean="0">
                 <a:latin typeface="Calibri" pitchFamily="34" charset="0"/>
               </a:rPr>
-              <a:t> пассивное;</a:t>
+              <a:t> </a:t>
+            </a:r>
+            <a:r>
+              <a:rPr lang="ru-RU" sz="2000" dirty="0" smtClean="0">
+                <a:latin typeface="Calibri" pitchFamily="34" charset="0"/>
+              </a:rPr>
+              <a:t>пассивное</a:t>
             </a:r>
             <a:endParaRPr lang="ru-RU" sz="2000" dirty="0">
               <a:latin typeface="Calibri" pitchFamily="34" charset="0"/>
@@ -8277,6 +8331,48 @@
           </a:prstGeom>
         </p:spPr>
       </p:pic>
+      <p:sp>
+        <p:nvSpPr>
+          <p:cNvPr id="7" name="TextBox 13"/>
+          <p:cNvSpPr txBox="1">
+            <a:spLocks noChangeArrowheads="1"/>
+          </p:cNvSpPr>
+          <p:nvPr/>
+        </p:nvSpPr>
+        <p:spPr bwMode="auto">
+          <a:xfrm>
+            <a:off x="5224016" y="2153816"/>
+            <a:ext cx="2736304" cy="400110"/>
+          </a:xfrm>
+          <a:prstGeom prst="rect">
+            <a:avLst/>
+          </a:prstGeom>
+          <a:noFill/>
+          <a:ln w="9525">
+            <a:noFill/>
+            <a:miter lim="800000"/>
+            <a:headEnd/>
+            <a:tailEnd/>
+          </a:ln>
+        </p:spPr>
+        <p:txBody>
+          <a:bodyPr wrap="square">
+            <a:spAutoFit/>
+          </a:bodyPr>
+          <a:lstStyle/>
+          <a:p>
+            <a:r>
+              <a:rPr lang="ru-RU" sz="2000" i="1" dirty="0" smtClean="0">
+                <a:latin typeface="Calibri" pitchFamily="34" charset="0"/>
+              </a:rPr>
+              <a:t>Диаграмма переходов</a:t>
+            </a:r>
+            <a:endParaRPr lang="ru-RU" sz="2000" i="1" dirty="0">
+              <a:latin typeface="Calibri" pitchFamily="34" charset="0"/>
+            </a:endParaRPr>
+          </a:p>
+        </p:txBody>
+      </p:sp>
     </p:spTree>
   </p:cSld>
   <p:clrMapOvr>
@@ -8388,8 +8484,8 @@
         </p:nvSpPr>
         <p:spPr bwMode="auto">
           <a:xfrm>
-            <a:off x="5584056" y="3161928"/>
-            <a:ext cx="4392488" cy="2400657"/>
+            <a:off x="5335464" y="2729880"/>
+            <a:ext cx="4824536" cy="2862322"/>
           </a:xfrm>
           <a:prstGeom prst="rect">
             <a:avLst/>
@@ -8408,7 +8504,22 @@
           </a:bodyPr>
           <a:lstStyle/>
           <a:p>
-            <a:pPr lvl="1">
+            <a:pPr lvl="1"/>
+            <a:r>
+              <a:rPr lang="ru-RU" sz="2000" dirty="0" smtClean="0">
+                <a:latin typeface="Calibri" pitchFamily="34" charset="0"/>
+              </a:rPr>
+              <a:t>Функции подсистемы:</a:t>
+            </a:r>
+          </a:p>
+          <a:p>
+            <a:pPr lvl="1"/>
+            <a:endParaRPr lang="ru-RU" sz="1000" dirty="0" smtClean="0">
+              <a:latin typeface="Calibri" pitchFamily="34" charset="0"/>
+            </a:endParaRPr>
+          </a:p>
+          <a:p>
+            <a:pPr lvl="2">
               <a:buFont typeface="Arial" pitchFamily="34" charset="0"/>
               <a:buChar char="•"/>
             </a:pPr>
@@ -8428,14 +8539,20 @@
               <a:rPr lang="ru-RU" sz="2000" dirty="0" smtClean="0">
                 <a:latin typeface="Calibri" pitchFamily="34" charset="0"/>
               </a:rPr>
-              <a:t> сессиями;</a:t>
+              <a:t> </a:t>
+            </a:r>
+            <a:r>
+              <a:rPr lang="ru-RU" sz="2000" dirty="0" smtClean="0">
+                <a:latin typeface="Calibri" pitchFamily="34" charset="0"/>
+              </a:rPr>
+              <a:t>сессиями</a:t>
             </a:r>
             <a:endParaRPr lang="en-US" sz="2000" dirty="0" smtClean="0">
               <a:latin typeface="Calibri" pitchFamily="34" charset="0"/>
             </a:endParaRPr>
           </a:p>
           <a:p>
-            <a:pPr lvl="1">
+            <a:pPr lvl="2">
               <a:buFont typeface="Arial" pitchFamily="34" charset="0"/>
               <a:buChar char="•"/>
             </a:pPr>
@@ -8444,7 +8561,7 @@
             </a:endParaRPr>
           </a:p>
           <a:p>
-            <a:pPr lvl="1">
+            <a:pPr lvl="2">
               <a:buFont typeface="Arial" pitchFamily="34" charset="0"/>
               <a:buChar char="•"/>
             </a:pPr>
@@ -8464,14 +8581,20 @@
               <a:rPr lang="ru-RU" sz="2000" dirty="0" smtClean="0">
                 <a:latin typeface="Calibri" pitchFamily="34" charset="0"/>
               </a:rPr>
-              <a:t> сетевой активности;</a:t>
+              <a:t> сетевой </a:t>
+            </a:r>
+            <a:r>
+              <a:rPr lang="ru-RU" sz="2000" dirty="0" smtClean="0">
+                <a:latin typeface="Calibri" pitchFamily="34" charset="0"/>
+              </a:rPr>
+              <a:t>активности</a:t>
             </a:r>
             <a:endParaRPr lang="en-US" sz="2000" dirty="0" smtClean="0">
               <a:latin typeface="Calibri" pitchFamily="34" charset="0"/>
             </a:endParaRPr>
           </a:p>
           <a:p>
-            <a:pPr lvl="1">
+            <a:pPr lvl="2">
               <a:buFont typeface="Arial" pitchFamily="34" charset="0"/>
               <a:buChar char="•"/>
             </a:pPr>
@@ -8480,7 +8603,7 @@
             </a:endParaRPr>
           </a:p>
           <a:p>
-            <a:pPr lvl="1">
+            <a:pPr lvl="2">
               <a:buFont typeface="Arial" pitchFamily="34" charset="0"/>
               <a:buChar char="•"/>
             </a:pPr>
@@ -8500,14 +8623,20 @@
               <a:rPr lang="ru-RU" sz="2000" dirty="0" smtClean="0">
                 <a:latin typeface="Calibri" pitchFamily="34" charset="0"/>
               </a:rPr>
-              <a:t> объектов;</a:t>
+              <a:t> </a:t>
+            </a:r>
+            <a:r>
+              <a:rPr lang="ru-RU" sz="2000" dirty="0" smtClean="0">
+                <a:latin typeface="Calibri" pitchFamily="34" charset="0"/>
+              </a:rPr>
+              <a:t>объектов</a:t>
             </a:r>
             <a:endParaRPr lang="en-US" sz="2000" dirty="0" smtClean="0">
               <a:latin typeface="Calibri" pitchFamily="34" charset="0"/>
             </a:endParaRPr>
           </a:p>
           <a:p>
-            <a:pPr lvl="1">
+            <a:pPr lvl="2">
               <a:buFont typeface="Arial" pitchFamily="34" charset="0"/>
               <a:buChar char="•"/>
             </a:pPr>
@@ -8516,7 +8645,7 @@
             </a:endParaRPr>
           </a:p>
           <a:p>
-            <a:pPr lvl="1">
+            <a:pPr lvl="2">
               <a:buFont typeface="Arial" pitchFamily="34" charset="0"/>
               <a:buChar char="•"/>
             </a:pPr>
@@ -8532,18 +8661,12 @@
               </a:rPr>
               <a:t>адресация</a:t>
             </a:r>
-            <a:r>
-              <a:rPr lang="ru-RU" sz="2000" dirty="0" smtClean="0">
-                <a:latin typeface="Calibri" pitchFamily="34" charset="0"/>
-              </a:rPr>
-              <a:t>;</a:t>
-            </a:r>
             <a:endParaRPr lang="en-US" sz="2000" dirty="0" smtClean="0">
               <a:latin typeface="Calibri" pitchFamily="34" charset="0"/>
             </a:endParaRPr>
           </a:p>
           <a:p>
-            <a:pPr lvl="1">
+            <a:pPr lvl="2">
               <a:buFont typeface="Arial" pitchFamily="34" charset="0"/>
               <a:buChar char="•"/>
             </a:pPr>
@@ -8552,7 +8675,7 @@
             </a:endParaRPr>
           </a:p>
           <a:p>
-            <a:pPr lvl="1">
+            <a:pPr lvl="2">
               <a:buFont typeface="Arial" pitchFamily="34" charset="0"/>
               <a:buChar char="•"/>
             </a:pPr>
@@ -8566,14 +8689,14 @@
               <a:rPr lang="ru-RU" sz="2000" dirty="0" smtClean="0">
                 <a:latin typeface="Calibri" pitchFamily="34" charset="0"/>
               </a:rPr>
-              <a:t>нагрузки;</a:t>
+              <a:t>нагрузки</a:t>
             </a:r>
             <a:endParaRPr lang="en-US" sz="2000" dirty="0" smtClean="0">
               <a:latin typeface="Calibri" pitchFamily="34" charset="0"/>
             </a:endParaRPr>
           </a:p>
           <a:p>
-            <a:pPr lvl="1">
+            <a:pPr lvl="2">
               <a:buFont typeface="Arial" pitchFamily="34" charset="0"/>
               <a:buChar char="•"/>
             </a:pPr>
@@ -8582,7 +8705,7 @@
             </a:endParaRPr>
           </a:p>
           <a:p>
-            <a:pPr lvl="1">
+            <a:pPr lvl="2">
               <a:buFont typeface="Arial" pitchFamily="34" charset="0"/>
               <a:buChar char="•"/>
             </a:pPr>
@@ -8596,13 +8719,13 @@
               <a:rPr lang="ru-RU" sz="2000" b="1" dirty="0" smtClean="0">
                 <a:latin typeface="Calibri" pitchFamily="34" charset="0"/>
               </a:rPr>
-              <a:t>выбор лидеров</a:t>
-            </a:r>
-            <a:r>
-              <a:rPr lang="ru-RU" sz="2000" dirty="0" smtClean="0">
-                <a:latin typeface="Calibri" pitchFamily="34" charset="0"/>
-              </a:rPr>
-              <a:t>;</a:t>
+              <a:t>выбор </a:t>
+            </a:r>
+            <a:r>
+              <a:rPr lang="ru-RU" sz="2000" b="1" dirty="0" smtClean="0">
+                <a:latin typeface="Calibri" pitchFamily="34" charset="0"/>
+              </a:rPr>
+              <a:t>лидеров</a:t>
             </a:r>
             <a:endParaRPr lang="ru-RU" sz="2000" dirty="0">
               <a:latin typeface="Calibri" pitchFamily="34" charset="0"/>
@@ -9100,8 +9223,8 @@
         </p:nvSpPr>
         <p:spPr bwMode="auto">
           <a:xfrm>
-            <a:off x="687512" y="3161928"/>
-            <a:ext cx="3744416" cy="2285241"/>
+            <a:off x="183456" y="2945904"/>
+            <a:ext cx="4392488" cy="2408352"/>
           </a:xfrm>
           <a:prstGeom prst="rect">
             <a:avLst/>
@@ -9120,12 +9243,20 @@
           </a:bodyPr>
           <a:lstStyle/>
           <a:p>
-            <a:endParaRPr lang="ru-RU" sz="1000" dirty="0" smtClean="0">
+            <a:r>
+              <a:rPr lang="ru-RU" sz="2000" dirty="0" smtClean="0">
+                <a:latin typeface="Calibri" pitchFamily="34" charset="0"/>
+              </a:rPr>
+              <a:t>Функции подсистемы:</a:t>
+            </a:r>
+          </a:p>
+          <a:p>
+            <a:endParaRPr lang="ru-RU" sz="2000" dirty="0" smtClean="0">
               <a:latin typeface="Calibri" pitchFamily="34" charset="0"/>
             </a:endParaRPr>
           </a:p>
           <a:p>
-            <a:pPr>
+            <a:pPr lvl="1">
               <a:buFont typeface="Arial" pitchFamily="34" charset="0"/>
               <a:buChar char="•"/>
             </a:pPr>
@@ -9145,11 +9276,20 @@
               <a:rPr lang="ru-RU" sz="2000" dirty="0" smtClean="0">
                 <a:latin typeface="Calibri" pitchFamily="34" charset="0"/>
               </a:rPr>
-              <a:t> запусков;</a:t>
-            </a:r>
-          </a:p>
-          <a:p>
-            <a:pPr>
+              <a:t> </a:t>
+            </a:r>
+            <a:r>
+              <a:rPr lang="ru-RU" sz="2000" dirty="0" smtClean="0">
+                <a:latin typeface="Calibri" pitchFamily="34" charset="0"/>
+              </a:rPr>
+              <a:t>запусков</a:t>
+            </a:r>
+            <a:endParaRPr lang="ru-RU" sz="2000" dirty="0" smtClean="0">
+              <a:latin typeface="Calibri" pitchFamily="34" charset="0"/>
+            </a:endParaRPr>
+          </a:p>
+          <a:p>
+            <a:pPr lvl="1">
               <a:buFont typeface="Arial" pitchFamily="34" charset="0"/>
               <a:buChar char="•"/>
             </a:pPr>
@@ -9158,7 +9298,7 @@
             </a:endParaRPr>
           </a:p>
           <a:p>
-            <a:pPr>
+            <a:pPr lvl="1">
               <a:buFont typeface="Arial" pitchFamily="34" charset="0"/>
               <a:buChar char="•"/>
             </a:pPr>
@@ -9178,11 +9318,20 @@
               <a:rPr lang="ru-RU" sz="2000" dirty="0" smtClean="0">
                 <a:latin typeface="Calibri" pitchFamily="34" charset="0"/>
               </a:rPr>
-              <a:t> модулей мониторига;</a:t>
-            </a:r>
-          </a:p>
-          <a:p>
-            <a:pPr>
+              <a:t> модулей </a:t>
+            </a:r>
+            <a:r>
+              <a:rPr lang="ru-RU" sz="2000" dirty="0" smtClean="0">
+                <a:latin typeface="Calibri" pitchFamily="34" charset="0"/>
+              </a:rPr>
+              <a:t>мониторига</a:t>
+            </a:r>
+            <a:endParaRPr lang="ru-RU" sz="2000" dirty="0" smtClean="0">
+              <a:latin typeface="Calibri" pitchFamily="34" charset="0"/>
+            </a:endParaRPr>
+          </a:p>
+          <a:p>
+            <a:pPr lvl="1">
               <a:buFont typeface="Arial" pitchFamily="34" charset="0"/>
               <a:buChar char="•"/>
             </a:pPr>
@@ -9191,7 +9340,7 @@
             </a:endParaRPr>
           </a:p>
           <a:p>
-            <a:pPr>
+            <a:pPr lvl="1">
               <a:buFont typeface="Arial" pitchFamily="34" charset="0"/>
               <a:buChar char="•"/>
             </a:pPr>
@@ -9211,11 +9360,20 @@
               <a:rPr lang="ru-RU" sz="2000" dirty="0" smtClean="0">
                 <a:latin typeface="Calibri" pitchFamily="34" charset="0"/>
               </a:rPr>
-              <a:t> результатов;</a:t>
-            </a:r>
-          </a:p>
-          <a:p>
-            <a:pPr>
+              <a:t> </a:t>
+            </a:r>
+            <a:r>
+              <a:rPr lang="ru-RU" sz="2000" dirty="0" smtClean="0">
+                <a:latin typeface="Calibri" pitchFamily="34" charset="0"/>
+              </a:rPr>
+              <a:t>результатов</a:t>
+            </a:r>
+            <a:endParaRPr lang="ru-RU" sz="2000" dirty="0" smtClean="0">
+              <a:latin typeface="Calibri" pitchFamily="34" charset="0"/>
+            </a:endParaRPr>
+          </a:p>
+          <a:p>
+            <a:pPr lvl="1">
               <a:buFont typeface="Arial" pitchFamily="34" charset="0"/>
               <a:buChar char="•"/>
             </a:pPr>
@@ -9224,7 +9382,7 @@
             </a:endParaRPr>
           </a:p>
           <a:p>
-            <a:pPr>
+            <a:pPr lvl="1">
               <a:buFont typeface="Arial" pitchFamily="34" charset="0"/>
               <a:buChar char="•"/>
             </a:pPr>
@@ -9244,14 +9402,14 @@
               <a:rPr lang="ru-RU" sz="2000" dirty="0" smtClean="0">
                 <a:latin typeface="Calibri" pitchFamily="34" charset="0"/>
               </a:rPr>
-              <a:t> модулей;</a:t>
-            </a:r>
-          </a:p>
-          <a:p>
-            <a:pPr>
-              <a:buFont typeface="Arial" pitchFamily="34" charset="0"/>
-              <a:buChar char="•"/>
-            </a:pPr>
+              <a:t> </a:t>
+            </a:r>
+            <a:r>
+              <a:rPr lang="ru-RU" sz="2000" dirty="0" smtClean="0">
+                <a:latin typeface="Calibri" pitchFamily="34" charset="0"/>
+              </a:rPr>
+              <a:t>модулей</a:t>
+            </a:r>
             <a:endParaRPr lang="ru-RU" sz="2200" dirty="0" smtClean="0">
               <a:latin typeface="Calibri" pitchFamily="34" charset="0"/>
             </a:endParaRPr>
@@ -9623,7 +9781,7 @@
         </p:nvSpPr>
         <p:spPr bwMode="auto">
           <a:xfrm>
-            <a:off x="471488" y="1937792"/>
+            <a:off x="399480" y="1937792"/>
             <a:ext cx="7344816" cy="3323987"/>
           </a:xfrm>
           <a:prstGeom prst="rect">
@@ -9662,17 +9820,21 @@
             </a:endParaRPr>
           </a:p>
           <a:p>
-            <a:endParaRPr lang="en-US" sz="2000" dirty="0" smtClean="0">
-              <a:latin typeface="Calibri" pitchFamily="34" charset="0"/>
-            </a:endParaRPr>
-          </a:p>
-          <a:p>
+            <a:r>
+              <a:rPr lang="ru-RU" sz="2000" dirty="0" smtClean="0">
+                <a:latin typeface="Calibri" pitchFamily="34" charset="0"/>
+              </a:rPr>
+              <a:t>Задачи подсистемы:</a:t>
+            </a:r>
+          </a:p>
+          <a:p>
+            <a:pPr lvl="1"/>
             <a:endParaRPr lang="ru-RU" sz="2000" dirty="0" smtClean="0">
               <a:latin typeface="Calibri" pitchFamily="34" charset="0"/>
             </a:endParaRPr>
           </a:p>
           <a:p>
-            <a:pPr>
+            <a:pPr lvl="1">
               <a:buFont typeface="Arial" pitchFamily="34" charset="0"/>
               <a:buChar char="•"/>
             </a:pPr>
@@ -9686,11 +9848,20 @@
               <a:rPr lang="ru-RU" sz="2000" b="1" dirty="0" smtClean="0">
                 <a:latin typeface="Calibri" pitchFamily="34" charset="0"/>
               </a:rPr>
-              <a:t>по расписанию;</a:t>
-            </a:r>
-          </a:p>
-          <a:p>
-            <a:pPr>
+              <a:t>по </a:t>
+            </a:r>
+            <a:r>
+              <a:rPr lang="ru-RU" sz="2000" b="1" dirty="0" smtClean="0">
+                <a:latin typeface="Calibri" pitchFamily="34" charset="0"/>
+              </a:rPr>
+              <a:t>расписанию</a:t>
+            </a:r>
+            <a:endParaRPr lang="ru-RU" sz="2000" b="1" dirty="0" smtClean="0">
+              <a:latin typeface="Calibri" pitchFamily="34" charset="0"/>
+            </a:endParaRPr>
+          </a:p>
+          <a:p>
+            <a:pPr lvl="1">
               <a:buFont typeface="Arial" pitchFamily="34" charset="0"/>
               <a:buChar char="•"/>
             </a:pPr>
@@ -9699,7 +9870,7 @@
             </a:endParaRPr>
           </a:p>
           <a:p>
-            <a:pPr>
+            <a:pPr lvl="1">
               <a:buFont typeface="Arial" pitchFamily="34" charset="0"/>
               <a:buChar char="•"/>
             </a:pPr>
@@ -9719,11 +9890,20 @@
               <a:rPr lang="ru-RU" sz="2000" dirty="0" smtClean="0">
                 <a:latin typeface="Calibri" pitchFamily="34" charset="0"/>
               </a:rPr>
-              <a:t> запуск;</a:t>
-            </a:r>
-          </a:p>
-          <a:p>
-            <a:pPr>
+              <a:t> </a:t>
+            </a:r>
+            <a:r>
+              <a:rPr lang="ru-RU" sz="2000" dirty="0" smtClean="0">
+                <a:latin typeface="Calibri" pitchFamily="34" charset="0"/>
+              </a:rPr>
+              <a:t>запуск</a:t>
+            </a:r>
+            <a:endParaRPr lang="ru-RU" sz="2000" dirty="0" smtClean="0">
+              <a:latin typeface="Calibri" pitchFamily="34" charset="0"/>
+            </a:endParaRPr>
+          </a:p>
+          <a:p>
+            <a:pPr lvl="1">
               <a:buFont typeface="Arial" pitchFamily="34" charset="0"/>
               <a:buChar char="•"/>
             </a:pPr>
@@ -9732,7 +9912,7 @@
             </a:endParaRPr>
           </a:p>
           <a:p>
-            <a:pPr>
+            <a:pPr lvl="1">
               <a:buFont typeface="Arial" pitchFamily="34" charset="0"/>
               <a:buChar char="•"/>
             </a:pPr>
@@ -9748,20 +9928,18 @@
               </a:rPr>
               <a:t>делигирование</a:t>
             </a:r>
-            <a:r>
-              <a:rPr lang="ru-RU" sz="2000" dirty="0" smtClean="0">
-                <a:latin typeface="Calibri" pitchFamily="34" charset="0"/>
-              </a:rPr>
-              <a:t>;</a:t>
-            </a:r>
-          </a:p>
-          <a:p>
+            <a:endParaRPr lang="ru-RU" sz="2000" dirty="0" smtClean="0">
+              <a:latin typeface="Calibri" pitchFamily="34" charset="0"/>
+            </a:endParaRPr>
+          </a:p>
+          <a:p>
+            <a:pPr lvl="1"/>
             <a:endParaRPr lang="ru-RU" sz="1000" b="1" dirty="0" smtClean="0">
               <a:latin typeface="Calibri" pitchFamily="34" charset="0"/>
             </a:endParaRPr>
           </a:p>
           <a:p>
-            <a:pPr>
+            <a:pPr lvl="1">
               <a:buFont typeface="Arial" pitchFamily="34" charset="0"/>
               <a:buChar char="•"/>
             </a:pPr>
@@ -9769,8 +9947,17 @@
               <a:rPr lang="ru-RU" sz="2000" b="1" dirty="0" smtClean="0">
                 <a:latin typeface="Calibri" pitchFamily="34" charset="0"/>
               </a:rPr>
-              <a:t> сериализуемость;</a:t>
-            </a:r>
+              <a:t> </a:t>
+            </a:r>
+            <a:r>
+              <a:rPr lang="ru-RU" sz="2000" b="1" dirty="0" smtClean="0">
+                <a:latin typeface="Calibri" pitchFamily="34" charset="0"/>
+              </a:rPr>
+              <a:t>сериализуемость</a:t>
+            </a:r>
+            <a:endParaRPr lang="ru-RU" sz="2000" b="1" dirty="0" smtClean="0">
+              <a:latin typeface="Calibri" pitchFamily="34" charset="0"/>
+            </a:endParaRPr>
           </a:p>
         </p:txBody>
       </p:sp>
@@ -9949,8 +10136,17 @@
               <a:rPr lang="ru-RU" sz="2000" dirty="0" smtClean="0">
                 <a:latin typeface="Calibri" pitchFamily="34" charset="0"/>
               </a:rPr>
-              <a:t> кода каркаса;</a:t>
-            </a:r>
+              <a:t> кода </a:t>
+            </a:r>
+            <a:r>
+              <a:rPr lang="ru-RU" sz="2000" dirty="0" smtClean="0">
+                <a:latin typeface="Calibri" pitchFamily="34" charset="0"/>
+              </a:rPr>
+              <a:t>каркаса</a:t>
+            </a:r>
+            <a:endParaRPr lang="ru-RU" sz="2000" dirty="0" smtClean="0">
+              <a:latin typeface="Calibri" pitchFamily="34" charset="0"/>
+            </a:endParaRPr>
           </a:p>
           <a:p>
             <a:pPr>
@@ -9982,8 +10178,17 @@
               <a:rPr lang="ru-RU" sz="2000" dirty="0" smtClean="0">
                 <a:latin typeface="Calibri" pitchFamily="34" charset="0"/>
               </a:rPr>
-              <a:t> модулей в ОС;</a:t>
-            </a:r>
+              <a:t> модулей в </a:t>
+            </a:r>
+            <a:r>
+              <a:rPr lang="ru-RU" sz="2000" dirty="0" smtClean="0">
+                <a:latin typeface="Calibri" pitchFamily="34" charset="0"/>
+              </a:rPr>
+              <a:t>ОС</a:t>
+            </a:r>
+            <a:endParaRPr lang="ru-RU" sz="2000" dirty="0" smtClean="0">
+              <a:latin typeface="Calibri" pitchFamily="34" charset="0"/>
+            </a:endParaRPr>
           </a:p>
           <a:p>
             <a:pPr>
@@ -10015,7 +10220,13 @@
               <a:rPr lang="ru-RU" sz="2000" dirty="0" smtClean="0">
                 <a:latin typeface="Calibri" pitchFamily="34" charset="0"/>
               </a:rPr>
-              <a:t> файловых операций;</a:t>
+              <a:t> файловых </a:t>
+            </a:r>
+            <a:r>
+              <a:rPr lang="ru-RU" sz="2000" dirty="0" smtClean="0">
+                <a:latin typeface="Calibri" pitchFamily="34" charset="0"/>
+              </a:rPr>
+              <a:t>операций</a:t>
             </a:r>
             <a:endParaRPr lang="ru-RU" sz="2200" dirty="0" smtClean="0">
               <a:latin typeface="Calibri" pitchFamily="34" charset="0"/>
@@ -10394,8 +10605,8 @@
         </p:blipFill>
         <p:spPr>
           <a:xfrm>
-            <a:off x="255464" y="1119832"/>
-            <a:ext cx="9593301" cy="6146552"/>
+            <a:off x="327473" y="1145704"/>
+            <a:ext cx="9505055" cy="6090011"/>
           </a:xfrm>
           <a:prstGeom prst="rect">
             <a:avLst/>
@@ -10514,7 +10725,7 @@
         <p:spPr bwMode="auto">
           <a:xfrm>
             <a:off x="183456" y="1577752"/>
-            <a:ext cx="6912768" cy="5601533"/>
+            <a:ext cx="6912768" cy="5539978"/>
           </a:xfrm>
           <a:prstGeom prst="rect">
             <a:avLst/>
@@ -10555,12 +10766,9 @@
               </a:rPr>
               <a:t>модель</a:t>
             </a:r>
-            <a:r>
-              <a:rPr lang="ru-RU" dirty="0" smtClean="0">
-                <a:latin typeface="Calibri" pitchFamily="34" charset="0"/>
-              </a:rPr>
-              <a:t>;</a:t>
-            </a:r>
+            <a:endParaRPr lang="ru-RU" dirty="0" smtClean="0">
+              <a:latin typeface="Calibri" pitchFamily="34" charset="0"/>
+            </a:endParaRPr>
           </a:p>
           <a:p>
             <a:pPr lvl="1"/>
@@ -10568,8 +10776,17 @@
               <a:rPr lang="ru-RU" sz="1800" dirty="0" smtClean="0">
                 <a:latin typeface="Calibri" pitchFamily="34" charset="0"/>
               </a:rPr>
-              <a:t>Модель распределенной системы с динамически расширяемым функционалом; </a:t>
-            </a:r>
+              <a:t>Модель распределенной системы с динамически расширяемым </a:t>
+            </a:r>
+            <a:r>
+              <a:rPr lang="ru-RU" sz="1800" dirty="0" smtClean="0">
+                <a:latin typeface="Calibri" pitchFamily="34" charset="0"/>
+              </a:rPr>
+              <a:t>функционалом </a:t>
+            </a:r>
+            <a:endParaRPr lang="ru-RU" sz="1800" dirty="0" smtClean="0">
+              <a:latin typeface="Calibri" pitchFamily="34" charset="0"/>
+            </a:endParaRPr>
           </a:p>
           <a:p>
             <a:pPr lvl="1"/>
@@ -10594,12 +10811,9 @@
               </a:rPr>
               <a:t>архитектура</a:t>
             </a:r>
-            <a:r>
-              <a:rPr lang="ru-RU" dirty="0" smtClean="0">
-                <a:latin typeface="Calibri" pitchFamily="34" charset="0"/>
-              </a:rPr>
-              <a:t>;</a:t>
-            </a:r>
+            <a:endParaRPr lang="ru-RU" dirty="0" smtClean="0">
+              <a:latin typeface="Calibri" pitchFamily="34" charset="0"/>
+            </a:endParaRPr>
           </a:p>
           <a:p>
             <a:pPr lvl="1"/>
@@ -10607,8 +10821,17 @@
               <a:rPr lang="ru-RU" sz="1800" dirty="0" smtClean="0">
                 <a:latin typeface="Calibri" pitchFamily="34" charset="0"/>
               </a:rPr>
-              <a:t>Архитектура высоконагруженной распределенной системы мониторинга;</a:t>
-            </a:r>
+              <a:t>Архитектура высоконагруженной распределенной системы </a:t>
+            </a:r>
+            <a:r>
+              <a:rPr lang="ru-RU" sz="1800" dirty="0" smtClean="0">
+                <a:latin typeface="Calibri" pitchFamily="34" charset="0"/>
+              </a:rPr>
+              <a:t>мониторинга</a:t>
+            </a:r>
+            <a:endParaRPr lang="ru-RU" sz="1800" dirty="0" smtClean="0">
+              <a:latin typeface="Calibri" pitchFamily="34" charset="0"/>
+            </a:endParaRPr>
           </a:p>
           <a:p>
             <a:pPr lvl="1"/>
@@ -10633,12 +10856,9 @@
               </a:rPr>
               <a:t>приложения</a:t>
             </a:r>
-            <a:r>
-              <a:rPr lang="ru-RU" dirty="0" smtClean="0">
-                <a:latin typeface="Calibri" pitchFamily="34" charset="0"/>
-              </a:rPr>
-              <a:t>;</a:t>
-            </a:r>
+            <a:endParaRPr lang="ru-RU" dirty="0" smtClean="0">
+              <a:latin typeface="Calibri" pitchFamily="34" charset="0"/>
+            </a:endParaRPr>
           </a:p>
           <a:p>
             <a:pPr marL="457200" lvl="2"/>
@@ -10682,8 +10902,17 @@
               <a:rPr lang="ru-RU" sz="1600" dirty="0" smtClean="0">
                 <a:latin typeface="Calibri" pitchFamily="34" charset="0"/>
               </a:rPr>
-              <a:t> ядра / платформы;</a:t>
-            </a:r>
+              <a:t> ядра / </a:t>
+            </a:r>
+            <a:r>
+              <a:rPr lang="ru-RU" sz="1600" dirty="0" smtClean="0">
+                <a:latin typeface="Calibri" pitchFamily="34" charset="0"/>
+              </a:rPr>
+              <a:t>платформы</a:t>
+            </a:r>
+            <a:endParaRPr lang="ru-RU" sz="1600" dirty="0" smtClean="0">
+              <a:latin typeface="Calibri" pitchFamily="34" charset="0"/>
+            </a:endParaRPr>
           </a:p>
           <a:p>
             <a:pPr marL="914400" lvl="3">
@@ -10694,8 +10923,17 @@
               <a:rPr lang="ru-RU" sz="1600" dirty="0" smtClean="0">
                 <a:latin typeface="Calibri" pitchFamily="34" charset="0"/>
               </a:rPr>
-              <a:t> подсистемы исполнения;</a:t>
-            </a:r>
+              <a:t> подсистемы </a:t>
+            </a:r>
+            <a:r>
+              <a:rPr lang="ru-RU" sz="1600" dirty="0" smtClean="0">
+                <a:latin typeface="Calibri" pitchFamily="34" charset="0"/>
+              </a:rPr>
+              <a:t>исполнения</a:t>
+            </a:r>
+            <a:endParaRPr lang="ru-RU" sz="1600" dirty="0" smtClean="0">
+              <a:latin typeface="Calibri" pitchFamily="34" charset="0"/>
+            </a:endParaRPr>
           </a:p>
           <a:p>
             <a:pPr marL="914400" lvl="3">
@@ -10706,8 +10944,17 @@
               <a:rPr lang="ru-RU" sz="1600" dirty="0" smtClean="0">
                 <a:latin typeface="Calibri" pitchFamily="34" charset="0"/>
               </a:rPr>
-              <a:t> транспортной подсистемы;</a:t>
-            </a:r>
+              <a:t> транспортной </a:t>
+            </a:r>
+            <a:r>
+              <a:rPr lang="ru-RU" sz="1600" dirty="0" smtClean="0">
+                <a:latin typeface="Calibri" pitchFamily="34" charset="0"/>
+              </a:rPr>
+              <a:t>подсистемы</a:t>
+            </a:r>
+            <a:endParaRPr lang="ru-RU" sz="1600" dirty="0" smtClean="0">
+              <a:latin typeface="Calibri" pitchFamily="34" charset="0"/>
+            </a:endParaRPr>
           </a:p>
           <a:p>
             <a:pPr marL="914400" lvl="3">
@@ -10748,8 +10995,17 @@
               <a:rPr lang="ru-RU" sz="1600" dirty="0" smtClean="0">
                 <a:latin typeface="Calibri" pitchFamily="34" charset="0"/>
               </a:rPr>
-              <a:t> кодогенератора;</a:t>
-            </a:r>
+              <a:t> </a:t>
+            </a:r>
+            <a:r>
+              <a:rPr lang="ru-RU" sz="1600" dirty="0" smtClean="0">
+                <a:latin typeface="Calibri" pitchFamily="34" charset="0"/>
+              </a:rPr>
+              <a:t>кодогенератора</a:t>
+            </a:r>
+            <a:endParaRPr lang="ru-RU" sz="1600" dirty="0" smtClean="0">
+              <a:latin typeface="Calibri" pitchFamily="34" charset="0"/>
+            </a:endParaRPr>
           </a:p>
           <a:p>
             <a:pPr marL="914400" lvl="3">
@@ -10760,7 +11016,13 @@
               <a:rPr lang="ru-RU" sz="1600" dirty="0" smtClean="0">
                 <a:latin typeface="Calibri" pitchFamily="34" charset="0"/>
               </a:rPr>
-              <a:t> подсистемы ввода/вывода;</a:t>
+              <a:t> подсистемы </a:t>
+            </a:r>
+            <a:r>
+              <a:rPr lang="ru-RU" sz="1600" dirty="0" smtClean="0">
+                <a:latin typeface="Calibri" pitchFamily="34" charset="0"/>
+              </a:rPr>
+              <a:t>ввода/вывода</a:t>
             </a:r>
           </a:p>
           <a:p>
@@ -10772,7 +11034,7 @@
               <a:rPr lang="ru-RU" sz="1600" dirty="0" smtClean="0">
                 <a:latin typeface="Calibri" pitchFamily="34" charset="0"/>
               </a:rPr>
-              <a:t> исполнителя;</a:t>
+              <a:t> исполнителя</a:t>
             </a:r>
             <a:endParaRPr lang="ru-RU" sz="1800" dirty="0" smtClean="0">
               <a:latin typeface="Calibri" pitchFamily="34" charset="0"/>
@@ -11016,8 +11278,8 @@
         </p:nvSpPr>
         <p:spPr bwMode="auto">
           <a:xfrm>
-            <a:off x="687512" y="2153816"/>
-            <a:ext cx="9217024" cy="4493538"/>
+            <a:off x="543496" y="2153816"/>
+            <a:ext cx="9217024" cy="4154984"/>
           </a:xfrm>
           <a:prstGeom prst="rect">
             <a:avLst/>
@@ -11068,8 +11330,60 @@
               <a:rPr lang="ru-RU" sz="2200" dirty="0" smtClean="0">
                 <a:latin typeface="Calibri" pitchFamily="34" charset="0"/>
               </a:rPr>
-              <a:t>т.д.);</a:t>
-            </a:r>
+              <a:t>т.д</a:t>
+            </a:r>
+            <a:r>
+              <a:rPr lang="ru-RU" sz="2200" dirty="0" smtClean="0">
+                <a:latin typeface="Calibri" pitchFamily="34" charset="0"/>
+              </a:rPr>
+              <a:t>.)</a:t>
+            </a:r>
+            <a:endParaRPr lang="ru-RU" sz="2200" dirty="0" smtClean="0">
+              <a:latin typeface="Calibri" pitchFamily="34" charset="0"/>
+            </a:endParaRPr>
+          </a:p>
+          <a:p>
+            <a:endParaRPr lang="ru-RU" sz="2200" dirty="0" smtClean="0">
+              <a:latin typeface="Calibri" pitchFamily="34" charset="0"/>
+            </a:endParaRPr>
+          </a:p>
+          <a:p>
+            <a:endParaRPr lang="ru-RU" sz="2200" dirty="0" smtClean="0">
+              <a:latin typeface="Calibri" pitchFamily="34" charset="0"/>
+            </a:endParaRPr>
+          </a:p>
+          <a:p>
+            <a:pPr>
+              <a:buFont typeface="Arial" charset="0"/>
+              <a:buChar char="•"/>
+            </a:pPr>
+            <a:r>
+              <a:rPr lang="ru-RU" sz="2200" b="1" dirty="0" smtClean="0">
+                <a:latin typeface="Calibri" pitchFamily="34" charset="0"/>
+              </a:rPr>
+              <a:t> </a:t>
+            </a:r>
+            <a:r>
+              <a:rPr lang="ru-RU" sz="2200" b="1" dirty="0" smtClean="0">
+                <a:latin typeface="Calibri" pitchFamily="34" charset="0"/>
+              </a:rPr>
+              <a:t>совершенствование </a:t>
+            </a:r>
+            <a:r>
+              <a:rPr lang="ru-RU" sz="2200" dirty="0" smtClean="0">
+                <a:latin typeface="Calibri" pitchFamily="34" charset="0"/>
+              </a:rPr>
+              <a:t>компонентов и оптимизация алгоритмов базовой </a:t>
+            </a:r>
+            <a:r>
+              <a:rPr lang="ru-RU" sz="2200" dirty="0" smtClean="0">
+                <a:latin typeface="Calibri" pitchFamily="34" charset="0"/>
+              </a:rPr>
+              <a:t>платформы</a:t>
+            </a:r>
+            <a:endParaRPr lang="ru-RU" sz="2200" dirty="0" smtClean="0">
+              <a:latin typeface="Calibri" pitchFamily="34" charset="0"/>
+            </a:endParaRPr>
           </a:p>
           <a:p>
             <a:pPr>
@@ -11085,95 +11399,44 @@
               <a:buFont typeface="Arial" charset="0"/>
               <a:buChar char="•"/>
             </a:pPr>
-            <a:r>
-              <a:rPr lang="ru-RU" sz="2200" dirty="0" smtClean="0">
-                <a:latin typeface="Calibri" pitchFamily="34" charset="0"/>
-              </a:rPr>
-              <a:t> </a:t>
-            </a:r>
-            <a:r>
-              <a:rPr lang="ru-RU" sz="2200" b="1" dirty="0" smtClean="0">
-                <a:latin typeface="Calibri" pitchFamily="34" charset="0"/>
-              </a:rPr>
-              <a:t>оформление</a:t>
-            </a:r>
-            <a:r>
-              <a:rPr lang="ru-RU" sz="2200" dirty="0" smtClean="0">
-                <a:latin typeface="Calibri" pitchFamily="34" charset="0"/>
-              </a:rPr>
-              <a:t> технической документации </a:t>
-            </a:r>
-            <a:r>
-              <a:rPr lang="en-US" sz="2200" dirty="0" smtClean="0">
-                <a:latin typeface="Calibri" pitchFamily="34" charset="0"/>
-              </a:rPr>
-              <a:t> </a:t>
-            </a:r>
-            <a:r>
-              <a:rPr lang="ru-RU" sz="2200" dirty="0" smtClean="0">
-                <a:latin typeface="Calibri" pitchFamily="34" charset="0"/>
-              </a:rPr>
-              <a:t>и спецификаций программного кода;</a:t>
-            </a:r>
+            <a:endParaRPr lang="ru-RU" sz="2200" dirty="0" smtClean="0">
+              <a:latin typeface="Calibri" pitchFamily="34" charset="0"/>
+            </a:endParaRPr>
           </a:p>
           <a:p>
             <a:pPr>
               <a:buFont typeface="Arial" charset="0"/>
               <a:buChar char="•"/>
             </a:pPr>
-            <a:endParaRPr lang="ru-RU" sz="2200" dirty="0" smtClean="0">
-              <a:latin typeface="Calibri" pitchFamily="34" charset="0"/>
-            </a:endParaRPr>
-          </a:p>
-          <a:p>
-            <a:pPr>
-              <a:buFont typeface="Arial" charset="0"/>
-              <a:buChar char="•"/>
-            </a:pPr>
+            <a:r>
+              <a:rPr lang="ru-RU" sz="2200" dirty="0" smtClean="0">
+                <a:latin typeface="Calibri" pitchFamily="34" charset="0"/>
+              </a:rPr>
+              <a:t> </a:t>
+            </a:r>
+            <a:r>
+              <a:rPr lang="ru-RU" sz="2200" dirty="0" smtClean="0">
+                <a:latin typeface="Calibri" pitchFamily="34" charset="0"/>
+              </a:rPr>
+              <a:t>полномасштабное </a:t>
+            </a:r>
             <a:r>
               <a:rPr lang="ru-RU" sz="2200" b="1" dirty="0" smtClean="0">
                 <a:latin typeface="Calibri" pitchFamily="34" charset="0"/>
               </a:rPr>
-              <a:t> совершенствование </a:t>
+              <a:t>внедрение</a:t>
             </a:r>
             <a:r>
               <a:rPr lang="ru-RU" sz="2200" dirty="0" smtClean="0">
                 <a:latin typeface="Calibri" pitchFamily="34" charset="0"/>
               </a:rPr>
-              <a:t>компонентов и оптимизация алгоритмов базовой платформы;</a:t>
-            </a:r>
-          </a:p>
-          <a:p>
-            <a:pPr>
-              <a:buFont typeface="Arial" charset="0"/>
-              <a:buChar char="•"/>
-            </a:pPr>
-            <a:endParaRPr lang="ru-RU" sz="2200" dirty="0" smtClean="0">
-              <a:latin typeface="Calibri" pitchFamily="34" charset="0"/>
-            </a:endParaRPr>
-          </a:p>
-          <a:p>
-            <a:pPr>
-              <a:buFont typeface="Arial" charset="0"/>
-              <a:buChar char="•"/>
-            </a:pPr>
+              <a:t> и нагрузочное тестирование системы на базе существующей инфраструктуры предприятия, например лаборатории МикроЭВМ </a:t>
+            </a:r>
             <a:r>
               <a:rPr lang="ru-RU" sz="2200" dirty="0" smtClean="0">
                 <a:latin typeface="Calibri" pitchFamily="34" charset="0"/>
               </a:rPr>
-              <a:t>  полномасштабное </a:t>
-            </a:r>
-            <a:r>
-              <a:rPr lang="ru-RU" sz="2200" b="1" dirty="0" smtClean="0">
-                <a:latin typeface="Calibri" pitchFamily="34" charset="0"/>
-              </a:rPr>
-              <a:t>внедрение</a:t>
-            </a:r>
-            <a:r>
-              <a:rPr lang="ru-RU" sz="2200" dirty="0" smtClean="0">
-                <a:latin typeface="Calibri" pitchFamily="34" charset="0"/>
-              </a:rPr>
-              <a:t> и нагрузочное тестирование системы на базе существующей инфраструктуры предприятия, например лаборатории МикроЭВМ АлтГТУ;</a:t>
+              <a:t>АлтГТУ</a:t>
             </a:r>
             <a:endParaRPr lang="en-US" sz="2200" dirty="0">
               <a:latin typeface="Calibri" pitchFamily="34" charset="0"/>
@@ -12134,7 +12397,13 @@
               <a:rPr lang="ru-RU" sz="2000" dirty="0" smtClean="0">
                 <a:latin typeface="Calibri" pitchFamily="34" charset="0"/>
               </a:rPr>
-              <a:t>сохраняюшщая сообщения об изменении этого состояния в хранилище данных.</a:t>
+              <a:t>сохраняющая </a:t>
+            </a:r>
+            <a:r>
+              <a:rPr lang="ru-RU" sz="2000" dirty="0" smtClean="0">
+                <a:latin typeface="Calibri" pitchFamily="34" charset="0"/>
+              </a:rPr>
+              <a:t>сообщения об изменении этого состояния в хранилище данных.</a:t>
             </a:r>
             <a:endParaRPr lang="ru-RU" sz="2000" dirty="0"/>
           </a:p>
@@ -12264,7 +12533,43 @@
               <a:rPr lang="ru-RU" sz="2000" dirty="0" smtClean="0">
                 <a:latin typeface="Calibri" pitchFamily="34" charset="0"/>
               </a:rPr>
-              <a:t>- пассивная сущностью, предоставляющая службам ресурсы для приема  сообщений их последующей обработки и хранения.</a:t>
+              <a:t>- пассивная </a:t>
+            </a:r>
+            <a:r>
+              <a:rPr lang="ru-RU" sz="2000" dirty="0" smtClean="0">
+                <a:latin typeface="Calibri" pitchFamily="34" charset="0"/>
+              </a:rPr>
+              <a:t>сущность, </a:t>
+            </a:r>
+            <a:r>
+              <a:rPr lang="ru-RU" sz="2000" dirty="0" smtClean="0">
+                <a:latin typeface="Calibri" pitchFamily="34" charset="0"/>
+              </a:rPr>
+              <a:t>предоставляющая службам ресурсы для приема  </a:t>
+            </a:r>
+            <a:r>
+              <a:rPr lang="ru-RU" sz="2000" dirty="0" smtClean="0">
+                <a:latin typeface="Calibri" pitchFamily="34" charset="0"/>
+              </a:rPr>
+              <a:t>сообщений</a:t>
+            </a:r>
+            <a:r>
+              <a:rPr lang="en-US" sz="2000" dirty="0" smtClean="0">
+                <a:latin typeface="Calibri" pitchFamily="34" charset="0"/>
+              </a:rPr>
+              <a:t>, </a:t>
+            </a:r>
+            <a:r>
+              <a:rPr lang="ru-RU" sz="2000" dirty="0" smtClean="0">
+                <a:latin typeface="Calibri" pitchFamily="34" charset="0"/>
+              </a:rPr>
+              <a:t>их </a:t>
+            </a:r>
+            <a:r>
+              <a:rPr lang="ru-RU" sz="2000" dirty="0" smtClean="0">
+                <a:latin typeface="Calibri" pitchFamily="34" charset="0"/>
+              </a:rPr>
+              <a:t>последующей обработки и хранения.</a:t>
             </a:r>
             <a:endParaRPr lang="ru-RU" sz="2000" dirty="0">
               <a:latin typeface="Calibri" pitchFamily="34" charset="0"/>
@@ -13205,8 +13510,17 @@
               <a:rPr lang="ru-RU" sz="2000" dirty="0">
                 <a:latin typeface="Calibri" pitchFamily="34" charset="0"/>
               </a:rPr>
-              <a:t> на узлы;</a:t>
-            </a:r>
+              <a:t> на </a:t>
+            </a:r>
+            <a:r>
+              <a:rPr lang="ru-RU" sz="2000" dirty="0" smtClean="0">
+                <a:latin typeface="Calibri" pitchFamily="34" charset="0"/>
+              </a:rPr>
+              <a:t>узлы.</a:t>
+            </a:r>
+            <a:endParaRPr lang="ru-RU" sz="2000" dirty="0">
+              <a:latin typeface="Calibri" pitchFamily="34" charset="0"/>
+            </a:endParaRPr>
           </a:p>
         </p:txBody>
       </p:sp>
@@ -13268,14 +13582,23 @@
               <a:rPr lang="ru-RU" sz="2000" b="1" dirty="0">
                 <a:latin typeface="Calibri" pitchFamily="34" charset="0"/>
               </a:rPr>
-              <a:t>индекс производительности</a:t>
+              <a:t>индекс </a:t>
+            </a:r>
+            <a:r>
+              <a:rPr lang="ru-RU" sz="2000" b="1" dirty="0" smtClean="0">
+                <a:latin typeface="Calibri" pitchFamily="34" charset="0"/>
+              </a:rPr>
+              <a:t>производительности</a:t>
             </a:r>
             <a:r>
               <a:rPr lang="ru-RU" sz="2000" dirty="0">
                 <a:latin typeface="Calibri" pitchFamily="34" charset="0"/>
               </a:rPr>
-              <a:t>;</a:t>
-            </a:r>
+              <a:t>.</a:t>
+            </a:r>
+            <a:endParaRPr lang="ru-RU" sz="2000" dirty="0">
+              <a:latin typeface="Calibri" pitchFamily="34" charset="0"/>
+            </a:endParaRPr>
           </a:p>
         </p:txBody>
       </p:sp>
@@ -13337,17 +13660,14 @@
               <a:t> </a:t>
             </a:r>
             <a:r>
-              <a:rPr lang="ru-RU" sz="2000" b="1" dirty="0">
+              <a:rPr lang="ru-RU" sz="2000" b="1" dirty="0" smtClean="0">
                 <a:latin typeface="Calibri" pitchFamily="34" charset="0"/>
               </a:rPr>
               <a:t>масштабируемость</a:t>
             </a:r>
-            <a:r>
-              <a:rPr lang="ru-RU" sz="2000" dirty="0">
-                <a:latin typeface="Calibri" pitchFamily="34" charset="0"/>
-              </a:rPr>
-              <a:t>;</a:t>
-            </a:r>
+            <a:endParaRPr lang="ru-RU" sz="2000" dirty="0">
+              <a:latin typeface="Calibri" pitchFamily="34" charset="0"/>
+            </a:endParaRPr>
           </a:p>
           <a:p>
             <a:pPr>
@@ -13361,17 +13681,14 @@
               <a:t> </a:t>
             </a:r>
             <a:r>
-              <a:rPr lang="ru-RU" sz="2000" b="1" dirty="0">
+              <a:rPr lang="ru-RU" sz="2000" b="1" dirty="0" smtClean="0">
                 <a:latin typeface="Calibri" pitchFamily="34" charset="0"/>
               </a:rPr>
               <a:t>сериализуемость</a:t>
             </a:r>
-            <a:r>
-              <a:rPr lang="ru-RU" sz="2000" dirty="0">
-                <a:latin typeface="Calibri" pitchFamily="34" charset="0"/>
-              </a:rPr>
-              <a:t>;</a:t>
-            </a:r>
+            <a:endParaRPr lang="ru-RU" sz="2000" dirty="0">
+              <a:latin typeface="Calibri" pitchFamily="34" charset="0"/>
+            </a:endParaRPr>
           </a:p>
           <a:p>
             <a:pPr>
@@ -13385,16 +13702,10 @@
               <a:t> </a:t>
             </a:r>
             <a:r>
-              <a:rPr lang="ru-RU" sz="2000" b="1" dirty="0">
+              <a:rPr lang="ru-RU" sz="2000" b="1" dirty="0" smtClean="0">
                 <a:latin typeface="Calibri" pitchFamily="34" charset="0"/>
               </a:rPr>
               <a:t>переносимость</a:t>
-            </a:r>
-            <a:r>
-              <a:rPr lang="ru-RU" sz="2000" dirty="0">
-                <a:latin typeface="Calibri" pitchFamily="34" charset="0"/>
-              </a:rPr>
-              <a:t>;</a:t>
             </a:r>
             <a:endParaRPr lang="ru-RU" dirty="0"/>
           </a:p>
@@ -14241,8 +14552,17 @@
               <a:rPr lang="ru-RU" sz="2000" dirty="0" smtClean="0">
                 <a:latin typeface="Calibri" pitchFamily="34" charset="0"/>
               </a:rPr>
-              <a:t>обеспечение работы основных подсистем;</a:t>
-            </a:r>
+              <a:t>обеспечение работы основных </a:t>
+            </a:r>
+            <a:r>
+              <a:rPr lang="ru-RU" sz="2000" dirty="0" smtClean="0">
+                <a:latin typeface="Calibri" pitchFamily="34" charset="0"/>
+              </a:rPr>
+              <a:t>подсистем</a:t>
+            </a:r>
+            <a:endParaRPr lang="ru-RU" sz="2000" dirty="0" smtClean="0">
+              <a:latin typeface="Calibri" pitchFamily="34" charset="0"/>
+            </a:endParaRPr>
           </a:p>
           <a:p>
             <a:pPr>
@@ -14253,8 +14573,17 @@
               <a:rPr lang="ru-RU" sz="2000" dirty="0" smtClean="0">
                 <a:latin typeface="Calibri" pitchFamily="34" charset="0"/>
               </a:rPr>
-              <a:t> распределенная коммуникация;</a:t>
-            </a:r>
+              <a:t> распределенная </a:t>
+            </a:r>
+            <a:r>
+              <a:rPr lang="ru-RU" sz="2000" dirty="0" smtClean="0">
+                <a:latin typeface="Calibri" pitchFamily="34" charset="0"/>
+              </a:rPr>
+              <a:t>коммуникация</a:t>
+            </a:r>
+            <a:endParaRPr lang="ru-RU" sz="2000" dirty="0" smtClean="0">
+              <a:latin typeface="Calibri" pitchFamily="34" charset="0"/>
+            </a:endParaRPr>
           </a:p>
           <a:p>
             <a:pPr>
@@ -14265,7 +14594,13 @@
               <a:rPr lang="ru-RU" sz="2000" dirty="0" smtClean="0">
                 <a:latin typeface="Calibri" pitchFamily="34" charset="0"/>
               </a:rPr>
-              <a:t> планирование и запуск модулей;</a:t>
+              <a:t> планирование и запуск </a:t>
+            </a:r>
+            <a:r>
+              <a:rPr lang="ru-RU" sz="2000" dirty="0" smtClean="0">
+                <a:latin typeface="Calibri" pitchFamily="34" charset="0"/>
+              </a:rPr>
+              <a:t>модулей</a:t>
             </a:r>
             <a:endParaRPr lang="ru-RU" sz="2000" dirty="0">
               <a:latin typeface="Calibri" pitchFamily="34" charset="0"/>
@@ -14339,13 +14674,13 @@
               <a:rPr lang="ru-RU" sz="2000" dirty="0" smtClean="0">
                 <a:latin typeface="Calibri" pitchFamily="34" charset="0"/>
               </a:rPr>
-              <a:t> платформа (ядро);</a:t>
-            </a:r>
-            <a:r>
-              <a:rPr lang="en-US" sz="2000" dirty="0" smtClean="0">
-                <a:latin typeface="Calibri" pitchFamily="34" charset="0"/>
-              </a:rPr>
-              <a:t> </a:t>
+              <a:t> платформа (ядро</a:t>
+            </a:r>
+            <a:r>
+              <a:rPr lang="ru-RU" sz="2000" dirty="0" smtClean="0">
+                <a:latin typeface="Calibri" pitchFamily="34" charset="0"/>
+              </a:rPr>
+              <a:t>)</a:t>
             </a:r>
             <a:endParaRPr lang="ru-RU" sz="2000" dirty="0" smtClean="0">
               <a:latin typeface="Calibri" pitchFamily="34" charset="0"/>
@@ -14360,8 +14695,17 @@
               <a:rPr lang="ru-RU" sz="2000" dirty="0" smtClean="0">
                 <a:latin typeface="Calibri" pitchFamily="34" charset="0"/>
               </a:rPr>
-              <a:t> транспортная;</a:t>
-            </a:r>
+              <a:t> </a:t>
+            </a:r>
+            <a:r>
+              <a:rPr lang="ru-RU" sz="2000" dirty="0" smtClean="0">
+                <a:latin typeface="Calibri" pitchFamily="34" charset="0"/>
+              </a:rPr>
+              <a:t>транспортная</a:t>
+            </a:r>
+            <a:endParaRPr lang="ru-RU" sz="2000" dirty="0" smtClean="0">
+              <a:latin typeface="Calibri" pitchFamily="34" charset="0"/>
+            </a:endParaRPr>
           </a:p>
           <a:p>
             <a:pPr>
@@ -14372,7 +14716,13 @@
               <a:rPr lang="ru-RU" sz="2000" dirty="0" smtClean="0">
                 <a:latin typeface="Calibri" pitchFamily="34" charset="0"/>
               </a:rPr>
-              <a:t> исполнительная;</a:t>
+              <a:t> </a:t>
+            </a:r>
+            <a:r>
+              <a:rPr lang="ru-RU" sz="2000" dirty="0" smtClean="0">
+                <a:latin typeface="Calibri" pitchFamily="34" charset="0"/>
+              </a:rPr>
+              <a:t>исполнительная</a:t>
             </a:r>
             <a:endParaRPr lang="ru-RU" sz="2000" dirty="0">
               <a:latin typeface="Calibri" pitchFamily="34" charset="0"/>
@@ -14636,7 +14986,31 @@
               <a:rPr lang="ru-RU" sz="2000" dirty="0" smtClean="0">
                 <a:latin typeface="Calibri" pitchFamily="34" charset="0"/>
               </a:rPr>
-              <a:t> – набор примитивов и механизмов используемых подсистемами службы. </a:t>
+              <a:t> – набор примитивов и </a:t>
+            </a:r>
+            <a:r>
+              <a:rPr lang="ru-RU" sz="2000" dirty="0" smtClean="0">
+                <a:latin typeface="Calibri" pitchFamily="34" charset="0"/>
+              </a:rPr>
+              <a:t>механизмов</a:t>
+            </a:r>
+            <a:r>
+              <a:rPr lang="en-US" sz="2000" dirty="0" smtClean="0">
+                <a:latin typeface="Calibri" pitchFamily="34" charset="0"/>
+              </a:rPr>
+              <a:t>,</a:t>
+            </a:r>
+            <a:r>
+              <a:rPr lang="ru-RU" sz="2000" dirty="0" smtClean="0">
+                <a:latin typeface="Calibri" pitchFamily="34" charset="0"/>
+              </a:rPr>
+              <a:t> </a:t>
+            </a:r>
+            <a:r>
+              <a:rPr lang="ru-RU" sz="2000" dirty="0" smtClean="0">
+                <a:latin typeface="Calibri" pitchFamily="34" charset="0"/>
+              </a:rPr>
+              <a:t>используемых подсистемами службы. </a:t>
             </a:r>
             <a:endParaRPr lang="ru-RU" sz="2000" dirty="0">
               <a:latin typeface="Calibri" pitchFamily="34" charset="0"/>
@@ -14690,12 +15064,9 @@
               </a:rPr>
               <a:t>драйверами</a:t>
             </a:r>
-            <a:r>
-              <a:rPr lang="ru-RU" sz="2000" b="1" dirty="0" smtClean="0">
-                <a:latin typeface="Calibri" pitchFamily="34" charset="0"/>
-              </a:rPr>
-              <a:t>;</a:t>
-            </a:r>
+            <a:endParaRPr lang="ru-RU" sz="2000" b="1" dirty="0" smtClean="0">
+              <a:latin typeface="Calibri" pitchFamily="34" charset="0"/>
+            </a:endParaRPr>
           </a:p>
           <a:p>
             <a:pPr>
@@ -14721,8 +15092,17 @@
               <a:rPr lang="ru-RU" sz="2000" dirty="0" smtClean="0">
                 <a:latin typeface="Calibri" pitchFamily="34" charset="0"/>
               </a:rPr>
-              <a:t> событий;</a:t>
-            </a:r>
+              <a:t> </a:t>
+            </a:r>
+            <a:r>
+              <a:rPr lang="ru-RU" sz="2000" dirty="0" smtClean="0">
+                <a:latin typeface="Calibri" pitchFamily="34" charset="0"/>
+              </a:rPr>
+              <a:t>событий</a:t>
+            </a:r>
+            <a:endParaRPr lang="ru-RU" sz="2000" dirty="0" smtClean="0">
+              <a:latin typeface="Calibri" pitchFamily="34" charset="0"/>
+            </a:endParaRPr>
           </a:p>
           <a:p>
             <a:pPr>
@@ -14748,8 +15128,17 @@
               <a:rPr lang="ru-RU" sz="2000" dirty="0" smtClean="0">
                 <a:latin typeface="Calibri" pitchFamily="34" charset="0"/>
               </a:rPr>
-              <a:t> адаптерами;</a:t>
-            </a:r>
+              <a:t> </a:t>
+            </a:r>
+            <a:r>
+              <a:rPr lang="ru-RU" sz="2000" dirty="0" smtClean="0">
+                <a:latin typeface="Calibri" pitchFamily="34" charset="0"/>
+              </a:rPr>
+              <a:t>адаптерами</a:t>
+            </a:r>
+            <a:endParaRPr lang="ru-RU" sz="2000" dirty="0" smtClean="0">
+              <a:latin typeface="Calibri" pitchFamily="34" charset="0"/>
+            </a:endParaRPr>
           </a:p>
           <a:p>
             <a:pPr>
@@ -14781,8 +15170,17 @@
               <a:rPr lang="ru-RU" sz="2000" dirty="0" smtClean="0">
                 <a:latin typeface="Calibri" pitchFamily="34" charset="0"/>
               </a:rPr>
-              <a:t> сессий;</a:t>
-            </a:r>
+              <a:t> </a:t>
+            </a:r>
+            <a:r>
+              <a:rPr lang="ru-RU" sz="2000" dirty="0" smtClean="0">
+                <a:latin typeface="Calibri" pitchFamily="34" charset="0"/>
+              </a:rPr>
+              <a:t>сессий</a:t>
+            </a:r>
+            <a:endParaRPr lang="ru-RU" sz="2000" dirty="0" smtClean="0">
+              <a:latin typeface="Calibri" pitchFamily="34" charset="0"/>
+            </a:endParaRPr>
           </a:p>
           <a:p>
             <a:pPr>
@@ -14814,8 +15212,17 @@
               <a:rPr lang="ru-RU" sz="2000" dirty="0" smtClean="0">
                 <a:latin typeface="Calibri" pitchFamily="34" charset="0"/>
               </a:rPr>
-              <a:t> потоков;</a:t>
-            </a:r>
+              <a:t> </a:t>
+            </a:r>
+            <a:r>
+              <a:rPr lang="ru-RU" sz="2000" dirty="0" smtClean="0">
+                <a:latin typeface="Calibri" pitchFamily="34" charset="0"/>
+              </a:rPr>
+              <a:t>потоков</a:t>
+            </a:r>
+            <a:endParaRPr lang="ru-RU" sz="2000" dirty="0" smtClean="0">
+              <a:latin typeface="Calibri" pitchFamily="34" charset="0"/>
+            </a:endParaRPr>
           </a:p>
         </p:txBody>
       </p:sp>
@@ -15058,8 +15465,17 @@
               <a:rPr lang="ru-RU" sz="2000" dirty="0" smtClean="0">
                 <a:latin typeface="Calibri" pitchFamily="34" charset="0"/>
               </a:rPr>
-              <a:t> унифицированный протокол обмена данными между драйверами;</a:t>
-            </a:r>
+              <a:t> унифицированный протокол обмена данными между </a:t>
+            </a:r>
+            <a:r>
+              <a:rPr lang="ru-RU" sz="2000" dirty="0" smtClean="0">
+                <a:latin typeface="Calibri" pitchFamily="34" charset="0"/>
+              </a:rPr>
+              <a:t>драйверами</a:t>
+            </a:r>
+            <a:endParaRPr lang="ru-RU" sz="2000" dirty="0" smtClean="0">
+              <a:latin typeface="Calibri" pitchFamily="34" charset="0"/>
+            </a:endParaRPr>
           </a:p>
           <a:p>
             <a:pPr lvl="1">
@@ -15070,7 +15486,25 @@
               <a:rPr lang="ru-RU" sz="2000" dirty="0" smtClean="0">
                 <a:latin typeface="Calibri" pitchFamily="34" charset="0"/>
               </a:rPr>
-              <a:t> меманизм изменения состояния ядра;</a:t>
+              <a:t> </a:t>
+            </a:r>
+            <a:r>
+              <a:rPr lang="ru-RU" sz="2000" dirty="0" smtClean="0">
+                <a:latin typeface="Calibri" pitchFamily="34" charset="0"/>
+              </a:rPr>
+              <a:t>механизм </a:t>
+            </a:r>
+            <a:r>
+              <a:rPr lang="ru-RU" sz="2000" dirty="0" smtClean="0">
+                <a:latin typeface="Calibri" pitchFamily="34" charset="0"/>
+              </a:rPr>
+              <a:t>изменения состояния </a:t>
+            </a:r>
+            <a:r>
+              <a:rPr lang="ru-RU" sz="2000" dirty="0" smtClean="0">
+                <a:latin typeface="Calibri" pitchFamily="34" charset="0"/>
+              </a:rPr>
+              <a:t>ядра</a:t>
             </a:r>
             <a:endParaRPr lang="ru-RU" sz="2000" dirty="0">
               <a:latin typeface="Calibri" pitchFamily="34" charset="0"/>

</xml_diff>